<commit_message>
update slides and screenshots
</commit_message>
<xml_diff>
--- a/Slides/Diapos_Suivit_projet.pptx
+++ b/Slides/Diapos_Suivit_projet.pptx
@@ -3654,989 +3654,6 @@
       <dsp:cNvGrpSpPr/>
     </dsp:nvGrpSpPr>
     <dsp:grpSpPr/>
-    <dsp:sp modelId="{68AC0C8C-6683-4490-8F38-983C8CB47C3F}">
-      <dsp:nvSpPr>
-        <dsp:cNvPr id="0" name=""/>
-        <dsp:cNvSpPr/>
-      </dsp:nvSpPr>
-      <dsp:spPr>
-        <a:xfrm>
-          <a:off x="3454528" y="2411770"/>
-          <a:ext cx="1752080" cy="1134951"/>
-        </a:xfrm>
-        <a:prstGeom prst="roundRect">
-          <a:avLst>
-            <a:gd name="adj" fmla="val 10000"/>
-          </a:avLst>
-        </a:prstGeom>
-        <a:solidFill>
-          <a:schemeClr val="lt1">
-            <a:alpha val="90000"/>
-            <a:hueOff val="0"/>
-            <a:satOff val="0"/>
-            <a:lumOff val="0"/>
-            <a:alphaOff val="0"/>
-          </a:schemeClr>
-        </a:solidFill>
-        <a:ln w="6350" cap="flat" cmpd="sng" algn="ctr">
-          <a:solidFill>
-            <a:schemeClr val="accent4">
-              <a:hueOff val="0"/>
-              <a:satOff val="0"/>
-              <a:lumOff val="0"/>
-              <a:alphaOff val="0"/>
-            </a:schemeClr>
-          </a:solidFill>
-          <a:prstDash val="solid"/>
-          <a:miter lim="800000"/>
-        </a:ln>
-        <a:effectLst/>
-        <a:scene3d>
-          <a:camera prst="orthographicFront"/>
-          <a:lightRig rig="flat" dir="t"/>
-        </a:scene3d>
-        <a:sp3d z="-190500" extrusionH="12700" prstMaterial="plastic">
-          <a:bevelT w="50800" h="50800"/>
-        </a:sp3d>
-      </dsp:spPr>
-      <dsp:style>
-        <a:lnRef idx="1">
-          <a:scrgbClr r="0" g="0" b="0"/>
-        </a:lnRef>
-        <a:fillRef idx="1">
-          <a:scrgbClr r="0" g="0" b="0"/>
-        </a:fillRef>
-        <a:effectRef idx="2">
-          <a:scrgbClr r="0" g="0" b="0"/>
-        </a:effectRef>
-        <a:fontRef idx="minor"/>
-      </dsp:style>
-      <dsp:txBody>
-        <a:bodyPr spcFirstLastPara="0" vert="horz" wrap="square" lIns="45720" tIns="45720" rIns="45720" bIns="45720" numCol="1" spcCol="1270" anchor="t" anchorCtr="0">
-          <a:noAutofit/>
-        </a:bodyPr>
-        <a:lstStyle/>
-        <a:p>
-          <a:pPr marL="57150" lvl="1" indent="-57150" algn="l" defTabSz="400050">
-            <a:lnSpc>
-              <a:spcPct val="90000"/>
-            </a:lnSpc>
-            <a:spcBef>
-              <a:spcPct val="0"/>
-            </a:spcBef>
-            <a:spcAft>
-              <a:spcPct val="15000"/>
-            </a:spcAft>
-            <a:buChar char="••"/>
-          </a:pPr>
-          <a:r>
-            <a:rPr lang="fr-FR" sz="900" kern="1200" dirty="0" smtClean="0"/>
-            <a:t>Risque de forte demande (serveur)</a:t>
-          </a:r>
-          <a:endParaRPr lang="fr-FR" sz="900" kern="1200" dirty="0"/>
-        </a:p>
-        <a:p>
-          <a:pPr marL="57150" lvl="1" indent="-57150" algn="l" defTabSz="400050">
-            <a:lnSpc>
-              <a:spcPct val="90000"/>
-            </a:lnSpc>
-            <a:spcBef>
-              <a:spcPct val="0"/>
-            </a:spcBef>
-            <a:spcAft>
-              <a:spcPct val="15000"/>
-            </a:spcAft>
-            <a:buChar char="••"/>
-          </a:pPr>
-          <a:r>
-            <a:rPr lang="fr-FR" sz="900" kern="1200" dirty="0" smtClean="0"/>
-            <a:t>Protection des données (temporaires)</a:t>
-          </a:r>
-          <a:endParaRPr lang="fr-FR" sz="900" kern="1200" dirty="0"/>
-        </a:p>
-      </dsp:txBody>
-      <dsp:txXfrm>
-        <a:off x="4005083" y="2720439"/>
-        <a:ext cx="1176594" cy="801351"/>
-      </dsp:txXfrm>
-    </dsp:sp>
-    <dsp:sp modelId="{431C4C2F-7F42-4D62-8EEF-918E7AD22EA0}">
-      <dsp:nvSpPr>
-        <dsp:cNvPr id="0" name=""/>
-        <dsp:cNvSpPr/>
-      </dsp:nvSpPr>
-      <dsp:spPr>
-        <a:xfrm>
-          <a:off x="565296" y="2411770"/>
-          <a:ext cx="1752080" cy="1134951"/>
-        </a:xfrm>
-        <a:prstGeom prst="roundRect">
-          <a:avLst>
-            <a:gd name="adj" fmla="val 10000"/>
-          </a:avLst>
-        </a:prstGeom>
-        <a:solidFill>
-          <a:schemeClr val="lt1">
-            <a:alpha val="90000"/>
-            <a:hueOff val="0"/>
-            <a:satOff val="0"/>
-            <a:lumOff val="0"/>
-            <a:alphaOff val="0"/>
-          </a:schemeClr>
-        </a:solidFill>
-        <a:ln w="6350" cap="flat" cmpd="sng" algn="ctr">
-          <a:solidFill>
-            <a:schemeClr val="accent5">
-              <a:hueOff val="0"/>
-              <a:satOff val="0"/>
-              <a:lumOff val="0"/>
-              <a:alphaOff val="0"/>
-            </a:schemeClr>
-          </a:solidFill>
-          <a:prstDash val="solid"/>
-          <a:miter lim="800000"/>
-        </a:ln>
-        <a:effectLst/>
-        <a:scene3d>
-          <a:camera prst="orthographicFront"/>
-          <a:lightRig rig="flat" dir="t"/>
-        </a:scene3d>
-        <a:sp3d z="-190500" extrusionH="12700" prstMaterial="plastic">
-          <a:bevelT w="50800" h="50800"/>
-        </a:sp3d>
-      </dsp:spPr>
-      <dsp:style>
-        <a:lnRef idx="1">
-          <a:scrgbClr r="0" g="0" b="0"/>
-        </a:lnRef>
-        <a:fillRef idx="1">
-          <a:scrgbClr r="0" g="0" b="0"/>
-        </a:fillRef>
-        <a:effectRef idx="2">
-          <a:scrgbClr r="0" g="0" b="0"/>
-        </a:effectRef>
-        <a:fontRef idx="minor"/>
-      </dsp:style>
-      <dsp:txBody>
-        <a:bodyPr spcFirstLastPara="0" vert="horz" wrap="square" lIns="45720" tIns="45720" rIns="45720" bIns="45720" numCol="1" spcCol="1270" anchor="t" anchorCtr="0">
-          <a:noAutofit/>
-        </a:bodyPr>
-        <a:lstStyle/>
-        <a:p>
-          <a:pPr marL="57150" lvl="1" indent="-57150" algn="l" defTabSz="400050">
-            <a:lnSpc>
-              <a:spcPct val="90000"/>
-            </a:lnSpc>
-            <a:spcBef>
-              <a:spcPct val="0"/>
-            </a:spcBef>
-            <a:spcAft>
-              <a:spcPct val="15000"/>
-            </a:spcAft>
-            <a:buChar char="••"/>
-          </a:pPr>
-          <a:r>
-            <a:rPr lang="fr-FR" sz="900" kern="1200" dirty="0" smtClean="0"/>
-            <a:t>Pas de concurrents</a:t>
-          </a:r>
-          <a:endParaRPr lang="fr-FR" sz="900" kern="1200" dirty="0"/>
-        </a:p>
-        <a:p>
-          <a:pPr marL="57150" lvl="1" indent="-57150" algn="l" defTabSz="400050">
-            <a:lnSpc>
-              <a:spcPct val="90000"/>
-            </a:lnSpc>
-            <a:spcBef>
-              <a:spcPct val="0"/>
-            </a:spcBef>
-            <a:spcAft>
-              <a:spcPct val="15000"/>
-            </a:spcAft>
-            <a:buChar char="••"/>
-          </a:pPr>
-          <a:r>
-            <a:rPr lang="fr-FR" sz="900" kern="1200" dirty="0" smtClean="0"/>
-            <a:t>Grande utilité</a:t>
-          </a:r>
-          <a:endParaRPr lang="fr-FR" sz="900" kern="1200" dirty="0"/>
-        </a:p>
-      </dsp:txBody>
-      <dsp:txXfrm>
-        <a:off x="590227" y="2720439"/>
-        <a:ext cx="1176594" cy="801351"/>
-      </dsp:txXfrm>
-    </dsp:sp>
-    <dsp:sp modelId="{05478942-E273-4856-8553-F0FD8F015AA2}">
-      <dsp:nvSpPr>
-        <dsp:cNvPr id="0" name=""/>
-        <dsp:cNvSpPr/>
-      </dsp:nvSpPr>
-      <dsp:spPr>
-        <a:xfrm>
-          <a:off x="3454528" y="0"/>
-          <a:ext cx="1752080" cy="1134951"/>
-        </a:xfrm>
-        <a:prstGeom prst="roundRect">
-          <a:avLst>
-            <a:gd name="adj" fmla="val 10000"/>
-          </a:avLst>
-        </a:prstGeom>
-        <a:solidFill>
-          <a:schemeClr val="lt1">
-            <a:alpha val="90000"/>
-            <a:hueOff val="0"/>
-            <a:satOff val="0"/>
-            <a:lumOff val="0"/>
-            <a:alphaOff val="0"/>
-          </a:schemeClr>
-        </a:solidFill>
-        <a:ln w="6350" cap="flat" cmpd="sng" algn="ctr">
-          <a:solidFill>
-            <a:schemeClr val="accent3">
-              <a:hueOff val="0"/>
-              <a:satOff val="0"/>
-              <a:lumOff val="0"/>
-              <a:alphaOff val="0"/>
-            </a:schemeClr>
-          </a:solidFill>
-          <a:prstDash val="solid"/>
-          <a:miter lim="800000"/>
-        </a:ln>
-        <a:effectLst/>
-        <a:scene3d>
-          <a:camera prst="orthographicFront"/>
-          <a:lightRig rig="flat" dir="t"/>
-        </a:scene3d>
-        <a:sp3d z="-190500" extrusionH="12700" prstMaterial="plastic">
-          <a:bevelT w="50800" h="50800"/>
-        </a:sp3d>
-      </dsp:spPr>
-      <dsp:style>
-        <a:lnRef idx="1">
-          <a:scrgbClr r="0" g="0" b="0"/>
-        </a:lnRef>
-        <a:fillRef idx="1">
-          <a:scrgbClr r="0" g="0" b="0"/>
-        </a:fillRef>
-        <a:effectRef idx="2">
-          <a:scrgbClr r="0" g="0" b="0"/>
-        </a:effectRef>
-        <a:fontRef idx="minor"/>
-      </dsp:style>
-      <dsp:txBody>
-        <a:bodyPr spcFirstLastPara="0" vert="horz" wrap="square" lIns="45720" tIns="45720" rIns="45720" bIns="45720" numCol="1" spcCol="1270" anchor="t" anchorCtr="0">
-          <a:noAutofit/>
-        </a:bodyPr>
-        <a:lstStyle/>
-        <a:p>
-          <a:pPr marL="57150" lvl="1" indent="-57150" algn="l" defTabSz="400050">
-            <a:lnSpc>
-              <a:spcPct val="90000"/>
-            </a:lnSpc>
-            <a:spcBef>
-              <a:spcPct val="0"/>
-            </a:spcBef>
-            <a:spcAft>
-              <a:spcPct val="15000"/>
-            </a:spcAft>
-            <a:buChar char="••"/>
-          </a:pPr>
-          <a:r>
-            <a:rPr lang="fr-FR" sz="900" kern="1200" dirty="0" smtClean="0"/>
-            <a:t>Deadlines courtes</a:t>
-          </a:r>
-          <a:endParaRPr lang="fr-FR" sz="900" kern="1200" dirty="0"/>
-        </a:p>
-        <a:p>
-          <a:pPr marL="57150" lvl="1" indent="-57150" algn="l" defTabSz="400050">
-            <a:lnSpc>
-              <a:spcPct val="90000"/>
-            </a:lnSpc>
-            <a:spcBef>
-              <a:spcPct val="0"/>
-            </a:spcBef>
-            <a:spcAft>
-              <a:spcPct val="15000"/>
-            </a:spcAft>
-            <a:buChar char="••"/>
-          </a:pPr>
-          <a:r>
-            <a:rPr lang="fr-FR" sz="900" kern="1200" dirty="0" smtClean="0"/>
-            <a:t>Faible documentation</a:t>
-          </a:r>
-          <a:endParaRPr lang="fr-FR" sz="900" kern="1200" dirty="0"/>
-        </a:p>
-      </dsp:txBody>
-      <dsp:txXfrm>
-        <a:off x="4005083" y="24931"/>
-        <a:ext cx="1176594" cy="801351"/>
-      </dsp:txXfrm>
-    </dsp:sp>
-    <dsp:sp modelId="{BC6F0824-1351-49BA-BADB-F02B71A91728}">
-      <dsp:nvSpPr>
-        <dsp:cNvPr id="0" name=""/>
-        <dsp:cNvSpPr/>
-      </dsp:nvSpPr>
-      <dsp:spPr>
-        <a:xfrm>
-          <a:off x="565296" y="0"/>
-          <a:ext cx="1752080" cy="1134951"/>
-        </a:xfrm>
-        <a:prstGeom prst="roundRect">
-          <a:avLst>
-            <a:gd name="adj" fmla="val 10000"/>
-          </a:avLst>
-        </a:prstGeom>
-        <a:solidFill>
-          <a:schemeClr val="lt1">
-            <a:alpha val="90000"/>
-            <a:hueOff val="0"/>
-            <a:satOff val="0"/>
-            <a:lumOff val="0"/>
-            <a:alphaOff val="0"/>
-          </a:schemeClr>
-        </a:solidFill>
-        <a:ln w="6350" cap="flat" cmpd="sng" algn="ctr">
-          <a:solidFill>
-            <a:schemeClr val="accent2">
-              <a:hueOff val="0"/>
-              <a:satOff val="0"/>
-              <a:lumOff val="0"/>
-              <a:alphaOff val="0"/>
-            </a:schemeClr>
-          </a:solidFill>
-          <a:prstDash val="solid"/>
-          <a:miter lim="800000"/>
-        </a:ln>
-        <a:effectLst/>
-        <a:scene3d>
-          <a:camera prst="orthographicFront"/>
-          <a:lightRig rig="flat" dir="t"/>
-        </a:scene3d>
-        <a:sp3d z="-190500" extrusionH="12700" prstMaterial="plastic">
-          <a:bevelT w="50800" h="50800"/>
-        </a:sp3d>
-      </dsp:spPr>
-      <dsp:style>
-        <a:lnRef idx="1">
-          <a:scrgbClr r="0" g="0" b="0"/>
-        </a:lnRef>
-        <a:fillRef idx="1">
-          <a:scrgbClr r="0" g="0" b="0"/>
-        </a:fillRef>
-        <a:effectRef idx="2">
-          <a:scrgbClr r="0" g="0" b="0"/>
-        </a:effectRef>
-        <a:fontRef idx="minor"/>
-      </dsp:style>
-      <dsp:txBody>
-        <a:bodyPr spcFirstLastPara="0" vert="horz" wrap="square" lIns="34290" tIns="34290" rIns="34290" bIns="34290" numCol="1" spcCol="1270" anchor="t" anchorCtr="0">
-          <a:noAutofit/>
-        </a:bodyPr>
-        <a:lstStyle/>
-        <a:p>
-          <a:pPr marL="57150" lvl="1" indent="-57150" algn="l" defTabSz="400050">
-            <a:lnSpc>
-              <a:spcPct val="90000"/>
-            </a:lnSpc>
-            <a:spcBef>
-              <a:spcPct val="0"/>
-            </a:spcBef>
-            <a:spcAft>
-              <a:spcPct val="15000"/>
-            </a:spcAft>
-            <a:buChar char="••"/>
-          </a:pPr>
-          <a:r>
-            <a:rPr lang="fr-FR" sz="900" kern="1200" dirty="0" smtClean="0"/>
-            <a:t>Différentes compétences</a:t>
-          </a:r>
-          <a:endParaRPr lang="fr-FR" sz="900" kern="1200" dirty="0"/>
-        </a:p>
-        <a:p>
-          <a:pPr marL="57150" lvl="1" indent="-57150" algn="l" defTabSz="400050">
-            <a:lnSpc>
-              <a:spcPct val="90000"/>
-            </a:lnSpc>
-            <a:spcBef>
-              <a:spcPct val="0"/>
-            </a:spcBef>
-            <a:spcAft>
-              <a:spcPct val="15000"/>
-            </a:spcAft>
-            <a:buChar char="••"/>
-          </a:pPr>
-          <a:r>
-            <a:rPr lang="fr-FR" sz="900" kern="1200" dirty="0" smtClean="0"/>
-            <a:t>Contact avec un expert</a:t>
-          </a:r>
-          <a:endParaRPr lang="fr-FR" sz="900" kern="1200" dirty="0"/>
-        </a:p>
-        <a:p>
-          <a:pPr marL="57150" lvl="1" indent="-57150" algn="l" defTabSz="400050">
-            <a:lnSpc>
-              <a:spcPct val="90000"/>
-            </a:lnSpc>
-            <a:spcBef>
-              <a:spcPct val="0"/>
-            </a:spcBef>
-            <a:spcAft>
-              <a:spcPct val="15000"/>
-            </a:spcAft>
-            <a:buChar char="••"/>
-          </a:pPr>
-          <a:r>
-            <a:rPr lang="fr-FR" sz="900" kern="1200" dirty="0" smtClean="0"/>
-            <a:t>Utilisation de package ‘open source ’</a:t>
-          </a:r>
-          <a:endParaRPr lang="fr-FR" sz="900" kern="1200" dirty="0"/>
-        </a:p>
-      </dsp:txBody>
-      <dsp:txXfrm>
-        <a:off x="590227" y="24931"/>
-        <a:ext cx="1176594" cy="801351"/>
-      </dsp:txXfrm>
-    </dsp:sp>
-    <dsp:sp modelId="{E72BDFA6-376E-4614-9D7C-A68241E884D9}">
-      <dsp:nvSpPr>
-        <dsp:cNvPr id="0" name=""/>
-        <dsp:cNvSpPr/>
-      </dsp:nvSpPr>
-      <dsp:spPr>
-        <a:xfrm>
-          <a:off x="1299468" y="202163"/>
-          <a:ext cx="1535730" cy="1535730"/>
-        </a:xfrm>
-        <a:prstGeom prst="pieWedge">
-          <a:avLst/>
-        </a:prstGeom>
-        <a:gradFill rotWithShape="0">
-          <a:gsLst>
-            <a:gs pos="0">
-              <a:schemeClr val="accent2">
-                <a:hueOff val="0"/>
-                <a:satOff val="0"/>
-                <a:lumOff val="0"/>
-                <a:alphaOff val="0"/>
-                <a:satMod val="103000"/>
-                <a:lumMod val="102000"/>
-                <a:tint val="94000"/>
-              </a:schemeClr>
-            </a:gs>
-            <a:gs pos="50000">
-              <a:schemeClr val="accent2">
-                <a:hueOff val="0"/>
-                <a:satOff val="0"/>
-                <a:lumOff val="0"/>
-                <a:alphaOff val="0"/>
-                <a:satMod val="110000"/>
-                <a:lumMod val="100000"/>
-                <a:shade val="100000"/>
-              </a:schemeClr>
-            </a:gs>
-            <a:gs pos="100000">
-              <a:schemeClr val="accent2">
-                <a:hueOff val="0"/>
-                <a:satOff val="0"/>
-                <a:lumOff val="0"/>
-                <a:alphaOff val="0"/>
-                <a:lumMod val="99000"/>
-                <a:satMod val="120000"/>
-                <a:shade val="78000"/>
-              </a:schemeClr>
-            </a:gs>
-          </a:gsLst>
-          <a:lin ang="5400000" scaled="0"/>
-        </a:gradFill>
-        <a:ln>
-          <a:noFill/>
-        </a:ln>
-        <a:effectLst/>
-        <a:scene3d>
-          <a:camera prst="orthographicFront"/>
-          <a:lightRig rig="flat" dir="t"/>
-        </a:scene3d>
-        <a:sp3d prstMaterial="plastic">
-          <a:bevelT w="120900" h="88900"/>
-          <a:bevelB w="88900" h="31750" prst="angle"/>
-        </a:sp3d>
-      </dsp:spPr>
-      <dsp:style>
-        <a:lnRef idx="0">
-          <a:scrgbClr r="0" g="0" b="0"/>
-        </a:lnRef>
-        <a:fillRef idx="3">
-          <a:scrgbClr r="0" g="0" b="0"/>
-        </a:fillRef>
-        <a:effectRef idx="2">
-          <a:scrgbClr r="0" g="0" b="0"/>
-        </a:effectRef>
-        <a:fontRef idx="minor">
-          <a:schemeClr val="lt1"/>
-        </a:fontRef>
-      </dsp:style>
-      <dsp:txBody>
-        <a:bodyPr spcFirstLastPara="0" vert="horz" wrap="square" lIns="270256" tIns="270256" rIns="270256" bIns="270256" numCol="1" spcCol="1270" anchor="ctr" anchorCtr="0">
-          <a:noAutofit/>
-        </a:bodyPr>
-        <a:lstStyle/>
-        <a:p>
-          <a:pPr lvl="0" algn="ctr" defTabSz="1689100">
-            <a:lnSpc>
-              <a:spcPct val="90000"/>
-            </a:lnSpc>
-            <a:spcBef>
-              <a:spcPct val="0"/>
-            </a:spcBef>
-            <a:spcAft>
-              <a:spcPct val="35000"/>
-            </a:spcAft>
-          </a:pPr>
-          <a:r>
-            <a:rPr lang="fr-FR" sz="3800" kern="1200" dirty="0" smtClean="0"/>
-            <a:t>S</a:t>
-          </a:r>
-          <a:endParaRPr lang="fr-FR" sz="3800" kern="1200" dirty="0"/>
-        </a:p>
-      </dsp:txBody>
-      <dsp:txXfrm>
-        <a:off x="1749273" y="651968"/>
-        <a:ext cx="1085925" cy="1085925"/>
-      </dsp:txXfrm>
-    </dsp:sp>
-    <dsp:sp modelId="{A67A60E5-5291-49E4-B3E5-53A58B528285}">
-      <dsp:nvSpPr>
-        <dsp:cNvPr id="0" name=""/>
-        <dsp:cNvSpPr/>
-      </dsp:nvSpPr>
-      <dsp:spPr>
-        <a:xfrm rot="5400000">
-          <a:off x="2906133" y="202163"/>
-          <a:ext cx="1535730" cy="1535730"/>
-        </a:xfrm>
-        <a:prstGeom prst="pieWedge">
-          <a:avLst/>
-        </a:prstGeom>
-        <a:gradFill rotWithShape="0">
-          <a:gsLst>
-            <a:gs pos="0">
-              <a:schemeClr val="accent3">
-                <a:hueOff val="0"/>
-                <a:satOff val="0"/>
-                <a:lumOff val="0"/>
-                <a:alphaOff val="0"/>
-                <a:satMod val="103000"/>
-                <a:lumMod val="102000"/>
-                <a:tint val="94000"/>
-              </a:schemeClr>
-            </a:gs>
-            <a:gs pos="50000">
-              <a:schemeClr val="accent3">
-                <a:hueOff val="0"/>
-                <a:satOff val="0"/>
-                <a:lumOff val="0"/>
-                <a:alphaOff val="0"/>
-                <a:satMod val="110000"/>
-                <a:lumMod val="100000"/>
-                <a:shade val="100000"/>
-              </a:schemeClr>
-            </a:gs>
-            <a:gs pos="100000">
-              <a:schemeClr val="accent3">
-                <a:hueOff val="0"/>
-                <a:satOff val="0"/>
-                <a:lumOff val="0"/>
-                <a:alphaOff val="0"/>
-                <a:lumMod val="99000"/>
-                <a:satMod val="120000"/>
-                <a:shade val="78000"/>
-              </a:schemeClr>
-            </a:gs>
-          </a:gsLst>
-          <a:lin ang="5400000" scaled="0"/>
-        </a:gradFill>
-        <a:ln>
-          <a:noFill/>
-        </a:ln>
-        <a:effectLst/>
-        <a:scene3d>
-          <a:camera prst="orthographicFront"/>
-          <a:lightRig rig="flat" dir="t"/>
-        </a:scene3d>
-        <a:sp3d prstMaterial="plastic">
-          <a:bevelT w="120900" h="88900"/>
-          <a:bevelB w="88900" h="31750" prst="angle"/>
-        </a:sp3d>
-      </dsp:spPr>
-      <dsp:style>
-        <a:lnRef idx="0">
-          <a:scrgbClr r="0" g="0" b="0"/>
-        </a:lnRef>
-        <a:fillRef idx="3">
-          <a:scrgbClr r="0" g="0" b="0"/>
-        </a:fillRef>
-        <a:effectRef idx="2">
-          <a:scrgbClr r="0" g="0" b="0"/>
-        </a:effectRef>
-        <a:fontRef idx="minor">
-          <a:schemeClr val="lt1"/>
-        </a:fontRef>
-      </dsp:style>
-      <dsp:txBody>
-        <a:bodyPr spcFirstLastPara="0" vert="horz" wrap="square" lIns="270256" tIns="270256" rIns="270256" bIns="270256" numCol="1" spcCol="1270" anchor="ctr" anchorCtr="0">
-          <a:noAutofit/>
-        </a:bodyPr>
-        <a:lstStyle/>
-        <a:p>
-          <a:pPr lvl="0" algn="ctr" defTabSz="1689100">
-            <a:lnSpc>
-              <a:spcPct val="90000"/>
-            </a:lnSpc>
-            <a:spcBef>
-              <a:spcPct val="0"/>
-            </a:spcBef>
-            <a:spcAft>
-              <a:spcPct val="35000"/>
-            </a:spcAft>
-          </a:pPr>
-          <a:r>
-            <a:rPr lang="fr-FR" sz="3800" kern="1200" dirty="0" smtClean="0"/>
-            <a:t>W</a:t>
-          </a:r>
-          <a:endParaRPr lang="fr-FR" sz="3800" kern="1200" dirty="0"/>
-        </a:p>
-      </dsp:txBody>
-      <dsp:txXfrm rot="-5400000">
-        <a:off x="2906133" y="651968"/>
-        <a:ext cx="1085925" cy="1085925"/>
-      </dsp:txXfrm>
-    </dsp:sp>
-    <dsp:sp modelId="{CF4FC7F6-A89C-4633-A10E-BFE92B369DCD}">
-      <dsp:nvSpPr>
-        <dsp:cNvPr id="0" name=""/>
-        <dsp:cNvSpPr/>
-      </dsp:nvSpPr>
-      <dsp:spPr>
-        <a:xfrm rot="10800000">
-          <a:off x="2906133" y="1808828"/>
-          <a:ext cx="1535730" cy="1535730"/>
-        </a:xfrm>
-        <a:prstGeom prst="pieWedge">
-          <a:avLst/>
-        </a:prstGeom>
-        <a:gradFill rotWithShape="0">
-          <a:gsLst>
-            <a:gs pos="0">
-              <a:schemeClr val="accent4">
-                <a:hueOff val="0"/>
-                <a:satOff val="0"/>
-                <a:lumOff val="0"/>
-                <a:alphaOff val="0"/>
-                <a:satMod val="103000"/>
-                <a:lumMod val="102000"/>
-                <a:tint val="94000"/>
-              </a:schemeClr>
-            </a:gs>
-            <a:gs pos="50000">
-              <a:schemeClr val="accent4">
-                <a:hueOff val="0"/>
-                <a:satOff val="0"/>
-                <a:lumOff val="0"/>
-                <a:alphaOff val="0"/>
-                <a:satMod val="110000"/>
-                <a:lumMod val="100000"/>
-                <a:shade val="100000"/>
-              </a:schemeClr>
-            </a:gs>
-            <a:gs pos="100000">
-              <a:schemeClr val="accent4">
-                <a:hueOff val="0"/>
-                <a:satOff val="0"/>
-                <a:lumOff val="0"/>
-                <a:alphaOff val="0"/>
-                <a:lumMod val="99000"/>
-                <a:satMod val="120000"/>
-                <a:shade val="78000"/>
-              </a:schemeClr>
-            </a:gs>
-          </a:gsLst>
-          <a:lin ang="5400000" scaled="0"/>
-        </a:gradFill>
-        <a:ln>
-          <a:noFill/>
-        </a:ln>
-        <a:effectLst/>
-        <a:scene3d>
-          <a:camera prst="orthographicFront"/>
-          <a:lightRig rig="flat" dir="t"/>
-        </a:scene3d>
-        <a:sp3d prstMaterial="plastic">
-          <a:bevelT w="120900" h="88900"/>
-          <a:bevelB w="88900" h="31750" prst="angle"/>
-        </a:sp3d>
-      </dsp:spPr>
-      <dsp:style>
-        <a:lnRef idx="0">
-          <a:scrgbClr r="0" g="0" b="0"/>
-        </a:lnRef>
-        <a:fillRef idx="3">
-          <a:scrgbClr r="0" g="0" b="0"/>
-        </a:fillRef>
-        <a:effectRef idx="2">
-          <a:scrgbClr r="0" g="0" b="0"/>
-        </a:effectRef>
-        <a:fontRef idx="minor">
-          <a:schemeClr val="lt1"/>
-        </a:fontRef>
-      </dsp:style>
-      <dsp:txBody>
-        <a:bodyPr spcFirstLastPara="0" vert="horz" wrap="square" lIns="270256" tIns="270256" rIns="270256" bIns="270256" numCol="1" spcCol="1270" anchor="ctr" anchorCtr="0">
-          <a:noAutofit/>
-        </a:bodyPr>
-        <a:lstStyle/>
-        <a:p>
-          <a:pPr lvl="0" algn="ctr" defTabSz="1689100">
-            <a:lnSpc>
-              <a:spcPct val="90000"/>
-            </a:lnSpc>
-            <a:spcBef>
-              <a:spcPct val="0"/>
-            </a:spcBef>
-            <a:spcAft>
-              <a:spcPct val="35000"/>
-            </a:spcAft>
-          </a:pPr>
-          <a:r>
-            <a:rPr lang="fr-FR" sz="3800" kern="1200" dirty="0" smtClean="0"/>
-            <a:t>T</a:t>
-          </a:r>
-          <a:endParaRPr lang="fr-FR" sz="3800" kern="1200" dirty="0"/>
-        </a:p>
-      </dsp:txBody>
-      <dsp:txXfrm rot="10800000">
-        <a:off x="2906133" y="1808828"/>
-        <a:ext cx="1085925" cy="1085925"/>
-      </dsp:txXfrm>
-    </dsp:sp>
-    <dsp:sp modelId="{C0852406-3DC0-4222-A1F8-184593FC4596}">
-      <dsp:nvSpPr>
-        <dsp:cNvPr id="0" name=""/>
-        <dsp:cNvSpPr/>
-      </dsp:nvSpPr>
-      <dsp:spPr>
-        <a:xfrm rot="16200000">
-          <a:off x="1299468" y="1808828"/>
-          <a:ext cx="1535730" cy="1535730"/>
-        </a:xfrm>
-        <a:prstGeom prst="pieWedge">
-          <a:avLst/>
-        </a:prstGeom>
-        <a:gradFill rotWithShape="0">
-          <a:gsLst>
-            <a:gs pos="0">
-              <a:schemeClr val="accent5">
-                <a:hueOff val="0"/>
-                <a:satOff val="0"/>
-                <a:lumOff val="0"/>
-                <a:alphaOff val="0"/>
-                <a:satMod val="103000"/>
-                <a:lumMod val="102000"/>
-                <a:tint val="94000"/>
-              </a:schemeClr>
-            </a:gs>
-            <a:gs pos="50000">
-              <a:schemeClr val="accent5">
-                <a:hueOff val="0"/>
-                <a:satOff val="0"/>
-                <a:lumOff val="0"/>
-                <a:alphaOff val="0"/>
-                <a:satMod val="110000"/>
-                <a:lumMod val="100000"/>
-                <a:shade val="100000"/>
-              </a:schemeClr>
-            </a:gs>
-            <a:gs pos="100000">
-              <a:schemeClr val="accent5">
-                <a:hueOff val="0"/>
-                <a:satOff val="0"/>
-                <a:lumOff val="0"/>
-                <a:alphaOff val="0"/>
-                <a:lumMod val="99000"/>
-                <a:satMod val="120000"/>
-                <a:shade val="78000"/>
-              </a:schemeClr>
-            </a:gs>
-          </a:gsLst>
-          <a:lin ang="5400000" scaled="0"/>
-        </a:gradFill>
-        <a:ln>
-          <a:noFill/>
-        </a:ln>
-        <a:effectLst/>
-        <a:scene3d>
-          <a:camera prst="orthographicFront"/>
-          <a:lightRig rig="flat" dir="t"/>
-        </a:scene3d>
-        <a:sp3d prstMaterial="plastic">
-          <a:bevelT w="120900" h="88900"/>
-          <a:bevelB w="88900" h="31750" prst="angle"/>
-        </a:sp3d>
-      </dsp:spPr>
-      <dsp:style>
-        <a:lnRef idx="0">
-          <a:scrgbClr r="0" g="0" b="0"/>
-        </a:lnRef>
-        <a:fillRef idx="3">
-          <a:scrgbClr r="0" g="0" b="0"/>
-        </a:fillRef>
-        <a:effectRef idx="2">
-          <a:scrgbClr r="0" g="0" b="0"/>
-        </a:effectRef>
-        <a:fontRef idx="minor">
-          <a:schemeClr val="lt1"/>
-        </a:fontRef>
-      </dsp:style>
-      <dsp:txBody>
-        <a:bodyPr spcFirstLastPara="0" vert="horz" wrap="square" lIns="270256" tIns="270256" rIns="270256" bIns="270256" numCol="1" spcCol="1270" anchor="ctr" anchorCtr="0">
-          <a:noAutofit/>
-        </a:bodyPr>
-        <a:lstStyle/>
-        <a:p>
-          <a:pPr lvl="0" algn="ctr" defTabSz="1689100">
-            <a:lnSpc>
-              <a:spcPct val="90000"/>
-            </a:lnSpc>
-            <a:spcBef>
-              <a:spcPct val="0"/>
-            </a:spcBef>
-            <a:spcAft>
-              <a:spcPct val="35000"/>
-            </a:spcAft>
-          </a:pPr>
-          <a:r>
-            <a:rPr lang="fr-FR" sz="3800" kern="1200" dirty="0" smtClean="0"/>
-            <a:t>O</a:t>
-          </a:r>
-          <a:endParaRPr lang="fr-FR" sz="3800" kern="1200" dirty="0"/>
-        </a:p>
-      </dsp:txBody>
-      <dsp:txXfrm rot="5400000">
-        <a:off x="1749273" y="1808828"/>
-        <a:ext cx="1085925" cy="1085925"/>
-      </dsp:txXfrm>
-    </dsp:sp>
-    <dsp:sp modelId="{3B6382B4-DDDF-482E-9E6A-38E6F7DB930C}">
-      <dsp:nvSpPr>
-        <dsp:cNvPr id="0" name=""/>
-        <dsp:cNvSpPr/>
-      </dsp:nvSpPr>
-      <dsp:spPr>
-        <a:xfrm>
-          <a:off x="4795333" y="1466369"/>
-          <a:ext cx="530234" cy="461073"/>
-        </a:xfrm>
-        <a:prstGeom prst="circularArrow">
-          <a:avLst/>
-        </a:prstGeom>
-        <a:solidFill>
-          <a:schemeClr val="accent2">
-            <a:tint val="40000"/>
-            <a:hueOff val="0"/>
-            <a:satOff val="0"/>
-            <a:lumOff val="0"/>
-            <a:alpha val="0"/>
-          </a:schemeClr>
-        </a:solidFill>
-        <a:ln>
-          <a:noFill/>
-        </a:ln>
-        <a:effectLst>
-          <a:outerShdw blurRad="57150" dist="19050" dir="5400000" algn="ctr" rotWithShape="0">
-            <a:srgbClr val="000000">
-              <a:alpha val="63000"/>
-            </a:srgbClr>
-          </a:outerShdw>
-        </a:effectLst>
-        <a:scene3d>
-          <a:camera prst="orthographicFront"/>
-          <a:lightRig rig="flat" dir="t"/>
-        </a:scene3d>
-        <a:sp3d z="190500" prstMaterial="plastic">
-          <a:bevelT w="120900" h="88900"/>
-          <a:bevelB w="88900" h="31750" prst="angle"/>
-        </a:sp3d>
-      </dsp:spPr>
-      <dsp:style>
-        <a:lnRef idx="0">
-          <a:scrgbClr r="0" g="0" b="0"/>
-        </a:lnRef>
-        <a:fillRef idx="1">
-          <a:scrgbClr r="0" g="0" b="0"/>
-        </a:fillRef>
-        <a:effectRef idx="3">
-          <a:scrgbClr r="0" g="0" b="0"/>
-        </a:effectRef>
-        <a:fontRef idx="minor">
-          <a:schemeClr val="lt1"/>
-        </a:fontRef>
-      </dsp:style>
-    </dsp:sp>
-    <dsp:sp modelId="{72B333DC-EBE8-4650-A713-61338E0F2C2D}">
-      <dsp:nvSpPr>
-        <dsp:cNvPr id="0" name=""/>
-        <dsp:cNvSpPr/>
-      </dsp:nvSpPr>
-      <dsp:spPr>
-        <a:xfrm rot="10800000">
-          <a:off x="4795333" y="1533776"/>
-          <a:ext cx="530234" cy="461073"/>
-        </a:xfrm>
-        <a:prstGeom prst="circularArrow">
-          <a:avLst/>
-        </a:prstGeom>
-        <a:solidFill>
-          <a:schemeClr val="accent2">
-            <a:tint val="40000"/>
-            <a:hueOff val="0"/>
-            <a:satOff val="0"/>
-            <a:lumOff val="0"/>
-            <a:alpha val="0"/>
-          </a:schemeClr>
-        </a:solidFill>
-        <a:ln>
-          <a:noFill/>
-        </a:ln>
-        <a:effectLst>
-          <a:outerShdw blurRad="57150" dist="19050" dir="5400000" algn="ctr" rotWithShape="0">
-            <a:srgbClr val="000000">
-              <a:alpha val="63000"/>
-            </a:srgbClr>
-          </a:outerShdw>
-        </a:effectLst>
-        <a:scene3d>
-          <a:camera prst="orthographicFront"/>
-          <a:lightRig rig="flat" dir="t"/>
-        </a:scene3d>
-        <a:sp3d z="190500" prstMaterial="plastic">
-          <a:bevelT w="120900" h="88900"/>
-          <a:bevelB w="88900" h="31750" prst="angle"/>
-        </a:sp3d>
-      </dsp:spPr>
-      <dsp:style>
-        <a:lnRef idx="0">
-          <a:scrgbClr r="0" g="0" b="0"/>
-        </a:lnRef>
-        <a:fillRef idx="1">
-          <a:scrgbClr r="0" g="0" b="0"/>
-        </a:fillRef>
-        <a:effectRef idx="3">
-          <a:scrgbClr r="0" g="0" b="0"/>
-        </a:effectRef>
-        <a:fontRef idx="minor">
-          <a:schemeClr val="lt1"/>
-        </a:fontRef>
-      </dsp:style>
-    </dsp:sp>
   </dsp:spTree>
 </dsp:drawing>
 </file>
@@ -4649,1037 +3666,6 @@
       <dsp:cNvGrpSpPr/>
     </dsp:nvGrpSpPr>
     <dsp:grpSpPr/>
-    <dsp:sp modelId="{68AC0C8C-6683-4490-8F38-983C8CB47C3F}">
-      <dsp:nvSpPr>
-        <dsp:cNvPr id="0" name=""/>
-        <dsp:cNvSpPr/>
-      </dsp:nvSpPr>
-      <dsp:spPr>
-        <a:xfrm>
-          <a:off x="3537515" y="2557236"/>
-          <a:ext cx="1857757" cy="1203405"/>
-        </a:xfrm>
-        <a:prstGeom prst="roundRect">
-          <a:avLst>
-            <a:gd name="adj" fmla="val 10000"/>
-          </a:avLst>
-        </a:prstGeom>
-        <a:solidFill>
-          <a:schemeClr val="lt1">
-            <a:alpha val="90000"/>
-            <a:hueOff val="0"/>
-            <a:satOff val="0"/>
-            <a:lumOff val="0"/>
-            <a:alphaOff val="0"/>
-          </a:schemeClr>
-        </a:solidFill>
-        <a:ln w="6350" cap="flat" cmpd="sng" algn="ctr">
-          <a:solidFill>
-            <a:schemeClr val="accent4">
-              <a:hueOff val="0"/>
-              <a:satOff val="0"/>
-              <a:lumOff val="0"/>
-              <a:alphaOff val="0"/>
-            </a:schemeClr>
-          </a:solidFill>
-          <a:prstDash val="solid"/>
-          <a:miter lim="800000"/>
-        </a:ln>
-        <a:effectLst/>
-        <a:scene3d>
-          <a:camera prst="orthographicFront"/>
-          <a:lightRig rig="flat" dir="t"/>
-        </a:scene3d>
-        <a:sp3d z="-190500" extrusionH="12700" prstMaterial="plastic">
-          <a:bevelT w="50800" h="50800"/>
-        </a:sp3d>
-      </dsp:spPr>
-      <dsp:style>
-        <a:lnRef idx="1">
-          <a:scrgbClr r="0" g="0" b="0"/>
-        </a:lnRef>
-        <a:fillRef idx="1">
-          <a:scrgbClr r="0" g="0" b="0"/>
-        </a:fillRef>
-        <a:effectRef idx="2">
-          <a:scrgbClr r="0" g="0" b="0"/>
-        </a:effectRef>
-        <a:fontRef idx="minor"/>
-      </dsp:style>
-      <dsp:txBody>
-        <a:bodyPr spcFirstLastPara="0" vert="horz" wrap="square" lIns="49530" tIns="49530" rIns="49530" bIns="49530" numCol="1" spcCol="1270" anchor="t" anchorCtr="0">
-          <a:noAutofit/>
-        </a:bodyPr>
-        <a:lstStyle/>
-        <a:p>
-          <a:pPr marL="57150" lvl="1" indent="-57150" algn="l" defTabSz="444500">
-            <a:lnSpc>
-              <a:spcPct val="90000"/>
-            </a:lnSpc>
-            <a:spcBef>
-              <a:spcPct val="0"/>
-            </a:spcBef>
-            <a:spcAft>
-              <a:spcPct val="15000"/>
-            </a:spcAft>
-            <a:buChar char="••"/>
-          </a:pPr>
-          <a:r>
-            <a:rPr lang="fr-FR" sz="1000" kern="1200" dirty="0" err="1" smtClean="0"/>
-            <a:t>Risk</a:t>
-          </a:r>
-          <a:r>
-            <a:rPr lang="fr-FR" sz="1000" kern="1200" dirty="0" smtClean="0"/>
-            <a:t> of high </a:t>
-          </a:r>
-          <a:r>
-            <a:rPr lang="fr-FR" sz="1000" kern="1200" dirty="0" err="1" smtClean="0"/>
-            <a:t>demand</a:t>
-          </a:r>
-          <a:r>
-            <a:rPr lang="fr-FR" sz="1000" kern="1200" dirty="0" smtClean="0"/>
-            <a:t> (server)</a:t>
-          </a:r>
-          <a:endParaRPr lang="fr-FR" sz="1000" kern="1200" dirty="0"/>
-        </a:p>
-        <a:p>
-          <a:pPr marL="57150" lvl="1" indent="-57150" algn="l" defTabSz="444500">
-            <a:lnSpc>
-              <a:spcPct val="90000"/>
-            </a:lnSpc>
-            <a:spcBef>
-              <a:spcPct val="0"/>
-            </a:spcBef>
-            <a:spcAft>
-              <a:spcPct val="15000"/>
-            </a:spcAft>
-            <a:buChar char="••"/>
-          </a:pPr>
-          <a:r>
-            <a:rPr lang="fr-FR" sz="1000" kern="1200" dirty="0" smtClean="0"/>
-            <a:t>Data protection (</a:t>
-          </a:r>
-          <a:r>
-            <a:rPr lang="fr-FR" sz="1000" kern="1200" dirty="0" err="1" smtClean="0"/>
-            <a:t>temporary</a:t>
-          </a:r>
-          <a:r>
-            <a:rPr lang="fr-FR" sz="1000" kern="1200" dirty="0" smtClean="0"/>
-            <a:t>)</a:t>
-          </a:r>
-          <a:endParaRPr lang="fr-FR" sz="1000" kern="1200" dirty="0"/>
-        </a:p>
-      </dsp:txBody>
-      <dsp:txXfrm>
-        <a:off x="4121277" y="2884522"/>
-        <a:ext cx="1247560" cy="849684"/>
-      </dsp:txXfrm>
-    </dsp:sp>
-    <dsp:sp modelId="{431C4C2F-7F42-4D62-8EEF-918E7AD22EA0}">
-      <dsp:nvSpPr>
-        <dsp:cNvPr id="0" name=""/>
-        <dsp:cNvSpPr/>
-      </dsp:nvSpPr>
-      <dsp:spPr>
-        <a:xfrm>
-          <a:off x="474019" y="2557236"/>
-          <a:ext cx="1857757" cy="1203405"/>
-        </a:xfrm>
-        <a:prstGeom prst="roundRect">
-          <a:avLst>
-            <a:gd name="adj" fmla="val 10000"/>
-          </a:avLst>
-        </a:prstGeom>
-        <a:solidFill>
-          <a:schemeClr val="lt1">
-            <a:alpha val="90000"/>
-            <a:hueOff val="0"/>
-            <a:satOff val="0"/>
-            <a:lumOff val="0"/>
-            <a:alphaOff val="0"/>
-          </a:schemeClr>
-        </a:solidFill>
-        <a:ln w="6350" cap="flat" cmpd="sng" algn="ctr">
-          <a:solidFill>
-            <a:schemeClr val="accent5">
-              <a:hueOff val="0"/>
-              <a:satOff val="0"/>
-              <a:lumOff val="0"/>
-              <a:alphaOff val="0"/>
-            </a:schemeClr>
-          </a:solidFill>
-          <a:prstDash val="solid"/>
-          <a:miter lim="800000"/>
-        </a:ln>
-        <a:effectLst/>
-        <a:scene3d>
-          <a:camera prst="orthographicFront"/>
-          <a:lightRig rig="flat" dir="t"/>
-        </a:scene3d>
-        <a:sp3d z="-190500" extrusionH="12700" prstMaterial="plastic">
-          <a:bevelT w="50800" h="50800"/>
-        </a:sp3d>
-      </dsp:spPr>
-      <dsp:style>
-        <a:lnRef idx="1">
-          <a:scrgbClr r="0" g="0" b="0"/>
-        </a:lnRef>
-        <a:fillRef idx="1">
-          <a:scrgbClr r="0" g="0" b="0"/>
-        </a:fillRef>
-        <a:effectRef idx="2">
-          <a:scrgbClr r="0" g="0" b="0"/>
-        </a:effectRef>
-        <a:fontRef idx="minor"/>
-      </dsp:style>
-      <dsp:txBody>
-        <a:bodyPr spcFirstLastPara="0" vert="horz" wrap="square" lIns="49530" tIns="49530" rIns="49530" bIns="49530" numCol="1" spcCol="1270" anchor="t" anchorCtr="0">
-          <a:noAutofit/>
-        </a:bodyPr>
-        <a:lstStyle/>
-        <a:p>
-          <a:pPr marL="57150" lvl="1" indent="-57150" algn="l" defTabSz="444500">
-            <a:lnSpc>
-              <a:spcPct val="90000"/>
-            </a:lnSpc>
-            <a:spcBef>
-              <a:spcPct val="0"/>
-            </a:spcBef>
-            <a:spcAft>
-              <a:spcPct val="15000"/>
-            </a:spcAft>
-            <a:buChar char="••"/>
-          </a:pPr>
-          <a:r>
-            <a:rPr lang="fr-FR" sz="1000" kern="1200" dirty="0" smtClean="0"/>
-            <a:t>No </a:t>
-          </a:r>
-          <a:r>
-            <a:rPr lang="fr-FR" sz="1000" kern="1200" dirty="0" err="1" smtClean="0"/>
-            <a:t>competition</a:t>
-          </a:r>
-          <a:endParaRPr lang="fr-FR" sz="1000" kern="1200" dirty="0"/>
-        </a:p>
-        <a:p>
-          <a:pPr marL="57150" lvl="1" indent="-57150" algn="l" defTabSz="444500">
-            <a:lnSpc>
-              <a:spcPct val="90000"/>
-            </a:lnSpc>
-            <a:spcBef>
-              <a:spcPct val="0"/>
-            </a:spcBef>
-            <a:spcAft>
-              <a:spcPct val="15000"/>
-            </a:spcAft>
-            <a:buChar char="••"/>
-          </a:pPr>
-          <a:r>
-            <a:rPr lang="fr-FR" sz="1000" kern="1200" dirty="0" smtClean="0"/>
-            <a:t>High utility</a:t>
-          </a:r>
-          <a:endParaRPr lang="fr-FR" sz="1000" kern="1200" dirty="0"/>
-        </a:p>
-      </dsp:txBody>
-      <dsp:txXfrm>
-        <a:off x="500454" y="2884522"/>
-        <a:ext cx="1247560" cy="849684"/>
-      </dsp:txXfrm>
-    </dsp:sp>
-    <dsp:sp modelId="{05478942-E273-4856-8553-F0FD8F015AA2}">
-      <dsp:nvSpPr>
-        <dsp:cNvPr id="0" name=""/>
-        <dsp:cNvSpPr/>
-      </dsp:nvSpPr>
-      <dsp:spPr>
-        <a:xfrm>
-          <a:off x="3537515" y="0"/>
-          <a:ext cx="1857757" cy="1203405"/>
-        </a:xfrm>
-        <a:prstGeom prst="roundRect">
-          <a:avLst>
-            <a:gd name="adj" fmla="val 10000"/>
-          </a:avLst>
-        </a:prstGeom>
-        <a:solidFill>
-          <a:schemeClr val="lt1">
-            <a:alpha val="90000"/>
-            <a:hueOff val="0"/>
-            <a:satOff val="0"/>
-            <a:lumOff val="0"/>
-            <a:alphaOff val="0"/>
-          </a:schemeClr>
-        </a:solidFill>
-        <a:ln w="6350" cap="flat" cmpd="sng" algn="ctr">
-          <a:solidFill>
-            <a:schemeClr val="accent3">
-              <a:hueOff val="0"/>
-              <a:satOff val="0"/>
-              <a:lumOff val="0"/>
-              <a:alphaOff val="0"/>
-            </a:schemeClr>
-          </a:solidFill>
-          <a:prstDash val="solid"/>
-          <a:miter lim="800000"/>
-        </a:ln>
-        <a:effectLst/>
-        <a:scene3d>
-          <a:camera prst="orthographicFront"/>
-          <a:lightRig rig="flat" dir="t"/>
-        </a:scene3d>
-        <a:sp3d z="-190500" extrusionH="12700" prstMaterial="plastic">
-          <a:bevelT w="50800" h="50800"/>
-        </a:sp3d>
-      </dsp:spPr>
-      <dsp:style>
-        <a:lnRef idx="1">
-          <a:scrgbClr r="0" g="0" b="0"/>
-        </a:lnRef>
-        <a:fillRef idx="1">
-          <a:scrgbClr r="0" g="0" b="0"/>
-        </a:fillRef>
-        <a:effectRef idx="2">
-          <a:scrgbClr r="0" g="0" b="0"/>
-        </a:effectRef>
-        <a:fontRef idx="minor"/>
-      </dsp:style>
-      <dsp:txBody>
-        <a:bodyPr spcFirstLastPara="0" vert="horz" wrap="square" lIns="49530" tIns="49530" rIns="49530" bIns="49530" numCol="1" spcCol="1270" anchor="t" anchorCtr="0">
-          <a:noAutofit/>
-        </a:bodyPr>
-        <a:lstStyle/>
-        <a:p>
-          <a:pPr marL="57150" lvl="1" indent="-57150" algn="l" defTabSz="444500">
-            <a:lnSpc>
-              <a:spcPct val="90000"/>
-            </a:lnSpc>
-            <a:spcBef>
-              <a:spcPct val="0"/>
-            </a:spcBef>
-            <a:spcAft>
-              <a:spcPct val="15000"/>
-            </a:spcAft>
-            <a:buChar char="••"/>
-          </a:pPr>
-          <a:r>
-            <a:rPr lang="fr-FR" sz="1000" kern="1200" dirty="0" smtClean="0"/>
-            <a:t>Short deadlines</a:t>
-          </a:r>
-          <a:endParaRPr lang="fr-FR" sz="1000" kern="1200" dirty="0"/>
-        </a:p>
-        <a:p>
-          <a:pPr marL="57150" lvl="1" indent="-57150" algn="l" defTabSz="444500">
-            <a:lnSpc>
-              <a:spcPct val="90000"/>
-            </a:lnSpc>
-            <a:spcBef>
-              <a:spcPct val="0"/>
-            </a:spcBef>
-            <a:spcAft>
-              <a:spcPct val="15000"/>
-            </a:spcAft>
-            <a:buChar char="••"/>
-          </a:pPr>
-          <a:r>
-            <a:rPr lang="fr-FR" sz="1000" kern="1200" dirty="0" smtClean="0"/>
-            <a:t>Not </a:t>
-          </a:r>
-          <a:r>
-            <a:rPr lang="fr-FR" sz="1000" kern="1200" dirty="0" err="1" smtClean="0"/>
-            <a:t>well</a:t>
-          </a:r>
-          <a:r>
-            <a:rPr lang="fr-FR" sz="1000" kern="1200" dirty="0" smtClean="0"/>
-            <a:t> </a:t>
-          </a:r>
-          <a:r>
-            <a:rPr lang="fr-FR" sz="1000" kern="1200" dirty="0" err="1" smtClean="0"/>
-            <a:t>documented</a:t>
-          </a:r>
-          <a:endParaRPr lang="fr-FR" sz="1000" kern="1200" dirty="0"/>
-        </a:p>
-      </dsp:txBody>
-      <dsp:txXfrm>
-        <a:off x="4121277" y="26435"/>
-        <a:ext cx="1247560" cy="849684"/>
-      </dsp:txXfrm>
-    </dsp:sp>
-    <dsp:sp modelId="{BC6F0824-1351-49BA-BADB-F02B71A91728}">
-      <dsp:nvSpPr>
-        <dsp:cNvPr id="0" name=""/>
-        <dsp:cNvSpPr/>
-      </dsp:nvSpPr>
-      <dsp:spPr>
-        <a:xfrm>
-          <a:off x="474019" y="0"/>
-          <a:ext cx="1857757" cy="1203405"/>
-        </a:xfrm>
-        <a:prstGeom prst="roundRect">
-          <a:avLst>
-            <a:gd name="adj" fmla="val 10000"/>
-          </a:avLst>
-        </a:prstGeom>
-        <a:solidFill>
-          <a:schemeClr val="lt1">
-            <a:alpha val="90000"/>
-            <a:hueOff val="0"/>
-            <a:satOff val="0"/>
-            <a:lumOff val="0"/>
-            <a:alphaOff val="0"/>
-          </a:schemeClr>
-        </a:solidFill>
-        <a:ln w="6350" cap="flat" cmpd="sng" algn="ctr">
-          <a:solidFill>
-            <a:schemeClr val="accent2">
-              <a:hueOff val="0"/>
-              <a:satOff val="0"/>
-              <a:lumOff val="0"/>
-              <a:alphaOff val="0"/>
-            </a:schemeClr>
-          </a:solidFill>
-          <a:prstDash val="solid"/>
-          <a:miter lim="800000"/>
-        </a:ln>
-        <a:effectLst/>
-        <a:scene3d>
-          <a:camera prst="orthographicFront"/>
-          <a:lightRig rig="flat" dir="t"/>
-        </a:scene3d>
-        <a:sp3d z="-190500" extrusionH="12700" prstMaterial="plastic">
-          <a:bevelT w="50800" h="50800"/>
-        </a:sp3d>
-      </dsp:spPr>
-      <dsp:style>
-        <a:lnRef idx="1">
-          <a:scrgbClr r="0" g="0" b="0"/>
-        </a:lnRef>
-        <a:fillRef idx="1">
-          <a:scrgbClr r="0" g="0" b="0"/>
-        </a:fillRef>
-        <a:effectRef idx="2">
-          <a:scrgbClr r="0" g="0" b="0"/>
-        </a:effectRef>
-        <a:fontRef idx="minor"/>
-      </dsp:style>
-      <dsp:txBody>
-        <a:bodyPr spcFirstLastPara="0" vert="horz" wrap="square" lIns="49530" tIns="49530" rIns="49530" bIns="49530" numCol="1" spcCol="1270" anchor="t" anchorCtr="0">
-          <a:noAutofit/>
-        </a:bodyPr>
-        <a:lstStyle/>
-        <a:p>
-          <a:pPr marL="57150" lvl="1" indent="-57150" algn="l" defTabSz="444500">
-            <a:lnSpc>
-              <a:spcPct val="90000"/>
-            </a:lnSpc>
-            <a:spcBef>
-              <a:spcPct val="0"/>
-            </a:spcBef>
-            <a:spcAft>
-              <a:spcPct val="15000"/>
-            </a:spcAft>
-            <a:buChar char="••"/>
-          </a:pPr>
-          <a:r>
-            <a:rPr lang="fr-FR" sz="1000" kern="1200" dirty="0" smtClean="0"/>
-            <a:t>Diverse </a:t>
-          </a:r>
-          <a:r>
-            <a:rPr lang="fr-FR" sz="1000" kern="1200" dirty="0" err="1" smtClean="0"/>
-            <a:t>skill</a:t>
-          </a:r>
-          <a:r>
-            <a:rPr lang="fr-FR" sz="1000" kern="1200" dirty="0" smtClean="0"/>
-            <a:t> set</a:t>
-          </a:r>
-          <a:endParaRPr lang="fr-FR" sz="1000" kern="1200" dirty="0"/>
-        </a:p>
-        <a:p>
-          <a:pPr marL="57150" lvl="1" indent="-57150" algn="l" defTabSz="444500">
-            <a:lnSpc>
-              <a:spcPct val="90000"/>
-            </a:lnSpc>
-            <a:spcBef>
-              <a:spcPct val="0"/>
-            </a:spcBef>
-            <a:spcAft>
-              <a:spcPct val="15000"/>
-            </a:spcAft>
-            <a:buChar char="••"/>
-          </a:pPr>
-          <a:r>
-            <a:rPr lang="fr-FR" sz="1000" kern="1200" dirty="0" smtClean="0"/>
-            <a:t>Access to expert </a:t>
-          </a:r>
-          <a:r>
-            <a:rPr lang="fr-FR" sz="1000" kern="1200" dirty="0" err="1" smtClean="0"/>
-            <a:t>advise</a:t>
-          </a:r>
-          <a:endParaRPr lang="fr-FR" sz="1000" kern="1200" dirty="0"/>
-        </a:p>
-        <a:p>
-          <a:pPr marL="57150" lvl="1" indent="-57150" algn="l" defTabSz="444500">
-            <a:lnSpc>
-              <a:spcPct val="90000"/>
-            </a:lnSpc>
-            <a:spcBef>
-              <a:spcPct val="0"/>
-            </a:spcBef>
-            <a:spcAft>
-              <a:spcPct val="15000"/>
-            </a:spcAft>
-            <a:buChar char="••"/>
-          </a:pPr>
-          <a:r>
-            <a:rPr lang="fr-FR" sz="1000" kern="1200" dirty="0" smtClean="0"/>
-            <a:t>Open source packages</a:t>
-          </a:r>
-          <a:endParaRPr lang="fr-FR" sz="1000" kern="1200" dirty="0"/>
-        </a:p>
-      </dsp:txBody>
-      <dsp:txXfrm>
-        <a:off x="500454" y="26435"/>
-        <a:ext cx="1247560" cy="849684"/>
-      </dsp:txXfrm>
-    </dsp:sp>
-    <dsp:sp modelId="{E72BDFA6-376E-4614-9D7C-A68241E884D9}">
-      <dsp:nvSpPr>
-        <dsp:cNvPr id="0" name=""/>
-        <dsp:cNvSpPr/>
-      </dsp:nvSpPr>
-      <dsp:spPr>
-        <a:xfrm>
-          <a:off x="1252472" y="214356"/>
-          <a:ext cx="1628357" cy="1628357"/>
-        </a:xfrm>
-        <a:prstGeom prst="pieWedge">
-          <a:avLst/>
-        </a:prstGeom>
-        <a:gradFill rotWithShape="0">
-          <a:gsLst>
-            <a:gs pos="0">
-              <a:schemeClr val="accent2">
-                <a:hueOff val="0"/>
-                <a:satOff val="0"/>
-                <a:lumOff val="0"/>
-                <a:alphaOff val="0"/>
-                <a:satMod val="103000"/>
-                <a:lumMod val="102000"/>
-                <a:tint val="94000"/>
-              </a:schemeClr>
-            </a:gs>
-            <a:gs pos="50000">
-              <a:schemeClr val="accent2">
-                <a:hueOff val="0"/>
-                <a:satOff val="0"/>
-                <a:lumOff val="0"/>
-                <a:alphaOff val="0"/>
-                <a:satMod val="110000"/>
-                <a:lumMod val="100000"/>
-                <a:shade val="100000"/>
-              </a:schemeClr>
-            </a:gs>
-            <a:gs pos="100000">
-              <a:schemeClr val="accent2">
-                <a:hueOff val="0"/>
-                <a:satOff val="0"/>
-                <a:lumOff val="0"/>
-                <a:alphaOff val="0"/>
-                <a:lumMod val="99000"/>
-                <a:satMod val="120000"/>
-                <a:shade val="78000"/>
-              </a:schemeClr>
-            </a:gs>
-          </a:gsLst>
-          <a:lin ang="5400000" scaled="0"/>
-        </a:gradFill>
-        <a:ln>
-          <a:noFill/>
-        </a:ln>
-        <a:effectLst/>
-        <a:scene3d>
-          <a:camera prst="orthographicFront"/>
-          <a:lightRig rig="flat" dir="t"/>
-        </a:scene3d>
-        <a:sp3d prstMaterial="plastic">
-          <a:bevelT w="120900" h="88900"/>
-          <a:bevelB w="88900" h="31750" prst="angle"/>
-        </a:sp3d>
-      </dsp:spPr>
-      <dsp:style>
-        <a:lnRef idx="0">
-          <a:scrgbClr r="0" g="0" b="0"/>
-        </a:lnRef>
-        <a:fillRef idx="3">
-          <a:scrgbClr r="0" g="0" b="0"/>
-        </a:fillRef>
-        <a:effectRef idx="2">
-          <a:scrgbClr r="0" g="0" b="0"/>
-        </a:effectRef>
-        <a:fontRef idx="minor">
-          <a:schemeClr val="lt1"/>
-        </a:fontRef>
-      </dsp:style>
-      <dsp:txBody>
-        <a:bodyPr spcFirstLastPara="0" vert="horz" wrap="square" lIns="284480" tIns="284480" rIns="284480" bIns="284480" numCol="1" spcCol="1270" anchor="ctr" anchorCtr="0">
-          <a:noAutofit/>
-        </a:bodyPr>
-        <a:lstStyle/>
-        <a:p>
-          <a:pPr lvl="0" algn="ctr" defTabSz="1778000">
-            <a:lnSpc>
-              <a:spcPct val="90000"/>
-            </a:lnSpc>
-            <a:spcBef>
-              <a:spcPct val="0"/>
-            </a:spcBef>
-            <a:spcAft>
-              <a:spcPct val="35000"/>
-            </a:spcAft>
-          </a:pPr>
-          <a:r>
-            <a:rPr lang="fr-FR" sz="4000" kern="1200" dirty="0" smtClean="0"/>
-            <a:t>S</a:t>
-          </a:r>
-          <a:endParaRPr lang="fr-FR" sz="4000" kern="1200" dirty="0"/>
-        </a:p>
-      </dsp:txBody>
-      <dsp:txXfrm>
-        <a:off x="1729407" y="691291"/>
-        <a:ext cx="1151422" cy="1151422"/>
-      </dsp:txXfrm>
-    </dsp:sp>
-    <dsp:sp modelId="{A67A60E5-5291-49E4-B3E5-53A58B528285}">
-      <dsp:nvSpPr>
-        <dsp:cNvPr id="0" name=""/>
-        <dsp:cNvSpPr/>
-      </dsp:nvSpPr>
-      <dsp:spPr>
-        <a:xfrm rot="5400000">
-          <a:off x="2956043" y="214356"/>
-          <a:ext cx="1628357" cy="1628357"/>
-        </a:xfrm>
-        <a:prstGeom prst="pieWedge">
-          <a:avLst/>
-        </a:prstGeom>
-        <a:gradFill rotWithShape="0">
-          <a:gsLst>
-            <a:gs pos="0">
-              <a:schemeClr val="accent3">
-                <a:hueOff val="0"/>
-                <a:satOff val="0"/>
-                <a:lumOff val="0"/>
-                <a:alphaOff val="0"/>
-                <a:satMod val="103000"/>
-                <a:lumMod val="102000"/>
-                <a:tint val="94000"/>
-              </a:schemeClr>
-            </a:gs>
-            <a:gs pos="50000">
-              <a:schemeClr val="accent3">
-                <a:hueOff val="0"/>
-                <a:satOff val="0"/>
-                <a:lumOff val="0"/>
-                <a:alphaOff val="0"/>
-                <a:satMod val="110000"/>
-                <a:lumMod val="100000"/>
-                <a:shade val="100000"/>
-              </a:schemeClr>
-            </a:gs>
-            <a:gs pos="100000">
-              <a:schemeClr val="accent3">
-                <a:hueOff val="0"/>
-                <a:satOff val="0"/>
-                <a:lumOff val="0"/>
-                <a:alphaOff val="0"/>
-                <a:lumMod val="99000"/>
-                <a:satMod val="120000"/>
-                <a:shade val="78000"/>
-              </a:schemeClr>
-            </a:gs>
-          </a:gsLst>
-          <a:lin ang="5400000" scaled="0"/>
-        </a:gradFill>
-        <a:ln>
-          <a:noFill/>
-        </a:ln>
-        <a:effectLst/>
-        <a:scene3d>
-          <a:camera prst="orthographicFront"/>
-          <a:lightRig rig="flat" dir="t"/>
-        </a:scene3d>
-        <a:sp3d prstMaterial="plastic">
-          <a:bevelT w="120900" h="88900"/>
-          <a:bevelB w="88900" h="31750" prst="angle"/>
-        </a:sp3d>
-      </dsp:spPr>
-      <dsp:style>
-        <a:lnRef idx="0">
-          <a:scrgbClr r="0" g="0" b="0"/>
-        </a:lnRef>
-        <a:fillRef idx="3">
-          <a:scrgbClr r="0" g="0" b="0"/>
-        </a:fillRef>
-        <a:effectRef idx="2">
-          <a:scrgbClr r="0" g="0" b="0"/>
-        </a:effectRef>
-        <a:fontRef idx="minor">
-          <a:schemeClr val="lt1"/>
-        </a:fontRef>
-      </dsp:style>
-      <dsp:txBody>
-        <a:bodyPr spcFirstLastPara="0" vert="horz" wrap="square" lIns="284480" tIns="284480" rIns="284480" bIns="284480" numCol="1" spcCol="1270" anchor="ctr" anchorCtr="0">
-          <a:noAutofit/>
-        </a:bodyPr>
-        <a:lstStyle/>
-        <a:p>
-          <a:pPr lvl="0" algn="ctr" defTabSz="1778000">
-            <a:lnSpc>
-              <a:spcPct val="90000"/>
-            </a:lnSpc>
-            <a:spcBef>
-              <a:spcPct val="0"/>
-            </a:spcBef>
-            <a:spcAft>
-              <a:spcPct val="35000"/>
-            </a:spcAft>
-          </a:pPr>
-          <a:r>
-            <a:rPr lang="fr-FR" sz="4000" kern="1200" dirty="0" smtClean="0"/>
-            <a:t>W</a:t>
-          </a:r>
-          <a:endParaRPr lang="fr-FR" sz="4000" kern="1200" dirty="0"/>
-        </a:p>
-      </dsp:txBody>
-      <dsp:txXfrm rot="-5400000">
-        <a:off x="2956043" y="691291"/>
-        <a:ext cx="1151422" cy="1151422"/>
-      </dsp:txXfrm>
-    </dsp:sp>
-    <dsp:sp modelId="{CF4FC7F6-A89C-4633-A10E-BFE92B369DCD}">
-      <dsp:nvSpPr>
-        <dsp:cNvPr id="0" name=""/>
-        <dsp:cNvSpPr/>
-      </dsp:nvSpPr>
-      <dsp:spPr>
-        <a:xfrm rot="10800000">
-          <a:off x="2956043" y="1917927"/>
-          <a:ext cx="1628357" cy="1628357"/>
-        </a:xfrm>
-        <a:prstGeom prst="pieWedge">
-          <a:avLst/>
-        </a:prstGeom>
-        <a:gradFill rotWithShape="0">
-          <a:gsLst>
-            <a:gs pos="0">
-              <a:schemeClr val="accent4">
-                <a:hueOff val="0"/>
-                <a:satOff val="0"/>
-                <a:lumOff val="0"/>
-                <a:alphaOff val="0"/>
-                <a:satMod val="103000"/>
-                <a:lumMod val="102000"/>
-                <a:tint val="94000"/>
-              </a:schemeClr>
-            </a:gs>
-            <a:gs pos="50000">
-              <a:schemeClr val="accent4">
-                <a:hueOff val="0"/>
-                <a:satOff val="0"/>
-                <a:lumOff val="0"/>
-                <a:alphaOff val="0"/>
-                <a:satMod val="110000"/>
-                <a:lumMod val="100000"/>
-                <a:shade val="100000"/>
-              </a:schemeClr>
-            </a:gs>
-            <a:gs pos="100000">
-              <a:schemeClr val="accent4">
-                <a:hueOff val="0"/>
-                <a:satOff val="0"/>
-                <a:lumOff val="0"/>
-                <a:alphaOff val="0"/>
-                <a:lumMod val="99000"/>
-                <a:satMod val="120000"/>
-                <a:shade val="78000"/>
-              </a:schemeClr>
-            </a:gs>
-          </a:gsLst>
-          <a:lin ang="5400000" scaled="0"/>
-        </a:gradFill>
-        <a:ln>
-          <a:noFill/>
-        </a:ln>
-        <a:effectLst/>
-        <a:scene3d>
-          <a:camera prst="orthographicFront"/>
-          <a:lightRig rig="flat" dir="t"/>
-        </a:scene3d>
-        <a:sp3d prstMaterial="plastic">
-          <a:bevelT w="120900" h="88900"/>
-          <a:bevelB w="88900" h="31750" prst="angle"/>
-        </a:sp3d>
-      </dsp:spPr>
-      <dsp:style>
-        <a:lnRef idx="0">
-          <a:scrgbClr r="0" g="0" b="0"/>
-        </a:lnRef>
-        <a:fillRef idx="3">
-          <a:scrgbClr r="0" g="0" b="0"/>
-        </a:fillRef>
-        <a:effectRef idx="2">
-          <a:scrgbClr r="0" g="0" b="0"/>
-        </a:effectRef>
-        <a:fontRef idx="minor">
-          <a:schemeClr val="lt1"/>
-        </a:fontRef>
-      </dsp:style>
-      <dsp:txBody>
-        <a:bodyPr spcFirstLastPara="0" vert="horz" wrap="square" lIns="284480" tIns="284480" rIns="284480" bIns="284480" numCol="1" spcCol="1270" anchor="ctr" anchorCtr="0">
-          <a:noAutofit/>
-        </a:bodyPr>
-        <a:lstStyle/>
-        <a:p>
-          <a:pPr lvl="0" algn="ctr" defTabSz="1778000">
-            <a:lnSpc>
-              <a:spcPct val="90000"/>
-            </a:lnSpc>
-            <a:spcBef>
-              <a:spcPct val="0"/>
-            </a:spcBef>
-            <a:spcAft>
-              <a:spcPct val="35000"/>
-            </a:spcAft>
-          </a:pPr>
-          <a:r>
-            <a:rPr lang="fr-FR" sz="4000" kern="1200" dirty="0" smtClean="0"/>
-            <a:t>T</a:t>
-          </a:r>
-          <a:endParaRPr lang="fr-FR" sz="4000" kern="1200" dirty="0"/>
-        </a:p>
-      </dsp:txBody>
-      <dsp:txXfrm rot="10800000">
-        <a:off x="2956043" y="1917927"/>
-        <a:ext cx="1151422" cy="1151422"/>
-      </dsp:txXfrm>
-    </dsp:sp>
-    <dsp:sp modelId="{C0852406-3DC0-4222-A1F8-184593FC4596}">
-      <dsp:nvSpPr>
-        <dsp:cNvPr id="0" name=""/>
-        <dsp:cNvSpPr/>
-      </dsp:nvSpPr>
-      <dsp:spPr>
-        <a:xfrm rot="16200000">
-          <a:off x="1252472" y="1917927"/>
-          <a:ext cx="1628357" cy="1628357"/>
-        </a:xfrm>
-        <a:prstGeom prst="pieWedge">
-          <a:avLst/>
-        </a:prstGeom>
-        <a:gradFill rotWithShape="0">
-          <a:gsLst>
-            <a:gs pos="0">
-              <a:schemeClr val="accent5">
-                <a:hueOff val="0"/>
-                <a:satOff val="0"/>
-                <a:lumOff val="0"/>
-                <a:alphaOff val="0"/>
-                <a:satMod val="103000"/>
-                <a:lumMod val="102000"/>
-                <a:tint val="94000"/>
-              </a:schemeClr>
-            </a:gs>
-            <a:gs pos="50000">
-              <a:schemeClr val="accent5">
-                <a:hueOff val="0"/>
-                <a:satOff val="0"/>
-                <a:lumOff val="0"/>
-                <a:alphaOff val="0"/>
-                <a:satMod val="110000"/>
-                <a:lumMod val="100000"/>
-                <a:shade val="100000"/>
-              </a:schemeClr>
-            </a:gs>
-            <a:gs pos="100000">
-              <a:schemeClr val="accent5">
-                <a:hueOff val="0"/>
-                <a:satOff val="0"/>
-                <a:lumOff val="0"/>
-                <a:alphaOff val="0"/>
-                <a:lumMod val="99000"/>
-                <a:satMod val="120000"/>
-                <a:shade val="78000"/>
-              </a:schemeClr>
-            </a:gs>
-          </a:gsLst>
-          <a:lin ang="5400000" scaled="0"/>
-        </a:gradFill>
-        <a:ln>
-          <a:noFill/>
-        </a:ln>
-        <a:effectLst/>
-        <a:scene3d>
-          <a:camera prst="orthographicFront"/>
-          <a:lightRig rig="flat" dir="t"/>
-        </a:scene3d>
-        <a:sp3d prstMaterial="plastic">
-          <a:bevelT w="120900" h="88900"/>
-          <a:bevelB w="88900" h="31750" prst="angle"/>
-        </a:sp3d>
-      </dsp:spPr>
-      <dsp:style>
-        <a:lnRef idx="0">
-          <a:scrgbClr r="0" g="0" b="0"/>
-        </a:lnRef>
-        <a:fillRef idx="3">
-          <a:scrgbClr r="0" g="0" b="0"/>
-        </a:fillRef>
-        <a:effectRef idx="2">
-          <a:scrgbClr r="0" g="0" b="0"/>
-        </a:effectRef>
-        <a:fontRef idx="minor">
-          <a:schemeClr val="lt1"/>
-        </a:fontRef>
-      </dsp:style>
-      <dsp:txBody>
-        <a:bodyPr spcFirstLastPara="0" vert="horz" wrap="square" lIns="284480" tIns="284480" rIns="284480" bIns="284480" numCol="1" spcCol="1270" anchor="ctr" anchorCtr="0">
-          <a:noAutofit/>
-        </a:bodyPr>
-        <a:lstStyle/>
-        <a:p>
-          <a:pPr lvl="0" algn="ctr" defTabSz="1778000">
-            <a:lnSpc>
-              <a:spcPct val="90000"/>
-            </a:lnSpc>
-            <a:spcBef>
-              <a:spcPct val="0"/>
-            </a:spcBef>
-            <a:spcAft>
-              <a:spcPct val="35000"/>
-            </a:spcAft>
-          </a:pPr>
-          <a:r>
-            <a:rPr lang="fr-FR" sz="4000" kern="1200" dirty="0" smtClean="0"/>
-            <a:t>O</a:t>
-          </a:r>
-          <a:endParaRPr lang="fr-FR" sz="4000" kern="1200" dirty="0"/>
-        </a:p>
-      </dsp:txBody>
-      <dsp:txXfrm rot="5400000">
-        <a:off x="1729407" y="1917927"/>
-        <a:ext cx="1151422" cy="1151422"/>
-      </dsp:txXfrm>
-    </dsp:sp>
-    <dsp:sp modelId="{3B6382B4-DDDF-482E-9E6A-38E6F7DB930C}">
-      <dsp:nvSpPr>
-        <dsp:cNvPr id="0" name=""/>
-        <dsp:cNvSpPr/>
-      </dsp:nvSpPr>
-      <dsp:spPr>
-        <a:xfrm>
-          <a:off x="4959191" y="1554813"/>
-          <a:ext cx="562215" cy="488883"/>
-        </a:xfrm>
-        <a:prstGeom prst="circularArrow">
-          <a:avLst/>
-        </a:prstGeom>
-        <a:solidFill>
-          <a:schemeClr val="accent2">
-            <a:tint val="40000"/>
-            <a:hueOff val="0"/>
-            <a:satOff val="0"/>
-            <a:lumOff val="0"/>
-            <a:alpha val="0"/>
-          </a:schemeClr>
-        </a:solidFill>
-        <a:ln>
-          <a:noFill/>
-        </a:ln>
-        <a:effectLst>
-          <a:outerShdw blurRad="57150" dist="19050" dir="5400000" algn="ctr" rotWithShape="0">
-            <a:srgbClr val="000000">
-              <a:alpha val="63000"/>
-            </a:srgbClr>
-          </a:outerShdw>
-        </a:effectLst>
-        <a:scene3d>
-          <a:camera prst="orthographicFront"/>
-          <a:lightRig rig="flat" dir="t"/>
-        </a:scene3d>
-        <a:sp3d z="190500" prstMaterial="plastic">
-          <a:bevelT w="120900" h="88900"/>
-          <a:bevelB w="88900" h="31750" prst="angle"/>
-        </a:sp3d>
-      </dsp:spPr>
-      <dsp:style>
-        <a:lnRef idx="0">
-          <a:scrgbClr r="0" g="0" b="0"/>
-        </a:lnRef>
-        <a:fillRef idx="1">
-          <a:scrgbClr r="0" g="0" b="0"/>
-        </a:fillRef>
-        <a:effectRef idx="3">
-          <a:scrgbClr r="0" g="0" b="0"/>
-        </a:effectRef>
-        <a:fontRef idx="minor">
-          <a:schemeClr val="lt1"/>
-        </a:fontRef>
-      </dsp:style>
-    </dsp:sp>
-    <dsp:sp modelId="{72B333DC-EBE8-4650-A713-61338E0F2C2D}">
-      <dsp:nvSpPr>
-        <dsp:cNvPr id="0" name=""/>
-        <dsp:cNvSpPr/>
-      </dsp:nvSpPr>
-      <dsp:spPr>
-        <a:xfrm rot="10800000">
-          <a:off x="4959191" y="1626286"/>
-          <a:ext cx="562215" cy="488883"/>
-        </a:xfrm>
-        <a:prstGeom prst="circularArrow">
-          <a:avLst/>
-        </a:prstGeom>
-        <a:solidFill>
-          <a:schemeClr val="accent2">
-            <a:tint val="40000"/>
-            <a:hueOff val="0"/>
-            <a:satOff val="0"/>
-            <a:lumOff val="0"/>
-            <a:alpha val="0"/>
-          </a:schemeClr>
-        </a:solidFill>
-        <a:ln>
-          <a:noFill/>
-        </a:ln>
-        <a:effectLst>
-          <a:outerShdw blurRad="57150" dist="19050" dir="5400000" algn="ctr" rotWithShape="0">
-            <a:srgbClr val="000000">
-              <a:alpha val="63000"/>
-            </a:srgbClr>
-          </a:outerShdw>
-        </a:effectLst>
-        <a:scene3d>
-          <a:camera prst="orthographicFront"/>
-          <a:lightRig rig="flat" dir="t"/>
-        </a:scene3d>
-        <a:sp3d z="190500" prstMaterial="plastic">
-          <a:bevelT w="120900" h="88900"/>
-          <a:bevelB w="88900" h="31750" prst="angle"/>
-        </a:sp3d>
-      </dsp:spPr>
-      <dsp:style>
-        <a:lnRef idx="0">
-          <a:scrgbClr r="0" g="0" b="0"/>
-        </a:lnRef>
-        <a:fillRef idx="1">
-          <a:scrgbClr r="0" g="0" b="0"/>
-        </a:fillRef>
-        <a:effectRef idx="3">
-          <a:scrgbClr r="0" g="0" b="0"/>
-        </a:effectRef>
-        <a:fontRef idx="minor">
-          <a:schemeClr val="lt1"/>
-        </a:fontRef>
-      </dsp:style>
-    </dsp:sp>
   </dsp:spTree>
 </dsp:drawing>
 </file>
@@ -9516,7 +7502,7 @@
           <a:p>
             <a:fld id="{38717F5D-9B99-41E9-AAF0-B73531F5A10E}" type="slidenum">
               <a:rPr lang="fr-FR" smtClean="0"/>
-              <a:t>‹N°›</a:t>
+              <a:t>‹#›</a:t>
             </a:fld>
             <a:endParaRPr lang="fr-FR"/>
           </a:p>
@@ -9774,7 +7760,7 @@
           <a:p>
             <a:fld id="{049843D5-FBCC-450E-8A81-920AD1F49A83}" type="slidenum">
               <a:rPr lang="fr-FR" smtClean="0"/>
-              <a:t>‹N°›</a:t>
+              <a:t>‹#›</a:t>
             </a:fld>
             <a:endParaRPr lang="fr-FR"/>
           </a:p>
@@ -10834,7 +8820,7 @@
             <a:fld id="{813506F1-DB5F-4FC9-88BA-B486F30FE4BF}" type="slidenum">
               <a:rPr lang="fr-FR" smtClean="0"/>
               <a:pPr/>
-              <a:t>‹N°›</a:t>
+              <a:t>‹#›</a:t>
             </a:fld>
             <a:endParaRPr lang="fr-FR" dirty="0"/>
           </a:p>
@@ -18408,13 +16394,8 @@
             </a:r>
             <a:r>
               <a:rPr lang="fr-FR" sz="2000" dirty="0" smtClean="0"/>
-              <a:t> </a:t>
+              <a:t> interface</a:t>
             </a:r>
-            <a:r>
-              <a:rPr lang="fr-FR" sz="2000" dirty="0" smtClean="0"/>
-              <a:t>interface</a:t>
-            </a:r>
-            <a:endParaRPr lang="fr-FR" sz="2000" dirty="0" smtClean="0"/>
           </a:p>
           <a:p>
             <a:pPr algn="just"/>
@@ -18469,7 +16450,6 @@
               <a:rPr lang="fr-FR" sz="2000" dirty="0" smtClean="0"/>
               <a:t> server</a:t>
             </a:r>
-            <a:endParaRPr lang="fr-FR" sz="2000" dirty="0" smtClean="0"/>
           </a:p>
         </p:txBody>
       </p:sp>
@@ -25454,7 +23434,6 @@
               <a:rPr lang="fr-FR" sz="2000" dirty="0" smtClean="0"/>
               <a:t>Ajouter le site sur le site du client</a:t>
             </a:r>
-            <a:endParaRPr lang="fr-FR" sz="2000" dirty="0" smtClean="0"/>
           </a:p>
         </p:txBody>
       </p:sp>
@@ -25814,6 +23793,96 @@
           </a:p>
         </p:txBody>
       </p:sp>
+      <p:pic>
+        <p:nvPicPr>
+          <p:cNvPr id="3" name="Picture 2"/>
+          <p:cNvPicPr>
+            <a:picLocks noChangeAspect="1"/>
+          </p:cNvPicPr>
+          <p:nvPr/>
+        </p:nvPicPr>
+        <p:blipFill>
+          <a:blip r:embed="rId2" cstate="print">
+            <a:extLst>
+              <a:ext uri="{28A0092B-C50C-407E-A947-70E740481C1C}">
+                <a14:useLocalDpi xmlns:a14="http://schemas.microsoft.com/office/drawing/2010/main" val="0"/>
+              </a:ext>
+            </a:extLst>
+          </a:blip>
+          <a:stretch>
+            <a:fillRect/>
+          </a:stretch>
+        </p:blipFill>
+        <p:spPr>
+          <a:xfrm>
+            <a:off x="1034288" y="1963022"/>
+            <a:ext cx="2537284" cy="2751591"/>
+          </a:xfrm>
+          <a:prstGeom prst="rect">
+            <a:avLst/>
+          </a:prstGeom>
+        </p:spPr>
+      </p:pic>
+      <p:pic>
+        <p:nvPicPr>
+          <p:cNvPr id="4" name="Picture 3"/>
+          <p:cNvPicPr>
+            <a:picLocks noChangeAspect="1"/>
+          </p:cNvPicPr>
+          <p:nvPr/>
+        </p:nvPicPr>
+        <p:blipFill>
+          <a:blip r:embed="rId3" cstate="print">
+            <a:extLst>
+              <a:ext uri="{28A0092B-C50C-407E-A947-70E740481C1C}">
+                <a14:useLocalDpi xmlns:a14="http://schemas.microsoft.com/office/drawing/2010/main" val="0"/>
+              </a:ext>
+            </a:extLst>
+          </a:blip>
+          <a:stretch>
+            <a:fillRect/>
+          </a:stretch>
+        </p:blipFill>
+        <p:spPr>
+          <a:xfrm>
+            <a:off x="3920165" y="1661017"/>
+            <a:ext cx="2664256" cy="2885815"/>
+          </a:xfrm>
+          <a:prstGeom prst="rect">
+            <a:avLst/>
+          </a:prstGeom>
+        </p:spPr>
+      </p:pic>
+      <p:pic>
+        <p:nvPicPr>
+          <p:cNvPr id="7" name="Picture 6"/>
+          <p:cNvPicPr>
+            <a:picLocks noChangeAspect="1"/>
+          </p:cNvPicPr>
+          <p:nvPr/>
+        </p:nvPicPr>
+        <p:blipFill>
+          <a:blip r:embed="rId4" cstate="print">
+            <a:extLst>
+              <a:ext uri="{28A0092B-C50C-407E-A947-70E740481C1C}">
+                <a14:useLocalDpi xmlns:a14="http://schemas.microsoft.com/office/drawing/2010/main" val="0"/>
+              </a:ext>
+            </a:extLst>
+          </a:blip>
+          <a:stretch>
+            <a:fillRect/>
+          </a:stretch>
+        </p:blipFill>
+        <p:spPr>
+          <a:xfrm>
+            <a:off x="5155142" y="2919368"/>
+            <a:ext cx="7036857" cy="3811631"/>
+          </a:xfrm>
+          <a:prstGeom prst="rect">
+            <a:avLst/>
+          </a:prstGeom>
+        </p:spPr>
+      </p:pic>
     </p:spTree>
     <p:extLst>
       <p:ext uri="{BB962C8B-B14F-4D97-AF65-F5344CB8AC3E}">

</xml_diff>

<commit_message>
Mise en forme des images
</commit_message>
<xml_diff>
--- a/Slides/Diapos_Suivit_projet.pptx
+++ b/Slides/Diapos_Suivit_projet.pptx
@@ -3654,6 +3654,989 @@
       <dsp:cNvGrpSpPr/>
     </dsp:nvGrpSpPr>
     <dsp:grpSpPr/>
+    <dsp:sp modelId="{68AC0C8C-6683-4490-8F38-983C8CB47C3F}">
+      <dsp:nvSpPr>
+        <dsp:cNvPr id="0" name=""/>
+        <dsp:cNvSpPr/>
+      </dsp:nvSpPr>
+      <dsp:spPr>
+        <a:xfrm>
+          <a:off x="3454528" y="2411770"/>
+          <a:ext cx="1752080" cy="1134951"/>
+        </a:xfrm>
+        <a:prstGeom prst="roundRect">
+          <a:avLst>
+            <a:gd name="adj" fmla="val 10000"/>
+          </a:avLst>
+        </a:prstGeom>
+        <a:solidFill>
+          <a:schemeClr val="lt1">
+            <a:alpha val="90000"/>
+            <a:hueOff val="0"/>
+            <a:satOff val="0"/>
+            <a:lumOff val="0"/>
+            <a:alphaOff val="0"/>
+          </a:schemeClr>
+        </a:solidFill>
+        <a:ln w="6350" cap="flat" cmpd="sng" algn="ctr">
+          <a:solidFill>
+            <a:schemeClr val="accent4">
+              <a:hueOff val="0"/>
+              <a:satOff val="0"/>
+              <a:lumOff val="0"/>
+              <a:alphaOff val="0"/>
+            </a:schemeClr>
+          </a:solidFill>
+          <a:prstDash val="solid"/>
+          <a:miter lim="800000"/>
+        </a:ln>
+        <a:effectLst/>
+        <a:scene3d>
+          <a:camera prst="orthographicFront"/>
+          <a:lightRig rig="flat" dir="t"/>
+        </a:scene3d>
+        <a:sp3d z="-190500" extrusionH="12700" prstMaterial="plastic">
+          <a:bevelT w="50800" h="50800"/>
+        </a:sp3d>
+      </dsp:spPr>
+      <dsp:style>
+        <a:lnRef idx="1">
+          <a:scrgbClr r="0" g="0" b="0"/>
+        </a:lnRef>
+        <a:fillRef idx="1">
+          <a:scrgbClr r="0" g="0" b="0"/>
+        </a:fillRef>
+        <a:effectRef idx="2">
+          <a:scrgbClr r="0" g="0" b="0"/>
+        </a:effectRef>
+        <a:fontRef idx="minor"/>
+      </dsp:style>
+      <dsp:txBody>
+        <a:bodyPr spcFirstLastPara="0" vert="horz" wrap="square" lIns="45720" tIns="45720" rIns="45720" bIns="45720" numCol="1" spcCol="1270" anchor="t" anchorCtr="0">
+          <a:noAutofit/>
+        </a:bodyPr>
+        <a:lstStyle/>
+        <a:p>
+          <a:pPr marL="57150" lvl="1" indent="-57150" algn="l" defTabSz="400050">
+            <a:lnSpc>
+              <a:spcPct val="90000"/>
+            </a:lnSpc>
+            <a:spcBef>
+              <a:spcPct val="0"/>
+            </a:spcBef>
+            <a:spcAft>
+              <a:spcPct val="15000"/>
+            </a:spcAft>
+            <a:buChar char="••"/>
+          </a:pPr>
+          <a:r>
+            <a:rPr lang="fr-FR" sz="900" kern="1200" dirty="0" smtClean="0"/>
+            <a:t>Risque de forte demande (serveur)</a:t>
+          </a:r>
+          <a:endParaRPr lang="fr-FR" sz="900" kern="1200" dirty="0"/>
+        </a:p>
+        <a:p>
+          <a:pPr marL="57150" lvl="1" indent="-57150" algn="l" defTabSz="400050">
+            <a:lnSpc>
+              <a:spcPct val="90000"/>
+            </a:lnSpc>
+            <a:spcBef>
+              <a:spcPct val="0"/>
+            </a:spcBef>
+            <a:spcAft>
+              <a:spcPct val="15000"/>
+            </a:spcAft>
+            <a:buChar char="••"/>
+          </a:pPr>
+          <a:r>
+            <a:rPr lang="fr-FR" sz="900" kern="1200" dirty="0" smtClean="0"/>
+            <a:t>Protection des données (temporaires)</a:t>
+          </a:r>
+          <a:endParaRPr lang="fr-FR" sz="900" kern="1200" dirty="0"/>
+        </a:p>
+      </dsp:txBody>
+      <dsp:txXfrm>
+        <a:off x="4005083" y="2720439"/>
+        <a:ext cx="1176594" cy="801351"/>
+      </dsp:txXfrm>
+    </dsp:sp>
+    <dsp:sp modelId="{431C4C2F-7F42-4D62-8EEF-918E7AD22EA0}">
+      <dsp:nvSpPr>
+        <dsp:cNvPr id="0" name=""/>
+        <dsp:cNvSpPr/>
+      </dsp:nvSpPr>
+      <dsp:spPr>
+        <a:xfrm>
+          <a:off x="565296" y="2411770"/>
+          <a:ext cx="1752080" cy="1134951"/>
+        </a:xfrm>
+        <a:prstGeom prst="roundRect">
+          <a:avLst>
+            <a:gd name="adj" fmla="val 10000"/>
+          </a:avLst>
+        </a:prstGeom>
+        <a:solidFill>
+          <a:schemeClr val="lt1">
+            <a:alpha val="90000"/>
+            <a:hueOff val="0"/>
+            <a:satOff val="0"/>
+            <a:lumOff val="0"/>
+            <a:alphaOff val="0"/>
+          </a:schemeClr>
+        </a:solidFill>
+        <a:ln w="6350" cap="flat" cmpd="sng" algn="ctr">
+          <a:solidFill>
+            <a:schemeClr val="accent5">
+              <a:hueOff val="0"/>
+              <a:satOff val="0"/>
+              <a:lumOff val="0"/>
+              <a:alphaOff val="0"/>
+            </a:schemeClr>
+          </a:solidFill>
+          <a:prstDash val="solid"/>
+          <a:miter lim="800000"/>
+        </a:ln>
+        <a:effectLst/>
+        <a:scene3d>
+          <a:camera prst="orthographicFront"/>
+          <a:lightRig rig="flat" dir="t"/>
+        </a:scene3d>
+        <a:sp3d z="-190500" extrusionH="12700" prstMaterial="plastic">
+          <a:bevelT w="50800" h="50800"/>
+        </a:sp3d>
+      </dsp:spPr>
+      <dsp:style>
+        <a:lnRef idx="1">
+          <a:scrgbClr r="0" g="0" b="0"/>
+        </a:lnRef>
+        <a:fillRef idx="1">
+          <a:scrgbClr r="0" g="0" b="0"/>
+        </a:fillRef>
+        <a:effectRef idx="2">
+          <a:scrgbClr r="0" g="0" b="0"/>
+        </a:effectRef>
+        <a:fontRef idx="minor"/>
+      </dsp:style>
+      <dsp:txBody>
+        <a:bodyPr spcFirstLastPara="0" vert="horz" wrap="square" lIns="45720" tIns="45720" rIns="45720" bIns="45720" numCol="1" spcCol="1270" anchor="t" anchorCtr="0">
+          <a:noAutofit/>
+        </a:bodyPr>
+        <a:lstStyle/>
+        <a:p>
+          <a:pPr marL="57150" lvl="1" indent="-57150" algn="l" defTabSz="400050">
+            <a:lnSpc>
+              <a:spcPct val="90000"/>
+            </a:lnSpc>
+            <a:spcBef>
+              <a:spcPct val="0"/>
+            </a:spcBef>
+            <a:spcAft>
+              <a:spcPct val="15000"/>
+            </a:spcAft>
+            <a:buChar char="••"/>
+          </a:pPr>
+          <a:r>
+            <a:rPr lang="fr-FR" sz="900" kern="1200" dirty="0" smtClean="0"/>
+            <a:t>Pas de concurrents</a:t>
+          </a:r>
+          <a:endParaRPr lang="fr-FR" sz="900" kern="1200" dirty="0"/>
+        </a:p>
+        <a:p>
+          <a:pPr marL="57150" lvl="1" indent="-57150" algn="l" defTabSz="400050">
+            <a:lnSpc>
+              <a:spcPct val="90000"/>
+            </a:lnSpc>
+            <a:spcBef>
+              <a:spcPct val="0"/>
+            </a:spcBef>
+            <a:spcAft>
+              <a:spcPct val="15000"/>
+            </a:spcAft>
+            <a:buChar char="••"/>
+          </a:pPr>
+          <a:r>
+            <a:rPr lang="fr-FR" sz="900" kern="1200" dirty="0" smtClean="0"/>
+            <a:t>Grande utilité</a:t>
+          </a:r>
+          <a:endParaRPr lang="fr-FR" sz="900" kern="1200" dirty="0"/>
+        </a:p>
+      </dsp:txBody>
+      <dsp:txXfrm>
+        <a:off x="590227" y="2720439"/>
+        <a:ext cx="1176594" cy="801351"/>
+      </dsp:txXfrm>
+    </dsp:sp>
+    <dsp:sp modelId="{05478942-E273-4856-8553-F0FD8F015AA2}">
+      <dsp:nvSpPr>
+        <dsp:cNvPr id="0" name=""/>
+        <dsp:cNvSpPr/>
+      </dsp:nvSpPr>
+      <dsp:spPr>
+        <a:xfrm>
+          <a:off x="3454528" y="0"/>
+          <a:ext cx="1752080" cy="1134951"/>
+        </a:xfrm>
+        <a:prstGeom prst="roundRect">
+          <a:avLst>
+            <a:gd name="adj" fmla="val 10000"/>
+          </a:avLst>
+        </a:prstGeom>
+        <a:solidFill>
+          <a:schemeClr val="lt1">
+            <a:alpha val="90000"/>
+            <a:hueOff val="0"/>
+            <a:satOff val="0"/>
+            <a:lumOff val="0"/>
+            <a:alphaOff val="0"/>
+          </a:schemeClr>
+        </a:solidFill>
+        <a:ln w="6350" cap="flat" cmpd="sng" algn="ctr">
+          <a:solidFill>
+            <a:schemeClr val="accent3">
+              <a:hueOff val="0"/>
+              <a:satOff val="0"/>
+              <a:lumOff val="0"/>
+              <a:alphaOff val="0"/>
+            </a:schemeClr>
+          </a:solidFill>
+          <a:prstDash val="solid"/>
+          <a:miter lim="800000"/>
+        </a:ln>
+        <a:effectLst/>
+        <a:scene3d>
+          <a:camera prst="orthographicFront"/>
+          <a:lightRig rig="flat" dir="t"/>
+        </a:scene3d>
+        <a:sp3d z="-190500" extrusionH="12700" prstMaterial="plastic">
+          <a:bevelT w="50800" h="50800"/>
+        </a:sp3d>
+      </dsp:spPr>
+      <dsp:style>
+        <a:lnRef idx="1">
+          <a:scrgbClr r="0" g="0" b="0"/>
+        </a:lnRef>
+        <a:fillRef idx="1">
+          <a:scrgbClr r="0" g="0" b="0"/>
+        </a:fillRef>
+        <a:effectRef idx="2">
+          <a:scrgbClr r="0" g="0" b="0"/>
+        </a:effectRef>
+        <a:fontRef idx="minor"/>
+      </dsp:style>
+      <dsp:txBody>
+        <a:bodyPr spcFirstLastPara="0" vert="horz" wrap="square" lIns="45720" tIns="45720" rIns="45720" bIns="45720" numCol="1" spcCol="1270" anchor="t" anchorCtr="0">
+          <a:noAutofit/>
+        </a:bodyPr>
+        <a:lstStyle/>
+        <a:p>
+          <a:pPr marL="57150" lvl="1" indent="-57150" algn="l" defTabSz="400050">
+            <a:lnSpc>
+              <a:spcPct val="90000"/>
+            </a:lnSpc>
+            <a:spcBef>
+              <a:spcPct val="0"/>
+            </a:spcBef>
+            <a:spcAft>
+              <a:spcPct val="15000"/>
+            </a:spcAft>
+            <a:buChar char="••"/>
+          </a:pPr>
+          <a:r>
+            <a:rPr lang="fr-FR" sz="900" kern="1200" dirty="0" smtClean="0"/>
+            <a:t>Deadlines courtes</a:t>
+          </a:r>
+          <a:endParaRPr lang="fr-FR" sz="900" kern="1200" dirty="0"/>
+        </a:p>
+        <a:p>
+          <a:pPr marL="57150" lvl="1" indent="-57150" algn="l" defTabSz="400050">
+            <a:lnSpc>
+              <a:spcPct val="90000"/>
+            </a:lnSpc>
+            <a:spcBef>
+              <a:spcPct val="0"/>
+            </a:spcBef>
+            <a:spcAft>
+              <a:spcPct val="15000"/>
+            </a:spcAft>
+            <a:buChar char="••"/>
+          </a:pPr>
+          <a:r>
+            <a:rPr lang="fr-FR" sz="900" kern="1200" dirty="0" smtClean="0"/>
+            <a:t>Faible documentation</a:t>
+          </a:r>
+          <a:endParaRPr lang="fr-FR" sz="900" kern="1200" dirty="0"/>
+        </a:p>
+      </dsp:txBody>
+      <dsp:txXfrm>
+        <a:off x="4005083" y="24931"/>
+        <a:ext cx="1176594" cy="801351"/>
+      </dsp:txXfrm>
+    </dsp:sp>
+    <dsp:sp modelId="{BC6F0824-1351-49BA-BADB-F02B71A91728}">
+      <dsp:nvSpPr>
+        <dsp:cNvPr id="0" name=""/>
+        <dsp:cNvSpPr/>
+      </dsp:nvSpPr>
+      <dsp:spPr>
+        <a:xfrm>
+          <a:off x="565296" y="0"/>
+          <a:ext cx="1752080" cy="1134951"/>
+        </a:xfrm>
+        <a:prstGeom prst="roundRect">
+          <a:avLst>
+            <a:gd name="adj" fmla="val 10000"/>
+          </a:avLst>
+        </a:prstGeom>
+        <a:solidFill>
+          <a:schemeClr val="lt1">
+            <a:alpha val="90000"/>
+            <a:hueOff val="0"/>
+            <a:satOff val="0"/>
+            <a:lumOff val="0"/>
+            <a:alphaOff val="0"/>
+          </a:schemeClr>
+        </a:solidFill>
+        <a:ln w="6350" cap="flat" cmpd="sng" algn="ctr">
+          <a:solidFill>
+            <a:schemeClr val="accent2">
+              <a:hueOff val="0"/>
+              <a:satOff val="0"/>
+              <a:lumOff val="0"/>
+              <a:alphaOff val="0"/>
+            </a:schemeClr>
+          </a:solidFill>
+          <a:prstDash val="solid"/>
+          <a:miter lim="800000"/>
+        </a:ln>
+        <a:effectLst/>
+        <a:scene3d>
+          <a:camera prst="orthographicFront"/>
+          <a:lightRig rig="flat" dir="t"/>
+        </a:scene3d>
+        <a:sp3d z="-190500" extrusionH="12700" prstMaterial="plastic">
+          <a:bevelT w="50800" h="50800"/>
+        </a:sp3d>
+      </dsp:spPr>
+      <dsp:style>
+        <a:lnRef idx="1">
+          <a:scrgbClr r="0" g="0" b="0"/>
+        </a:lnRef>
+        <a:fillRef idx="1">
+          <a:scrgbClr r="0" g="0" b="0"/>
+        </a:fillRef>
+        <a:effectRef idx="2">
+          <a:scrgbClr r="0" g="0" b="0"/>
+        </a:effectRef>
+        <a:fontRef idx="minor"/>
+      </dsp:style>
+      <dsp:txBody>
+        <a:bodyPr spcFirstLastPara="0" vert="horz" wrap="square" lIns="34290" tIns="34290" rIns="34290" bIns="34290" numCol="1" spcCol="1270" anchor="t" anchorCtr="0">
+          <a:noAutofit/>
+        </a:bodyPr>
+        <a:lstStyle/>
+        <a:p>
+          <a:pPr marL="57150" lvl="1" indent="-57150" algn="l" defTabSz="400050">
+            <a:lnSpc>
+              <a:spcPct val="90000"/>
+            </a:lnSpc>
+            <a:spcBef>
+              <a:spcPct val="0"/>
+            </a:spcBef>
+            <a:spcAft>
+              <a:spcPct val="15000"/>
+            </a:spcAft>
+            <a:buChar char="••"/>
+          </a:pPr>
+          <a:r>
+            <a:rPr lang="fr-FR" sz="900" kern="1200" dirty="0" smtClean="0"/>
+            <a:t>Différentes compétences</a:t>
+          </a:r>
+          <a:endParaRPr lang="fr-FR" sz="900" kern="1200" dirty="0"/>
+        </a:p>
+        <a:p>
+          <a:pPr marL="57150" lvl="1" indent="-57150" algn="l" defTabSz="400050">
+            <a:lnSpc>
+              <a:spcPct val="90000"/>
+            </a:lnSpc>
+            <a:spcBef>
+              <a:spcPct val="0"/>
+            </a:spcBef>
+            <a:spcAft>
+              <a:spcPct val="15000"/>
+            </a:spcAft>
+            <a:buChar char="••"/>
+          </a:pPr>
+          <a:r>
+            <a:rPr lang="fr-FR" sz="900" kern="1200" dirty="0" smtClean="0"/>
+            <a:t>Contact avec un expert</a:t>
+          </a:r>
+          <a:endParaRPr lang="fr-FR" sz="900" kern="1200" dirty="0"/>
+        </a:p>
+        <a:p>
+          <a:pPr marL="57150" lvl="1" indent="-57150" algn="l" defTabSz="400050">
+            <a:lnSpc>
+              <a:spcPct val="90000"/>
+            </a:lnSpc>
+            <a:spcBef>
+              <a:spcPct val="0"/>
+            </a:spcBef>
+            <a:spcAft>
+              <a:spcPct val="15000"/>
+            </a:spcAft>
+            <a:buChar char="••"/>
+          </a:pPr>
+          <a:r>
+            <a:rPr lang="fr-FR" sz="900" kern="1200" dirty="0" smtClean="0"/>
+            <a:t>Utilisation de package ‘open source ’</a:t>
+          </a:r>
+          <a:endParaRPr lang="fr-FR" sz="900" kern="1200" dirty="0"/>
+        </a:p>
+      </dsp:txBody>
+      <dsp:txXfrm>
+        <a:off x="590227" y="24931"/>
+        <a:ext cx="1176594" cy="801351"/>
+      </dsp:txXfrm>
+    </dsp:sp>
+    <dsp:sp modelId="{E72BDFA6-376E-4614-9D7C-A68241E884D9}">
+      <dsp:nvSpPr>
+        <dsp:cNvPr id="0" name=""/>
+        <dsp:cNvSpPr/>
+      </dsp:nvSpPr>
+      <dsp:spPr>
+        <a:xfrm>
+          <a:off x="1299468" y="202163"/>
+          <a:ext cx="1535730" cy="1535730"/>
+        </a:xfrm>
+        <a:prstGeom prst="pieWedge">
+          <a:avLst/>
+        </a:prstGeom>
+        <a:gradFill rotWithShape="0">
+          <a:gsLst>
+            <a:gs pos="0">
+              <a:schemeClr val="accent2">
+                <a:hueOff val="0"/>
+                <a:satOff val="0"/>
+                <a:lumOff val="0"/>
+                <a:alphaOff val="0"/>
+                <a:satMod val="103000"/>
+                <a:lumMod val="102000"/>
+                <a:tint val="94000"/>
+              </a:schemeClr>
+            </a:gs>
+            <a:gs pos="50000">
+              <a:schemeClr val="accent2">
+                <a:hueOff val="0"/>
+                <a:satOff val="0"/>
+                <a:lumOff val="0"/>
+                <a:alphaOff val="0"/>
+                <a:satMod val="110000"/>
+                <a:lumMod val="100000"/>
+                <a:shade val="100000"/>
+              </a:schemeClr>
+            </a:gs>
+            <a:gs pos="100000">
+              <a:schemeClr val="accent2">
+                <a:hueOff val="0"/>
+                <a:satOff val="0"/>
+                <a:lumOff val="0"/>
+                <a:alphaOff val="0"/>
+                <a:lumMod val="99000"/>
+                <a:satMod val="120000"/>
+                <a:shade val="78000"/>
+              </a:schemeClr>
+            </a:gs>
+          </a:gsLst>
+          <a:lin ang="5400000" scaled="0"/>
+        </a:gradFill>
+        <a:ln>
+          <a:noFill/>
+        </a:ln>
+        <a:effectLst/>
+        <a:scene3d>
+          <a:camera prst="orthographicFront"/>
+          <a:lightRig rig="flat" dir="t"/>
+        </a:scene3d>
+        <a:sp3d prstMaterial="plastic">
+          <a:bevelT w="120900" h="88900"/>
+          <a:bevelB w="88900" h="31750" prst="angle"/>
+        </a:sp3d>
+      </dsp:spPr>
+      <dsp:style>
+        <a:lnRef idx="0">
+          <a:scrgbClr r="0" g="0" b="0"/>
+        </a:lnRef>
+        <a:fillRef idx="3">
+          <a:scrgbClr r="0" g="0" b="0"/>
+        </a:fillRef>
+        <a:effectRef idx="2">
+          <a:scrgbClr r="0" g="0" b="0"/>
+        </a:effectRef>
+        <a:fontRef idx="minor">
+          <a:schemeClr val="lt1"/>
+        </a:fontRef>
+      </dsp:style>
+      <dsp:txBody>
+        <a:bodyPr spcFirstLastPara="0" vert="horz" wrap="square" lIns="270256" tIns="270256" rIns="270256" bIns="270256" numCol="1" spcCol="1270" anchor="ctr" anchorCtr="0">
+          <a:noAutofit/>
+        </a:bodyPr>
+        <a:lstStyle/>
+        <a:p>
+          <a:pPr lvl="0" algn="ctr" defTabSz="1689100">
+            <a:lnSpc>
+              <a:spcPct val="90000"/>
+            </a:lnSpc>
+            <a:spcBef>
+              <a:spcPct val="0"/>
+            </a:spcBef>
+            <a:spcAft>
+              <a:spcPct val="35000"/>
+            </a:spcAft>
+          </a:pPr>
+          <a:r>
+            <a:rPr lang="fr-FR" sz="3800" kern="1200" dirty="0" smtClean="0"/>
+            <a:t>S</a:t>
+          </a:r>
+          <a:endParaRPr lang="fr-FR" sz="3800" kern="1200" dirty="0"/>
+        </a:p>
+      </dsp:txBody>
+      <dsp:txXfrm>
+        <a:off x="1749273" y="651968"/>
+        <a:ext cx="1085925" cy="1085925"/>
+      </dsp:txXfrm>
+    </dsp:sp>
+    <dsp:sp modelId="{A67A60E5-5291-49E4-B3E5-53A58B528285}">
+      <dsp:nvSpPr>
+        <dsp:cNvPr id="0" name=""/>
+        <dsp:cNvSpPr/>
+      </dsp:nvSpPr>
+      <dsp:spPr>
+        <a:xfrm rot="5400000">
+          <a:off x="2906133" y="202163"/>
+          <a:ext cx="1535730" cy="1535730"/>
+        </a:xfrm>
+        <a:prstGeom prst="pieWedge">
+          <a:avLst/>
+        </a:prstGeom>
+        <a:gradFill rotWithShape="0">
+          <a:gsLst>
+            <a:gs pos="0">
+              <a:schemeClr val="accent3">
+                <a:hueOff val="0"/>
+                <a:satOff val="0"/>
+                <a:lumOff val="0"/>
+                <a:alphaOff val="0"/>
+                <a:satMod val="103000"/>
+                <a:lumMod val="102000"/>
+                <a:tint val="94000"/>
+              </a:schemeClr>
+            </a:gs>
+            <a:gs pos="50000">
+              <a:schemeClr val="accent3">
+                <a:hueOff val="0"/>
+                <a:satOff val="0"/>
+                <a:lumOff val="0"/>
+                <a:alphaOff val="0"/>
+                <a:satMod val="110000"/>
+                <a:lumMod val="100000"/>
+                <a:shade val="100000"/>
+              </a:schemeClr>
+            </a:gs>
+            <a:gs pos="100000">
+              <a:schemeClr val="accent3">
+                <a:hueOff val="0"/>
+                <a:satOff val="0"/>
+                <a:lumOff val="0"/>
+                <a:alphaOff val="0"/>
+                <a:lumMod val="99000"/>
+                <a:satMod val="120000"/>
+                <a:shade val="78000"/>
+              </a:schemeClr>
+            </a:gs>
+          </a:gsLst>
+          <a:lin ang="5400000" scaled="0"/>
+        </a:gradFill>
+        <a:ln>
+          <a:noFill/>
+        </a:ln>
+        <a:effectLst/>
+        <a:scene3d>
+          <a:camera prst="orthographicFront"/>
+          <a:lightRig rig="flat" dir="t"/>
+        </a:scene3d>
+        <a:sp3d prstMaterial="plastic">
+          <a:bevelT w="120900" h="88900"/>
+          <a:bevelB w="88900" h="31750" prst="angle"/>
+        </a:sp3d>
+      </dsp:spPr>
+      <dsp:style>
+        <a:lnRef idx="0">
+          <a:scrgbClr r="0" g="0" b="0"/>
+        </a:lnRef>
+        <a:fillRef idx="3">
+          <a:scrgbClr r="0" g="0" b="0"/>
+        </a:fillRef>
+        <a:effectRef idx="2">
+          <a:scrgbClr r="0" g="0" b="0"/>
+        </a:effectRef>
+        <a:fontRef idx="minor">
+          <a:schemeClr val="lt1"/>
+        </a:fontRef>
+      </dsp:style>
+      <dsp:txBody>
+        <a:bodyPr spcFirstLastPara="0" vert="horz" wrap="square" lIns="270256" tIns="270256" rIns="270256" bIns="270256" numCol="1" spcCol="1270" anchor="ctr" anchorCtr="0">
+          <a:noAutofit/>
+        </a:bodyPr>
+        <a:lstStyle/>
+        <a:p>
+          <a:pPr lvl="0" algn="ctr" defTabSz="1689100">
+            <a:lnSpc>
+              <a:spcPct val="90000"/>
+            </a:lnSpc>
+            <a:spcBef>
+              <a:spcPct val="0"/>
+            </a:spcBef>
+            <a:spcAft>
+              <a:spcPct val="35000"/>
+            </a:spcAft>
+          </a:pPr>
+          <a:r>
+            <a:rPr lang="fr-FR" sz="3800" kern="1200" dirty="0" smtClean="0"/>
+            <a:t>W</a:t>
+          </a:r>
+          <a:endParaRPr lang="fr-FR" sz="3800" kern="1200" dirty="0"/>
+        </a:p>
+      </dsp:txBody>
+      <dsp:txXfrm rot="-5400000">
+        <a:off x="2906133" y="651968"/>
+        <a:ext cx="1085925" cy="1085925"/>
+      </dsp:txXfrm>
+    </dsp:sp>
+    <dsp:sp modelId="{CF4FC7F6-A89C-4633-A10E-BFE92B369DCD}">
+      <dsp:nvSpPr>
+        <dsp:cNvPr id="0" name=""/>
+        <dsp:cNvSpPr/>
+      </dsp:nvSpPr>
+      <dsp:spPr>
+        <a:xfrm rot="10800000">
+          <a:off x="2906133" y="1808828"/>
+          <a:ext cx="1535730" cy="1535730"/>
+        </a:xfrm>
+        <a:prstGeom prst="pieWedge">
+          <a:avLst/>
+        </a:prstGeom>
+        <a:gradFill rotWithShape="0">
+          <a:gsLst>
+            <a:gs pos="0">
+              <a:schemeClr val="accent4">
+                <a:hueOff val="0"/>
+                <a:satOff val="0"/>
+                <a:lumOff val="0"/>
+                <a:alphaOff val="0"/>
+                <a:satMod val="103000"/>
+                <a:lumMod val="102000"/>
+                <a:tint val="94000"/>
+              </a:schemeClr>
+            </a:gs>
+            <a:gs pos="50000">
+              <a:schemeClr val="accent4">
+                <a:hueOff val="0"/>
+                <a:satOff val="0"/>
+                <a:lumOff val="0"/>
+                <a:alphaOff val="0"/>
+                <a:satMod val="110000"/>
+                <a:lumMod val="100000"/>
+                <a:shade val="100000"/>
+              </a:schemeClr>
+            </a:gs>
+            <a:gs pos="100000">
+              <a:schemeClr val="accent4">
+                <a:hueOff val="0"/>
+                <a:satOff val="0"/>
+                <a:lumOff val="0"/>
+                <a:alphaOff val="0"/>
+                <a:lumMod val="99000"/>
+                <a:satMod val="120000"/>
+                <a:shade val="78000"/>
+              </a:schemeClr>
+            </a:gs>
+          </a:gsLst>
+          <a:lin ang="5400000" scaled="0"/>
+        </a:gradFill>
+        <a:ln>
+          <a:noFill/>
+        </a:ln>
+        <a:effectLst/>
+        <a:scene3d>
+          <a:camera prst="orthographicFront"/>
+          <a:lightRig rig="flat" dir="t"/>
+        </a:scene3d>
+        <a:sp3d prstMaterial="plastic">
+          <a:bevelT w="120900" h="88900"/>
+          <a:bevelB w="88900" h="31750" prst="angle"/>
+        </a:sp3d>
+      </dsp:spPr>
+      <dsp:style>
+        <a:lnRef idx="0">
+          <a:scrgbClr r="0" g="0" b="0"/>
+        </a:lnRef>
+        <a:fillRef idx="3">
+          <a:scrgbClr r="0" g="0" b="0"/>
+        </a:fillRef>
+        <a:effectRef idx="2">
+          <a:scrgbClr r="0" g="0" b="0"/>
+        </a:effectRef>
+        <a:fontRef idx="minor">
+          <a:schemeClr val="lt1"/>
+        </a:fontRef>
+      </dsp:style>
+      <dsp:txBody>
+        <a:bodyPr spcFirstLastPara="0" vert="horz" wrap="square" lIns="270256" tIns="270256" rIns="270256" bIns="270256" numCol="1" spcCol="1270" anchor="ctr" anchorCtr="0">
+          <a:noAutofit/>
+        </a:bodyPr>
+        <a:lstStyle/>
+        <a:p>
+          <a:pPr lvl="0" algn="ctr" defTabSz="1689100">
+            <a:lnSpc>
+              <a:spcPct val="90000"/>
+            </a:lnSpc>
+            <a:spcBef>
+              <a:spcPct val="0"/>
+            </a:spcBef>
+            <a:spcAft>
+              <a:spcPct val="35000"/>
+            </a:spcAft>
+          </a:pPr>
+          <a:r>
+            <a:rPr lang="fr-FR" sz="3800" kern="1200" dirty="0" smtClean="0"/>
+            <a:t>T</a:t>
+          </a:r>
+          <a:endParaRPr lang="fr-FR" sz="3800" kern="1200" dirty="0"/>
+        </a:p>
+      </dsp:txBody>
+      <dsp:txXfrm rot="10800000">
+        <a:off x="2906133" y="1808828"/>
+        <a:ext cx="1085925" cy="1085925"/>
+      </dsp:txXfrm>
+    </dsp:sp>
+    <dsp:sp modelId="{C0852406-3DC0-4222-A1F8-184593FC4596}">
+      <dsp:nvSpPr>
+        <dsp:cNvPr id="0" name=""/>
+        <dsp:cNvSpPr/>
+      </dsp:nvSpPr>
+      <dsp:spPr>
+        <a:xfrm rot="16200000">
+          <a:off x="1299468" y="1808828"/>
+          <a:ext cx="1535730" cy="1535730"/>
+        </a:xfrm>
+        <a:prstGeom prst="pieWedge">
+          <a:avLst/>
+        </a:prstGeom>
+        <a:gradFill rotWithShape="0">
+          <a:gsLst>
+            <a:gs pos="0">
+              <a:schemeClr val="accent5">
+                <a:hueOff val="0"/>
+                <a:satOff val="0"/>
+                <a:lumOff val="0"/>
+                <a:alphaOff val="0"/>
+                <a:satMod val="103000"/>
+                <a:lumMod val="102000"/>
+                <a:tint val="94000"/>
+              </a:schemeClr>
+            </a:gs>
+            <a:gs pos="50000">
+              <a:schemeClr val="accent5">
+                <a:hueOff val="0"/>
+                <a:satOff val="0"/>
+                <a:lumOff val="0"/>
+                <a:alphaOff val="0"/>
+                <a:satMod val="110000"/>
+                <a:lumMod val="100000"/>
+                <a:shade val="100000"/>
+              </a:schemeClr>
+            </a:gs>
+            <a:gs pos="100000">
+              <a:schemeClr val="accent5">
+                <a:hueOff val="0"/>
+                <a:satOff val="0"/>
+                <a:lumOff val="0"/>
+                <a:alphaOff val="0"/>
+                <a:lumMod val="99000"/>
+                <a:satMod val="120000"/>
+                <a:shade val="78000"/>
+              </a:schemeClr>
+            </a:gs>
+          </a:gsLst>
+          <a:lin ang="5400000" scaled="0"/>
+        </a:gradFill>
+        <a:ln>
+          <a:noFill/>
+        </a:ln>
+        <a:effectLst/>
+        <a:scene3d>
+          <a:camera prst="orthographicFront"/>
+          <a:lightRig rig="flat" dir="t"/>
+        </a:scene3d>
+        <a:sp3d prstMaterial="plastic">
+          <a:bevelT w="120900" h="88900"/>
+          <a:bevelB w="88900" h="31750" prst="angle"/>
+        </a:sp3d>
+      </dsp:spPr>
+      <dsp:style>
+        <a:lnRef idx="0">
+          <a:scrgbClr r="0" g="0" b="0"/>
+        </a:lnRef>
+        <a:fillRef idx="3">
+          <a:scrgbClr r="0" g="0" b="0"/>
+        </a:fillRef>
+        <a:effectRef idx="2">
+          <a:scrgbClr r="0" g="0" b="0"/>
+        </a:effectRef>
+        <a:fontRef idx="minor">
+          <a:schemeClr val="lt1"/>
+        </a:fontRef>
+      </dsp:style>
+      <dsp:txBody>
+        <a:bodyPr spcFirstLastPara="0" vert="horz" wrap="square" lIns="270256" tIns="270256" rIns="270256" bIns="270256" numCol="1" spcCol="1270" anchor="ctr" anchorCtr="0">
+          <a:noAutofit/>
+        </a:bodyPr>
+        <a:lstStyle/>
+        <a:p>
+          <a:pPr lvl="0" algn="ctr" defTabSz="1689100">
+            <a:lnSpc>
+              <a:spcPct val="90000"/>
+            </a:lnSpc>
+            <a:spcBef>
+              <a:spcPct val="0"/>
+            </a:spcBef>
+            <a:spcAft>
+              <a:spcPct val="35000"/>
+            </a:spcAft>
+          </a:pPr>
+          <a:r>
+            <a:rPr lang="fr-FR" sz="3800" kern="1200" dirty="0" smtClean="0"/>
+            <a:t>O</a:t>
+          </a:r>
+          <a:endParaRPr lang="fr-FR" sz="3800" kern="1200" dirty="0"/>
+        </a:p>
+      </dsp:txBody>
+      <dsp:txXfrm rot="5400000">
+        <a:off x="1749273" y="1808828"/>
+        <a:ext cx="1085925" cy="1085925"/>
+      </dsp:txXfrm>
+    </dsp:sp>
+    <dsp:sp modelId="{3B6382B4-DDDF-482E-9E6A-38E6F7DB930C}">
+      <dsp:nvSpPr>
+        <dsp:cNvPr id="0" name=""/>
+        <dsp:cNvSpPr/>
+      </dsp:nvSpPr>
+      <dsp:spPr>
+        <a:xfrm>
+          <a:off x="4795333" y="1466369"/>
+          <a:ext cx="530234" cy="461073"/>
+        </a:xfrm>
+        <a:prstGeom prst="circularArrow">
+          <a:avLst/>
+        </a:prstGeom>
+        <a:solidFill>
+          <a:schemeClr val="accent2">
+            <a:tint val="40000"/>
+            <a:hueOff val="0"/>
+            <a:satOff val="0"/>
+            <a:lumOff val="0"/>
+            <a:alpha val="0"/>
+          </a:schemeClr>
+        </a:solidFill>
+        <a:ln>
+          <a:noFill/>
+        </a:ln>
+        <a:effectLst>
+          <a:outerShdw blurRad="57150" dist="19050" dir="5400000" algn="ctr" rotWithShape="0">
+            <a:srgbClr val="000000">
+              <a:alpha val="63000"/>
+            </a:srgbClr>
+          </a:outerShdw>
+        </a:effectLst>
+        <a:scene3d>
+          <a:camera prst="orthographicFront"/>
+          <a:lightRig rig="flat" dir="t"/>
+        </a:scene3d>
+        <a:sp3d z="190500" prstMaterial="plastic">
+          <a:bevelT w="120900" h="88900"/>
+          <a:bevelB w="88900" h="31750" prst="angle"/>
+        </a:sp3d>
+      </dsp:spPr>
+      <dsp:style>
+        <a:lnRef idx="0">
+          <a:scrgbClr r="0" g="0" b="0"/>
+        </a:lnRef>
+        <a:fillRef idx="1">
+          <a:scrgbClr r="0" g="0" b="0"/>
+        </a:fillRef>
+        <a:effectRef idx="3">
+          <a:scrgbClr r="0" g="0" b="0"/>
+        </a:effectRef>
+        <a:fontRef idx="minor">
+          <a:schemeClr val="lt1"/>
+        </a:fontRef>
+      </dsp:style>
+    </dsp:sp>
+    <dsp:sp modelId="{72B333DC-EBE8-4650-A713-61338E0F2C2D}">
+      <dsp:nvSpPr>
+        <dsp:cNvPr id="0" name=""/>
+        <dsp:cNvSpPr/>
+      </dsp:nvSpPr>
+      <dsp:spPr>
+        <a:xfrm rot="10800000">
+          <a:off x="4795333" y="1533776"/>
+          <a:ext cx="530234" cy="461073"/>
+        </a:xfrm>
+        <a:prstGeom prst="circularArrow">
+          <a:avLst/>
+        </a:prstGeom>
+        <a:solidFill>
+          <a:schemeClr val="accent2">
+            <a:tint val="40000"/>
+            <a:hueOff val="0"/>
+            <a:satOff val="0"/>
+            <a:lumOff val="0"/>
+            <a:alpha val="0"/>
+          </a:schemeClr>
+        </a:solidFill>
+        <a:ln>
+          <a:noFill/>
+        </a:ln>
+        <a:effectLst>
+          <a:outerShdw blurRad="57150" dist="19050" dir="5400000" algn="ctr" rotWithShape="0">
+            <a:srgbClr val="000000">
+              <a:alpha val="63000"/>
+            </a:srgbClr>
+          </a:outerShdw>
+        </a:effectLst>
+        <a:scene3d>
+          <a:camera prst="orthographicFront"/>
+          <a:lightRig rig="flat" dir="t"/>
+        </a:scene3d>
+        <a:sp3d z="190500" prstMaterial="plastic">
+          <a:bevelT w="120900" h="88900"/>
+          <a:bevelB w="88900" h="31750" prst="angle"/>
+        </a:sp3d>
+      </dsp:spPr>
+      <dsp:style>
+        <a:lnRef idx="0">
+          <a:scrgbClr r="0" g="0" b="0"/>
+        </a:lnRef>
+        <a:fillRef idx="1">
+          <a:scrgbClr r="0" g="0" b="0"/>
+        </a:fillRef>
+        <a:effectRef idx="3">
+          <a:scrgbClr r="0" g="0" b="0"/>
+        </a:effectRef>
+        <a:fontRef idx="minor">
+          <a:schemeClr val="lt1"/>
+        </a:fontRef>
+      </dsp:style>
+    </dsp:sp>
   </dsp:spTree>
 </dsp:drawing>
 </file>
@@ -3666,6 +4649,1037 @@
       <dsp:cNvGrpSpPr/>
     </dsp:nvGrpSpPr>
     <dsp:grpSpPr/>
+    <dsp:sp modelId="{68AC0C8C-6683-4490-8F38-983C8CB47C3F}">
+      <dsp:nvSpPr>
+        <dsp:cNvPr id="0" name=""/>
+        <dsp:cNvSpPr/>
+      </dsp:nvSpPr>
+      <dsp:spPr>
+        <a:xfrm>
+          <a:off x="3537515" y="2557236"/>
+          <a:ext cx="1857757" cy="1203405"/>
+        </a:xfrm>
+        <a:prstGeom prst="roundRect">
+          <a:avLst>
+            <a:gd name="adj" fmla="val 10000"/>
+          </a:avLst>
+        </a:prstGeom>
+        <a:solidFill>
+          <a:schemeClr val="lt1">
+            <a:alpha val="90000"/>
+            <a:hueOff val="0"/>
+            <a:satOff val="0"/>
+            <a:lumOff val="0"/>
+            <a:alphaOff val="0"/>
+          </a:schemeClr>
+        </a:solidFill>
+        <a:ln w="6350" cap="flat" cmpd="sng" algn="ctr">
+          <a:solidFill>
+            <a:schemeClr val="accent4">
+              <a:hueOff val="0"/>
+              <a:satOff val="0"/>
+              <a:lumOff val="0"/>
+              <a:alphaOff val="0"/>
+            </a:schemeClr>
+          </a:solidFill>
+          <a:prstDash val="solid"/>
+          <a:miter lim="800000"/>
+        </a:ln>
+        <a:effectLst/>
+        <a:scene3d>
+          <a:camera prst="orthographicFront"/>
+          <a:lightRig rig="flat" dir="t"/>
+        </a:scene3d>
+        <a:sp3d z="-190500" extrusionH="12700" prstMaterial="plastic">
+          <a:bevelT w="50800" h="50800"/>
+        </a:sp3d>
+      </dsp:spPr>
+      <dsp:style>
+        <a:lnRef idx="1">
+          <a:scrgbClr r="0" g="0" b="0"/>
+        </a:lnRef>
+        <a:fillRef idx="1">
+          <a:scrgbClr r="0" g="0" b="0"/>
+        </a:fillRef>
+        <a:effectRef idx="2">
+          <a:scrgbClr r="0" g="0" b="0"/>
+        </a:effectRef>
+        <a:fontRef idx="minor"/>
+      </dsp:style>
+      <dsp:txBody>
+        <a:bodyPr spcFirstLastPara="0" vert="horz" wrap="square" lIns="49530" tIns="49530" rIns="49530" bIns="49530" numCol="1" spcCol="1270" anchor="t" anchorCtr="0">
+          <a:noAutofit/>
+        </a:bodyPr>
+        <a:lstStyle/>
+        <a:p>
+          <a:pPr marL="57150" lvl="1" indent="-57150" algn="l" defTabSz="444500">
+            <a:lnSpc>
+              <a:spcPct val="90000"/>
+            </a:lnSpc>
+            <a:spcBef>
+              <a:spcPct val="0"/>
+            </a:spcBef>
+            <a:spcAft>
+              <a:spcPct val="15000"/>
+            </a:spcAft>
+            <a:buChar char="••"/>
+          </a:pPr>
+          <a:r>
+            <a:rPr lang="fr-FR" sz="1000" kern="1200" dirty="0" err="1" smtClean="0"/>
+            <a:t>Risk</a:t>
+          </a:r>
+          <a:r>
+            <a:rPr lang="fr-FR" sz="1000" kern="1200" dirty="0" smtClean="0"/>
+            <a:t> of high </a:t>
+          </a:r>
+          <a:r>
+            <a:rPr lang="fr-FR" sz="1000" kern="1200" dirty="0" err="1" smtClean="0"/>
+            <a:t>demand</a:t>
+          </a:r>
+          <a:r>
+            <a:rPr lang="fr-FR" sz="1000" kern="1200" dirty="0" smtClean="0"/>
+            <a:t> (server)</a:t>
+          </a:r>
+          <a:endParaRPr lang="fr-FR" sz="1000" kern="1200" dirty="0"/>
+        </a:p>
+        <a:p>
+          <a:pPr marL="57150" lvl="1" indent="-57150" algn="l" defTabSz="444500">
+            <a:lnSpc>
+              <a:spcPct val="90000"/>
+            </a:lnSpc>
+            <a:spcBef>
+              <a:spcPct val="0"/>
+            </a:spcBef>
+            <a:spcAft>
+              <a:spcPct val="15000"/>
+            </a:spcAft>
+            <a:buChar char="••"/>
+          </a:pPr>
+          <a:r>
+            <a:rPr lang="fr-FR" sz="1000" kern="1200" dirty="0" smtClean="0"/>
+            <a:t>Data protection (</a:t>
+          </a:r>
+          <a:r>
+            <a:rPr lang="fr-FR" sz="1000" kern="1200" dirty="0" err="1" smtClean="0"/>
+            <a:t>temporary</a:t>
+          </a:r>
+          <a:r>
+            <a:rPr lang="fr-FR" sz="1000" kern="1200" dirty="0" smtClean="0"/>
+            <a:t>)</a:t>
+          </a:r>
+          <a:endParaRPr lang="fr-FR" sz="1000" kern="1200" dirty="0"/>
+        </a:p>
+      </dsp:txBody>
+      <dsp:txXfrm>
+        <a:off x="4121277" y="2884522"/>
+        <a:ext cx="1247560" cy="849684"/>
+      </dsp:txXfrm>
+    </dsp:sp>
+    <dsp:sp modelId="{431C4C2F-7F42-4D62-8EEF-918E7AD22EA0}">
+      <dsp:nvSpPr>
+        <dsp:cNvPr id="0" name=""/>
+        <dsp:cNvSpPr/>
+      </dsp:nvSpPr>
+      <dsp:spPr>
+        <a:xfrm>
+          <a:off x="474019" y="2557236"/>
+          <a:ext cx="1857757" cy="1203405"/>
+        </a:xfrm>
+        <a:prstGeom prst="roundRect">
+          <a:avLst>
+            <a:gd name="adj" fmla="val 10000"/>
+          </a:avLst>
+        </a:prstGeom>
+        <a:solidFill>
+          <a:schemeClr val="lt1">
+            <a:alpha val="90000"/>
+            <a:hueOff val="0"/>
+            <a:satOff val="0"/>
+            <a:lumOff val="0"/>
+            <a:alphaOff val="0"/>
+          </a:schemeClr>
+        </a:solidFill>
+        <a:ln w="6350" cap="flat" cmpd="sng" algn="ctr">
+          <a:solidFill>
+            <a:schemeClr val="accent5">
+              <a:hueOff val="0"/>
+              <a:satOff val="0"/>
+              <a:lumOff val="0"/>
+              <a:alphaOff val="0"/>
+            </a:schemeClr>
+          </a:solidFill>
+          <a:prstDash val="solid"/>
+          <a:miter lim="800000"/>
+        </a:ln>
+        <a:effectLst/>
+        <a:scene3d>
+          <a:camera prst="orthographicFront"/>
+          <a:lightRig rig="flat" dir="t"/>
+        </a:scene3d>
+        <a:sp3d z="-190500" extrusionH="12700" prstMaterial="plastic">
+          <a:bevelT w="50800" h="50800"/>
+        </a:sp3d>
+      </dsp:spPr>
+      <dsp:style>
+        <a:lnRef idx="1">
+          <a:scrgbClr r="0" g="0" b="0"/>
+        </a:lnRef>
+        <a:fillRef idx="1">
+          <a:scrgbClr r="0" g="0" b="0"/>
+        </a:fillRef>
+        <a:effectRef idx="2">
+          <a:scrgbClr r="0" g="0" b="0"/>
+        </a:effectRef>
+        <a:fontRef idx="minor"/>
+      </dsp:style>
+      <dsp:txBody>
+        <a:bodyPr spcFirstLastPara="0" vert="horz" wrap="square" lIns="49530" tIns="49530" rIns="49530" bIns="49530" numCol="1" spcCol="1270" anchor="t" anchorCtr="0">
+          <a:noAutofit/>
+        </a:bodyPr>
+        <a:lstStyle/>
+        <a:p>
+          <a:pPr marL="57150" lvl="1" indent="-57150" algn="l" defTabSz="444500">
+            <a:lnSpc>
+              <a:spcPct val="90000"/>
+            </a:lnSpc>
+            <a:spcBef>
+              <a:spcPct val="0"/>
+            </a:spcBef>
+            <a:spcAft>
+              <a:spcPct val="15000"/>
+            </a:spcAft>
+            <a:buChar char="••"/>
+          </a:pPr>
+          <a:r>
+            <a:rPr lang="fr-FR" sz="1000" kern="1200" dirty="0" smtClean="0"/>
+            <a:t>No </a:t>
+          </a:r>
+          <a:r>
+            <a:rPr lang="fr-FR" sz="1000" kern="1200" dirty="0" err="1" smtClean="0"/>
+            <a:t>competition</a:t>
+          </a:r>
+          <a:endParaRPr lang="fr-FR" sz="1000" kern="1200" dirty="0"/>
+        </a:p>
+        <a:p>
+          <a:pPr marL="57150" lvl="1" indent="-57150" algn="l" defTabSz="444500">
+            <a:lnSpc>
+              <a:spcPct val="90000"/>
+            </a:lnSpc>
+            <a:spcBef>
+              <a:spcPct val="0"/>
+            </a:spcBef>
+            <a:spcAft>
+              <a:spcPct val="15000"/>
+            </a:spcAft>
+            <a:buChar char="••"/>
+          </a:pPr>
+          <a:r>
+            <a:rPr lang="fr-FR" sz="1000" kern="1200" dirty="0" smtClean="0"/>
+            <a:t>High utility</a:t>
+          </a:r>
+          <a:endParaRPr lang="fr-FR" sz="1000" kern="1200" dirty="0"/>
+        </a:p>
+      </dsp:txBody>
+      <dsp:txXfrm>
+        <a:off x="500454" y="2884522"/>
+        <a:ext cx="1247560" cy="849684"/>
+      </dsp:txXfrm>
+    </dsp:sp>
+    <dsp:sp modelId="{05478942-E273-4856-8553-F0FD8F015AA2}">
+      <dsp:nvSpPr>
+        <dsp:cNvPr id="0" name=""/>
+        <dsp:cNvSpPr/>
+      </dsp:nvSpPr>
+      <dsp:spPr>
+        <a:xfrm>
+          <a:off x="3537515" y="0"/>
+          <a:ext cx="1857757" cy="1203405"/>
+        </a:xfrm>
+        <a:prstGeom prst="roundRect">
+          <a:avLst>
+            <a:gd name="adj" fmla="val 10000"/>
+          </a:avLst>
+        </a:prstGeom>
+        <a:solidFill>
+          <a:schemeClr val="lt1">
+            <a:alpha val="90000"/>
+            <a:hueOff val="0"/>
+            <a:satOff val="0"/>
+            <a:lumOff val="0"/>
+            <a:alphaOff val="0"/>
+          </a:schemeClr>
+        </a:solidFill>
+        <a:ln w="6350" cap="flat" cmpd="sng" algn="ctr">
+          <a:solidFill>
+            <a:schemeClr val="accent3">
+              <a:hueOff val="0"/>
+              <a:satOff val="0"/>
+              <a:lumOff val="0"/>
+              <a:alphaOff val="0"/>
+            </a:schemeClr>
+          </a:solidFill>
+          <a:prstDash val="solid"/>
+          <a:miter lim="800000"/>
+        </a:ln>
+        <a:effectLst/>
+        <a:scene3d>
+          <a:camera prst="orthographicFront"/>
+          <a:lightRig rig="flat" dir="t"/>
+        </a:scene3d>
+        <a:sp3d z="-190500" extrusionH="12700" prstMaterial="plastic">
+          <a:bevelT w="50800" h="50800"/>
+        </a:sp3d>
+      </dsp:spPr>
+      <dsp:style>
+        <a:lnRef idx="1">
+          <a:scrgbClr r="0" g="0" b="0"/>
+        </a:lnRef>
+        <a:fillRef idx="1">
+          <a:scrgbClr r="0" g="0" b="0"/>
+        </a:fillRef>
+        <a:effectRef idx="2">
+          <a:scrgbClr r="0" g="0" b="0"/>
+        </a:effectRef>
+        <a:fontRef idx="minor"/>
+      </dsp:style>
+      <dsp:txBody>
+        <a:bodyPr spcFirstLastPara="0" vert="horz" wrap="square" lIns="49530" tIns="49530" rIns="49530" bIns="49530" numCol="1" spcCol="1270" anchor="t" anchorCtr="0">
+          <a:noAutofit/>
+        </a:bodyPr>
+        <a:lstStyle/>
+        <a:p>
+          <a:pPr marL="57150" lvl="1" indent="-57150" algn="l" defTabSz="444500">
+            <a:lnSpc>
+              <a:spcPct val="90000"/>
+            </a:lnSpc>
+            <a:spcBef>
+              <a:spcPct val="0"/>
+            </a:spcBef>
+            <a:spcAft>
+              <a:spcPct val="15000"/>
+            </a:spcAft>
+            <a:buChar char="••"/>
+          </a:pPr>
+          <a:r>
+            <a:rPr lang="fr-FR" sz="1000" kern="1200" dirty="0" smtClean="0"/>
+            <a:t>Short deadlines</a:t>
+          </a:r>
+          <a:endParaRPr lang="fr-FR" sz="1000" kern="1200" dirty="0"/>
+        </a:p>
+        <a:p>
+          <a:pPr marL="57150" lvl="1" indent="-57150" algn="l" defTabSz="444500">
+            <a:lnSpc>
+              <a:spcPct val="90000"/>
+            </a:lnSpc>
+            <a:spcBef>
+              <a:spcPct val="0"/>
+            </a:spcBef>
+            <a:spcAft>
+              <a:spcPct val="15000"/>
+            </a:spcAft>
+            <a:buChar char="••"/>
+          </a:pPr>
+          <a:r>
+            <a:rPr lang="fr-FR" sz="1000" kern="1200" dirty="0" smtClean="0"/>
+            <a:t>Not </a:t>
+          </a:r>
+          <a:r>
+            <a:rPr lang="fr-FR" sz="1000" kern="1200" dirty="0" err="1" smtClean="0"/>
+            <a:t>well</a:t>
+          </a:r>
+          <a:r>
+            <a:rPr lang="fr-FR" sz="1000" kern="1200" dirty="0" smtClean="0"/>
+            <a:t> </a:t>
+          </a:r>
+          <a:r>
+            <a:rPr lang="fr-FR" sz="1000" kern="1200" dirty="0" err="1" smtClean="0"/>
+            <a:t>documented</a:t>
+          </a:r>
+          <a:endParaRPr lang="fr-FR" sz="1000" kern="1200" dirty="0"/>
+        </a:p>
+      </dsp:txBody>
+      <dsp:txXfrm>
+        <a:off x="4121277" y="26435"/>
+        <a:ext cx="1247560" cy="849684"/>
+      </dsp:txXfrm>
+    </dsp:sp>
+    <dsp:sp modelId="{BC6F0824-1351-49BA-BADB-F02B71A91728}">
+      <dsp:nvSpPr>
+        <dsp:cNvPr id="0" name=""/>
+        <dsp:cNvSpPr/>
+      </dsp:nvSpPr>
+      <dsp:spPr>
+        <a:xfrm>
+          <a:off x="474019" y="0"/>
+          <a:ext cx="1857757" cy="1203405"/>
+        </a:xfrm>
+        <a:prstGeom prst="roundRect">
+          <a:avLst>
+            <a:gd name="adj" fmla="val 10000"/>
+          </a:avLst>
+        </a:prstGeom>
+        <a:solidFill>
+          <a:schemeClr val="lt1">
+            <a:alpha val="90000"/>
+            <a:hueOff val="0"/>
+            <a:satOff val="0"/>
+            <a:lumOff val="0"/>
+            <a:alphaOff val="0"/>
+          </a:schemeClr>
+        </a:solidFill>
+        <a:ln w="6350" cap="flat" cmpd="sng" algn="ctr">
+          <a:solidFill>
+            <a:schemeClr val="accent2">
+              <a:hueOff val="0"/>
+              <a:satOff val="0"/>
+              <a:lumOff val="0"/>
+              <a:alphaOff val="0"/>
+            </a:schemeClr>
+          </a:solidFill>
+          <a:prstDash val="solid"/>
+          <a:miter lim="800000"/>
+        </a:ln>
+        <a:effectLst/>
+        <a:scene3d>
+          <a:camera prst="orthographicFront"/>
+          <a:lightRig rig="flat" dir="t"/>
+        </a:scene3d>
+        <a:sp3d z="-190500" extrusionH="12700" prstMaterial="plastic">
+          <a:bevelT w="50800" h="50800"/>
+        </a:sp3d>
+      </dsp:spPr>
+      <dsp:style>
+        <a:lnRef idx="1">
+          <a:scrgbClr r="0" g="0" b="0"/>
+        </a:lnRef>
+        <a:fillRef idx="1">
+          <a:scrgbClr r="0" g="0" b="0"/>
+        </a:fillRef>
+        <a:effectRef idx="2">
+          <a:scrgbClr r="0" g="0" b="0"/>
+        </a:effectRef>
+        <a:fontRef idx="minor"/>
+      </dsp:style>
+      <dsp:txBody>
+        <a:bodyPr spcFirstLastPara="0" vert="horz" wrap="square" lIns="49530" tIns="49530" rIns="49530" bIns="49530" numCol="1" spcCol="1270" anchor="t" anchorCtr="0">
+          <a:noAutofit/>
+        </a:bodyPr>
+        <a:lstStyle/>
+        <a:p>
+          <a:pPr marL="57150" lvl="1" indent="-57150" algn="l" defTabSz="444500">
+            <a:lnSpc>
+              <a:spcPct val="90000"/>
+            </a:lnSpc>
+            <a:spcBef>
+              <a:spcPct val="0"/>
+            </a:spcBef>
+            <a:spcAft>
+              <a:spcPct val="15000"/>
+            </a:spcAft>
+            <a:buChar char="••"/>
+          </a:pPr>
+          <a:r>
+            <a:rPr lang="fr-FR" sz="1000" kern="1200" dirty="0" smtClean="0"/>
+            <a:t>Diverse </a:t>
+          </a:r>
+          <a:r>
+            <a:rPr lang="fr-FR" sz="1000" kern="1200" dirty="0" err="1" smtClean="0"/>
+            <a:t>skill</a:t>
+          </a:r>
+          <a:r>
+            <a:rPr lang="fr-FR" sz="1000" kern="1200" dirty="0" smtClean="0"/>
+            <a:t> set</a:t>
+          </a:r>
+          <a:endParaRPr lang="fr-FR" sz="1000" kern="1200" dirty="0"/>
+        </a:p>
+        <a:p>
+          <a:pPr marL="57150" lvl="1" indent="-57150" algn="l" defTabSz="444500">
+            <a:lnSpc>
+              <a:spcPct val="90000"/>
+            </a:lnSpc>
+            <a:spcBef>
+              <a:spcPct val="0"/>
+            </a:spcBef>
+            <a:spcAft>
+              <a:spcPct val="15000"/>
+            </a:spcAft>
+            <a:buChar char="••"/>
+          </a:pPr>
+          <a:r>
+            <a:rPr lang="fr-FR" sz="1000" kern="1200" dirty="0" smtClean="0"/>
+            <a:t>Access to expert </a:t>
+          </a:r>
+          <a:r>
+            <a:rPr lang="fr-FR" sz="1000" kern="1200" dirty="0" err="1" smtClean="0"/>
+            <a:t>advise</a:t>
+          </a:r>
+          <a:endParaRPr lang="fr-FR" sz="1000" kern="1200" dirty="0"/>
+        </a:p>
+        <a:p>
+          <a:pPr marL="57150" lvl="1" indent="-57150" algn="l" defTabSz="444500">
+            <a:lnSpc>
+              <a:spcPct val="90000"/>
+            </a:lnSpc>
+            <a:spcBef>
+              <a:spcPct val="0"/>
+            </a:spcBef>
+            <a:spcAft>
+              <a:spcPct val="15000"/>
+            </a:spcAft>
+            <a:buChar char="••"/>
+          </a:pPr>
+          <a:r>
+            <a:rPr lang="fr-FR" sz="1000" kern="1200" dirty="0" smtClean="0"/>
+            <a:t>Open source packages</a:t>
+          </a:r>
+          <a:endParaRPr lang="fr-FR" sz="1000" kern="1200" dirty="0"/>
+        </a:p>
+      </dsp:txBody>
+      <dsp:txXfrm>
+        <a:off x="500454" y="26435"/>
+        <a:ext cx="1247560" cy="849684"/>
+      </dsp:txXfrm>
+    </dsp:sp>
+    <dsp:sp modelId="{E72BDFA6-376E-4614-9D7C-A68241E884D9}">
+      <dsp:nvSpPr>
+        <dsp:cNvPr id="0" name=""/>
+        <dsp:cNvSpPr/>
+      </dsp:nvSpPr>
+      <dsp:spPr>
+        <a:xfrm>
+          <a:off x="1252472" y="214356"/>
+          <a:ext cx="1628357" cy="1628357"/>
+        </a:xfrm>
+        <a:prstGeom prst="pieWedge">
+          <a:avLst/>
+        </a:prstGeom>
+        <a:gradFill rotWithShape="0">
+          <a:gsLst>
+            <a:gs pos="0">
+              <a:schemeClr val="accent2">
+                <a:hueOff val="0"/>
+                <a:satOff val="0"/>
+                <a:lumOff val="0"/>
+                <a:alphaOff val="0"/>
+                <a:satMod val="103000"/>
+                <a:lumMod val="102000"/>
+                <a:tint val="94000"/>
+              </a:schemeClr>
+            </a:gs>
+            <a:gs pos="50000">
+              <a:schemeClr val="accent2">
+                <a:hueOff val="0"/>
+                <a:satOff val="0"/>
+                <a:lumOff val="0"/>
+                <a:alphaOff val="0"/>
+                <a:satMod val="110000"/>
+                <a:lumMod val="100000"/>
+                <a:shade val="100000"/>
+              </a:schemeClr>
+            </a:gs>
+            <a:gs pos="100000">
+              <a:schemeClr val="accent2">
+                <a:hueOff val="0"/>
+                <a:satOff val="0"/>
+                <a:lumOff val="0"/>
+                <a:alphaOff val="0"/>
+                <a:lumMod val="99000"/>
+                <a:satMod val="120000"/>
+                <a:shade val="78000"/>
+              </a:schemeClr>
+            </a:gs>
+          </a:gsLst>
+          <a:lin ang="5400000" scaled="0"/>
+        </a:gradFill>
+        <a:ln>
+          <a:noFill/>
+        </a:ln>
+        <a:effectLst/>
+        <a:scene3d>
+          <a:camera prst="orthographicFront"/>
+          <a:lightRig rig="flat" dir="t"/>
+        </a:scene3d>
+        <a:sp3d prstMaterial="plastic">
+          <a:bevelT w="120900" h="88900"/>
+          <a:bevelB w="88900" h="31750" prst="angle"/>
+        </a:sp3d>
+      </dsp:spPr>
+      <dsp:style>
+        <a:lnRef idx="0">
+          <a:scrgbClr r="0" g="0" b="0"/>
+        </a:lnRef>
+        <a:fillRef idx="3">
+          <a:scrgbClr r="0" g="0" b="0"/>
+        </a:fillRef>
+        <a:effectRef idx="2">
+          <a:scrgbClr r="0" g="0" b="0"/>
+        </a:effectRef>
+        <a:fontRef idx="minor">
+          <a:schemeClr val="lt1"/>
+        </a:fontRef>
+      </dsp:style>
+      <dsp:txBody>
+        <a:bodyPr spcFirstLastPara="0" vert="horz" wrap="square" lIns="284480" tIns="284480" rIns="284480" bIns="284480" numCol="1" spcCol="1270" anchor="ctr" anchorCtr="0">
+          <a:noAutofit/>
+        </a:bodyPr>
+        <a:lstStyle/>
+        <a:p>
+          <a:pPr lvl="0" algn="ctr" defTabSz="1778000">
+            <a:lnSpc>
+              <a:spcPct val="90000"/>
+            </a:lnSpc>
+            <a:spcBef>
+              <a:spcPct val="0"/>
+            </a:spcBef>
+            <a:spcAft>
+              <a:spcPct val="35000"/>
+            </a:spcAft>
+          </a:pPr>
+          <a:r>
+            <a:rPr lang="fr-FR" sz="4000" kern="1200" dirty="0" smtClean="0"/>
+            <a:t>S</a:t>
+          </a:r>
+          <a:endParaRPr lang="fr-FR" sz="4000" kern="1200" dirty="0"/>
+        </a:p>
+      </dsp:txBody>
+      <dsp:txXfrm>
+        <a:off x="1729407" y="691291"/>
+        <a:ext cx="1151422" cy="1151422"/>
+      </dsp:txXfrm>
+    </dsp:sp>
+    <dsp:sp modelId="{A67A60E5-5291-49E4-B3E5-53A58B528285}">
+      <dsp:nvSpPr>
+        <dsp:cNvPr id="0" name=""/>
+        <dsp:cNvSpPr/>
+      </dsp:nvSpPr>
+      <dsp:spPr>
+        <a:xfrm rot="5400000">
+          <a:off x="2956043" y="214356"/>
+          <a:ext cx="1628357" cy="1628357"/>
+        </a:xfrm>
+        <a:prstGeom prst="pieWedge">
+          <a:avLst/>
+        </a:prstGeom>
+        <a:gradFill rotWithShape="0">
+          <a:gsLst>
+            <a:gs pos="0">
+              <a:schemeClr val="accent3">
+                <a:hueOff val="0"/>
+                <a:satOff val="0"/>
+                <a:lumOff val="0"/>
+                <a:alphaOff val="0"/>
+                <a:satMod val="103000"/>
+                <a:lumMod val="102000"/>
+                <a:tint val="94000"/>
+              </a:schemeClr>
+            </a:gs>
+            <a:gs pos="50000">
+              <a:schemeClr val="accent3">
+                <a:hueOff val="0"/>
+                <a:satOff val="0"/>
+                <a:lumOff val="0"/>
+                <a:alphaOff val="0"/>
+                <a:satMod val="110000"/>
+                <a:lumMod val="100000"/>
+                <a:shade val="100000"/>
+              </a:schemeClr>
+            </a:gs>
+            <a:gs pos="100000">
+              <a:schemeClr val="accent3">
+                <a:hueOff val="0"/>
+                <a:satOff val="0"/>
+                <a:lumOff val="0"/>
+                <a:alphaOff val="0"/>
+                <a:lumMod val="99000"/>
+                <a:satMod val="120000"/>
+                <a:shade val="78000"/>
+              </a:schemeClr>
+            </a:gs>
+          </a:gsLst>
+          <a:lin ang="5400000" scaled="0"/>
+        </a:gradFill>
+        <a:ln>
+          <a:noFill/>
+        </a:ln>
+        <a:effectLst/>
+        <a:scene3d>
+          <a:camera prst="orthographicFront"/>
+          <a:lightRig rig="flat" dir="t"/>
+        </a:scene3d>
+        <a:sp3d prstMaterial="plastic">
+          <a:bevelT w="120900" h="88900"/>
+          <a:bevelB w="88900" h="31750" prst="angle"/>
+        </a:sp3d>
+      </dsp:spPr>
+      <dsp:style>
+        <a:lnRef idx="0">
+          <a:scrgbClr r="0" g="0" b="0"/>
+        </a:lnRef>
+        <a:fillRef idx="3">
+          <a:scrgbClr r="0" g="0" b="0"/>
+        </a:fillRef>
+        <a:effectRef idx="2">
+          <a:scrgbClr r="0" g="0" b="0"/>
+        </a:effectRef>
+        <a:fontRef idx="minor">
+          <a:schemeClr val="lt1"/>
+        </a:fontRef>
+      </dsp:style>
+      <dsp:txBody>
+        <a:bodyPr spcFirstLastPara="0" vert="horz" wrap="square" lIns="284480" tIns="284480" rIns="284480" bIns="284480" numCol="1" spcCol="1270" anchor="ctr" anchorCtr="0">
+          <a:noAutofit/>
+        </a:bodyPr>
+        <a:lstStyle/>
+        <a:p>
+          <a:pPr lvl="0" algn="ctr" defTabSz="1778000">
+            <a:lnSpc>
+              <a:spcPct val="90000"/>
+            </a:lnSpc>
+            <a:spcBef>
+              <a:spcPct val="0"/>
+            </a:spcBef>
+            <a:spcAft>
+              <a:spcPct val="35000"/>
+            </a:spcAft>
+          </a:pPr>
+          <a:r>
+            <a:rPr lang="fr-FR" sz="4000" kern="1200" dirty="0" smtClean="0"/>
+            <a:t>W</a:t>
+          </a:r>
+          <a:endParaRPr lang="fr-FR" sz="4000" kern="1200" dirty="0"/>
+        </a:p>
+      </dsp:txBody>
+      <dsp:txXfrm rot="-5400000">
+        <a:off x="2956043" y="691291"/>
+        <a:ext cx="1151422" cy="1151422"/>
+      </dsp:txXfrm>
+    </dsp:sp>
+    <dsp:sp modelId="{CF4FC7F6-A89C-4633-A10E-BFE92B369DCD}">
+      <dsp:nvSpPr>
+        <dsp:cNvPr id="0" name=""/>
+        <dsp:cNvSpPr/>
+      </dsp:nvSpPr>
+      <dsp:spPr>
+        <a:xfrm rot="10800000">
+          <a:off x="2956043" y="1917927"/>
+          <a:ext cx="1628357" cy="1628357"/>
+        </a:xfrm>
+        <a:prstGeom prst="pieWedge">
+          <a:avLst/>
+        </a:prstGeom>
+        <a:gradFill rotWithShape="0">
+          <a:gsLst>
+            <a:gs pos="0">
+              <a:schemeClr val="accent4">
+                <a:hueOff val="0"/>
+                <a:satOff val="0"/>
+                <a:lumOff val="0"/>
+                <a:alphaOff val="0"/>
+                <a:satMod val="103000"/>
+                <a:lumMod val="102000"/>
+                <a:tint val="94000"/>
+              </a:schemeClr>
+            </a:gs>
+            <a:gs pos="50000">
+              <a:schemeClr val="accent4">
+                <a:hueOff val="0"/>
+                <a:satOff val="0"/>
+                <a:lumOff val="0"/>
+                <a:alphaOff val="0"/>
+                <a:satMod val="110000"/>
+                <a:lumMod val="100000"/>
+                <a:shade val="100000"/>
+              </a:schemeClr>
+            </a:gs>
+            <a:gs pos="100000">
+              <a:schemeClr val="accent4">
+                <a:hueOff val="0"/>
+                <a:satOff val="0"/>
+                <a:lumOff val="0"/>
+                <a:alphaOff val="0"/>
+                <a:lumMod val="99000"/>
+                <a:satMod val="120000"/>
+                <a:shade val="78000"/>
+              </a:schemeClr>
+            </a:gs>
+          </a:gsLst>
+          <a:lin ang="5400000" scaled="0"/>
+        </a:gradFill>
+        <a:ln>
+          <a:noFill/>
+        </a:ln>
+        <a:effectLst/>
+        <a:scene3d>
+          <a:camera prst="orthographicFront"/>
+          <a:lightRig rig="flat" dir="t"/>
+        </a:scene3d>
+        <a:sp3d prstMaterial="plastic">
+          <a:bevelT w="120900" h="88900"/>
+          <a:bevelB w="88900" h="31750" prst="angle"/>
+        </a:sp3d>
+      </dsp:spPr>
+      <dsp:style>
+        <a:lnRef idx="0">
+          <a:scrgbClr r="0" g="0" b="0"/>
+        </a:lnRef>
+        <a:fillRef idx="3">
+          <a:scrgbClr r="0" g="0" b="0"/>
+        </a:fillRef>
+        <a:effectRef idx="2">
+          <a:scrgbClr r="0" g="0" b="0"/>
+        </a:effectRef>
+        <a:fontRef idx="minor">
+          <a:schemeClr val="lt1"/>
+        </a:fontRef>
+      </dsp:style>
+      <dsp:txBody>
+        <a:bodyPr spcFirstLastPara="0" vert="horz" wrap="square" lIns="284480" tIns="284480" rIns="284480" bIns="284480" numCol="1" spcCol="1270" anchor="ctr" anchorCtr="0">
+          <a:noAutofit/>
+        </a:bodyPr>
+        <a:lstStyle/>
+        <a:p>
+          <a:pPr lvl="0" algn="ctr" defTabSz="1778000">
+            <a:lnSpc>
+              <a:spcPct val="90000"/>
+            </a:lnSpc>
+            <a:spcBef>
+              <a:spcPct val="0"/>
+            </a:spcBef>
+            <a:spcAft>
+              <a:spcPct val="35000"/>
+            </a:spcAft>
+          </a:pPr>
+          <a:r>
+            <a:rPr lang="fr-FR" sz="4000" kern="1200" dirty="0" smtClean="0"/>
+            <a:t>T</a:t>
+          </a:r>
+          <a:endParaRPr lang="fr-FR" sz="4000" kern="1200" dirty="0"/>
+        </a:p>
+      </dsp:txBody>
+      <dsp:txXfrm rot="10800000">
+        <a:off x="2956043" y="1917927"/>
+        <a:ext cx="1151422" cy="1151422"/>
+      </dsp:txXfrm>
+    </dsp:sp>
+    <dsp:sp modelId="{C0852406-3DC0-4222-A1F8-184593FC4596}">
+      <dsp:nvSpPr>
+        <dsp:cNvPr id="0" name=""/>
+        <dsp:cNvSpPr/>
+      </dsp:nvSpPr>
+      <dsp:spPr>
+        <a:xfrm rot="16200000">
+          <a:off x="1252472" y="1917927"/>
+          <a:ext cx="1628357" cy="1628357"/>
+        </a:xfrm>
+        <a:prstGeom prst="pieWedge">
+          <a:avLst/>
+        </a:prstGeom>
+        <a:gradFill rotWithShape="0">
+          <a:gsLst>
+            <a:gs pos="0">
+              <a:schemeClr val="accent5">
+                <a:hueOff val="0"/>
+                <a:satOff val="0"/>
+                <a:lumOff val="0"/>
+                <a:alphaOff val="0"/>
+                <a:satMod val="103000"/>
+                <a:lumMod val="102000"/>
+                <a:tint val="94000"/>
+              </a:schemeClr>
+            </a:gs>
+            <a:gs pos="50000">
+              <a:schemeClr val="accent5">
+                <a:hueOff val="0"/>
+                <a:satOff val="0"/>
+                <a:lumOff val="0"/>
+                <a:alphaOff val="0"/>
+                <a:satMod val="110000"/>
+                <a:lumMod val="100000"/>
+                <a:shade val="100000"/>
+              </a:schemeClr>
+            </a:gs>
+            <a:gs pos="100000">
+              <a:schemeClr val="accent5">
+                <a:hueOff val="0"/>
+                <a:satOff val="0"/>
+                <a:lumOff val="0"/>
+                <a:alphaOff val="0"/>
+                <a:lumMod val="99000"/>
+                <a:satMod val="120000"/>
+                <a:shade val="78000"/>
+              </a:schemeClr>
+            </a:gs>
+          </a:gsLst>
+          <a:lin ang="5400000" scaled="0"/>
+        </a:gradFill>
+        <a:ln>
+          <a:noFill/>
+        </a:ln>
+        <a:effectLst/>
+        <a:scene3d>
+          <a:camera prst="orthographicFront"/>
+          <a:lightRig rig="flat" dir="t"/>
+        </a:scene3d>
+        <a:sp3d prstMaterial="plastic">
+          <a:bevelT w="120900" h="88900"/>
+          <a:bevelB w="88900" h="31750" prst="angle"/>
+        </a:sp3d>
+      </dsp:spPr>
+      <dsp:style>
+        <a:lnRef idx="0">
+          <a:scrgbClr r="0" g="0" b="0"/>
+        </a:lnRef>
+        <a:fillRef idx="3">
+          <a:scrgbClr r="0" g="0" b="0"/>
+        </a:fillRef>
+        <a:effectRef idx="2">
+          <a:scrgbClr r="0" g="0" b="0"/>
+        </a:effectRef>
+        <a:fontRef idx="minor">
+          <a:schemeClr val="lt1"/>
+        </a:fontRef>
+      </dsp:style>
+      <dsp:txBody>
+        <a:bodyPr spcFirstLastPara="0" vert="horz" wrap="square" lIns="284480" tIns="284480" rIns="284480" bIns="284480" numCol="1" spcCol="1270" anchor="ctr" anchorCtr="0">
+          <a:noAutofit/>
+        </a:bodyPr>
+        <a:lstStyle/>
+        <a:p>
+          <a:pPr lvl="0" algn="ctr" defTabSz="1778000">
+            <a:lnSpc>
+              <a:spcPct val="90000"/>
+            </a:lnSpc>
+            <a:spcBef>
+              <a:spcPct val="0"/>
+            </a:spcBef>
+            <a:spcAft>
+              <a:spcPct val="35000"/>
+            </a:spcAft>
+          </a:pPr>
+          <a:r>
+            <a:rPr lang="fr-FR" sz="4000" kern="1200" dirty="0" smtClean="0"/>
+            <a:t>O</a:t>
+          </a:r>
+          <a:endParaRPr lang="fr-FR" sz="4000" kern="1200" dirty="0"/>
+        </a:p>
+      </dsp:txBody>
+      <dsp:txXfrm rot="5400000">
+        <a:off x="1729407" y="1917927"/>
+        <a:ext cx="1151422" cy="1151422"/>
+      </dsp:txXfrm>
+    </dsp:sp>
+    <dsp:sp modelId="{3B6382B4-DDDF-482E-9E6A-38E6F7DB930C}">
+      <dsp:nvSpPr>
+        <dsp:cNvPr id="0" name=""/>
+        <dsp:cNvSpPr/>
+      </dsp:nvSpPr>
+      <dsp:spPr>
+        <a:xfrm>
+          <a:off x="4959191" y="1554813"/>
+          <a:ext cx="562215" cy="488883"/>
+        </a:xfrm>
+        <a:prstGeom prst="circularArrow">
+          <a:avLst/>
+        </a:prstGeom>
+        <a:solidFill>
+          <a:schemeClr val="accent2">
+            <a:tint val="40000"/>
+            <a:hueOff val="0"/>
+            <a:satOff val="0"/>
+            <a:lumOff val="0"/>
+            <a:alpha val="0"/>
+          </a:schemeClr>
+        </a:solidFill>
+        <a:ln>
+          <a:noFill/>
+        </a:ln>
+        <a:effectLst>
+          <a:outerShdw blurRad="57150" dist="19050" dir="5400000" algn="ctr" rotWithShape="0">
+            <a:srgbClr val="000000">
+              <a:alpha val="63000"/>
+            </a:srgbClr>
+          </a:outerShdw>
+        </a:effectLst>
+        <a:scene3d>
+          <a:camera prst="orthographicFront"/>
+          <a:lightRig rig="flat" dir="t"/>
+        </a:scene3d>
+        <a:sp3d z="190500" prstMaterial="plastic">
+          <a:bevelT w="120900" h="88900"/>
+          <a:bevelB w="88900" h="31750" prst="angle"/>
+        </a:sp3d>
+      </dsp:spPr>
+      <dsp:style>
+        <a:lnRef idx="0">
+          <a:scrgbClr r="0" g="0" b="0"/>
+        </a:lnRef>
+        <a:fillRef idx="1">
+          <a:scrgbClr r="0" g="0" b="0"/>
+        </a:fillRef>
+        <a:effectRef idx="3">
+          <a:scrgbClr r="0" g="0" b="0"/>
+        </a:effectRef>
+        <a:fontRef idx="minor">
+          <a:schemeClr val="lt1"/>
+        </a:fontRef>
+      </dsp:style>
+    </dsp:sp>
+    <dsp:sp modelId="{72B333DC-EBE8-4650-A713-61338E0F2C2D}">
+      <dsp:nvSpPr>
+        <dsp:cNvPr id="0" name=""/>
+        <dsp:cNvSpPr/>
+      </dsp:nvSpPr>
+      <dsp:spPr>
+        <a:xfrm rot="10800000">
+          <a:off x="4959191" y="1626286"/>
+          <a:ext cx="562215" cy="488883"/>
+        </a:xfrm>
+        <a:prstGeom prst="circularArrow">
+          <a:avLst/>
+        </a:prstGeom>
+        <a:solidFill>
+          <a:schemeClr val="accent2">
+            <a:tint val="40000"/>
+            <a:hueOff val="0"/>
+            <a:satOff val="0"/>
+            <a:lumOff val="0"/>
+            <a:alpha val="0"/>
+          </a:schemeClr>
+        </a:solidFill>
+        <a:ln>
+          <a:noFill/>
+        </a:ln>
+        <a:effectLst>
+          <a:outerShdw blurRad="57150" dist="19050" dir="5400000" algn="ctr" rotWithShape="0">
+            <a:srgbClr val="000000">
+              <a:alpha val="63000"/>
+            </a:srgbClr>
+          </a:outerShdw>
+        </a:effectLst>
+        <a:scene3d>
+          <a:camera prst="orthographicFront"/>
+          <a:lightRig rig="flat" dir="t"/>
+        </a:scene3d>
+        <a:sp3d z="190500" prstMaterial="plastic">
+          <a:bevelT w="120900" h="88900"/>
+          <a:bevelB w="88900" h="31750" prst="angle"/>
+        </a:sp3d>
+      </dsp:spPr>
+      <dsp:style>
+        <a:lnRef idx="0">
+          <a:scrgbClr r="0" g="0" b="0"/>
+        </a:lnRef>
+        <a:fillRef idx="1">
+          <a:scrgbClr r="0" g="0" b="0"/>
+        </a:fillRef>
+        <a:effectRef idx="3">
+          <a:scrgbClr r="0" g="0" b="0"/>
+        </a:effectRef>
+        <a:fontRef idx="minor">
+          <a:schemeClr val="lt1"/>
+        </a:fontRef>
+      </dsp:style>
+    </dsp:sp>
   </dsp:spTree>
 </dsp:drawing>
 </file>
@@ -7502,7 +9516,7 @@
           <a:p>
             <a:fld id="{38717F5D-9B99-41E9-AAF0-B73531F5A10E}" type="slidenum">
               <a:rPr lang="fr-FR" smtClean="0"/>
-              <a:t>‹#›</a:t>
+              <a:t>‹N°›</a:t>
             </a:fld>
             <a:endParaRPr lang="fr-FR"/>
           </a:p>
@@ -7760,7 +9774,7 @@
           <a:p>
             <a:fld id="{049843D5-FBCC-450E-8A81-920AD1F49A83}" type="slidenum">
               <a:rPr lang="fr-FR" smtClean="0"/>
-              <a:t>‹#›</a:t>
+              <a:t>‹N°›</a:t>
             </a:fld>
             <a:endParaRPr lang="fr-FR"/>
           </a:p>
@@ -8820,7 +10834,7 @@
             <a:fld id="{813506F1-DB5F-4FC9-88BA-B486F30FE4BF}" type="slidenum">
               <a:rPr lang="fr-FR" smtClean="0"/>
               <a:pPr/>
-              <a:t>‹#›</a:t>
+              <a:t>‹N°›</a:t>
             </a:fld>
             <a:endParaRPr lang="fr-FR" dirty="0"/>
           </a:p>
@@ -9465,6 +11479,13 @@
   <p:clrMapOvr>
     <a:masterClrMapping/>
   </p:clrMapOvr>
+  <p:timing>
+    <p:tnLst>
+      <p:par>
+        <p:cTn id="1" dur="indefinite" restart="never" nodeType="tmRoot"/>
+      </p:par>
+    </p:tnLst>
+  </p:timing>
 </p:sld>
 </file>
 
@@ -16809,6 +18830,93 @@
           </a:p>
         </p:txBody>
       </p:sp>
+      <p:pic>
+        <p:nvPicPr>
+          <p:cNvPr id="4" name="Picture 2"/>
+          <p:cNvPicPr>
+            <a:picLocks noChangeAspect="1"/>
+          </p:cNvPicPr>
+          <p:nvPr/>
+        </p:nvPicPr>
+        <p:blipFill rotWithShape="1">
+          <a:blip r:embed="rId2" cstate="print">
+            <a:extLst>
+              <a:ext uri="{28A0092B-C50C-407E-A947-70E740481C1C}">
+                <a14:useLocalDpi xmlns:a14="http://schemas.microsoft.com/office/drawing/2010/main" val="0"/>
+              </a:ext>
+            </a:extLst>
+          </a:blip>
+          <a:srcRect t="7294"/>
+          <a:stretch/>
+        </p:blipFill>
+        <p:spPr>
+          <a:xfrm>
+            <a:off x="648393" y="1756666"/>
+            <a:ext cx="5074114" cy="5101334"/>
+          </a:xfrm>
+          <a:prstGeom prst="rect">
+            <a:avLst/>
+          </a:prstGeom>
+        </p:spPr>
+      </p:pic>
+      <p:pic>
+        <p:nvPicPr>
+          <p:cNvPr id="5" name="Picture 3"/>
+          <p:cNvPicPr>
+            <a:picLocks noChangeAspect="1"/>
+          </p:cNvPicPr>
+          <p:nvPr/>
+        </p:nvPicPr>
+        <p:blipFill rotWithShape="1">
+          <a:blip r:embed="rId3" cstate="print">
+            <a:extLst>
+              <a:ext uri="{28A0092B-C50C-407E-A947-70E740481C1C}">
+                <a14:useLocalDpi xmlns:a14="http://schemas.microsoft.com/office/drawing/2010/main" val="0"/>
+              </a:ext>
+            </a:extLst>
+          </a:blip>
+          <a:srcRect t="6500" b="29501"/>
+          <a:stretch/>
+        </p:blipFill>
+        <p:spPr>
+          <a:xfrm>
+            <a:off x="6032614" y="1718225"/>
+            <a:ext cx="3454285" cy="2434675"/>
+          </a:xfrm>
+          <a:prstGeom prst="rect">
+            <a:avLst/>
+          </a:prstGeom>
+        </p:spPr>
+      </p:pic>
+      <p:pic>
+        <p:nvPicPr>
+          <p:cNvPr id="6" name="Picture 6"/>
+          <p:cNvPicPr>
+            <a:picLocks noChangeAspect="1"/>
+          </p:cNvPicPr>
+          <p:nvPr/>
+        </p:nvPicPr>
+        <p:blipFill rotWithShape="1">
+          <a:blip r:embed="rId4" cstate="print">
+            <a:extLst>
+              <a:ext uri="{28A0092B-C50C-407E-A947-70E740481C1C}">
+                <a14:useLocalDpi xmlns:a14="http://schemas.microsoft.com/office/drawing/2010/main" val="0"/>
+              </a:ext>
+            </a:extLst>
+          </a:blip>
+          <a:srcRect t="7626" r="14094" b="18958"/>
+          <a:stretch/>
+        </p:blipFill>
+        <p:spPr>
+          <a:xfrm>
+            <a:off x="6032615" y="4152900"/>
+            <a:ext cx="6045085" cy="2705100"/>
+          </a:xfrm>
+          <a:prstGeom prst="rect">
+            <a:avLst/>
+          </a:prstGeom>
+        </p:spPr>
+      </p:pic>
     </p:spTree>
     <p:extLst>
       <p:ext uri="{BB962C8B-B14F-4D97-AF65-F5344CB8AC3E}">
@@ -17590,6 +19698,13 @@
   <p:clrMapOvr>
     <a:masterClrMapping/>
   </p:clrMapOvr>
+  <p:timing>
+    <p:tnLst>
+      <p:par>
+        <p:cTn id="1" dur="indefinite" restart="never" nodeType="tmRoot"/>
+      </p:par>
+    </p:tnLst>
+  </p:timing>
 </p:sld>
 </file>
 
@@ -17944,6 +20059,13 @@
   <p:clrMapOvr>
     <a:masterClrMapping/>
   </p:clrMapOvr>
+  <p:timing>
+    <p:tnLst>
+      <p:par>
+        <p:cTn id="1" dur="indefinite" restart="never" nodeType="tmRoot"/>
+      </p:par>
+    </p:tnLst>
+  </p:timing>
 </p:sld>
 </file>
 
@@ -18536,6 +20658,13 @@
   <p:clrMapOvr>
     <a:masterClrMapping/>
   </p:clrMapOvr>
+  <p:timing>
+    <p:tnLst>
+      <p:par>
+        <p:cTn id="1" dur="indefinite" restart="never" nodeType="tmRoot"/>
+      </p:par>
+    </p:tnLst>
+  </p:timing>
 </p:sld>
 </file>
 
@@ -22904,6 +25033,13 @@
   <p:clrMapOvr>
     <a:masterClrMapping/>
   </p:clrMapOvr>
+  <p:timing>
+    <p:tnLst>
+      <p:par>
+        <p:cTn id="1" dur="indefinite" restart="never" nodeType="tmRoot"/>
+      </p:par>
+    </p:tnLst>
+  </p:timing>
 </p:sld>
 </file>
 
@@ -23068,6 +25204,13 @@
   <p:clrMapOvr>
     <a:masterClrMapping/>
   </p:clrMapOvr>
+  <p:timing>
+    <p:tnLst>
+      <p:par>
+        <p:cTn id="1" dur="indefinite" restart="never" nodeType="tmRoot"/>
+      </p:par>
+    </p:tnLst>
+  </p:timing>
 </p:sld>
 </file>
 
@@ -23749,6 +25892,13 @@
   <p:clrMapOvr>
     <a:masterClrMapping/>
   </p:clrMapOvr>
+  <p:timing>
+    <p:tnLst>
+      <p:par>
+        <p:cTn id="1" dur="indefinite" restart="never" nodeType="tmRoot"/>
+      </p:par>
+    </p:tnLst>
+  </p:timing>
 </p:sld>
 </file>
 
@@ -23801,7 +25951,7 @@
           </p:cNvPicPr>
           <p:nvPr/>
         </p:nvPicPr>
-        <p:blipFill>
+        <p:blipFill rotWithShape="1">
           <a:blip r:embed="rId2" cstate="print">
             <a:extLst>
               <a:ext uri="{28A0092B-C50C-407E-A947-70E740481C1C}">
@@ -23809,14 +25959,13 @@
               </a:ext>
             </a:extLst>
           </a:blip>
-          <a:stretch>
-            <a:fillRect/>
-          </a:stretch>
+          <a:srcRect t="7294"/>
+          <a:stretch/>
         </p:blipFill>
         <p:spPr>
           <a:xfrm>
-            <a:off x="1034288" y="1963022"/>
-            <a:ext cx="2537284" cy="2751591"/>
+            <a:off x="648393" y="1756666"/>
+            <a:ext cx="5074114" cy="5101334"/>
           </a:xfrm>
           <a:prstGeom prst="rect">
             <a:avLst/>
@@ -23831,7 +25980,7 @@
           </p:cNvPicPr>
           <p:nvPr/>
         </p:nvPicPr>
-        <p:blipFill>
+        <p:blipFill rotWithShape="1">
           <a:blip r:embed="rId3" cstate="print">
             <a:extLst>
               <a:ext uri="{28A0092B-C50C-407E-A947-70E740481C1C}">
@@ -23839,14 +25988,13 @@
               </a:ext>
             </a:extLst>
           </a:blip>
-          <a:stretch>
-            <a:fillRect/>
-          </a:stretch>
+          <a:srcRect t="6500" b="29501"/>
+          <a:stretch/>
         </p:blipFill>
         <p:spPr>
           <a:xfrm>
-            <a:off x="3920165" y="1661017"/>
-            <a:ext cx="2664256" cy="2885815"/>
+            <a:off x="6032614" y="1718225"/>
+            <a:ext cx="3454285" cy="2434675"/>
           </a:xfrm>
           <a:prstGeom prst="rect">
             <a:avLst/>
@@ -23861,7 +26009,7 @@
           </p:cNvPicPr>
           <p:nvPr/>
         </p:nvPicPr>
-        <p:blipFill>
+        <p:blipFill rotWithShape="1">
           <a:blip r:embed="rId4" cstate="print">
             <a:extLst>
               <a:ext uri="{28A0092B-C50C-407E-A947-70E740481C1C}">
@@ -23869,14 +26017,13 @@
               </a:ext>
             </a:extLst>
           </a:blip>
-          <a:stretch>
-            <a:fillRect/>
-          </a:stretch>
+          <a:srcRect t="7626" r="14094" b="18958"/>
+          <a:stretch/>
         </p:blipFill>
         <p:spPr>
           <a:xfrm>
-            <a:off x="5155142" y="2919368"/>
-            <a:ext cx="7036857" cy="3811631"/>
+            <a:off x="6032615" y="4152900"/>
+            <a:ext cx="6045085" cy="2705100"/>
           </a:xfrm>
           <a:prstGeom prst="rect">
             <a:avLst/>
@@ -23893,6 +26040,13 @@
   <p:clrMapOvr>
     <a:masterClrMapping/>
   </p:clrMapOvr>
+  <p:timing>
+    <p:tnLst>
+      <p:par>
+        <p:cTn id="1" dur="indefinite" restart="never" nodeType="tmRoot"/>
+      </p:par>
+    </p:tnLst>
+  </p:timing>
 </p:sld>
 </file>
 
@@ -24026,6 +26180,13 @@
   <p:clrMapOvr>
     <a:masterClrMapping/>
   </p:clrMapOvr>
+  <p:timing>
+    <p:tnLst>
+      <p:par>
+        <p:cTn id="1" dur="indefinite" restart="never" nodeType="tmRoot"/>
+      </p:par>
+    </p:tnLst>
+  </p:timing>
 </p:sld>
 </file>
 

</xml_diff>

<commit_message>
Update ddb and ppt
</commit_message>
<xml_diff>
--- a/Slides/Diapos_Suivit_projet.pptx
+++ b/Slides/Diapos_Suivit_projet.pptx
@@ -1069,10 +1069,9 @@
         <a:lstStyle/>
         <a:p>
           <a:r>
-            <a:rPr lang="fr-FR" dirty="0" smtClean="0"/>
+            <a:rPr lang="fr-FR" dirty="0"/>
             <a:t>S</a:t>
           </a:r>
-          <a:endParaRPr lang="fr-FR" dirty="0"/>
         </a:p>
       </dgm:t>
     </dgm:pt>
@@ -1106,18 +1105,17 @@
         <a:lstStyle/>
         <a:p>
           <a:r>
-            <a:rPr lang="fr-FR" dirty="0" smtClean="0"/>
+            <a:rPr lang="fr-FR" dirty="0"/>
             <a:t>Diverse </a:t>
           </a:r>
           <a:r>
-            <a:rPr lang="fr-FR" dirty="0" err="1" smtClean="0"/>
+            <a:rPr lang="fr-FR" dirty="0" err="1"/>
             <a:t>skill</a:t>
           </a:r>
           <a:r>
-            <a:rPr lang="fr-FR" dirty="0" smtClean="0"/>
+            <a:rPr lang="fr-FR" dirty="0"/>
             <a:t> set</a:t>
           </a:r>
-          <a:endParaRPr lang="fr-FR" dirty="0"/>
         </a:p>
       </dgm:t>
     </dgm:pt>
@@ -1151,10 +1149,9 @@
         <a:lstStyle/>
         <a:p>
           <a:r>
-            <a:rPr lang="fr-FR" dirty="0" smtClean="0"/>
+            <a:rPr lang="fr-FR" dirty="0"/>
             <a:t>W</a:t>
           </a:r>
-          <a:endParaRPr lang="fr-FR" dirty="0"/>
         </a:p>
       </dgm:t>
     </dgm:pt>
@@ -1188,10 +1185,9 @@
         <a:lstStyle/>
         <a:p>
           <a:r>
-            <a:rPr lang="fr-FR" dirty="0" smtClean="0"/>
+            <a:rPr lang="fr-FR" dirty="0"/>
             <a:t>Short deadlines</a:t>
           </a:r>
-          <a:endParaRPr lang="fr-FR" dirty="0"/>
         </a:p>
       </dgm:t>
     </dgm:pt>
@@ -1225,10 +1221,9 @@
         <a:lstStyle/>
         <a:p>
           <a:r>
-            <a:rPr lang="fr-FR" dirty="0" smtClean="0"/>
+            <a:rPr lang="fr-FR" dirty="0"/>
             <a:t>T</a:t>
           </a:r>
-          <a:endParaRPr lang="fr-FR" dirty="0"/>
         </a:p>
       </dgm:t>
     </dgm:pt>
@@ -1262,22 +1257,21 @@
         <a:lstStyle/>
         <a:p>
           <a:r>
-            <a:rPr lang="fr-FR" dirty="0" err="1" smtClean="0"/>
+            <a:rPr lang="fr-FR" dirty="0" err="1"/>
             <a:t>Risk</a:t>
           </a:r>
           <a:r>
-            <a:rPr lang="fr-FR" dirty="0" smtClean="0"/>
+            <a:rPr lang="fr-FR" dirty="0"/>
             <a:t> of high </a:t>
           </a:r>
           <a:r>
-            <a:rPr lang="fr-FR" dirty="0" err="1" smtClean="0"/>
+            <a:rPr lang="fr-FR" dirty="0" err="1"/>
             <a:t>demand</a:t>
           </a:r>
           <a:r>
-            <a:rPr lang="fr-FR" dirty="0" smtClean="0"/>
+            <a:rPr lang="fr-FR" dirty="0"/>
             <a:t> (server)</a:t>
           </a:r>
-          <a:endParaRPr lang="fr-FR" dirty="0"/>
         </a:p>
       </dgm:t>
     </dgm:pt>
@@ -1311,10 +1305,9 @@
         <a:lstStyle/>
         <a:p>
           <a:r>
-            <a:rPr lang="fr-FR" dirty="0" smtClean="0"/>
+            <a:rPr lang="fr-FR" dirty="0"/>
             <a:t>O</a:t>
           </a:r>
-          <a:endParaRPr lang="fr-FR" dirty="0"/>
         </a:p>
       </dgm:t>
     </dgm:pt>
@@ -1348,11 +1341,11 @@
         <a:lstStyle/>
         <a:p>
           <a:r>
-            <a:rPr lang="fr-FR" dirty="0" smtClean="0"/>
+            <a:rPr lang="fr-FR" dirty="0"/>
             <a:t>No </a:t>
           </a:r>
           <a:r>
-            <a:rPr lang="fr-FR" dirty="0" err="1" smtClean="0"/>
+            <a:rPr lang="fr-FR" dirty="0" err="1"/>
             <a:t>competition</a:t>
           </a:r>
           <a:endParaRPr lang="fr-FR" dirty="0"/>
@@ -1389,11 +1382,11 @@
         <a:lstStyle/>
         <a:p>
           <a:r>
-            <a:rPr lang="fr-FR" dirty="0" smtClean="0"/>
+            <a:rPr lang="fr-FR" dirty="0"/>
             <a:t>Access to expert </a:t>
           </a:r>
           <a:r>
-            <a:rPr lang="fr-FR" dirty="0" err="1" smtClean="0"/>
+            <a:rPr lang="fr-FR" dirty="0" err="1"/>
             <a:t>advise</a:t>
           </a:r>
           <a:endParaRPr lang="fr-FR" dirty="0"/>
@@ -1430,19 +1423,19 @@
         <a:lstStyle/>
         <a:p>
           <a:r>
-            <a:rPr lang="fr-FR" dirty="0" smtClean="0"/>
+            <a:rPr lang="fr-FR" dirty="0"/>
             <a:t>Not </a:t>
           </a:r>
           <a:r>
-            <a:rPr lang="fr-FR" dirty="0" err="1" smtClean="0"/>
+            <a:rPr lang="fr-FR" dirty="0" err="1"/>
             <a:t>well</a:t>
           </a:r>
           <a:r>
-            <a:rPr lang="fr-FR" dirty="0" smtClean="0"/>
+            <a:rPr lang="fr-FR" dirty="0"/>
             <a:t> </a:t>
           </a:r>
           <a:r>
-            <a:rPr lang="fr-FR" dirty="0" err="1" smtClean="0"/>
+            <a:rPr lang="fr-FR" dirty="0" err="1"/>
             <a:t>documented</a:t>
           </a:r>
           <a:endParaRPr lang="fr-FR" dirty="0"/>
@@ -1479,10 +1472,9 @@
         <a:lstStyle/>
         <a:p>
           <a:r>
-            <a:rPr lang="fr-FR" dirty="0" smtClean="0"/>
+            <a:rPr lang="fr-FR" dirty="0"/>
             <a:t>High utility</a:t>
           </a:r>
-          <a:endParaRPr lang="fr-FR" dirty="0"/>
         </a:p>
       </dgm:t>
     </dgm:pt>
@@ -1516,18 +1508,17 @@
         <a:lstStyle/>
         <a:p>
           <a:r>
-            <a:rPr lang="fr-FR" dirty="0" smtClean="0"/>
+            <a:rPr lang="fr-FR" dirty="0"/>
             <a:t>Data protection (</a:t>
           </a:r>
           <a:r>
-            <a:rPr lang="fr-FR" dirty="0" err="1" smtClean="0"/>
+            <a:rPr lang="fr-FR" dirty="0" err="1"/>
             <a:t>temporary</a:t>
           </a:r>
           <a:r>
-            <a:rPr lang="fr-FR" dirty="0" smtClean="0"/>
+            <a:rPr lang="fr-FR" dirty="0"/>
             <a:t>)</a:t>
           </a:r>
-          <a:endParaRPr lang="fr-FR" dirty="0"/>
         </a:p>
       </dgm:t>
     </dgm:pt>
@@ -1561,10 +1552,9 @@
         <a:lstStyle/>
         <a:p>
           <a:r>
-            <a:rPr lang="fr-FR" dirty="0" smtClean="0"/>
+            <a:rPr lang="fr-FR" dirty="0"/>
             <a:t>Open source packages</a:t>
           </a:r>
-          <a:endParaRPr lang="fr-FR" dirty="0"/>
         </a:p>
       </dgm:t>
     </dgm:pt>
@@ -1600,13 +1590,6 @@
         </dgm:presLayoutVars>
       </dgm:prSet>
       <dgm:spPr/>
-      <dgm:t>
-        <a:bodyPr/>
-        <a:lstStyle/>
-        <a:p>
-          <a:endParaRPr lang="fr-FR"/>
-        </a:p>
-      </dgm:t>
     </dgm:pt>
     <dgm:pt modelId="{D7E58549-68A7-4F21-BF0D-84F7636DCD92}" type="pres">
       <dgm:prSet presAssocID="{CC293B1C-4CF8-4FF0-BBC7-4942ED2D7F88}" presName="children" presStyleCnt="0"/>
@@ -1619,13 +1602,6 @@
     <dgm:pt modelId="{BC6F0824-1351-49BA-BADB-F02B71A91728}" type="pres">
       <dgm:prSet presAssocID="{CC293B1C-4CF8-4FF0-BBC7-4942ED2D7F88}" presName="child1" presStyleLbl="bgAcc1" presStyleIdx="0" presStyleCnt="4"/>
       <dgm:spPr/>
-      <dgm:t>
-        <a:bodyPr/>
-        <a:lstStyle/>
-        <a:p>
-          <a:endParaRPr lang="fr-FR"/>
-        </a:p>
-      </dgm:t>
     </dgm:pt>
     <dgm:pt modelId="{8128ED5B-798D-45C7-BB11-A0996A8BF223}" type="pres">
       <dgm:prSet presAssocID="{CC293B1C-4CF8-4FF0-BBC7-4942ED2D7F88}" presName="child1Text" presStyleLbl="bgAcc1" presStyleIdx="0" presStyleCnt="4">
@@ -1634,13 +1610,6 @@
         </dgm:presLayoutVars>
       </dgm:prSet>
       <dgm:spPr/>
-      <dgm:t>
-        <a:bodyPr/>
-        <a:lstStyle/>
-        <a:p>
-          <a:endParaRPr lang="fr-FR"/>
-        </a:p>
-      </dgm:t>
     </dgm:pt>
     <dgm:pt modelId="{D1CAC0FF-E414-4230-81F1-48A389FCAA90}" type="pres">
       <dgm:prSet presAssocID="{CC293B1C-4CF8-4FF0-BBC7-4942ED2D7F88}" presName="child2group" presStyleCnt="0"/>
@@ -1649,13 +1618,6 @@
     <dgm:pt modelId="{05478942-E273-4856-8553-F0FD8F015AA2}" type="pres">
       <dgm:prSet presAssocID="{CC293B1C-4CF8-4FF0-BBC7-4942ED2D7F88}" presName="child2" presStyleLbl="bgAcc1" presStyleIdx="1" presStyleCnt="4" custLinFactNeighborX="1745"/>
       <dgm:spPr/>
-      <dgm:t>
-        <a:bodyPr/>
-        <a:lstStyle/>
-        <a:p>
-          <a:endParaRPr lang="fr-FR"/>
-        </a:p>
-      </dgm:t>
     </dgm:pt>
     <dgm:pt modelId="{FFCC9154-8E22-496A-ADF8-EA81D4AB5D77}" type="pres">
       <dgm:prSet presAssocID="{CC293B1C-4CF8-4FF0-BBC7-4942ED2D7F88}" presName="child2Text" presStyleLbl="bgAcc1" presStyleIdx="1" presStyleCnt="4">
@@ -1664,13 +1626,6 @@
         </dgm:presLayoutVars>
       </dgm:prSet>
       <dgm:spPr/>
-      <dgm:t>
-        <a:bodyPr/>
-        <a:lstStyle/>
-        <a:p>
-          <a:endParaRPr lang="fr-FR"/>
-        </a:p>
-      </dgm:t>
     </dgm:pt>
     <dgm:pt modelId="{AC6B2FBF-7301-4489-8CBA-C72E325139A7}" type="pres">
       <dgm:prSet presAssocID="{CC293B1C-4CF8-4FF0-BBC7-4942ED2D7F88}" presName="child3group" presStyleCnt="0"/>
@@ -1679,13 +1634,6 @@
     <dgm:pt modelId="{68AC0C8C-6683-4490-8F38-983C8CB47C3F}" type="pres">
       <dgm:prSet presAssocID="{CC293B1C-4CF8-4FF0-BBC7-4942ED2D7F88}" presName="child3" presStyleLbl="bgAcc1" presStyleIdx="2" presStyleCnt="4" custLinFactNeighborX="1745"/>
       <dgm:spPr/>
-      <dgm:t>
-        <a:bodyPr/>
-        <a:lstStyle/>
-        <a:p>
-          <a:endParaRPr lang="fr-FR"/>
-        </a:p>
-      </dgm:t>
     </dgm:pt>
     <dgm:pt modelId="{60120B91-D76F-4101-857D-B9B656863593}" type="pres">
       <dgm:prSet presAssocID="{CC293B1C-4CF8-4FF0-BBC7-4942ED2D7F88}" presName="child3Text" presStyleLbl="bgAcc1" presStyleIdx="2" presStyleCnt="4">
@@ -1694,13 +1642,6 @@
         </dgm:presLayoutVars>
       </dgm:prSet>
       <dgm:spPr/>
-      <dgm:t>
-        <a:bodyPr/>
-        <a:lstStyle/>
-        <a:p>
-          <a:endParaRPr lang="fr-FR"/>
-        </a:p>
-      </dgm:t>
     </dgm:pt>
     <dgm:pt modelId="{FE4735BA-FC16-4D11-8D7D-854C3BB49539}" type="pres">
       <dgm:prSet presAssocID="{CC293B1C-4CF8-4FF0-BBC7-4942ED2D7F88}" presName="child4group" presStyleCnt="0"/>
@@ -1709,13 +1650,6 @@
     <dgm:pt modelId="{431C4C2F-7F42-4D62-8EEF-918E7AD22EA0}" type="pres">
       <dgm:prSet presAssocID="{CC293B1C-4CF8-4FF0-BBC7-4942ED2D7F88}" presName="child4" presStyleLbl="bgAcc1" presStyleIdx="3" presStyleCnt="4"/>
       <dgm:spPr/>
-      <dgm:t>
-        <a:bodyPr/>
-        <a:lstStyle/>
-        <a:p>
-          <a:endParaRPr lang="fr-FR"/>
-        </a:p>
-      </dgm:t>
     </dgm:pt>
     <dgm:pt modelId="{53088BBF-CDFB-43AD-88FA-A16B4FDD4AEA}" type="pres">
       <dgm:prSet presAssocID="{CC293B1C-4CF8-4FF0-BBC7-4942ED2D7F88}" presName="child4Text" presStyleLbl="bgAcc1" presStyleIdx="3" presStyleCnt="4">
@@ -1724,13 +1658,6 @@
         </dgm:presLayoutVars>
       </dgm:prSet>
       <dgm:spPr/>
-      <dgm:t>
-        <a:bodyPr/>
-        <a:lstStyle/>
-        <a:p>
-          <a:endParaRPr lang="fr-FR"/>
-        </a:p>
-      </dgm:t>
     </dgm:pt>
     <dgm:pt modelId="{4C71D571-69A8-40F3-850A-97D36405B4CD}" type="pres">
       <dgm:prSet presAssocID="{CC293B1C-4CF8-4FF0-BBC7-4942ED2D7F88}" presName="childPlaceholder" presStyleCnt="0"/>
@@ -1748,13 +1675,6 @@
         </dgm:presLayoutVars>
       </dgm:prSet>
       <dgm:spPr/>
-      <dgm:t>
-        <a:bodyPr/>
-        <a:lstStyle/>
-        <a:p>
-          <a:endParaRPr lang="fr-FR"/>
-        </a:p>
-      </dgm:t>
     </dgm:pt>
     <dgm:pt modelId="{A67A60E5-5291-49E4-B3E5-53A58B528285}" type="pres">
       <dgm:prSet presAssocID="{CC293B1C-4CF8-4FF0-BBC7-4942ED2D7F88}" presName="quadrant2" presStyleLbl="node1" presStyleIdx="1" presStyleCnt="4">
@@ -1764,13 +1684,6 @@
         </dgm:presLayoutVars>
       </dgm:prSet>
       <dgm:spPr/>
-      <dgm:t>
-        <a:bodyPr/>
-        <a:lstStyle/>
-        <a:p>
-          <a:endParaRPr lang="fr-FR"/>
-        </a:p>
-      </dgm:t>
     </dgm:pt>
     <dgm:pt modelId="{CF4FC7F6-A89C-4633-A10E-BFE92B369DCD}" type="pres">
       <dgm:prSet presAssocID="{CC293B1C-4CF8-4FF0-BBC7-4942ED2D7F88}" presName="quadrant3" presStyleLbl="node1" presStyleIdx="2" presStyleCnt="4">
@@ -1780,13 +1693,6 @@
         </dgm:presLayoutVars>
       </dgm:prSet>
       <dgm:spPr/>
-      <dgm:t>
-        <a:bodyPr/>
-        <a:lstStyle/>
-        <a:p>
-          <a:endParaRPr lang="fr-FR"/>
-        </a:p>
-      </dgm:t>
     </dgm:pt>
     <dgm:pt modelId="{C0852406-3DC0-4222-A1F8-184593FC4596}" type="pres">
       <dgm:prSet presAssocID="{CC293B1C-4CF8-4FF0-BBC7-4942ED2D7F88}" presName="quadrant4" presStyleLbl="node1" presStyleIdx="3" presStyleCnt="4">
@@ -1796,13 +1702,6 @@
         </dgm:presLayoutVars>
       </dgm:prSet>
       <dgm:spPr/>
-      <dgm:t>
-        <a:bodyPr/>
-        <a:lstStyle/>
-        <a:p>
-          <a:endParaRPr lang="fr-FR"/>
-        </a:p>
-      </dgm:t>
     </dgm:pt>
     <dgm:pt modelId="{B569151F-8995-4BD7-A8F3-A948642763E3}" type="pres">
       <dgm:prSet presAssocID="{CC293B1C-4CF8-4FF0-BBC7-4942ED2D7F88}" presName="quadrantPlaceholder" presStyleCnt="0"/>
@@ -1838,42 +1737,42 @@
     </dgm:pt>
   </dgm:ptLst>
   <dgm:cxnLst>
+    <dgm:cxn modelId="{061DA901-6AB9-43FE-A11B-A7F3BBF2B2DF}" type="presOf" srcId="{49454F30-2B75-445A-845F-7473D893477D}" destId="{53088BBF-CDFB-43AD-88FA-A16B4FDD4AEA}" srcOrd="1" destOrd="0" presId="urn:microsoft.com/office/officeart/2005/8/layout/cycle4"/>
+    <dgm:cxn modelId="{566F2C05-C614-467E-BF41-9EC9D316C5BC}" type="presOf" srcId="{21C7A246-DDB5-40DD-9118-CC4963BF878A}" destId="{BC6F0824-1351-49BA-BADB-F02B71A91728}" srcOrd="0" destOrd="1" presId="urn:microsoft.com/office/officeart/2005/8/layout/cycle4"/>
+    <dgm:cxn modelId="{5E45B507-1330-428C-A195-37581AAE5A63}" srcId="{8FEE133A-1A79-4187-9AFD-4F06B42A70BC}" destId="{21C7A246-DDB5-40DD-9118-CC4963BF878A}" srcOrd="1" destOrd="0" parTransId="{CD9E23AD-A863-49AB-83BE-431D89C28AF8}" sibTransId="{9EFEBC15-1E66-4CAC-95AE-73B08C514600}"/>
+    <dgm:cxn modelId="{8CB24317-C189-4E11-828E-2DB5B4E08A1D}" type="presOf" srcId="{7FF71154-70C1-47DE-91E2-5DB90307E807}" destId="{68AC0C8C-6683-4490-8F38-983C8CB47C3F}" srcOrd="0" destOrd="1" presId="urn:microsoft.com/office/officeart/2005/8/layout/cycle4"/>
+    <dgm:cxn modelId="{FED0961E-8858-4D34-97EC-EA6298A2D7A2}" type="presOf" srcId="{AE8D8FFF-9AF0-4B15-AF81-01A130F2BD02}" destId="{FFCC9154-8E22-496A-ADF8-EA81D4AB5D77}" srcOrd="1" destOrd="1" presId="urn:microsoft.com/office/officeart/2005/8/layout/cycle4"/>
+    <dgm:cxn modelId="{E37A2B1F-3837-42DC-8FC2-44F2A90B56EC}" type="presOf" srcId="{CC293B1C-4CF8-4FF0-BBC7-4942ED2D7F88}" destId="{39401A14-B365-4553-9A3D-A401D3183747}" srcOrd="0" destOrd="0" presId="urn:microsoft.com/office/officeart/2005/8/layout/cycle4"/>
+    <dgm:cxn modelId="{6484E426-69AA-42DF-977B-A67A73203BD9}" srcId="{8BEA78FF-204F-4428-9092-659961DC247C}" destId="{49454F30-2B75-445A-845F-7473D893477D}" srcOrd="0" destOrd="0" parTransId="{347F498C-146E-4A53-8576-856FB00E3649}" sibTransId="{FAF60BDA-D885-4200-9740-D21B994BE362}"/>
+    <dgm:cxn modelId="{8FDDA428-0D6A-4010-8A54-C0B0EB6C77E4}" type="presOf" srcId="{0916D3E2-7950-4B1E-A80A-B1A0DFE4D7BE}" destId="{CF4FC7F6-A89C-4633-A10E-BFE92B369DCD}" srcOrd="0" destOrd="0" presId="urn:microsoft.com/office/officeart/2005/8/layout/cycle4"/>
+    <dgm:cxn modelId="{8117BD28-990A-4794-8E5A-2D49697F13CF}" srcId="{0916D3E2-7950-4B1E-A80A-B1A0DFE4D7BE}" destId="{7FF71154-70C1-47DE-91E2-5DB90307E807}" srcOrd="1" destOrd="0" parTransId="{1B9722FC-C7C2-486D-BC7E-72CE34B24ADB}" sibTransId="{96E0472B-19D5-49CC-8E2D-2FF1A8F57871}"/>
+    <dgm:cxn modelId="{3CE6DC31-8913-4EA7-9612-8A8DD923E800}" type="presOf" srcId="{AE8D8FFF-9AF0-4B15-AF81-01A130F2BD02}" destId="{05478942-E273-4856-8553-F0FD8F015AA2}" srcOrd="0" destOrd="1" presId="urn:microsoft.com/office/officeart/2005/8/layout/cycle4"/>
+    <dgm:cxn modelId="{930F1B63-AA36-4E17-A5FE-F2AB0A6DC221}" type="presOf" srcId="{1981BF8C-ABB4-462F-BD54-45D3229B3478}" destId="{05478942-E273-4856-8553-F0FD8F015AA2}" srcOrd="0" destOrd="0" presId="urn:microsoft.com/office/officeart/2005/8/layout/cycle4"/>
+    <dgm:cxn modelId="{457E1C46-C110-4646-BA7F-FD7DB5F5C6EF}" type="presOf" srcId="{8BEA78FF-204F-4428-9092-659961DC247C}" destId="{C0852406-3DC0-4222-A1F8-184593FC4596}" srcOrd="0" destOrd="0" presId="urn:microsoft.com/office/officeart/2005/8/layout/cycle4"/>
+    <dgm:cxn modelId="{A2830668-E8D8-479D-BDD1-DDDBB0D25879}" type="presOf" srcId="{DCE41F30-8A4B-4090-95D5-6CBD1CFA1EEC}" destId="{A67A60E5-5291-49E4-B3E5-53A58B528285}" srcOrd="0" destOrd="0" presId="urn:microsoft.com/office/officeart/2005/8/layout/cycle4"/>
+    <dgm:cxn modelId="{58755D72-6A8A-4181-8EB5-41F1412B480B}" srcId="{8FEE133A-1A79-4187-9AFD-4F06B42A70BC}" destId="{62885FA7-E7FB-4933-9935-6A8AA90289B4}" srcOrd="2" destOrd="0" parTransId="{9870B421-E3D6-4556-A843-2F0EDB4F207B}" sibTransId="{EB0831C9-645B-4C0B-8FAE-4F47D0F4E0C7}"/>
     <dgm:cxn modelId="{5DC2DB55-F097-4294-8B9E-72B598743DA3}" srcId="{8BEA78FF-204F-4428-9092-659961DC247C}" destId="{850DD825-7D08-4BBC-94B9-7E217910F9A2}" srcOrd="1" destOrd="0" parTransId="{D847AE72-61FF-43C4-BFB0-3E6EC0A79B26}" sibTransId="{DD66B6EB-9ADC-44F2-A7C2-DA4869ECDFFE}"/>
-    <dgm:cxn modelId="{8FDDA428-0D6A-4010-8A54-C0B0EB6C77E4}" type="presOf" srcId="{0916D3E2-7950-4B1E-A80A-B1A0DFE4D7BE}" destId="{CF4FC7F6-A89C-4633-A10E-BFE92B369DCD}" srcOrd="0" destOrd="0" presId="urn:microsoft.com/office/officeart/2005/8/layout/cycle4"/>
-    <dgm:cxn modelId="{61191D9C-E95A-4D05-8EB5-50675A3F154F}" srcId="{DCE41F30-8A4B-4090-95D5-6CBD1CFA1EEC}" destId="{AE8D8FFF-9AF0-4B15-AF81-01A130F2BD02}" srcOrd="1" destOrd="0" parTransId="{09A1B763-003F-4D1E-A0CA-D45779C90106}" sibTransId="{16409495-689E-4EF6-90A7-12E4E2621B22}"/>
-    <dgm:cxn modelId="{E37A2B1F-3837-42DC-8FC2-44F2A90B56EC}" type="presOf" srcId="{CC293B1C-4CF8-4FF0-BBC7-4942ED2D7F88}" destId="{39401A14-B365-4553-9A3D-A401D3183747}" srcOrd="0" destOrd="0" presId="urn:microsoft.com/office/officeart/2005/8/layout/cycle4"/>
-    <dgm:cxn modelId="{10E792CA-6A54-4E59-81A9-D2596CD479D3}" type="presOf" srcId="{7FF71154-70C1-47DE-91E2-5DB90307E807}" destId="{60120B91-D76F-4101-857D-B9B656863593}" srcOrd="1" destOrd="1" presId="urn:microsoft.com/office/officeart/2005/8/layout/cycle4"/>
+    <dgm:cxn modelId="{2F545677-CE33-4761-99ED-0F7D3431F1B7}" srcId="{DCE41F30-8A4B-4090-95D5-6CBD1CFA1EEC}" destId="{1981BF8C-ABB4-462F-BD54-45D3229B3478}" srcOrd="0" destOrd="0" parTransId="{420AF548-7339-428B-B062-F64CBEBA21A3}" sibTransId="{314ADFC2-8DB9-4517-A22A-D1F9C188BEE4}"/>
     <dgm:cxn modelId="{ABC80A87-3620-4E91-942F-287CDBCD7966}" type="presOf" srcId="{35F1F2D2-FC47-4990-98DB-731AFE036343}" destId="{8128ED5B-798D-45C7-BB11-A0996A8BF223}" srcOrd="1" destOrd="0" presId="urn:microsoft.com/office/officeart/2005/8/layout/cycle4"/>
     <dgm:cxn modelId="{F9F99A89-5C91-4531-84CA-6F19594E744A}" type="presOf" srcId="{9B35DA45-8824-4EE3-89F0-3F4E07F980E3}" destId="{60120B91-D76F-4101-857D-B9B656863593}" srcOrd="1" destOrd="0" presId="urn:microsoft.com/office/officeart/2005/8/layout/cycle4"/>
+    <dgm:cxn modelId="{A9B36F8A-C74B-47A9-B539-806F6BB77A1A}" srcId="{CC293B1C-4CF8-4FF0-BBC7-4942ED2D7F88}" destId="{0916D3E2-7950-4B1E-A80A-B1A0DFE4D7BE}" srcOrd="2" destOrd="0" parTransId="{78ED7DF1-7D14-4D64-A8E3-CBD6C30B03FB}" sibTransId="{402F8436-663D-4DB8-A22F-0A8F501EB425}"/>
+    <dgm:cxn modelId="{856CCC98-4D42-4940-9913-BB20C5217489}" srcId="{CC293B1C-4CF8-4FF0-BBC7-4942ED2D7F88}" destId="{DCE41F30-8A4B-4090-95D5-6CBD1CFA1EEC}" srcOrd="1" destOrd="0" parTransId="{480265E7-8542-40B5-95A1-EC04B55B8C68}" sibTransId="{005E5E72-5BE1-4DC4-AD1C-48C242521B93}"/>
+    <dgm:cxn modelId="{61191D9C-E95A-4D05-8EB5-50675A3F154F}" srcId="{DCE41F30-8A4B-4090-95D5-6CBD1CFA1EEC}" destId="{AE8D8FFF-9AF0-4B15-AF81-01A130F2BD02}" srcOrd="1" destOrd="0" parTransId="{09A1B763-003F-4D1E-A0CA-D45779C90106}" sibTransId="{16409495-689E-4EF6-90A7-12E4E2621B22}"/>
+    <dgm:cxn modelId="{08978BA1-AE5A-4DFF-A0C3-92D4A0078A98}" srcId="{0916D3E2-7950-4B1E-A80A-B1A0DFE4D7BE}" destId="{9B35DA45-8824-4EE3-89F0-3F4E07F980E3}" srcOrd="0" destOrd="0" parTransId="{F26E0BCB-616E-4F5C-9212-B89461307743}" sibTransId="{6FFF208B-A136-4388-9736-DE2BA4AFD5AF}"/>
+    <dgm:cxn modelId="{E05818A8-BE3A-4136-9B61-768FB33C0CED}" type="presOf" srcId="{9B35DA45-8824-4EE3-89F0-3F4E07F980E3}" destId="{68AC0C8C-6683-4490-8F38-983C8CB47C3F}" srcOrd="0" destOrd="0" presId="urn:microsoft.com/office/officeart/2005/8/layout/cycle4"/>
+    <dgm:cxn modelId="{F3DC86B6-474F-4BE6-A324-3FE9F9B8844A}" srcId="{CC293B1C-4CF8-4FF0-BBC7-4942ED2D7F88}" destId="{8FEE133A-1A79-4187-9AFD-4F06B42A70BC}" srcOrd="0" destOrd="0" parTransId="{7D947A46-F0B2-4D95-921D-7768A2A81535}" sibTransId="{A16446F1-3DF9-49B1-92C9-2E546FABE218}"/>
+    <dgm:cxn modelId="{9ACD57B9-40A8-4D83-8F17-C0C9FD7A26B5}" type="presOf" srcId="{1981BF8C-ABB4-462F-BD54-45D3229B3478}" destId="{FFCC9154-8E22-496A-ADF8-EA81D4AB5D77}" srcOrd="1" destOrd="0" presId="urn:microsoft.com/office/officeart/2005/8/layout/cycle4"/>
+    <dgm:cxn modelId="{9E1359C4-3028-4094-9E24-9652C5C56552}" type="presOf" srcId="{8FEE133A-1A79-4187-9AFD-4F06B42A70BC}" destId="{E72BDFA6-376E-4614-9D7C-A68241E884D9}" srcOrd="0" destOrd="0" presId="urn:microsoft.com/office/officeart/2005/8/layout/cycle4"/>
+    <dgm:cxn modelId="{10E792CA-6A54-4E59-81A9-D2596CD479D3}" type="presOf" srcId="{7FF71154-70C1-47DE-91E2-5DB90307E807}" destId="{60120B91-D76F-4101-857D-B9B656863593}" srcOrd="1" destOrd="1" presId="urn:microsoft.com/office/officeart/2005/8/layout/cycle4"/>
     <dgm:cxn modelId="{5F7AD9D5-E7E6-4F46-A4C5-3A0CE6F62C8E}" srcId="{8FEE133A-1A79-4187-9AFD-4F06B42A70BC}" destId="{35F1F2D2-FC47-4990-98DB-731AFE036343}" srcOrd="0" destOrd="0" parTransId="{D8C3661F-62F4-45E8-BB01-35BAAF924AEB}" sibTransId="{4EFE689A-014D-4F95-82DA-3254DF013F6C}"/>
-    <dgm:cxn modelId="{08978BA1-AE5A-4DFF-A0C3-92D4A0078A98}" srcId="{0916D3E2-7950-4B1E-A80A-B1A0DFE4D7BE}" destId="{9B35DA45-8824-4EE3-89F0-3F4E07F980E3}" srcOrd="0" destOrd="0" parTransId="{F26E0BCB-616E-4F5C-9212-B89461307743}" sibTransId="{6FFF208B-A136-4388-9736-DE2BA4AFD5AF}"/>
-    <dgm:cxn modelId="{8117BD28-990A-4794-8E5A-2D49697F13CF}" srcId="{0916D3E2-7950-4B1E-A80A-B1A0DFE4D7BE}" destId="{7FF71154-70C1-47DE-91E2-5DB90307E807}" srcOrd="1" destOrd="0" parTransId="{1B9722FC-C7C2-486D-BC7E-72CE34B24ADB}" sibTransId="{96E0472B-19D5-49CC-8E2D-2FF1A8F57871}"/>
-    <dgm:cxn modelId="{5E45B507-1330-428C-A195-37581AAE5A63}" srcId="{8FEE133A-1A79-4187-9AFD-4F06B42A70BC}" destId="{21C7A246-DDB5-40DD-9118-CC4963BF878A}" srcOrd="1" destOrd="0" parTransId="{CD9E23AD-A863-49AB-83BE-431D89C28AF8}" sibTransId="{9EFEBC15-1E66-4CAC-95AE-73B08C514600}"/>
-    <dgm:cxn modelId="{930F1B63-AA36-4E17-A5FE-F2AB0A6DC221}" type="presOf" srcId="{1981BF8C-ABB4-462F-BD54-45D3229B3478}" destId="{05478942-E273-4856-8553-F0FD8F015AA2}" srcOrd="0" destOrd="0" presId="urn:microsoft.com/office/officeart/2005/8/layout/cycle4"/>
-    <dgm:cxn modelId="{061DA901-6AB9-43FE-A11B-A7F3BBF2B2DF}" type="presOf" srcId="{49454F30-2B75-445A-845F-7473D893477D}" destId="{53088BBF-CDFB-43AD-88FA-A16B4FDD4AEA}" srcOrd="1" destOrd="0" presId="urn:microsoft.com/office/officeart/2005/8/layout/cycle4"/>
-    <dgm:cxn modelId="{F3DC86B6-474F-4BE6-A324-3FE9F9B8844A}" srcId="{CC293B1C-4CF8-4FF0-BBC7-4942ED2D7F88}" destId="{8FEE133A-1A79-4187-9AFD-4F06B42A70BC}" srcOrd="0" destOrd="0" parTransId="{7D947A46-F0B2-4D95-921D-7768A2A81535}" sibTransId="{A16446F1-3DF9-49B1-92C9-2E546FABE218}"/>
-    <dgm:cxn modelId="{9E1359C4-3028-4094-9E24-9652C5C56552}" type="presOf" srcId="{8FEE133A-1A79-4187-9AFD-4F06B42A70BC}" destId="{E72BDFA6-376E-4614-9D7C-A68241E884D9}" srcOrd="0" destOrd="0" presId="urn:microsoft.com/office/officeart/2005/8/layout/cycle4"/>
-    <dgm:cxn modelId="{FED0961E-8858-4D34-97EC-EA6298A2D7A2}" type="presOf" srcId="{AE8D8FFF-9AF0-4B15-AF81-01A130F2BD02}" destId="{FFCC9154-8E22-496A-ADF8-EA81D4AB5D77}" srcOrd="1" destOrd="1" presId="urn:microsoft.com/office/officeart/2005/8/layout/cycle4"/>
-    <dgm:cxn modelId="{E05818A8-BE3A-4136-9B61-768FB33C0CED}" type="presOf" srcId="{9B35DA45-8824-4EE3-89F0-3F4E07F980E3}" destId="{68AC0C8C-6683-4490-8F38-983C8CB47C3F}" srcOrd="0" destOrd="0" presId="urn:microsoft.com/office/officeart/2005/8/layout/cycle4"/>
-    <dgm:cxn modelId="{457E1C46-C110-4646-BA7F-FD7DB5F5C6EF}" type="presOf" srcId="{8BEA78FF-204F-4428-9092-659961DC247C}" destId="{C0852406-3DC0-4222-A1F8-184593FC4596}" srcOrd="0" destOrd="0" presId="urn:microsoft.com/office/officeart/2005/8/layout/cycle4"/>
     <dgm:cxn modelId="{97B8E8D6-6FCE-438F-84D7-14FD178A9EF3}" type="presOf" srcId="{850DD825-7D08-4BBC-94B9-7E217910F9A2}" destId="{53088BBF-CDFB-43AD-88FA-A16B4FDD4AEA}" srcOrd="1" destOrd="1" presId="urn:microsoft.com/office/officeart/2005/8/layout/cycle4"/>
-    <dgm:cxn modelId="{3CE6DC31-8913-4EA7-9612-8A8DD923E800}" type="presOf" srcId="{AE8D8FFF-9AF0-4B15-AF81-01A130F2BD02}" destId="{05478942-E273-4856-8553-F0FD8F015AA2}" srcOrd="0" destOrd="1" presId="urn:microsoft.com/office/officeart/2005/8/layout/cycle4"/>
-    <dgm:cxn modelId="{566F2C05-C614-467E-BF41-9EC9D316C5BC}" type="presOf" srcId="{21C7A246-DDB5-40DD-9118-CC4963BF878A}" destId="{BC6F0824-1351-49BA-BADB-F02B71A91728}" srcOrd="0" destOrd="1" presId="urn:microsoft.com/office/officeart/2005/8/layout/cycle4"/>
-    <dgm:cxn modelId="{1468CFFF-FBB7-45F2-916E-B340F25DE96A}" type="presOf" srcId="{62885FA7-E7FB-4933-9935-6A8AA90289B4}" destId="{8128ED5B-798D-45C7-BB11-A0996A8BF223}" srcOrd="1" destOrd="2" presId="urn:microsoft.com/office/officeart/2005/8/layout/cycle4"/>
-    <dgm:cxn modelId="{2F545677-CE33-4761-99ED-0F7D3431F1B7}" srcId="{DCE41F30-8A4B-4090-95D5-6CBD1CFA1EEC}" destId="{1981BF8C-ABB4-462F-BD54-45D3229B3478}" srcOrd="0" destOrd="0" parTransId="{420AF548-7339-428B-B062-F64CBEBA21A3}" sibTransId="{314ADFC2-8DB9-4517-A22A-D1F9C188BEE4}"/>
-    <dgm:cxn modelId="{FAF752F4-9430-4CD1-99E0-745C623B88AB}" type="presOf" srcId="{35F1F2D2-FC47-4990-98DB-731AFE036343}" destId="{BC6F0824-1351-49BA-BADB-F02B71A91728}" srcOrd="0" destOrd="0" presId="urn:microsoft.com/office/officeart/2005/8/layout/cycle4"/>
-    <dgm:cxn modelId="{58755D72-6A8A-4181-8EB5-41F1412B480B}" srcId="{8FEE133A-1A79-4187-9AFD-4F06B42A70BC}" destId="{62885FA7-E7FB-4933-9935-6A8AA90289B4}" srcOrd="2" destOrd="0" parTransId="{9870B421-E3D6-4556-A843-2F0EDB4F207B}" sibTransId="{EB0831C9-645B-4C0B-8FAE-4F47D0F4E0C7}"/>
-    <dgm:cxn modelId="{9ACD57B9-40A8-4D83-8F17-C0C9FD7A26B5}" type="presOf" srcId="{1981BF8C-ABB4-462F-BD54-45D3229B3478}" destId="{FFCC9154-8E22-496A-ADF8-EA81D4AB5D77}" srcOrd="1" destOrd="0" presId="urn:microsoft.com/office/officeart/2005/8/layout/cycle4"/>
-    <dgm:cxn modelId="{A9B36F8A-C74B-47A9-B539-806F6BB77A1A}" srcId="{CC293B1C-4CF8-4FF0-BBC7-4942ED2D7F88}" destId="{0916D3E2-7950-4B1E-A80A-B1A0DFE4D7BE}" srcOrd="2" destOrd="0" parTransId="{78ED7DF1-7D14-4D64-A8E3-CBD6C30B03FB}" sibTransId="{402F8436-663D-4DB8-A22F-0A8F501EB425}"/>
-    <dgm:cxn modelId="{8CB24317-C189-4E11-828E-2DB5B4E08A1D}" type="presOf" srcId="{7FF71154-70C1-47DE-91E2-5DB90307E807}" destId="{68AC0C8C-6683-4490-8F38-983C8CB47C3F}" srcOrd="0" destOrd="1" presId="urn:microsoft.com/office/officeart/2005/8/layout/cycle4"/>
-    <dgm:cxn modelId="{6168F4F0-48DB-4619-B96E-621CC5E0B43B}" type="presOf" srcId="{49454F30-2B75-445A-845F-7473D893477D}" destId="{431C4C2F-7F42-4D62-8EEF-918E7AD22EA0}" srcOrd="0" destOrd="0" presId="urn:microsoft.com/office/officeart/2005/8/layout/cycle4"/>
-    <dgm:cxn modelId="{FEABB5F9-7EAA-49A3-B760-2F60AD748862}" type="presOf" srcId="{62885FA7-E7FB-4933-9935-6A8AA90289B4}" destId="{BC6F0824-1351-49BA-BADB-F02B71A91728}" srcOrd="0" destOrd="2" presId="urn:microsoft.com/office/officeart/2005/8/layout/cycle4"/>
-    <dgm:cxn modelId="{6484E426-69AA-42DF-977B-A67A73203BD9}" srcId="{8BEA78FF-204F-4428-9092-659961DC247C}" destId="{49454F30-2B75-445A-845F-7473D893477D}" srcOrd="0" destOrd="0" parTransId="{347F498C-146E-4A53-8576-856FB00E3649}" sibTransId="{FAF60BDA-D885-4200-9740-D21B994BE362}"/>
-    <dgm:cxn modelId="{856CCC98-4D42-4940-9913-BB20C5217489}" srcId="{CC293B1C-4CF8-4FF0-BBC7-4942ED2D7F88}" destId="{DCE41F30-8A4B-4090-95D5-6CBD1CFA1EEC}" srcOrd="1" destOrd="0" parTransId="{480265E7-8542-40B5-95A1-EC04B55B8C68}" sibTransId="{005E5E72-5BE1-4DC4-AD1C-48C242521B93}"/>
-    <dgm:cxn modelId="{558EB1E9-7D3B-4CFB-91ED-0AE5FFB267A1}" type="presOf" srcId="{850DD825-7D08-4BBC-94B9-7E217910F9A2}" destId="{431C4C2F-7F42-4D62-8EEF-918E7AD22EA0}" srcOrd="0" destOrd="1" presId="urn:microsoft.com/office/officeart/2005/8/layout/cycle4"/>
     <dgm:cxn modelId="{A5D3F3DB-629E-46CD-AA76-C52C0C251A66}" srcId="{CC293B1C-4CF8-4FF0-BBC7-4942ED2D7F88}" destId="{8BEA78FF-204F-4428-9092-659961DC247C}" srcOrd="3" destOrd="0" parTransId="{41090789-956B-42C9-B909-44B2D62666F5}" sibTransId="{F0DB2DD3-51DB-4551-8E87-8440876EF808}"/>
     <dgm:cxn modelId="{E10831DF-BE5F-4779-B0A8-5C9716C52F17}" type="presOf" srcId="{21C7A246-DDB5-40DD-9118-CC4963BF878A}" destId="{8128ED5B-798D-45C7-BB11-A0996A8BF223}" srcOrd="1" destOrd="1" presId="urn:microsoft.com/office/officeart/2005/8/layout/cycle4"/>
-    <dgm:cxn modelId="{A2830668-E8D8-479D-BDD1-DDDBB0D25879}" type="presOf" srcId="{DCE41F30-8A4B-4090-95D5-6CBD1CFA1EEC}" destId="{A67A60E5-5291-49E4-B3E5-53A58B528285}" srcOrd="0" destOrd="0" presId="urn:microsoft.com/office/officeart/2005/8/layout/cycle4"/>
+    <dgm:cxn modelId="{558EB1E9-7D3B-4CFB-91ED-0AE5FFB267A1}" type="presOf" srcId="{850DD825-7D08-4BBC-94B9-7E217910F9A2}" destId="{431C4C2F-7F42-4D62-8EEF-918E7AD22EA0}" srcOrd="0" destOrd="1" presId="urn:microsoft.com/office/officeart/2005/8/layout/cycle4"/>
+    <dgm:cxn modelId="{6168F4F0-48DB-4619-B96E-621CC5E0B43B}" type="presOf" srcId="{49454F30-2B75-445A-845F-7473D893477D}" destId="{431C4C2F-7F42-4D62-8EEF-918E7AD22EA0}" srcOrd="0" destOrd="0" presId="urn:microsoft.com/office/officeart/2005/8/layout/cycle4"/>
+    <dgm:cxn modelId="{FAF752F4-9430-4CD1-99E0-745C623B88AB}" type="presOf" srcId="{35F1F2D2-FC47-4990-98DB-731AFE036343}" destId="{BC6F0824-1351-49BA-BADB-F02B71A91728}" srcOrd="0" destOrd="0" presId="urn:microsoft.com/office/officeart/2005/8/layout/cycle4"/>
+    <dgm:cxn modelId="{FEABB5F9-7EAA-49A3-B760-2F60AD748862}" type="presOf" srcId="{62885FA7-E7FB-4933-9935-6A8AA90289B4}" destId="{BC6F0824-1351-49BA-BADB-F02B71A91728}" srcOrd="0" destOrd="2" presId="urn:microsoft.com/office/officeart/2005/8/layout/cycle4"/>
+    <dgm:cxn modelId="{1468CFFF-FBB7-45F2-916E-B340F25DE96A}" type="presOf" srcId="{62885FA7-E7FB-4933-9935-6A8AA90289B4}" destId="{8128ED5B-798D-45C7-BB11-A0996A8BF223}" srcOrd="1" destOrd="2" presId="urn:microsoft.com/office/officeart/2005/8/layout/cycle4"/>
     <dgm:cxn modelId="{822B2CC5-3F61-47E6-A8CF-F020DE610282}" type="presParOf" srcId="{39401A14-B365-4553-9A3D-A401D3183747}" destId="{D7E58549-68A7-4F21-BF0D-84F7636DCD92}" srcOrd="0" destOrd="0" presId="urn:microsoft.com/office/officeart/2005/8/layout/cycle4"/>
     <dgm:cxn modelId="{36CA4649-6ADC-4F65-B2F0-0B78942CAAD0}" type="presParOf" srcId="{D7E58549-68A7-4F21-BF0D-84F7636DCD92}" destId="{5D458377-8CFE-43EB-BDF2-7CB3F0D876C1}" srcOrd="0" destOrd="0" presId="urn:microsoft.com/office/officeart/2005/8/layout/cycle4"/>
     <dgm:cxn modelId="{A88339D0-150F-4C00-AF89-E2C0BC06E74A}" type="presParOf" srcId="{5D458377-8CFE-43EB-BDF2-7CB3F0D876C1}" destId="{BC6F0824-1351-49BA-BADB-F02B71A91728}" srcOrd="0" destOrd="0" presId="urn:microsoft.com/office/officeart/2005/8/layout/cycle4"/>
@@ -1988,25 +1887,24 @@
             <a:spcAft>
               <a:spcPct val="15000"/>
             </a:spcAft>
-            <a:buChar char="••"/>
+            <a:buChar char="•"/>
           </a:pPr>
           <a:r>
-            <a:rPr lang="fr-FR" sz="1000" kern="1200" dirty="0" err="1" smtClean="0"/>
+            <a:rPr lang="fr-FR" sz="1000" kern="1200" dirty="0" err="1"/>
             <a:t>Risk</a:t>
           </a:r>
           <a:r>
-            <a:rPr lang="fr-FR" sz="1000" kern="1200" dirty="0" smtClean="0"/>
+            <a:rPr lang="fr-FR" sz="1000" kern="1200" dirty="0"/>
             <a:t> of high </a:t>
           </a:r>
           <a:r>
-            <a:rPr lang="fr-FR" sz="1000" kern="1200" dirty="0" err="1" smtClean="0"/>
+            <a:rPr lang="fr-FR" sz="1000" kern="1200" dirty="0" err="1"/>
             <a:t>demand</a:t>
           </a:r>
           <a:r>
-            <a:rPr lang="fr-FR" sz="1000" kern="1200" dirty="0" smtClean="0"/>
+            <a:rPr lang="fr-FR" sz="1000" kern="1200" dirty="0"/>
             <a:t> (server)</a:t>
           </a:r>
-          <a:endParaRPr lang="fr-FR" sz="1000" kern="1200" dirty="0"/>
         </a:p>
         <a:p>
           <a:pPr marL="57150" lvl="1" indent="-57150" algn="l" defTabSz="444500">
@@ -2019,21 +1917,20 @@
             <a:spcAft>
               <a:spcPct val="15000"/>
             </a:spcAft>
-            <a:buChar char="••"/>
+            <a:buChar char="•"/>
           </a:pPr>
           <a:r>
-            <a:rPr lang="fr-FR" sz="1000" kern="1200" dirty="0" smtClean="0"/>
+            <a:rPr lang="fr-FR" sz="1000" kern="1200" dirty="0"/>
             <a:t>Data protection (</a:t>
           </a:r>
           <a:r>
-            <a:rPr lang="fr-FR" sz="1000" kern="1200" dirty="0" err="1" smtClean="0"/>
+            <a:rPr lang="fr-FR" sz="1000" kern="1200" dirty="0" err="1"/>
             <a:t>temporary</a:t>
           </a:r>
           <a:r>
-            <a:rPr lang="fr-FR" sz="1000" kern="1200" dirty="0" smtClean="0"/>
+            <a:rPr lang="fr-FR" sz="1000" kern="1200" dirty="0"/>
             <a:t>)</a:t>
           </a:r>
-          <a:endParaRPr lang="fr-FR" sz="1000" kern="1200" dirty="0"/>
         </a:p>
       </dsp:txBody>
       <dsp:txXfrm>
@@ -2114,14 +2011,14 @@
             <a:spcAft>
               <a:spcPct val="15000"/>
             </a:spcAft>
-            <a:buChar char="••"/>
+            <a:buChar char="•"/>
           </a:pPr>
           <a:r>
-            <a:rPr lang="fr-FR" sz="1000" kern="1200" dirty="0" smtClean="0"/>
+            <a:rPr lang="fr-FR" sz="1000" kern="1200" dirty="0"/>
             <a:t>No </a:t>
           </a:r>
           <a:r>
-            <a:rPr lang="fr-FR" sz="1000" kern="1200" dirty="0" err="1" smtClean="0"/>
+            <a:rPr lang="fr-FR" sz="1000" kern="1200" dirty="0" err="1"/>
             <a:t>competition</a:t>
           </a:r>
           <a:endParaRPr lang="fr-FR" sz="1000" kern="1200" dirty="0"/>
@@ -2137,13 +2034,12 @@
             <a:spcAft>
               <a:spcPct val="15000"/>
             </a:spcAft>
-            <a:buChar char="••"/>
+            <a:buChar char="•"/>
           </a:pPr>
           <a:r>
-            <a:rPr lang="fr-FR" sz="1000" kern="1200" dirty="0" smtClean="0"/>
+            <a:rPr lang="fr-FR" sz="1000" kern="1200" dirty="0"/>
             <a:t>High utility</a:t>
           </a:r>
-          <a:endParaRPr lang="fr-FR" sz="1000" kern="1200" dirty="0"/>
         </a:p>
       </dsp:txBody>
       <dsp:txXfrm>
@@ -2224,13 +2120,12 @@
             <a:spcAft>
               <a:spcPct val="15000"/>
             </a:spcAft>
-            <a:buChar char="••"/>
+            <a:buChar char="•"/>
           </a:pPr>
           <a:r>
-            <a:rPr lang="fr-FR" sz="1000" kern="1200" dirty="0" smtClean="0"/>
+            <a:rPr lang="fr-FR" sz="1000" kern="1200" dirty="0"/>
             <a:t>Short deadlines</a:t>
           </a:r>
-          <a:endParaRPr lang="fr-FR" sz="1000" kern="1200" dirty="0"/>
         </a:p>
         <a:p>
           <a:pPr marL="57150" lvl="1" indent="-57150" algn="l" defTabSz="444500">
@@ -2243,22 +2138,22 @@
             <a:spcAft>
               <a:spcPct val="15000"/>
             </a:spcAft>
-            <a:buChar char="••"/>
+            <a:buChar char="•"/>
           </a:pPr>
           <a:r>
-            <a:rPr lang="fr-FR" sz="1000" kern="1200" dirty="0" smtClean="0"/>
+            <a:rPr lang="fr-FR" sz="1000" kern="1200" dirty="0"/>
             <a:t>Not </a:t>
           </a:r>
           <a:r>
-            <a:rPr lang="fr-FR" sz="1000" kern="1200" dirty="0" err="1" smtClean="0"/>
+            <a:rPr lang="fr-FR" sz="1000" kern="1200" dirty="0" err="1"/>
             <a:t>well</a:t>
           </a:r>
           <a:r>
-            <a:rPr lang="fr-FR" sz="1000" kern="1200" dirty="0" smtClean="0"/>
+            <a:rPr lang="fr-FR" sz="1000" kern="1200" dirty="0"/>
             <a:t> </a:t>
           </a:r>
           <a:r>
-            <a:rPr lang="fr-FR" sz="1000" kern="1200" dirty="0" err="1" smtClean="0"/>
+            <a:rPr lang="fr-FR" sz="1000" kern="1200" dirty="0" err="1"/>
             <a:t>documented</a:t>
           </a:r>
           <a:endParaRPr lang="fr-FR" sz="1000" kern="1200" dirty="0"/>
@@ -2342,21 +2237,20 @@
             <a:spcAft>
               <a:spcPct val="15000"/>
             </a:spcAft>
-            <a:buChar char="••"/>
+            <a:buChar char="•"/>
           </a:pPr>
           <a:r>
-            <a:rPr lang="fr-FR" sz="1000" kern="1200" dirty="0" smtClean="0"/>
+            <a:rPr lang="fr-FR" sz="1000" kern="1200" dirty="0"/>
             <a:t>Diverse </a:t>
           </a:r>
           <a:r>
-            <a:rPr lang="fr-FR" sz="1000" kern="1200" dirty="0" err="1" smtClean="0"/>
+            <a:rPr lang="fr-FR" sz="1000" kern="1200" dirty="0" err="1"/>
             <a:t>skill</a:t>
           </a:r>
           <a:r>
-            <a:rPr lang="fr-FR" sz="1000" kern="1200" dirty="0" smtClean="0"/>
+            <a:rPr lang="fr-FR" sz="1000" kern="1200" dirty="0"/>
             <a:t> set</a:t>
           </a:r>
-          <a:endParaRPr lang="fr-FR" sz="1000" kern="1200" dirty="0"/>
         </a:p>
         <a:p>
           <a:pPr marL="57150" lvl="1" indent="-57150" algn="l" defTabSz="444500">
@@ -2369,14 +2263,14 @@
             <a:spcAft>
               <a:spcPct val="15000"/>
             </a:spcAft>
-            <a:buChar char="••"/>
+            <a:buChar char="•"/>
           </a:pPr>
           <a:r>
-            <a:rPr lang="fr-FR" sz="1000" kern="1200" dirty="0" smtClean="0"/>
+            <a:rPr lang="fr-FR" sz="1000" kern="1200" dirty="0"/>
             <a:t>Access to expert </a:t>
           </a:r>
           <a:r>
-            <a:rPr lang="fr-FR" sz="1000" kern="1200" dirty="0" err="1" smtClean="0"/>
+            <a:rPr lang="fr-FR" sz="1000" kern="1200" dirty="0" err="1"/>
             <a:t>advise</a:t>
           </a:r>
           <a:endParaRPr lang="fr-FR" sz="1000" kern="1200" dirty="0"/>
@@ -2392,13 +2286,12 @@
             <a:spcAft>
               <a:spcPct val="15000"/>
             </a:spcAft>
-            <a:buChar char="••"/>
+            <a:buChar char="•"/>
           </a:pPr>
           <a:r>
-            <a:rPr lang="fr-FR" sz="1000" kern="1200" dirty="0" smtClean="0"/>
+            <a:rPr lang="fr-FR" sz="1000" kern="1200" dirty="0"/>
             <a:t>Open source packages</a:t>
           </a:r>
-          <a:endParaRPr lang="fr-FR" sz="1000" kern="1200" dirty="0"/>
         </a:p>
       </dsp:txBody>
       <dsp:txXfrm>
@@ -2490,7 +2383,7 @@
         </a:bodyPr>
         <a:lstStyle/>
         <a:p>
-          <a:pPr lvl="0" algn="ctr" defTabSz="1778000">
+          <a:pPr marL="0" lvl="0" indent="0" algn="ctr" defTabSz="1778000">
             <a:lnSpc>
               <a:spcPct val="90000"/>
             </a:lnSpc>
@@ -2500,12 +2393,12 @@
             <a:spcAft>
               <a:spcPct val="35000"/>
             </a:spcAft>
+            <a:buNone/>
           </a:pPr>
           <a:r>
-            <a:rPr lang="fr-FR" sz="4000" kern="1200" dirty="0" smtClean="0"/>
+            <a:rPr lang="fr-FR" sz="4000" kern="1200" dirty="0"/>
             <a:t>S</a:t>
           </a:r>
-          <a:endParaRPr lang="fr-FR" sz="4000" kern="1200" dirty="0"/>
         </a:p>
       </dsp:txBody>
       <dsp:txXfrm>
@@ -2597,7 +2490,7 @@
         </a:bodyPr>
         <a:lstStyle/>
         <a:p>
-          <a:pPr lvl="0" algn="ctr" defTabSz="1778000">
+          <a:pPr marL="0" lvl="0" indent="0" algn="ctr" defTabSz="1778000">
             <a:lnSpc>
               <a:spcPct val="90000"/>
             </a:lnSpc>
@@ -2607,12 +2500,12 @@
             <a:spcAft>
               <a:spcPct val="35000"/>
             </a:spcAft>
+            <a:buNone/>
           </a:pPr>
           <a:r>
-            <a:rPr lang="fr-FR" sz="4000" kern="1200" dirty="0" smtClean="0"/>
+            <a:rPr lang="fr-FR" sz="4000" kern="1200" dirty="0"/>
             <a:t>W</a:t>
           </a:r>
-          <a:endParaRPr lang="fr-FR" sz="4000" kern="1200" dirty="0"/>
         </a:p>
       </dsp:txBody>
       <dsp:txXfrm rot="-5400000">
@@ -2704,7 +2597,7 @@
         </a:bodyPr>
         <a:lstStyle/>
         <a:p>
-          <a:pPr lvl="0" algn="ctr" defTabSz="1778000">
+          <a:pPr marL="0" lvl="0" indent="0" algn="ctr" defTabSz="1778000">
             <a:lnSpc>
               <a:spcPct val="90000"/>
             </a:lnSpc>
@@ -2714,12 +2607,12 @@
             <a:spcAft>
               <a:spcPct val="35000"/>
             </a:spcAft>
+            <a:buNone/>
           </a:pPr>
           <a:r>
-            <a:rPr lang="fr-FR" sz="4000" kern="1200" dirty="0" smtClean="0"/>
+            <a:rPr lang="fr-FR" sz="4000" kern="1200" dirty="0"/>
             <a:t>T</a:t>
           </a:r>
-          <a:endParaRPr lang="fr-FR" sz="4000" kern="1200" dirty="0"/>
         </a:p>
       </dsp:txBody>
       <dsp:txXfrm rot="10800000">
@@ -2811,7 +2704,7 @@
         </a:bodyPr>
         <a:lstStyle/>
         <a:p>
-          <a:pPr lvl="0" algn="ctr" defTabSz="1778000">
+          <a:pPr marL="0" lvl="0" indent="0" algn="ctr" defTabSz="1778000">
             <a:lnSpc>
               <a:spcPct val="90000"/>
             </a:lnSpc>
@@ -2821,12 +2714,12 @@
             <a:spcAft>
               <a:spcPct val="35000"/>
             </a:spcAft>
+            <a:buNone/>
           </a:pPr>
           <a:r>
-            <a:rPr lang="fr-FR" sz="4000" kern="1200" dirty="0" smtClean="0"/>
+            <a:rPr lang="fr-FR" sz="4000" kern="1200" dirty="0"/>
             <a:t>O</a:t>
           </a:r>
-          <a:endParaRPr lang="fr-FR" sz="4000" kern="1200" dirty="0"/>
         </a:p>
       </dsp:txBody>
       <dsp:txXfrm rot="5400000">
@@ -4940,7 +4833,7 @@
           <a:p>
             <a:fld id="{38717F5D-9B99-41E9-AAF0-B73531F5A10E}" type="slidenum">
               <a:rPr lang="fr-FR" smtClean="0"/>
-              <a:t>‹#›</a:t>
+              <a:t>‹N°›</a:t>
             </a:fld>
             <a:endParaRPr lang="fr-FR"/>
           </a:p>
@@ -5198,7 +5091,7 @@
           <a:p>
             <a:fld id="{049843D5-FBCC-450E-8A81-920AD1F49A83}" type="slidenum">
               <a:rPr lang="fr-FR" smtClean="0"/>
-              <a:t>‹#›</a:t>
+              <a:t>‹N°›</a:t>
             </a:fld>
             <a:endParaRPr lang="fr-FR"/>
           </a:p>
@@ -6006,7 +5899,7 @@
             <a:fld id="{813506F1-DB5F-4FC9-88BA-B486F30FE4BF}" type="slidenum">
               <a:rPr lang="fr-FR" smtClean="0"/>
               <a:pPr/>
-              <a:t>‹#›</a:t>
+              <a:t>‹N°›</a:t>
             </a:fld>
             <a:endParaRPr lang="fr-FR" dirty="0"/>
           </a:p>
@@ -6651,13 +6544,6 @@
   <p:clrMapOvr>
     <a:masterClrMapping/>
   </p:clrMapOvr>
-  <p:timing>
-    <p:tnLst>
-      <p:par>
-        <p:cTn id="1" dur="indefinite" restart="never" nodeType="tmRoot"/>
-      </p:par>
-    </p:tnLst>
-  </p:timing>
 </p:sld>
 </file>
 
@@ -6949,11 +6835,11 @@
               <a:t> </a:t>
             </a:r>
             <a:r>
-              <a:rPr lang="fr-FR" sz="2000" dirty="0" err="1" smtClean="0"/>
+              <a:rPr lang="fr-FR" sz="2000" dirty="0" err="1"/>
               <a:t>currently</a:t>
             </a:r>
             <a:r>
-              <a:rPr lang="fr-FR" sz="2000" dirty="0" smtClean="0"/>
+              <a:rPr lang="fr-FR" sz="2000" dirty="0"/>
               <a:t> </a:t>
             </a:r>
             <a:r>
@@ -7009,16 +6895,12 @@
               <a:t> : </a:t>
             </a:r>
             <a:r>
-              <a:rPr lang="fr-FR" sz="2000" dirty="0" err="1" smtClean="0"/>
+              <a:rPr lang="fr-FR" sz="2000" dirty="0" err="1"/>
               <a:t>Glycolysis</a:t>
             </a:r>
             <a:r>
-              <a:rPr lang="fr-FR" sz="2000" dirty="0" smtClean="0"/>
-              <a:t> + Krebs </a:t>
-            </a:r>
-            <a:r>
               <a:rPr lang="fr-FR" sz="2000" dirty="0"/>
-              <a:t>cycle</a:t>
+              <a:t> + Krebs cycle</a:t>
             </a:r>
           </a:p>
         </p:txBody>
@@ -7765,15 +7647,7 @@
             </a:r>
             <a:r>
               <a:rPr lang="fr-FR" sz="2000" dirty="0"/>
-              <a:t> </a:t>
-            </a:r>
-            <a:r>
-              <a:rPr lang="fr-FR" sz="2000" dirty="0" smtClean="0"/>
-              <a:t>a </a:t>
-            </a:r>
-            <a:r>
-              <a:rPr lang="fr-FR" sz="2000" dirty="0"/>
-              <a:t>user </a:t>
+              <a:t> a user </a:t>
             </a:r>
             <a:r>
               <a:rPr lang="fr-FR" sz="2000" dirty="0" err="1"/>
@@ -7798,11 +7672,11 @@
           <a:p>
             <a:pPr algn="just"/>
             <a:r>
-              <a:rPr lang="fr-FR" sz="2000" dirty="0" err="1" smtClean="0"/>
+              <a:rPr lang="fr-FR" sz="2000" dirty="0" err="1"/>
               <a:t>Results</a:t>
             </a:r>
             <a:r>
-              <a:rPr lang="fr-FR" sz="2000" dirty="0" smtClean="0"/>
+              <a:rPr lang="fr-FR" sz="2000" dirty="0"/>
               <a:t> are </a:t>
             </a:r>
             <a:r>
@@ -7837,11 +7711,11 @@
           <a:p>
             <a:pPr algn="just"/>
             <a:r>
-              <a:rPr lang="fr-FR" sz="2000" dirty="0" smtClean="0"/>
+              <a:rPr lang="fr-FR" sz="2000" dirty="0"/>
               <a:t>Identification of non-canonical </a:t>
             </a:r>
             <a:r>
-              <a:rPr lang="fr-FR" sz="2000" dirty="0" err="1" smtClean="0"/>
+              <a:rPr lang="fr-FR" sz="2000" dirty="0" err="1"/>
               <a:t>genes</a:t>
             </a:r>
             <a:endParaRPr lang="fr-FR" sz="2000" dirty="0"/>
@@ -7853,15 +7727,15 @@
           <a:p>
             <a:pPr algn="just"/>
             <a:r>
-              <a:rPr lang="fr-FR" sz="2000" dirty="0" err="1" smtClean="0"/>
+              <a:rPr lang="fr-FR" sz="2000" dirty="0" err="1"/>
               <a:t>Interpretation</a:t>
             </a:r>
             <a:r>
-              <a:rPr lang="fr-FR" sz="2000" dirty="0" smtClean="0"/>
+              <a:rPr lang="fr-FR" sz="2000" dirty="0"/>
               <a:t> of </a:t>
             </a:r>
             <a:r>
-              <a:rPr lang="fr-FR" sz="2000" dirty="0" err="1" smtClean="0"/>
+              <a:rPr lang="fr-FR" sz="2000" dirty="0" err="1"/>
               <a:t>results</a:t>
             </a:r>
             <a:endParaRPr lang="fr-FR" sz="2000" dirty="0"/>
@@ -7873,20 +7747,16 @@
           <a:p>
             <a:pPr algn="just"/>
             <a:r>
-              <a:rPr lang="fr-FR" sz="2000" dirty="0" smtClean="0"/>
+              <a:rPr lang="fr-FR" sz="2000" dirty="0"/>
               <a:t>Host the </a:t>
             </a:r>
             <a:r>
-              <a:rPr lang="fr-FR" sz="2000" dirty="0" err="1" smtClean="0"/>
+              <a:rPr lang="fr-FR" sz="2000" dirty="0" err="1"/>
               <a:t>tool</a:t>
             </a:r>
             <a:r>
-              <a:rPr lang="fr-FR" sz="2000" dirty="0" smtClean="0"/>
-              <a:t> on </a:t>
-            </a:r>
-            <a:r>
               <a:rPr lang="fr-FR" sz="2000" dirty="0"/>
-              <a:t>the </a:t>
+              <a:t> on the </a:t>
             </a:r>
             <a:r>
               <a:rPr lang="fr-FR" sz="2000" dirty="0" err="1"/>
@@ -7909,29 +7779,29 @@
               <a:t>Cellomet</a:t>
             </a:r>
             <a:r>
-              <a:rPr lang="fr-FR" sz="2000" dirty="0" smtClean="0"/>
+              <a:rPr lang="fr-FR" sz="2000" dirty="0"/>
               <a:t>) </a:t>
             </a:r>
             <a:r>
-              <a:rPr lang="fr-FR" sz="2000" dirty="0" smtClean="0">
+              <a:rPr lang="fr-FR" sz="2000" dirty="0">
                 <a:sym typeface="Wingdings" panose="05000000000000000000" pitchFamily="2" charset="2"/>
               </a:rPr>
               <a:t> </a:t>
             </a:r>
             <a:r>
-              <a:rPr lang="fr-FR" sz="2000" dirty="0" err="1" smtClean="0">
+              <a:rPr lang="fr-FR" sz="2000" dirty="0" err="1">
                 <a:sym typeface="Wingdings" panose="05000000000000000000" pitchFamily="2" charset="2"/>
               </a:rPr>
               <a:t>Download</a:t>
             </a:r>
             <a:r>
-              <a:rPr lang="fr-FR" sz="2000" dirty="0" smtClean="0">
+              <a:rPr lang="fr-FR" sz="2000" dirty="0">
                 <a:sym typeface="Wingdings" panose="05000000000000000000" pitchFamily="2" charset="2"/>
               </a:rPr>
               <a:t> and data </a:t>
             </a:r>
             <a:r>
-              <a:rPr lang="fr-FR" sz="2000" dirty="0" err="1" smtClean="0">
+              <a:rPr lang="fr-FR" sz="2000" dirty="0" err="1">
                 <a:sym typeface="Wingdings" panose="05000000000000000000" pitchFamily="2" charset="2"/>
               </a:rPr>
               <a:t>retrieval</a:t>
@@ -8265,24 +8135,20 @@
               <a:buNone/>
             </a:pPr>
             <a:r>
-              <a:rPr lang="fr-FR" sz="2400" dirty="0" err="1" smtClean="0"/>
+              <a:rPr lang="fr-FR" sz="2400" dirty="0" err="1"/>
               <a:t>Programming</a:t>
             </a:r>
             <a:r>
-              <a:rPr lang="fr-FR" sz="2400" dirty="0" smtClean="0"/>
+              <a:rPr lang="fr-FR" sz="2400" dirty="0"/>
               <a:t> </a:t>
             </a:r>
             <a:r>
-              <a:rPr lang="fr-FR" sz="2400" dirty="0" err="1" smtClean="0"/>
+              <a:rPr lang="fr-FR" sz="2400" dirty="0" err="1"/>
               <a:t>language</a:t>
             </a:r>
             <a:r>
-              <a:rPr lang="fr-FR" sz="2400" dirty="0" smtClean="0"/>
-              <a:t> </a:t>
-            </a:r>
-            <a:r>
               <a:rPr lang="fr-FR" sz="2400" dirty="0"/>
-              <a:t>for </a:t>
+              <a:t> for </a:t>
             </a:r>
             <a:r>
               <a:rPr lang="fr-FR" sz="2400" dirty="0" err="1"/>
@@ -8290,13 +8156,8 @@
             </a:r>
             <a:r>
               <a:rPr lang="fr-FR" sz="2400" dirty="0"/>
-              <a:t> </a:t>
-            </a:r>
-            <a:r>
-              <a:rPr lang="fr-FR" sz="2400" dirty="0" smtClean="0"/>
-              <a:t>analyses</a:t>
-            </a:r>
-            <a:endParaRPr lang="fr-FR" sz="2400" dirty="0"/>
+              <a:t> analyses</a:t>
+            </a:r>
           </a:p>
           <a:p>
             <a:pPr marL="0" indent="0" algn="just">
@@ -8313,11 +8174,7 @@
             </a:pPr>
             <a:r>
               <a:rPr lang="fr-FR" sz="2000" dirty="0"/>
-              <a:t>	- </a:t>
-            </a:r>
-            <a:r>
-              <a:rPr lang="fr-FR" sz="2000" dirty="0" smtClean="0"/>
-              <a:t>DESeq2</a:t>
+              <a:t>	- DESeq2</a:t>
             </a:r>
           </a:p>
           <a:p>
@@ -8326,17 +8183,13 @@
             </a:pPr>
             <a:r>
               <a:rPr lang="fr-FR" sz="2000" dirty="0"/>
-              <a:t>	</a:t>
-            </a:r>
-            <a:r>
-              <a:rPr lang="fr-FR" sz="2000" dirty="0" smtClean="0"/>
-              <a:t>- </a:t>
-            </a:r>
-            <a:r>
-              <a:rPr lang="fr-FR" sz="2000" dirty="0" err="1" smtClean="0"/>
+              <a:t>	- </a:t>
+            </a:r>
+            <a:r>
+              <a:rPr lang="fr-FR" sz="2000" dirty="0" err="1"/>
               <a:t>Rshiny</a:t>
             </a:r>
-            <a:endParaRPr lang="fr-FR" sz="2000" dirty="0" smtClean="0"/>
+            <a:endParaRPr lang="fr-FR" sz="2000" dirty="0"/>
           </a:p>
         </p:txBody>
       </p:sp>
@@ -11402,7 +11255,7 @@
           <a:p>
             <a:pPr algn="r"/>
             <a:r>
-              <a:rPr lang="fr-FR" sz="1100" b="1" dirty="0" err="1" smtClean="0">
+              <a:rPr lang="fr-FR" sz="1100" b="1" dirty="0" err="1">
                 <a:solidFill>
                   <a:schemeClr val="dk1"/>
                 </a:solidFill>
@@ -11411,7 +11264,7 @@
               <a:t>Understand</a:t>
             </a:r>
             <a:r>
-              <a:rPr lang="fr-FR" sz="1100" b="1" dirty="0" smtClean="0">
+              <a:rPr lang="fr-FR" sz="1100" b="1" dirty="0">
                 <a:solidFill>
                   <a:schemeClr val="dk1"/>
                 </a:solidFill>
@@ -11419,12 +11272,6 @@
               </a:rPr>
               <a:t> DESeq2</a:t>
             </a:r>
-            <a:endParaRPr lang="fr-FR" sz="1100" b="1" dirty="0">
-              <a:solidFill>
-                <a:schemeClr val="dk1"/>
-              </a:solidFill>
-              <a:latin typeface="Calibri" panose="020F0502020204030204" pitchFamily="34" charset="0"/>
-            </a:endParaRPr>
           </a:p>
         </p:txBody>
       </p:sp>
@@ -11663,7 +11510,7 @@
           <a:p>
             <a:pPr algn="ctr"/>
             <a:r>
-              <a:rPr lang="fr-FR" sz="1100" b="1" spc="-6" dirty="0" smtClean="0">
+              <a:rPr lang="fr-FR" sz="1100" b="1" spc="-6" dirty="0">
                 <a:solidFill>
                   <a:schemeClr val="dk1"/>
                 </a:solidFill>
@@ -11671,12 +11518,6 @@
               </a:rPr>
               <a:t>Créer l'interface web</a:t>
             </a:r>
-            <a:endParaRPr lang="fr-FR" sz="1100" b="1" spc="-6" dirty="0">
-              <a:solidFill>
-                <a:schemeClr val="dk1"/>
-              </a:solidFill>
-              <a:latin typeface="Calibri" panose="020F0502020204030204" pitchFamily="34" charset="0"/>
-            </a:endParaRPr>
           </a:p>
         </p:txBody>
       </p:sp>
@@ -11832,7 +11673,7 @@
           <a:p>
             <a:pPr algn="r"/>
             <a:r>
-              <a:rPr lang="fr-FR" sz="1100" b="1" spc="-6" dirty="0" smtClean="0">
+              <a:rPr lang="fr-FR" sz="1100" b="1" spc="-6" dirty="0">
                 <a:solidFill>
                   <a:schemeClr val="dk1"/>
                 </a:solidFill>
@@ -11841,7 +11682,7 @@
               <a:t>Write </a:t>
             </a:r>
             <a:r>
-              <a:rPr lang="fr-FR" sz="1100" b="1" spc="-6" dirty="0" err="1" smtClean="0">
+              <a:rPr lang="fr-FR" sz="1100" b="1" spc="-6" dirty="0" err="1">
                 <a:solidFill>
                   <a:schemeClr val="dk1"/>
                 </a:solidFill>
@@ -11850,7 +11691,7 @@
               <a:t>functionnal</a:t>
             </a:r>
             <a:r>
-              <a:rPr lang="fr-FR" sz="1100" b="1" spc="-6" dirty="0" smtClean="0">
+              <a:rPr lang="fr-FR" sz="1100" b="1" spc="-6" dirty="0">
                 <a:solidFill>
                   <a:schemeClr val="dk1"/>
                 </a:solidFill>
@@ -11858,12 +11699,6 @@
               </a:rPr>
               <a:t> scripts</a:t>
             </a:r>
-            <a:endParaRPr lang="fr-FR" sz="1100" b="1" spc="-6" dirty="0">
-              <a:solidFill>
-                <a:schemeClr val="dk1"/>
-              </a:solidFill>
-              <a:latin typeface="Calibri" panose="020F0502020204030204" pitchFamily="34" charset="0"/>
-            </a:endParaRPr>
           </a:p>
         </p:txBody>
       </p:sp>
@@ -12095,7 +11930,7 @@
           <a:p>
             <a:pPr algn="r"/>
             <a:r>
-              <a:rPr lang="fr-FR" sz="1100" b="1" spc="-4" dirty="0" err="1" smtClean="0">
+              <a:rPr lang="fr-FR" sz="1100" b="1" spc="-4" dirty="0" err="1">
                 <a:solidFill>
                   <a:schemeClr val="dk1"/>
                 </a:solidFill>
@@ -12104,7 +11939,7 @@
               <a:t>Gather</a:t>
             </a:r>
             <a:r>
-              <a:rPr lang="fr-FR" sz="1100" b="1" spc="-4" dirty="0" smtClean="0">
+              <a:rPr lang="fr-FR" sz="1100" b="1" spc="-4" dirty="0">
                 <a:solidFill>
                   <a:schemeClr val="dk1"/>
                 </a:solidFill>
@@ -12112,12 +11947,6 @@
               </a:rPr>
               <a:t> all scripts</a:t>
             </a:r>
-            <a:endParaRPr lang="fr-FR" sz="1100" b="1" spc="-4" dirty="0">
-              <a:solidFill>
-                <a:schemeClr val="dk1"/>
-              </a:solidFill>
-              <a:latin typeface="Calibri" panose="020F0502020204030204" pitchFamily="34" charset="0"/>
-            </a:endParaRPr>
           </a:p>
         </p:txBody>
       </p:sp>
@@ -12689,7 +12518,7 @@
           <a:p>
             <a:pPr algn="r"/>
             <a:r>
-              <a:rPr lang="fr-FR" sz="1100" b="1" spc="-4" dirty="0" smtClean="0">
+              <a:rPr lang="fr-FR" sz="1100" b="1" spc="-4" dirty="0">
                 <a:solidFill>
                   <a:schemeClr val="dk1"/>
                 </a:solidFill>
@@ -12698,7 +12527,7 @@
               <a:t>Tests  and </a:t>
             </a:r>
             <a:r>
-              <a:rPr lang="fr-FR" sz="1100" b="1" spc="-4" dirty="0" err="1" smtClean="0">
+              <a:rPr lang="fr-FR" sz="1100" b="1" spc="-4" dirty="0" err="1">
                 <a:solidFill>
                   <a:schemeClr val="dk1"/>
                 </a:solidFill>
@@ -12877,7 +12706,7 @@
           <a:p>
             <a:pPr algn="ctr"/>
             <a:r>
-              <a:rPr lang="fr-FR" sz="1100" b="1" spc="-2" dirty="0" err="1" smtClean="0">
+              <a:rPr lang="fr-FR" sz="1100" b="1" spc="-2" dirty="0" err="1">
                 <a:solidFill>
                   <a:schemeClr val="dk1"/>
                 </a:solidFill>
@@ -12886,7 +12715,7 @@
               <a:t>Add</a:t>
             </a:r>
             <a:r>
-              <a:rPr lang="fr-FR" sz="1100" b="1" spc="-2" dirty="0" smtClean="0">
+              <a:rPr lang="fr-FR" sz="1100" b="1" spc="-2" dirty="0">
                 <a:solidFill>
                   <a:schemeClr val="dk1"/>
                 </a:solidFill>
@@ -12895,7 +12724,7 @@
               <a:t> non-canonical </a:t>
             </a:r>
             <a:r>
-              <a:rPr lang="fr-FR" sz="1100" b="1" spc="-2" dirty="0" err="1" smtClean="0">
+              <a:rPr lang="fr-FR" sz="1100" b="1" spc="-2" dirty="0" err="1">
                 <a:solidFill>
                   <a:schemeClr val="dk1"/>
                 </a:solidFill>
@@ -13103,14 +12932,13 @@
           </a:lstStyle>
           <a:p>
             <a:r>
-              <a:rPr lang="fr-FR" dirty="0" err="1" smtClean="0"/>
+              <a:rPr lang="fr-FR" dirty="0" err="1"/>
               <a:t>Risk</a:t>
             </a:r>
             <a:r>
-              <a:rPr lang="fr-FR" dirty="0" smtClean="0"/>
+              <a:rPr lang="fr-FR" dirty="0"/>
               <a:t> Management</a:t>
             </a:r>
-            <a:endParaRPr lang="fr-FR" dirty="0"/>
           </a:p>
         </p:txBody>
       </p:sp>
@@ -13308,7 +13136,7 @@
         </p:spPr>
         <p:txBody>
           <a:bodyPr>
-            <a:normAutofit fontScale="92500" lnSpcReduction="20000"/>
+            <a:normAutofit fontScale="85000" lnSpcReduction="20000"/>
           </a:bodyPr>
           <a:lstStyle>
             <a:lvl1pPr marL="228600" indent="-228600" algn="l" defTabSz="914400" rtl="0" eaLnBrk="1" latinLnBrk="0" hangingPunct="1">
@@ -13493,15 +13321,15 @@
               <a:t> set up and </a:t>
             </a:r>
             <a:r>
-              <a:rPr lang="fr-FR" sz="2000" dirty="0" err="1" smtClean="0"/>
+              <a:rPr lang="fr-FR" sz="2000" dirty="0" err="1"/>
               <a:t>is</a:t>
             </a:r>
             <a:r>
-              <a:rPr lang="fr-FR" sz="2000" dirty="0" smtClean="0"/>
+              <a:rPr lang="fr-FR" sz="2000" dirty="0"/>
               <a:t> </a:t>
             </a:r>
             <a:r>
-              <a:rPr lang="fr-FR" sz="2000" dirty="0" err="1" smtClean="0"/>
+              <a:rPr lang="fr-FR" sz="2000" dirty="0" err="1"/>
               <a:t>functional</a:t>
             </a:r>
             <a:endParaRPr lang="fr-FR" sz="2000" dirty="0"/>
@@ -13529,22 +13357,21 @@
           <a:p>
             <a:pPr algn="just"/>
             <a:r>
-              <a:rPr lang="fr-FR" sz="2000" dirty="0" err="1" smtClean="0"/>
+              <a:rPr lang="fr-FR" sz="2000" dirty="0" err="1"/>
               <a:t>Started</a:t>
             </a:r>
             <a:r>
-              <a:rPr lang="fr-FR" sz="2000" dirty="0" smtClean="0"/>
+              <a:rPr lang="fr-FR" sz="2000" dirty="0"/>
               <a:t> </a:t>
             </a:r>
             <a:r>
-              <a:rPr lang="fr-FR" sz="2000" dirty="0" err="1" smtClean="0"/>
+              <a:rPr lang="fr-FR" sz="2000" dirty="0" err="1"/>
               <a:t>designing</a:t>
             </a:r>
             <a:r>
-              <a:rPr lang="fr-FR" sz="2000" dirty="0" smtClean="0"/>
+              <a:rPr lang="fr-FR" sz="2000" dirty="0"/>
               <a:t> web interface</a:t>
             </a:r>
-            <a:endParaRPr lang="fr-FR" sz="2000" dirty="0"/>
           </a:p>
           <a:p>
             <a:pPr algn="just"/>
@@ -13557,22 +13384,22 @@
               <a:t> 4 R scripts in one script and test </a:t>
             </a:r>
             <a:r>
-              <a:rPr lang="fr-FR" sz="2000" dirty="0" err="1" smtClean="0"/>
+              <a:rPr lang="fr-FR" sz="2000" dirty="0" err="1"/>
               <a:t>it</a:t>
             </a:r>
-            <a:endParaRPr lang="fr-FR" sz="2000" dirty="0" smtClean="0"/>
+            <a:endParaRPr lang="fr-FR" sz="2000" dirty="0"/>
           </a:p>
           <a:p>
             <a:pPr algn="just"/>
             <a:r>
-              <a:rPr lang="fr-FR" sz="2000" dirty="0" smtClean="0"/>
+              <a:rPr lang="fr-FR" sz="2000" dirty="0"/>
               <a:t>Local </a:t>
             </a:r>
             <a:r>
-              <a:rPr lang="fr-FR" sz="2000" dirty="0" err="1" smtClean="0"/>
+              <a:rPr lang="fr-FR" sz="2000" dirty="0" err="1"/>
               <a:t>database</a:t>
             </a:r>
-            <a:endParaRPr lang="fr-FR" sz="2000" dirty="0" smtClean="0"/>
+            <a:endParaRPr lang="fr-FR" sz="2000" dirty="0"/>
           </a:p>
           <a:p>
             <a:pPr algn="just"/>
@@ -13581,25 +13408,52 @@
               <a:t>Complete the </a:t>
             </a:r>
             <a:r>
-              <a:rPr lang="fr-FR" sz="2000" dirty="0" err="1" smtClean="0"/>
+              <a:rPr lang="fr-FR" sz="2000" dirty="0" err="1"/>
               <a:t>Rshiny</a:t>
             </a:r>
             <a:r>
-              <a:rPr lang="fr-FR" sz="2000" dirty="0" smtClean="0"/>
+              <a:rPr lang="fr-FR" sz="2000" dirty="0"/>
               <a:t> interface</a:t>
             </a:r>
           </a:p>
           <a:p>
             <a:pPr algn="just"/>
             <a:r>
-              <a:rPr lang="fr-FR" sz="2000" dirty="0" smtClean="0"/>
+              <a:rPr lang="fr-FR" sz="2000" dirty="0"/>
               <a:t>Strategic </a:t>
             </a:r>
             <a:r>
-              <a:rPr lang="fr-FR" sz="2000" dirty="0" err="1" smtClean="0"/>
+              <a:rPr lang="fr-FR" sz="2000" dirty="0" err="1"/>
               <a:t>reorientation</a:t>
             </a:r>
             <a:endParaRPr lang="fr-FR" sz="2000" dirty="0"/>
+          </a:p>
+          <a:p>
+            <a:pPr algn="just"/>
+            <a:r>
+              <a:rPr lang="fr-FR" sz="2000" dirty="0" err="1"/>
+              <a:t>Add</a:t>
+            </a:r>
+            <a:r>
+              <a:rPr lang="fr-FR" sz="2000" dirty="0"/>
+              <a:t> the </a:t>
+            </a:r>
+            <a:r>
+              <a:rPr lang="fr-FR" sz="2000" dirty="0" err="1"/>
+              <a:t>Database</a:t>
+            </a:r>
+            <a:r>
+              <a:rPr lang="fr-FR" sz="2000" dirty="0"/>
+              <a:t> on </a:t>
+            </a:r>
+            <a:r>
+              <a:rPr lang="fr-FR" sz="2000" dirty="0" err="1"/>
+              <a:t>client’s</a:t>
+            </a:r>
+            <a:r>
+              <a:rPr lang="fr-FR" sz="2000" dirty="0"/>
+              <a:t> server</a:t>
+            </a:r>
           </a:p>
           <a:p>
             <a:pPr algn="just"/>
@@ -13607,65 +13461,33 @@
           </a:p>
           <a:p>
             <a:pPr algn="just"/>
+            <a:endParaRPr lang="fr-FR" sz="2000" dirty="0"/>
+          </a:p>
+          <a:p>
+            <a:pPr algn="just"/>
             <a:r>
               <a:rPr lang="fr-FR" sz="2000" dirty="0"/>
-              <a:t>Complete the web </a:t>
-            </a:r>
-            <a:r>
-              <a:rPr lang="fr-FR" sz="2000" dirty="0" smtClean="0"/>
-              <a:t>interface</a:t>
+              <a:t>Complete the web interface</a:t>
             </a:r>
           </a:p>
           <a:p>
             <a:pPr algn="just"/>
             <a:r>
-              <a:rPr lang="fr-FR" sz="2000" dirty="0" err="1" smtClean="0"/>
-              <a:t>Add</a:t>
-            </a:r>
-            <a:r>
-              <a:rPr lang="fr-FR" sz="2000" dirty="0" smtClean="0"/>
-              <a:t> the </a:t>
-            </a:r>
-            <a:r>
-              <a:rPr lang="fr-FR" sz="2000" dirty="0" err="1" smtClean="0"/>
-              <a:t>Database</a:t>
-            </a:r>
-            <a:r>
-              <a:rPr lang="fr-FR" sz="2000" dirty="0" smtClean="0"/>
-              <a:t> on </a:t>
-            </a:r>
-            <a:r>
-              <a:rPr lang="fr-FR" sz="2000" dirty="0" err="1" smtClean="0"/>
-              <a:t>client’s</a:t>
-            </a:r>
-            <a:r>
-              <a:rPr lang="fr-FR" sz="2000" dirty="0" smtClean="0"/>
-              <a:t> </a:t>
-            </a:r>
-            <a:r>
-              <a:rPr lang="fr-FR" sz="2000" dirty="0" smtClean="0"/>
-              <a:t>server</a:t>
-            </a:r>
-          </a:p>
-          <a:p>
-            <a:pPr algn="just"/>
-            <a:r>
-              <a:rPr lang="fr-FR" sz="2000" dirty="0" err="1" smtClean="0"/>
+              <a:rPr lang="fr-FR" sz="2000" dirty="0" err="1"/>
               <a:t>Create</a:t>
             </a:r>
             <a:r>
-              <a:rPr lang="fr-FR" sz="2000" dirty="0" smtClean="0"/>
+              <a:rPr lang="fr-FR" sz="2000" dirty="0"/>
               <a:t> an </a:t>
             </a:r>
             <a:r>
-              <a:rPr lang="fr-FR" sz="2000" dirty="0" err="1" smtClean="0"/>
+              <a:rPr lang="fr-FR" sz="2000" dirty="0" err="1"/>
               <a:t>executable</a:t>
             </a:r>
             <a:r>
-              <a:rPr lang="fr-FR" sz="2000" dirty="0" smtClean="0"/>
+              <a:rPr lang="fr-FR" sz="2000" dirty="0"/>
               <a:t> file</a:t>
             </a:r>
-            <a:endParaRPr lang="fr-FR" sz="2000" dirty="0" smtClean="0"/>
           </a:p>
         </p:txBody>
       </p:sp>
@@ -13690,7 +13512,7 @@
         </p:blipFill>
         <p:spPr>
           <a:xfrm>
-            <a:off x="5360477" y="2810079"/>
+            <a:off x="5028800" y="2835479"/>
             <a:ext cx="304695" cy="293615"/>
           </a:xfrm>
           <a:prstGeom prst="rect">
@@ -13719,7 +13541,7 @@
         </p:blipFill>
         <p:spPr>
           <a:xfrm>
-            <a:off x="4774965" y="3141241"/>
+            <a:off x="4419410" y="3119578"/>
             <a:ext cx="304695" cy="293615"/>
           </a:xfrm>
           <a:prstGeom prst="rect">
@@ -13748,7 +13570,7 @@
         </p:blipFill>
         <p:spPr>
           <a:xfrm>
-            <a:off x="4724105" y="3489900"/>
+            <a:off x="4339929" y="3422504"/>
             <a:ext cx="304695" cy="293615"/>
           </a:xfrm>
           <a:prstGeom prst="rect">
@@ -13818,7 +13640,7 @@
         </p:blipFill>
         <p:spPr>
           <a:xfrm>
-            <a:off x="4345317" y="5454454"/>
+            <a:off x="4054981" y="5873616"/>
             <a:ext cx="299307" cy="310393"/>
           </a:xfrm>
           <a:prstGeom prst="rect">
@@ -13847,7 +13669,7 @@
         </p:blipFill>
         <p:spPr>
           <a:xfrm>
-            <a:off x="5741226" y="3799478"/>
+            <a:off x="5333495" y="3721085"/>
             <a:ext cx="304695" cy="293615"/>
           </a:xfrm>
           <a:prstGeom prst="rect">
@@ -13876,7 +13698,7 @@
         </p:blipFill>
         <p:spPr>
           <a:xfrm>
-            <a:off x="3055194" y="4140195"/>
+            <a:off x="2980394" y="4014700"/>
             <a:ext cx="304695" cy="293615"/>
           </a:xfrm>
           <a:prstGeom prst="rect">
@@ -13905,7 +13727,7 @@
         </p:blipFill>
         <p:spPr>
           <a:xfrm>
-            <a:off x="4561377" y="4474046"/>
+            <a:off x="4339929" y="4327238"/>
             <a:ext cx="304695" cy="293615"/>
           </a:xfrm>
           <a:prstGeom prst="rect">
@@ -13934,37 +13756,8 @@
         </p:blipFill>
         <p:spPr>
           <a:xfrm>
-            <a:off x="3798762" y="4811435"/>
+            <a:off x="3576571" y="4670220"/>
             <a:ext cx="304695" cy="293615"/>
-          </a:xfrm>
-          <a:prstGeom prst="rect">
-            <a:avLst/>
-          </a:prstGeom>
-        </p:spPr>
-      </p:pic>
-      <p:pic>
-        <p:nvPicPr>
-          <p:cNvPr id="17" name="Picture 19"/>
-          <p:cNvPicPr>
-            <a:picLocks noChangeAspect="1"/>
-          </p:cNvPicPr>
-          <p:nvPr/>
-        </p:nvPicPr>
-        <p:blipFill rotWithShape="1">
-          <a:blip r:embed="rId4" cstate="print">
-            <a:extLst>
-              <a:ext uri="{28A0092B-C50C-407E-A947-70E740481C1C}">
-                <a14:useLocalDpi xmlns:a14="http://schemas.microsoft.com/office/drawing/2010/main" val="0"/>
-              </a:ext>
-            </a:extLst>
-          </a:blip>
-          <a:srcRect l="19168" t="30789" r="68942" b="44551"/>
-          <a:stretch/>
-        </p:blipFill>
-        <p:spPr>
-          <a:xfrm>
-            <a:off x="5087813" y="5783966"/>
-            <a:ext cx="299307" cy="310393"/>
           </a:xfrm>
           <a:prstGeom prst="rect">
             <a:avLst/>
@@ -13992,8 +13785,43 @@
         </p:blipFill>
         <p:spPr>
           <a:xfrm>
-            <a:off x="4020843" y="6103487"/>
+            <a:off x="3881266" y="6180400"/>
             <a:ext cx="299307" cy="310393"/>
+          </a:xfrm>
+          <a:prstGeom prst="rect">
+            <a:avLst/>
+          </a:prstGeom>
+        </p:spPr>
+      </p:pic>
+      <p:pic>
+        <p:nvPicPr>
+          <p:cNvPr id="20" name="Picture 21">
+            <a:extLst>
+              <a:ext uri="{FF2B5EF4-FFF2-40B4-BE49-F238E27FC236}">
+                <a16:creationId xmlns:a16="http://schemas.microsoft.com/office/drawing/2014/main" id="{B5CFFB0B-64B3-4444-8884-869C3290F229}"/>
+              </a:ext>
+            </a:extLst>
+          </p:cNvPr>
+          <p:cNvPicPr>
+            <a:picLocks noChangeAspect="1"/>
+          </p:cNvPicPr>
+          <p:nvPr/>
+        </p:nvPicPr>
+        <p:blipFill rotWithShape="1">
+          <a:blip r:embed="rId2" cstate="print">
+            <a:extLst>
+              <a:ext uri="{28A0092B-C50C-407E-A947-70E740481C1C}">
+                <a14:useLocalDpi xmlns:a14="http://schemas.microsoft.com/office/drawing/2010/main" val="0"/>
+              </a:ext>
+            </a:extLst>
+          </a:blip>
+          <a:srcRect l="69156" t="31820" r="18734" b="44840"/>
+          <a:stretch/>
+        </p:blipFill>
+        <p:spPr>
+          <a:xfrm>
+            <a:off x="4724105" y="4963835"/>
+            <a:ext cx="304695" cy="293615"/>
           </a:xfrm>
           <a:prstGeom prst="rect">
             <a:avLst/>

</xml_diff>

<commit_message>
mise a jour diapos
</commit_message>
<xml_diff>
--- a/Slides/Diapos_Suivit_projet.pptx
+++ b/Slides/Diapos_Suivit_projet.pptx
@@ -4638,51 +4638,51 @@
     </dgm:pt>
   </dgm:ptLst>
   <dgm:cxnLst>
-    <dgm:cxn modelId="{428F15AF-99F9-482D-BD31-313434250C80}" type="presOf" srcId="{B8F4B4B5-48BB-4436-A4C8-0772D59377AC}" destId="{68AC0C8C-6683-4490-8F38-983C8CB47C3F}" srcOrd="0" destOrd="2" presId="urn:microsoft.com/office/officeart/2005/8/layout/cycle4"/>
-    <dgm:cxn modelId="{3E82771C-0B66-4E74-9190-DF73756B0079}" type="presOf" srcId="{9B35DA45-8824-4EE3-89F0-3F4E07F980E3}" destId="{68AC0C8C-6683-4490-8F38-983C8CB47C3F}" srcOrd="0" destOrd="0" presId="urn:microsoft.com/office/officeart/2005/8/layout/cycle4"/>
+    <dgm:cxn modelId="{2F545677-CE33-4761-99ED-0F7D3431F1B7}" srcId="{DCE41F30-8A4B-4090-95D5-6CBD1CFA1EEC}" destId="{1981BF8C-ABB4-462F-BD54-45D3229B3478}" srcOrd="0" destOrd="0" parTransId="{420AF548-7339-428B-B062-F64CBEBA21A3}" sibTransId="{314ADFC2-8DB9-4517-A22A-D1F9C188BEE4}"/>
+    <dgm:cxn modelId="{89D0B3FB-B9CD-4764-B589-7798A97071B4}" type="presOf" srcId="{62885FA7-E7FB-4933-9935-6A8AA90289B4}" destId="{8128ED5B-798D-45C7-BB11-A0996A8BF223}" srcOrd="1" destOrd="2" presId="urn:microsoft.com/office/officeart/2005/8/layout/cycle4"/>
+    <dgm:cxn modelId="{B7269B33-2027-41D2-877C-9C09FF6D1AFA}" type="presOf" srcId="{DCE41F30-8A4B-4090-95D5-6CBD1CFA1EEC}" destId="{A67A60E5-5291-49E4-B3E5-53A58B528285}" srcOrd="0" destOrd="0" presId="urn:microsoft.com/office/officeart/2005/8/layout/cycle4"/>
+    <dgm:cxn modelId="{E2754B57-2984-4FD2-B783-8552C8246FA1}" type="presOf" srcId="{CC293B1C-4CF8-4FF0-BBC7-4942ED2D7F88}" destId="{39401A14-B365-4553-9A3D-A401D3183747}" srcOrd="0" destOrd="0" presId="urn:microsoft.com/office/officeart/2005/8/layout/cycle4"/>
+    <dgm:cxn modelId="{C9309115-721C-48C4-9369-542B8A264ABE}" type="presOf" srcId="{6446DC96-6D1C-4742-A646-C454D61C5C9D}" destId="{05478942-E273-4856-8553-F0FD8F015AA2}" srcOrd="0" destOrd="2" presId="urn:microsoft.com/office/officeart/2005/8/layout/cycle4"/>
+    <dgm:cxn modelId="{6484E426-69AA-42DF-977B-A67A73203BD9}" srcId="{8BEA78FF-204F-4428-9092-659961DC247C}" destId="{49454F30-2B75-445A-845F-7473D893477D}" srcOrd="0" destOrd="0" parTransId="{347F498C-146E-4A53-8576-856FB00E3649}" sibTransId="{FAF60BDA-D885-4200-9740-D21B994BE362}"/>
+    <dgm:cxn modelId="{C3E8D53F-9F19-4D6D-8520-8C7F3D75E371}" type="presOf" srcId="{1981BF8C-ABB4-462F-BD54-45D3229B3478}" destId="{05478942-E273-4856-8553-F0FD8F015AA2}" srcOrd="0" destOrd="0" presId="urn:microsoft.com/office/officeart/2005/8/layout/cycle4"/>
+    <dgm:cxn modelId="{F3DC86B6-474F-4BE6-A324-3FE9F9B8844A}" srcId="{CC293B1C-4CF8-4FF0-BBC7-4942ED2D7F88}" destId="{8FEE133A-1A79-4187-9AFD-4F06B42A70BC}" srcOrd="0" destOrd="0" parTransId="{7D947A46-F0B2-4D95-921D-7768A2A81535}" sibTransId="{A16446F1-3DF9-49B1-92C9-2E546FABE218}"/>
     <dgm:cxn modelId="{903B2690-11E5-47AD-BCC6-61ACBE650952}" type="presOf" srcId="{7F397B27-ED42-4C0B-84EB-F42483A443DB}" destId="{60120B91-D76F-4101-857D-B9B656863593}" srcOrd="1" destOrd="1" presId="urn:microsoft.com/office/officeart/2005/8/layout/cycle4"/>
-    <dgm:cxn modelId="{08978BA1-AE5A-4DFF-A0C3-92D4A0078A98}" srcId="{0916D3E2-7950-4B1E-A80A-B1A0DFE4D7BE}" destId="{9B35DA45-8824-4EE3-89F0-3F4E07F980E3}" srcOrd="0" destOrd="0" parTransId="{F26E0BCB-616E-4F5C-9212-B89461307743}" sibTransId="{6FFF208B-A136-4388-9736-DE2BA4AFD5AF}"/>
-    <dgm:cxn modelId="{566BE653-B770-4199-A086-63C9C0FABF06}" type="presOf" srcId="{5A50A77D-7959-4302-B136-B1316B3CEC1D}" destId="{53088BBF-CDFB-43AD-88FA-A16B4FDD4AEA}" srcOrd="1" destOrd="2" presId="urn:microsoft.com/office/officeart/2005/8/layout/cycle4"/>
-    <dgm:cxn modelId="{B7269B33-2027-41D2-877C-9C09FF6D1AFA}" type="presOf" srcId="{DCE41F30-8A4B-4090-95D5-6CBD1CFA1EEC}" destId="{A67A60E5-5291-49E4-B3E5-53A58B528285}" srcOrd="0" destOrd="0" presId="urn:microsoft.com/office/officeart/2005/8/layout/cycle4"/>
-    <dgm:cxn modelId="{A5D3F3DB-629E-46CD-AA76-C52C0C251A66}" srcId="{CC293B1C-4CF8-4FF0-BBC7-4942ED2D7F88}" destId="{8BEA78FF-204F-4428-9092-659961DC247C}" srcOrd="3" destOrd="0" parTransId="{41090789-956B-42C9-B909-44B2D62666F5}" sibTransId="{F0DB2DD3-51DB-4551-8E87-8440876EF808}"/>
+    <dgm:cxn modelId="{27155828-56A7-4BF4-8458-F295A9014509}" type="presOf" srcId="{49454F30-2B75-445A-845F-7473D893477D}" destId="{53088BBF-CDFB-43AD-88FA-A16B4FDD4AEA}" srcOrd="1" destOrd="0" presId="urn:microsoft.com/office/officeart/2005/8/layout/cycle4"/>
+    <dgm:cxn modelId="{1055A9D0-9C78-4F22-9ACE-90E8B5CF69D8}" type="presOf" srcId="{62885FA7-E7FB-4933-9935-6A8AA90289B4}" destId="{BC6F0824-1351-49BA-BADB-F02B71A91728}" srcOrd="0" destOrd="2" presId="urn:microsoft.com/office/officeart/2005/8/layout/cycle4"/>
     <dgm:cxn modelId="{AB5765CF-0167-4FE2-BF9A-07ED0B2F26E9}" type="presOf" srcId="{0916D3E2-7950-4B1E-A80A-B1A0DFE4D7BE}" destId="{CF4FC7F6-A89C-4633-A10E-BFE92B369DCD}" srcOrd="0" destOrd="0" presId="urn:microsoft.com/office/officeart/2005/8/layout/cycle4"/>
-    <dgm:cxn modelId="{3B991839-62B0-437F-ABDE-F4C1C596D307}" type="presOf" srcId="{1981BF8C-ABB4-462F-BD54-45D3229B3478}" destId="{FFCC9154-8E22-496A-ADF8-EA81D4AB5D77}" srcOrd="1" destOrd="0" presId="urn:microsoft.com/office/officeart/2005/8/layout/cycle4"/>
-    <dgm:cxn modelId="{5E45B507-1330-428C-A195-37581AAE5A63}" srcId="{8FEE133A-1A79-4187-9AFD-4F06B42A70BC}" destId="{21C7A246-DDB5-40DD-9118-CC4963BF878A}" srcOrd="1" destOrd="0" parTransId="{CD9E23AD-A863-49AB-83BE-431D89C28AF8}" sibTransId="{9EFEBC15-1E66-4CAC-95AE-73B08C514600}"/>
-    <dgm:cxn modelId="{7218C120-B69C-4A7A-BFBB-3F0F6D56C7F9}" type="presOf" srcId="{2B6A55A5-45D3-4E17-9C60-8FB16C933545}" destId="{FFCC9154-8E22-496A-ADF8-EA81D4AB5D77}" srcOrd="1" destOrd="1" presId="urn:microsoft.com/office/officeart/2005/8/layout/cycle4"/>
-    <dgm:cxn modelId="{266426E9-0DF4-450D-A48C-4EFDAB10A528}" type="presOf" srcId="{35F1F2D2-FC47-4990-98DB-731AFE036343}" destId="{BC6F0824-1351-49BA-BADB-F02B71A91728}" srcOrd="0" destOrd="0" presId="urn:microsoft.com/office/officeart/2005/8/layout/cycle4"/>
-    <dgm:cxn modelId="{89D0B3FB-B9CD-4764-B589-7798A97071B4}" type="presOf" srcId="{62885FA7-E7FB-4933-9935-6A8AA90289B4}" destId="{8128ED5B-798D-45C7-BB11-A0996A8BF223}" srcOrd="1" destOrd="2" presId="urn:microsoft.com/office/officeart/2005/8/layout/cycle4"/>
-    <dgm:cxn modelId="{A9B36F8A-C74B-47A9-B539-806F6BB77A1A}" srcId="{CC293B1C-4CF8-4FF0-BBC7-4942ED2D7F88}" destId="{0916D3E2-7950-4B1E-A80A-B1A0DFE4D7BE}" srcOrd="2" destOrd="0" parTransId="{78ED7DF1-7D14-4D64-A8E3-CBD6C30B03FB}" sibTransId="{402F8436-663D-4DB8-A22F-0A8F501EB425}"/>
-    <dgm:cxn modelId="{880D0322-3BCC-4373-B5CC-28A59B1C01C8}" type="presOf" srcId="{8FEE133A-1A79-4187-9AFD-4F06B42A70BC}" destId="{E72BDFA6-376E-4614-9D7C-A68241E884D9}" srcOrd="0" destOrd="0" presId="urn:microsoft.com/office/officeart/2005/8/layout/cycle4"/>
-    <dgm:cxn modelId="{A075CE85-5595-4859-A6BA-53D921007C6A}" srcId="{8BEA78FF-204F-4428-9092-659961DC247C}" destId="{5A50A77D-7959-4302-B136-B1316B3CEC1D}" srcOrd="2" destOrd="0" parTransId="{D56876BE-429C-478F-B26B-EE6C114C7CCE}" sibTransId="{5909CF64-4028-4CB9-9607-23629C5D37FB}"/>
-    <dgm:cxn modelId="{8A65DEA3-CD5A-4164-9FF0-75D085D4963C}" type="presOf" srcId="{21C7A246-DDB5-40DD-9118-CC4963BF878A}" destId="{BC6F0824-1351-49BA-BADB-F02B71A91728}" srcOrd="0" destOrd="1" presId="urn:microsoft.com/office/officeart/2005/8/layout/cycle4"/>
-    <dgm:cxn modelId="{5F7AD9D5-E7E6-4F46-A4C5-3A0CE6F62C8E}" srcId="{8FEE133A-1A79-4187-9AFD-4F06B42A70BC}" destId="{35F1F2D2-FC47-4990-98DB-731AFE036343}" srcOrd="0" destOrd="0" parTransId="{D8C3661F-62F4-45E8-BB01-35BAAF924AEB}" sibTransId="{4EFE689A-014D-4F95-82DA-3254DF013F6C}"/>
-    <dgm:cxn modelId="{AC846C45-BD23-47C6-830C-DB7B38427447}" type="presOf" srcId="{21C7A246-DDB5-40DD-9118-CC4963BF878A}" destId="{8128ED5B-798D-45C7-BB11-A0996A8BF223}" srcOrd="1" destOrd="1" presId="urn:microsoft.com/office/officeart/2005/8/layout/cycle4"/>
-    <dgm:cxn modelId="{2D7DE33D-C3DB-49E5-ADF6-52C214CF1C59}" srcId="{0916D3E2-7950-4B1E-A80A-B1A0DFE4D7BE}" destId="{7F397B27-ED42-4C0B-84EB-F42483A443DB}" srcOrd="1" destOrd="0" parTransId="{DD81B84C-4525-4615-9233-87E402AFBABC}" sibTransId="{97EBF3C2-DAC2-40A4-AE80-264E3F21FCCC}"/>
-    <dgm:cxn modelId="{0CDC6E4C-D4C6-410A-AF0C-236AC9D58E85}" type="presOf" srcId="{49454F30-2B75-445A-845F-7473D893477D}" destId="{431C4C2F-7F42-4D62-8EEF-918E7AD22EA0}" srcOrd="0" destOrd="0" presId="urn:microsoft.com/office/officeart/2005/8/layout/cycle4"/>
-    <dgm:cxn modelId="{873A3803-B8DA-4FC5-BC33-F8C410A4D637}" srcId="{DCE41F30-8A4B-4090-95D5-6CBD1CFA1EEC}" destId="{2B6A55A5-45D3-4E17-9C60-8FB16C933545}" srcOrd="1" destOrd="0" parTransId="{39E63537-B578-4C3D-8704-A072006EF998}" sibTransId="{0D1774AF-0E34-4AE0-B5A3-8DBDBFA17414}"/>
-    <dgm:cxn modelId="{C3E8D53F-9F19-4D6D-8520-8C7F3D75E371}" type="presOf" srcId="{1981BF8C-ABB4-462F-BD54-45D3229B3478}" destId="{05478942-E273-4856-8553-F0FD8F015AA2}" srcOrd="0" destOrd="0" presId="urn:microsoft.com/office/officeart/2005/8/layout/cycle4"/>
-    <dgm:cxn modelId="{68FB5C9D-DDC8-4910-B2E5-E22BB93FDB98}" type="presOf" srcId="{7F397B27-ED42-4C0B-84EB-F42483A443DB}" destId="{68AC0C8C-6683-4490-8F38-983C8CB47C3F}" srcOrd="0" destOrd="1" presId="urn:microsoft.com/office/officeart/2005/8/layout/cycle4"/>
-    <dgm:cxn modelId="{D00AE9DD-6598-4D17-9501-51424D49EECF}" type="presOf" srcId="{B8F4B4B5-48BB-4436-A4C8-0772D59377AC}" destId="{60120B91-D76F-4101-857D-B9B656863593}" srcOrd="1" destOrd="2" presId="urn:microsoft.com/office/officeart/2005/8/layout/cycle4"/>
-    <dgm:cxn modelId="{414CD220-C59F-4661-8172-F038F66587EA}" type="presOf" srcId="{5A50A77D-7959-4302-B136-B1316B3CEC1D}" destId="{431C4C2F-7F42-4D62-8EEF-918E7AD22EA0}" srcOrd="0" destOrd="2" presId="urn:microsoft.com/office/officeart/2005/8/layout/cycle4"/>
-    <dgm:cxn modelId="{2F545677-CE33-4761-99ED-0F7D3431F1B7}" srcId="{DCE41F30-8A4B-4090-95D5-6CBD1CFA1EEC}" destId="{1981BF8C-ABB4-462F-BD54-45D3229B3478}" srcOrd="0" destOrd="0" parTransId="{420AF548-7339-428B-B062-F64CBEBA21A3}" sibTransId="{314ADFC2-8DB9-4517-A22A-D1F9C188BEE4}"/>
-    <dgm:cxn modelId="{121AB52D-0394-4FA4-9EF7-82DA7D790C6C}" type="presOf" srcId="{35F1F2D2-FC47-4990-98DB-731AFE036343}" destId="{8128ED5B-798D-45C7-BB11-A0996A8BF223}" srcOrd="1" destOrd="0" presId="urn:microsoft.com/office/officeart/2005/8/layout/cycle4"/>
+    <dgm:cxn modelId="{16B43346-203E-404D-8530-860C599DFB3F}" type="presOf" srcId="{8BEA78FF-204F-4428-9092-659961DC247C}" destId="{C0852406-3DC0-4222-A1F8-184593FC4596}" srcOrd="0" destOrd="0" presId="urn:microsoft.com/office/officeart/2005/8/layout/cycle4"/>
     <dgm:cxn modelId="{C5F1050C-6E9E-4C54-966B-703AF570D023}" type="presOf" srcId="{850DD825-7D08-4BBC-94B9-7E217910F9A2}" destId="{53088BBF-CDFB-43AD-88FA-A16B4FDD4AEA}" srcOrd="1" destOrd="1" presId="urn:microsoft.com/office/officeart/2005/8/layout/cycle4"/>
-    <dgm:cxn modelId="{27155828-56A7-4BF4-8458-F295A9014509}" type="presOf" srcId="{49454F30-2B75-445A-845F-7473D893477D}" destId="{53088BBF-CDFB-43AD-88FA-A16B4FDD4AEA}" srcOrd="1" destOrd="0" presId="urn:microsoft.com/office/officeart/2005/8/layout/cycle4"/>
-    <dgm:cxn modelId="{95B5D13D-EC31-405A-B94A-D19BE8153AD7}" type="presOf" srcId="{2B6A55A5-45D3-4E17-9C60-8FB16C933545}" destId="{05478942-E273-4856-8553-F0FD8F015AA2}" srcOrd="0" destOrd="1" presId="urn:microsoft.com/office/officeart/2005/8/layout/cycle4"/>
-    <dgm:cxn modelId="{E2754B57-2984-4FD2-B783-8552C8246FA1}" type="presOf" srcId="{CC293B1C-4CF8-4FF0-BBC7-4942ED2D7F88}" destId="{39401A14-B365-4553-9A3D-A401D3183747}" srcOrd="0" destOrd="0" presId="urn:microsoft.com/office/officeart/2005/8/layout/cycle4"/>
     <dgm:cxn modelId="{0CC69F44-D607-40E7-840F-972AE0C732F5}" type="presOf" srcId="{850DD825-7D08-4BBC-94B9-7E217910F9A2}" destId="{431C4C2F-7F42-4D62-8EEF-918E7AD22EA0}" srcOrd="0" destOrd="1" presId="urn:microsoft.com/office/officeart/2005/8/layout/cycle4"/>
     <dgm:cxn modelId="{5DC2DB55-F097-4294-8B9E-72B598743DA3}" srcId="{8BEA78FF-204F-4428-9092-659961DC247C}" destId="{850DD825-7D08-4BBC-94B9-7E217910F9A2}" srcOrd="1" destOrd="0" parTransId="{D847AE72-61FF-43C4-BFB0-3E6EC0A79B26}" sibTransId="{DD66B6EB-9ADC-44F2-A7C2-DA4869ECDFFE}"/>
-    <dgm:cxn modelId="{6484E426-69AA-42DF-977B-A67A73203BD9}" srcId="{8BEA78FF-204F-4428-9092-659961DC247C}" destId="{49454F30-2B75-445A-845F-7473D893477D}" srcOrd="0" destOrd="0" parTransId="{347F498C-146E-4A53-8576-856FB00E3649}" sibTransId="{FAF60BDA-D885-4200-9740-D21B994BE362}"/>
-    <dgm:cxn modelId="{16B43346-203E-404D-8530-860C599DFB3F}" type="presOf" srcId="{8BEA78FF-204F-4428-9092-659961DC247C}" destId="{C0852406-3DC0-4222-A1F8-184593FC4596}" srcOrd="0" destOrd="0" presId="urn:microsoft.com/office/officeart/2005/8/layout/cycle4"/>
-    <dgm:cxn modelId="{F3DC86B6-474F-4BE6-A324-3FE9F9B8844A}" srcId="{CC293B1C-4CF8-4FF0-BBC7-4942ED2D7F88}" destId="{8FEE133A-1A79-4187-9AFD-4F06B42A70BC}" srcOrd="0" destOrd="0" parTransId="{7D947A46-F0B2-4D95-921D-7768A2A81535}" sibTransId="{A16446F1-3DF9-49B1-92C9-2E546FABE218}"/>
+    <dgm:cxn modelId="{5E45B507-1330-428C-A195-37581AAE5A63}" srcId="{8FEE133A-1A79-4187-9AFD-4F06B42A70BC}" destId="{21C7A246-DDB5-40DD-9118-CC4963BF878A}" srcOrd="1" destOrd="0" parTransId="{CD9E23AD-A863-49AB-83BE-431D89C28AF8}" sibTransId="{9EFEBC15-1E66-4CAC-95AE-73B08C514600}"/>
+    <dgm:cxn modelId="{266426E9-0DF4-450D-A48C-4EFDAB10A528}" type="presOf" srcId="{35F1F2D2-FC47-4990-98DB-731AFE036343}" destId="{BC6F0824-1351-49BA-BADB-F02B71A91728}" srcOrd="0" destOrd="0" presId="urn:microsoft.com/office/officeart/2005/8/layout/cycle4"/>
+    <dgm:cxn modelId="{68FB5C9D-DDC8-4910-B2E5-E22BB93FDB98}" type="presOf" srcId="{7F397B27-ED42-4C0B-84EB-F42483A443DB}" destId="{68AC0C8C-6683-4490-8F38-983C8CB47C3F}" srcOrd="0" destOrd="1" presId="urn:microsoft.com/office/officeart/2005/8/layout/cycle4"/>
+    <dgm:cxn modelId="{A9B36F8A-C74B-47A9-B539-806F6BB77A1A}" srcId="{CC293B1C-4CF8-4FF0-BBC7-4942ED2D7F88}" destId="{0916D3E2-7950-4B1E-A80A-B1A0DFE4D7BE}" srcOrd="2" destOrd="0" parTransId="{78ED7DF1-7D14-4D64-A8E3-CBD6C30B03FB}" sibTransId="{402F8436-663D-4DB8-A22F-0A8F501EB425}"/>
+    <dgm:cxn modelId="{414CD220-C59F-4661-8172-F038F66587EA}" type="presOf" srcId="{5A50A77D-7959-4302-B136-B1316B3CEC1D}" destId="{431C4C2F-7F42-4D62-8EEF-918E7AD22EA0}" srcOrd="0" destOrd="2" presId="urn:microsoft.com/office/officeart/2005/8/layout/cycle4"/>
+    <dgm:cxn modelId="{566BE653-B770-4199-A086-63C9C0FABF06}" type="presOf" srcId="{5A50A77D-7959-4302-B136-B1316B3CEC1D}" destId="{53088BBF-CDFB-43AD-88FA-A16B4FDD4AEA}" srcOrd="1" destOrd="2" presId="urn:microsoft.com/office/officeart/2005/8/layout/cycle4"/>
+    <dgm:cxn modelId="{A2BBFC70-EC5F-4207-B2BA-2AAE56D317DC}" type="presOf" srcId="{9B35DA45-8824-4EE3-89F0-3F4E07F980E3}" destId="{60120B91-D76F-4101-857D-B9B656863593}" srcOrd="1" destOrd="0" presId="urn:microsoft.com/office/officeart/2005/8/layout/cycle4"/>
+    <dgm:cxn modelId="{8A65DEA3-CD5A-4164-9FF0-75D085D4963C}" type="presOf" srcId="{21C7A246-DDB5-40DD-9118-CC4963BF878A}" destId="{BC6F0824-1351-49BA-BADB-F02B71A91728}" srcOrd="0" destOrd="1" presId="urn:microsoft.com/office/officeart/2005/8/layout/cycle4"/>
+    <dgm:cxn modelId="{121AB52D-0394-4FA4-9EF7-82DA7D790C6C}" type="presOf" srcId="{35F1F2D2-FC47-4990-98DB-731AFE036343}" destId="{8128ED5B-798D-45C7-BB11-A0996A8BF223}" srcOrd="1" destOrd="0" presId="urn:microsoft.com/office/officeart/2005/8/layout/cycle4"/>
+    <dgm:cxn modelId="{428F15AF-99F9-482D-BD31-313434250C80}" type="presOf" srcId="{B8F4B4B5-48BB-4436-A4C8-0772D59377AC}" destId="{68AC0C8C-6683-4490-8F38-983C8CB47C3F}" srcOrd="0" destOrd="2" presId="urn:microsoft.com/office/officeart/2005/8/layout/cycle4"/>
+    <dgm:cxn modelId="{5F7AD9D5-E7E6-4F46-A4C5-3A0CE6F62C8E}" srcId="{8FEE133A-1A79-4187-9AFD-4F06B42A70BC}" destId="{35F1F2D2-FC47-4990-98DB-731AFE036343}" srcOrd="0" destOrd="0" parTransId="{D8C3661F-62F4-45E8-BB01-35BAAF924AEB}" sibTransId="{4EFE689A-014D-4F95-82DA-3254DF013F6C}"/>
+    <dgm:cxn modelId="{3B991839-62B0-437F-ABDE-F4C1C596D307}" type="presOf" srcId="{1981BF8C-ABB4-462F-BD54-45D3229B3478}" destId="{FFCC9154-8E22-496A-ADF8-EA81D4AB5D77}" srcOrd="1" destOrd="0" presId="urn:microsoft.com/office/officeart/2005/8/layout/cycle4"/>
+    <dgm:cxn modelId="{7218C120-B69C-4A7A-BFBB-3F0F6D56C7F9}" type="presOf" srcId="{2B6A55A5-45D3-4E17-9C60-8FB16C933545}" destId="{FFCC9154-8E22-496A-ADF8-EA81D4AB5D77}" srcOrd="1" destOrd="1" presId="urn:microsoft.com/office/officeart/2005/8/layout/cycle4"/>
+    <dgm:cxn modelId="{58755D72-6A8A-4181-8EB5-41F1412B480B}" srcId="{8FEE133A-1A79-4187-9AFD-4F06B42A70BC}" destId="{62885FA7-E7FB-4933-9935-6A8AA90289B4}" srcOrd="2" destOrd="0" parTransId="{9870B421-E3D6-4556-A843-2F0EDB4F207B}" sibTransId="{EB0831C9-645B-4C0B-8FAE-4F47D0F4E0C7}"/>
+    <dgm:cxn modelId="{F7CBC7F7-FBF9-4329-A3B5-F8A568558D6C}" srcId="{DCE41F30-8A4B-4090-95D5-6CBD1CFA1EEC}" destId="{6446DC96-6D1C-4742-A646-C454D61C5C9D}" srcOrd="2" destOrd="0" parTransId="{F1EB376B-DD8F-4D0A-B475-0137A25A9B1D}" sibTransId="{2E4D0765-7F9C-4470-8414-926AC02E2CE2}"/>
+    <dgm:cxn modelId="{3E82771C-0B66-4E74-9190-DF73756B0079}" type="presOf" srcId="{9B35DA45-8824-4EE3-89F0-3F4E07F980E3}" destId="{68AC0C8C-6683-4490-8F38-983C8CB47C3F}" srcOrd="0" destOrd="0" presId="urn:microsoft.com/office/officeart/2005/8/layout/cycle4"/>
+    <dgm:cxn modelId="{CE2AF7AB-2949-4DCD-9C29-6B60E91D8468}" srcId="{0916D3E2-7950-4B1E-A80A-B1A0DFE4D7BE}" destId="{B8F4B4B5-48BB-4436-A4C8-0772D59377AC}" srcOrd="2" destOrd="0" parTransId="{EEB7DF95-B1E1-4355-BDED-67254F3A40BF}" sibTransId="{07F8EC93-687D-4C25-BBFA-77894EDF7DA2}"/>
+    <dgm:cxn modelId="{856CCC98-4D42-4940-9913-BB20C5217489}" srcId="{CC293B1C-4CF8-4FF0-BBC7-4942ED2D7F88}" destId="{DCE41F30-8A4B-4090-95D5-6CBD1CFA1EEC}" srcOrd="1" destOrd="0" parTransId="{480265E7-8542-40B5-95A1-EC04B55B8C68}" sibTransId="{005E5E72-5BE1-4DC4-AD1C-48C242521B93}"/>
+    <dgm:cxn modelId="{873A3803-B8DA-4FC5-BC33-F8C410A4D637}" srcId="{DCE41F30-8A4B-4090-95D5-6CBD1CFA1EEC}" destId="{2B6A55A5-45D3-4E17-9C60-8FB16C933545}" srcOrd="1" destOrd="0" parTransId="{39E63537-B578-4C3D-8704-A072006EF998}" sibTransId="{0D1774AF-0E34-4AE0-B5A3-8DBDBFA17414}"/>
+    <dgm:cxn modelId="{08978BA1-AE5A-4DFF-A0C3-92D4A0078A98}" srcId="{0916D3E2-7950-4B1E-A80A-B1A0DFE4D7BE}" destId="{9B35DA45-8824-4EE3-89F0-3F4E07F980E3}" srcOrd="0" destOrd="0" parTransId="{F26E0BCB-616E-4F5C-9212-B89461307743}" sibTransId="{6FFF208B-A136-4388-9736-DE2BA4AFD5AF}"/>
+    <dgm:cxn modelId="{880D0322-3BCC-4373-B5CC-28A59B1C01C8}" type="presOf" srcId="{8FEE133A-1A79-4187-9AFD-4F06B42A70BC}" destId="{E72BDFA6-376E-4614-9D7C-A68241E884D9}" srcOrd="0" destOrd="0" presId="urn:microsoft.com/office/officeart/2005/8/layout/cycle4"/>
+    <dgm:cxn modelId="{0CDC6E4C-D4C6-410A-AF0C-236AC9D58E85}" type="presOf" srcId="{49454F30-2B75-445A-845F-7473D893477D}" destId="{431C4C2F-7F42-4D62-8EEF-918E7AD22EA0}" srcOrd="0" destOrd="0" presId="urn:microsoft.com/office/officeart/2005/8/layout/cycle4"/>
+    <dgm:cxn modelId="{A075CE85-5595-4859-A6BA-53D921007C6A}" srcId="{8BEA78FF-204F-4428-9092-659961DC247C}" destId="{5A50A77D-7959-4302-B136-B1316B3CEC1D}" srcOrd="2" destOrd="0" parTransId="{D56876BE-429C-478F-B26B-EE6C114C7CCE}" sibTransId="{5909CF64-4028-4CB9-9607-23629C5D37FB}"/>
+    <dgm:cxn modelId="{A5D3F3DB-629E-46CD-AA76-C52C0C251A66}" srcId="{CC293B1C-4CF8-4FF0-BBC7-4942ED2D7F88}" destId="{8BEA78FF-204F-4428-9092-659961DC247C}" srcOrd="3" destOrd="0" parTransId="{41090789-956B-42C9-B909-44B2D62666F5}" sibTransId="{F0DB2DD3-51DB-4551-8E87-8440876EF808}"/>
+    <dgm:cxn modelId="{95B5D13D-EC31-405A-B94A-D19BE8153AD7}" type="presOf" srcId="{2B6A55A5-45D3-4E17-9C60-8FB16C933545}" destId="{05478942-E273-4856-8553-F0FD8F015AA2}" srcOrd="0" destOrd="1" presId="urn:microsoft.com/office/officeart/2005/8/layout/cycle4"/>
     <dgm:cxn modelId="{E2D839A8-A246-4BFE-8C62-59A978A4AE65}" type="presOf" srcId="{6446DC96-6D1C-4742-A646-C454D61C5C9D}" destId="{FFCC9154-8E22-496A-ADF8-EA81D4AB5D77}" srcOrd="1" destOrd="2" presId="urn:microsoft.com/office/officeart/2005/8/layout/cycle4"/>
-    <dgm:cxn modelId="{A2BBFC70-EC5F-4207-B2BA-2AAE56D317DC}" type="presOf" srcId="{9B35DA45-8824-4EE3-89F0-3F4E07F980E3}" destId="{60120B91-D76F-4101-857D-B9B656863593}" srcOrd="1" destOrd="0" presId="urn:microsoft.com/office/officeart/2005/8/layout/cycle4"/>
-    <dgm:cxn modelId="{F7CBC7F7-FBF9-4329-A3B5-F8A568558D6C}" srcId="{DCE41F30-8A4B-4090-95D5-6CBD1CFA1EEC}" destId="{6446DC96-6D1C-4742-A646-C454D61C5C9D}" srcOrd="2" destOrd="0" parTransId="{F1EB376B-DD8F-4D0A-B475-0137A25A9B1D}" sibTransId="{2E4D0765-7F9C-4470-8414-926AC02E2CE2}"/>
-    <dgm:cxn modelId="{1055A9D0-9C78-4F22-9ACE-90E8B5CF69D8}" type="presOf" srcId="{62885FA7-E7FB-4933-9935-6A8AA90289B4}" destId="{BC6F0824-1351-49BA-BADB-F02B71A91728}" srcOrd="0" destOrd="2" presId="urn:microsoft.com/office/officeart/2005/8/layout/cycle4"/>
-    <dgm:cxn modelId="{58755D72-6A8A-4181-8EB5-41F1412B480B}" srcId="{8FEE133A-1A79-4187-9AFD-4F06B42A70BC}" destId="{62885FA7-E7FB-4933-9935-6A8AA90289B4}" srcOrd="2" destOrd="0" parTransId="{9870B421-E3D6-4556-A843-2F0EDB4F207B}" sibTransId="{EB0831C9-645B-4C0B-8FAE-4F47D0F4E0C7}"/>
-    <dgm:cxn modelId="{C9309115-721C-48C4-9369-542B8A264ABE}" type="presOf" srcId="{6446DC96-6D1C-4742-A646-C454D61C5C9D}" destId="{05478942-E273-4856-8553-F0FD8F015AA2}" srcOrd="0" destOrd="2" presId="urn:microsoft.com/office/officeart/2005/8/layout/cycle4"/>
-    <dgm:cxn modelId="{856CCC98-4D42-4940-9913-BB20C5217489}" srcId="{CC293B1C-4CF8-4FF0-BBC7-4942ED2D7F88}" destId="{DCE41F30-8A4B-4090-95D5-6CBD1CFA1EEC}" srcOrd="1" destOrd="0" parTransId="{480265E7-8542-40B5-95A1-EC04B55B8C68}" sibTransId="{005E5E72-5BE1-4DC4-AD1C-48C242521B93}"/>
-    <dgm:cxn modelId="{CE2AF7AB-2949-4DCD-9C29-6B60E91D8468}" srcId="{0916D3E2-7950-4B1E-A80A-B1A0DFE4D7BE}" destId="{B8F4B4B5-48BB-4436-A4C8-0772D59377AC}" srcOrd="2" destOrd="0" parTransId="{EEB7DF95-B1E1-4355-BDED-67254F3A40BF}" sibTransId="{07F8EC93-687D-4C25-BBFA-77894EDF7DA2}"/>
+    <dgm:cxn modelId="{AC846C45-BD23-47C6-830C-DB7B38427447}" type="presOf" srcId="{21C7A246-DDB5-40DD-9118-CC4963BF878A}" destId="{8128ED5B-798D-45C7-BB11-A0996A8BF223}" srcOrd="1" destOrd="1" presId="urn:microsoft.com/office/officeart/2005/8/layout/cycle4"/>
+    <dgm:cxn modelId="{D00AE9DD-6598-4D17-9501-51424D49EECF}" type="presOf" srcId="{B8F4B4B5-48BB-4436-A4C8-0772D59377AC}" destId="{60120B91-D76F-4101-857D-B9B656863593}" srcOrd="1" destOrd="2" presId="urn:microsoft.com/office/officeart/2005/8/layout/cycle4"/>
+    <dgm:cxn modelId="{2D7DE33D-C3DB-49E5-ADF6-52C214CF1C59}" srcId="{0916D3E2-7950-4B1E-A80A-B1A0DFE4D7BE}" destId="{7F397B27-ED42-4C0B-84EB-F42483A443DB}" srcOrd="1" destOrd="0" parTransId="{DD81B84C-4525-4615-9233-87E402AFBABC}" sibTransId="{97EBF3C2-DAC2-40A4-AE80-264E3F21FCCC}"/>
     <dgm:cxn modelId="{B1E069C3-9DD3-4EEB-A9B1-5E2D53207CE5}" type="presParOf" srcId="{39401A14-B365-4553-9A3D-A401D3183747}" destId="{D7E58549-68A7-4F21-BF0D-84F7636DCD92}" srcOrd="0" destOrd="0" presId="urn:microsoft.com/office/officeart/2005/8/layout/cycle4"/>
     <dgm:cxn modelId="{4079B0D3-B13D-4703-803A-77CE7F7A9C17}" type="presParOf" srcId="{D7E58549-68A7-4F21-BF0D-84F7636DCD92}" destId="{5D458377-8CFE-43EB-BDF2-7CB3F0D876C1}" srcOrd="0" destOrd="0" presId="urn:microsoft.com/office/officeart/2005/8/layout/cycle4"/>
     <dgm:cxn modelId="{C9FF3A53-9225-470B-9DC4-DDEF2A15114A}" type="presParOf" srcId="{5D458377-8CFE-43EB-BDF2-7CB3F0D876C1}" destId="{BC6F0824-1351-49BA-BADB-F02B71A91728}" srcOrd="0" destOrd="0" presId="urn:microsoft.com/office/officeart/2005/8/layout/cycle4"/>
@@ -5060,8 +5060,8 @@
   <dgm:cxnLst>
     <dgm:cxn modelId="{C5B0C467-63B8-4E98-832A-9BF26145A1F5}" type="presOf" srcId="{EEB7DF95-B1E1-4355-BDED-67254F3A40BF}" destId="{156A4B50-5EBB-4BD2-8AF0-C722439DBC8D}" srcOrd="0" destOrd="0" presId="urn:microsoft.com/office/officeart/2005/8/layout/radial1"/>
     <dgm:cxn modelId="{CE2AF7AB-2949-4DCD-9C29-6B60E91D8468}" srcId="{0916D3E2-7950-4B1E-A80A-B1A0DFE4D7BE}" destId="{B8F4B4B5-48BB-4436-A4C8-0772D59377AC}" srcOrd="2" destOrd="0" parTransId="{EEB7DF95-B1E1-4355-BDED-67254F3A40BF}" sibTransId="{07F8EC93-687D-4C25-BBFA-77894EDF7DA2}"/>
+    <dgm:cxn modelId="{FFD69671-1326-471B-AA88-BD646D876CA6}" type="presOf" srcId="{7F397B27-ED42-4C0B-84EB-F42483A443DB}" destId="{FC75532D-1A75-4D81-A458-80C91B398F9D}" srcOrd="0" destOrd="0" presId="urn:microsoft.com/office/officeart/2005/8/layout/radial1"/>
     <dgm:cxn modelId="{2D7DE33D-C3DB-49E5-ADF6-52C214CF1C59}" srcId="{0916D3E2-7950-4B1E-A80A-B1A0DFE4D7BE}" destId="{7F397B27-ED42-4C0B-84EB-F42483A443DB}" srcOrd="1" destOrd="0" parTransId="{DD81B84C-4525-4615-9233-87E402AFBABC}" sibTransId="{97EBF3C2-DAC2-40A4-AE80-264E3F21FCCC}"/>
-    <dgm:cxn modelId="{FFD69671-1326-471B-AA88-BD646D876CA6}" type="presOf" srcId="{7F397B27-ED42-4C0B-84EB-F42483A443DB}" destId="{FC75532D-1A75-4D81-A458-80C91B398F9D}" srcOrd="0" destOrd="0" presId="urn:microsoft.com/office/officeart/2005/8/layout/radial1"/>
     <dgm:cxn modelId="{8AA47935-1384-4442-9382-F8E987DEE2AB}" type="presOf" srcId="{B8F4B4B5-48BB-4436-A4C8-0772D59377AC}" destId="{B8775ABA-3037-409F-B1F5-5479D38AC897}" srcOrd="0" destOrd="0" presId="urn:microsoft.com/office/officeart/2005/8/layout/radial1"/>
     <dgm:cxn modelId="{FB204E9A-D97C-4DB1-A8E6-396FB3CCCB82}" type="presOf" srcId="{EEB7DF95-B1E1-4355-BDED-67254F3A40BF}" destId="{0FA48441-B5ED-464B-AB5B-44DAB679EE64}" srcOrd="1" destOrd="0" presId="urn:microsoft.com/office/officeart/2005/8/layout/radial1"/>
     <dgm:cxn modelId="{A9B36F8A-C74B-47A9-B539-806F6BB77A1A}" srcId="{CC293B1C-4CF8-4FF0-BBC7-4942ED2D7F88}" destId="{0916D3E2-7950-4B1E-A80A-B1A0DFE4D7BE}" srcOrd="0" destOrd="0" parTransId="{78ED7DF1-7D14-4D64-A8E3-CBD6C30B03FB}" sibTransId="{402F8436-663D-4DB8-A22F-0A8F501EB425}"/>
@@ -28277,7 +28277,6 @@
               <a:rPr lang="fr-FR" sz="2000" dirty="0" smtClean="0"/>
               <a:t> (server) </a:t>
             </a:r>
-            <a:endParaRPr lang="fr-FR" sz="2000" dirty="0" smtClean="0"/>
           </a:p>
           <a:p>
             <a:pPr algn="just"/>

</xml_diff>

<commit_message>
More work on slides (final presentation and suivit de projet)
</commit_message>
<xml_diff>
--- a/Slides/Diapos_Suivit_projet.pptx
+++ b/Slides/Diapos_Suivit_projet.pptx
@@ -5,10 +5,10 @@
     <p:sldMasterId id="2147483648" r:id="rId1"/>
   </p:sldMasterIdLst>
   <p:notesMasterIdLst>
-    <p:notesMasterId r:id="rId12"/>
+    <p:notesMasterId r:id="rId13"/>
   </p:notesMasterIdLst>
   <p:handoutMasterIdLst>
-    <p:handoutMasterId r:id="rId13"/>
+    <p:handoutMasterId r:id="rId14"/>
   </p:handoutMasterIdLst>
   <p:sldIdLst>
     <p:sldId id="288" r:id="rId2"/>
@@ -16,11 +16,12 @@
     <p:sldId id="285" r:id="rId4"/>
     <p:sldId id="284" r:id="rId5"/>
     <p:sldId id="283" r:id="rId6"/>
-    <p:sldId id="282" r:id="rId7"/>
-    <p:sldId id="273" r:id="rId8"/>
-    <p:sldId id="278" r:id="rId9"/>
-    <p:sldId id="287" r:id="rId10"/>
-    <p:sldId id="286" r:id="rId11"/>
+    <p:sldId id="289" r:id="rId7"/>
+    <p:sldId id="282" r:id="rId8"/>
+    <p:sldId id="273" r:id="rId9"/>
+    <p:sldId id="278" r:id="rId10"/>
+    <p:sldId id="287" r:id="rId11"/>
+    <p:sldId id="286" r:id="rId12"/>
   </p:sldIdLst>
   <p:sldSz cx="12192000" cy="6858000"/>
   <p:notesSz cx="6858000" cy="9144000"/>
@@ -15553,7 +15554,7 @@
             <a:lvl1pPr algn="r">
               <a:defRPr sz="2500">
                 <a:solidFill>
-                  <a:schemeClr val="tx1"/>
+                  <a:schemeClr val="bg1"/>
                 </a:solidFill>
               </a:defRPr>
             </a:lvl1pPr>
@@ -16238,6 +16239,410 @@
       </p:grpSpPr>
       <p:sp>
         <p:nvSpPr>
+          <p:cNvPr id="2" name="Slide Number Placeholder 1"/>
+          <p:cNvSpPr>
+            <a:spLocks noGrp="1"/>
+          </p:cNvSpPr>
+          <p:nvPr>
+            <p:ph type="sldNum" sz="quarter" idx="4"/>
+          </p:nvPr>
+        </p:nvSpPr>
+        <p:spPr/>
+        <p:txBody>
+          <a:bodyPr/>
+          <a:lstStyle/>
+          <a:p>
+            <a:fld id="{813506F1-DB5F-4FC9-88BA-B486F30FE4BF}" type="slidenum">
+              <a:rPr lang="fr-FR" smtClean="0"/>
+              <a:pPr/>
+              <a:t>9</a:t>
+            </a:fld>
+            <a:endParaRPr lang="fr-FR" dirty="0"/>
+          </a:p>
+        </p:txBody>
+      </p:sp>
+      <p:pic>
+        <p:nvPicPr>
+          <p:cNvPr id="3" name="Image 2"/>
+          <p:cNvPicPr>
+            <a:picLocks noChangeAspect="1"/>
+          </p:cNvPicPr>
+          <p:nvPr/>
+        </p:nvPicPr>
+        <p:blipFill>
+          <a:blip r:embed="rId2"/>
+          <a:stretch>
+            <a:fillRect/>
+          </a:stretch>
+        </p:blipFill>
+        <p:spPr>
+          <a:xfrm>
+            <a:off x="5606587" y="1874730"/>
+            <a:ext cx="6290138" cy="4531498"/>
+          </a:xfrm>
+          <a:prstGeom prst="rect">
+            <a:avLst/>
+          </a:prstGeom>
+          <a:ln>
+            <a:solidFill>
+              <a:schemeClr val="tx1"/>
+            </a:solidFill>
+          </a:ln>
+        </p:spPr>
+      </p:pic>
+      <p:sp>
+        <p:nvSpPr>
+          <p:cNvPr id="4" name="Title 1"/>
+          <p:cNvSpPr txBox="1">
+            <a:spLocks/>
+          </p:cNvSpPr>
+          <p:nvPr/>
+        </p:nvSpPr>
+        <p:spPr>
+          <a:xfrm>
+            <a:off x="648394" y="2101646"/>
+            <a:ext cx="4866581" cy="733833"/>
+          </a:xfrm>
+          <a:prstGeom prst="rect">
+            <a:avLst/>
+          </a:prstGeom>
+        </p:spPr>
+        <p:txBody>
+          <a:bodyPr/>
+          <a:lstStyle>
+            <a:lvl1pPr algn="l" defTabSz="914400" rtl="0" eaLnBrk="1" latinLnBrk="0" hangingPunct="1">
+              <a:lnSpc>
+                <a:spcPct val="90000"/>
+              </a:lnSpc>
+              <a:spcBef>
+                <a:spcPct val="0"/>
+              </a:spcBef>
+              <a:buNone/>
+              <a:defRPr sz="4400" kern="1200">
+                <a:solidFill>
+                  <a:schemeClr val="tx1"/>
+                </a:solidFill>
+                <a:latin typeface="+mj-lt"/>
+                <a:ea typeface="+mj-ea"/>
+                <a:cs typeface="+mj-cs"/>
+              </a:defRPr>
+            </a:lvl1pPr>
+          </a:lstStyle>
+          <a:p>
+            <a:r>
+              <a:rPr lang="fr-FR" dirty="0" smtClean="0"/>
+              <a:t>App – User </a:t>
+            </a:r>
+            <a:r>
+              <a:rPr lang="fr-FR" dirty="0" err="1" smtClean="0"/>
+              <a:t>webpage</a:t>
+            </a:r>
+            <a:endParaRPr lang="fr-FR" dirty="0"/>
+          </a:p>
+        </p:txBody>
+      </p:sp>
+      <p:sp>
+        <p:nvSpPr>
+          <p:cNvPr id="5" name="Content Placeholder 2"/>
+          <p:cNvSpPr txBox="1">
+            <a:spLocks/>
+          </p:cNvSpPr>
+          <p:nvPr/>
+        </p:nvSpPr>
+        <p:spPr>
+          <a:xfrm>
+            <a:off x="1236684" y="2835479"/>
+            <a:ext cx="4161226" cy="3842158"/>
+          </a:xfrm>
+          <a:prstGeom prst="rect">
+            <a:avLst/>
+          </a:prstGeom>
+        </p:spPr>
+        <p:txBody>
+          <a:bodyPr>
+            <a:normAutofit/>
+          </a:bodyPr>
+          <a:lstStyle>
+            <a:lvl1pPr marL="228600" indent="-228600" algn="l" defTabSz="914400" rtl="0" eaLnBrk="1" latinLnBrk="0" hangingPunct="1">
+              <a:lnSpc>
+                <a:spcPct val="90000"/>
+              </a:lnSpc>
+              <a:spcBef>
+                <a:spcPts val="1000"/>
+              </a:spcBef>
+              <a:buFont typeface="Arial" panose="020B0604020202020204" pitchFamily="34" charset="0"/>
+              <a:buChar char="•"/>
+              <a:defRPr sz="2800" kern="1200">
+                <a:solidFill>
+                  <a:schemeClr val="tx1"/>
+                </a:solidFill>
+                <a:latin typeface="+mn-lt"/>
+                <a:ea typeface="+mn-ea"/>
+                <a:cs typeface="+mn-cs"/>
+              </a:defRPr>
+            </a:lvl1pPr>
+            <a:lvl2pPr marL="685800" indent="-228600" algn="l" defTabSz="914400" rtl="0" eaLnBrk="1" latinLnBrk="0" hangingPunct="1">
+              <a:lnSpc>
+                <a:spcPct val="90000"/>
+              </a:lnSpc>
+              <a:spcBef>
+                <a:spcPts val="500"/>
+              </a:spcBef>
+              <a:buFont typeface="Arial" panose="020B0604020202020204" pitchFamily="34" charset="0"/>
+              <a:buChar char="•"/>
+              <a:defRPr sz="2400" kern="1200">
+                <a:solidFill>
+                  <a:schemeClr val="tx1"/>
+                </a:solidFill>
+                <a:latin typeface="+mn-lt"/>
+                <a:ea typeface="+mn-ea"/>
+                <a:cs typeface="+mn-cs"/>
+              </a:defRPr>
+            </a:lvl2pPr>
+            <a:lvl3pPr marL="1143000" indent="-228600" algn="l" defTabSz="914400" rtl="0" eaLnBrk="1" latinLnBrk="0" hangingPunct="1">
+              <a:lnSpc>
+                <a:spcPct val="90000"/>
+              </a:lnSpc>
+              <a:spcBef>
+                <a:spcPts val="500"/>
+              </a:spcBef>
+              <a:buFont typeface="Arial" panose="020B0604020202020204" pitchFamily="34" charset="0"/>
+              <a:buChar char="•"/>
+              <a:defRPr sz="2000" kern="1200">
+                <a:solidFill>
+                  <a:schemeClr val="tx1"/>
+                </a:solidFill>
+                <a:latin typeface="+mn-lt"/>
+                <a:ea typeface="+mn-ea"/>
+                <a:cs typeface="+mn-cs"/>
+              </a:defRPr>
+            </a:lvl3pPr>
+            <a:lvl4pPr marL="1600200" indent="-228600" algn="l" defTabSz="914400" rtl="0" eaLnBrk="1" latinLnBrk="0" hangingPunct="1">
+              <a:lnSpc>
+                <a:spcPct val="90000"/>
+              </a:lnSpc>
+              <a:spcBef>
+                <a:spcPts val="500"/>
+              </a:spcBef>
+              <a:buFont typeface="Arial" panose="020B0604020202020204" pitchFamily="34" charset="0"/>
+              <a:buChar char="•"/>
+              <a:defRPr sz="1800" kern="1200">
+                <a:solidFill>
+                  <a:schemeClr val="tx1"/>
+                </a:solidFill>
+                <a:latin typeface="+mn-lt"/>
+                <a:ea typeface="+mn-ea"/>
+                <a:cs typeface="+mn-cs"/>
+              </a:defRPr>
+            </a:lvl4pPr>
+            <a:lvl5pPr marL="2057400" indent="-228600" algn="l" defTabSz="914400" rtl="0" eaLnBrk="1" latinLnBrk="0" hangingPunct="1">
+              <a:lnSpc>
+                <a:spcPct val="90000"/>
+              </a:lnSpc>
+              <a:spcBef>
+                <a:spcPts val="500"/>
+              </a:spcBef>
+              <a:buFont typeface="Arial" panose="020B0604020202020204" pitchFamily="34" charset="0"/>
+              <a:buChar char="•"/>
+              <a:defRPr sz="1800" kern="1200">
+                <a:solidFill>
+                  <a:schemeClr val="tx1"/>
+                </a:solidFill>
+                <a:latin typeface="+mn-lt"/>
+                <a:ea typeface="+mn-ea"/>
+                <a:cs typeface="+mn-cs"/>
+              </a:defRPr>
+            </a:lvl5pPr>
+            <a:lvl6pPr marL="2514600" indent="-228600" algn="l" defTabSz="914400" rtl="0" eaLnBrk="1" latinLnBrk="0" hangingPunct="1">
+              <a:lnSpc>
+                <a:spcPct val="90000"/>
+              </a:lnSpc>
+              <a:spcBef>
+                <a:spcPts val="500"/>
+              </a:spcBef>
+              <a:buFont typeface="Arial" panose="020B0604020202020204" pitchFamily="34" charset="0"/>
+              <a:buChar char="•"/>
+              <a:defRPr sz="1800" kern="1200">
+                <a:solidFill>
+                  <a:schemeClr val="tx1"/>
+                </a:solidFill>
+                <a:latin typeface="+mn-lt"/>
+                <a:ea typeface="+mn-ea"/>
+                <a:cs typeface="+mn-cs"/>
+              </a:defRPr>
+            </a:lvl6pPr>
+            <a:lvl7pPr marL="2971800" indent="-228600" algn="l" defTabSz="914400" rtl="0" eaLnBrk="1" latinLnBrk="0" hangingPunct="1">
+              <a:lnSpc>
+                <a:spcPct val="90000"/>
+              </a:lnSpc>
+              <a:spcBef>
+                <a:spcPts val="500"/>
+              </a:spcBef>
+              <a:buFont typeface="Arial" panose="020B0604020202020204" pitchFamily="34" charset="0"/>
+              <a:buChar char="•"/>
+              <a:defRPr sz="1800" kern="1200">
+                <a:solidFill>
+                  <a:schemeClr val="tx1"/>
+                </a:solidFill>
+                <a:latin typeface="+mn-lt"/>
+                <a:ea typeface="+mn-ea"/>
+                <a:cs typeface="+mn-cs"/>
+              </a:defRPr>
+            </a:lvl7pPr>
+            <a:lvl8pPr marL="3429000" indent="-228600" algn="l" defTabSz="914400" rtl="0" eaLnBrk="1" latinLnBrk="0" hangingPunct="1">
+              <a:lnSpc>
+                <a:spcPct val="90000"/>
+              </a:lnSpc>
+              <a:spcBef>
+                <a:spcPts val="500"/>
+              </a:spcBef>
+              <a:buFont typeface="Arial" panose="020B0604020202020204" pitchFamily="34" charset="0"/>
+              <a:buChar char="•"/>
+              <a:defRPr sz="1800" kern="1200">
+                <a:solidFill>
+                  <a:schemeClr val="tx1"/>
+                </a:solidFill>
+                <a:latin typeface="+mn-lt"/>
+                <a:ea typeface="+mn-ea"/>
+                <a:cs typeface="+mn-cs"/>
+              </a:defRPr>
+            </a:lvl8pPr>
+            <a:lvl9pPr marL="3886200" indent="-228600" algn="l" defTabSz="914400" rtl="0" eaLnBrk="1" latinLnBrk="0" hangingPunct="1">
+              <a:lnSpc>
+                <a:spcPct val="90000"/>
+              </a:lnSpc>
+              <a:spcBef>
+                <a:spcPts val="500"/>
+              </a:spcBef>
+              <a:buFont typeface="Arial" panose="020B0604020202020204" pitchFamily="34" charset="0"/>
+              <a:buChar char="•"/>
+              <a:defRPr sz="1800" kern="1200">
+                <a:solidFill>
+                  <a:schemeClr val="tx1"/>
+                </a:solidFill>
+                <a:latin typeface="+mn-lt"/>
+                <a:ea typeface="+mn-ea"/>
+                <a:cs typeface="+mn-cs"/>
+              </a:defRPr>
+            </a:lvl9pPr>
+          </a:lstStyle>
+          <a:p>
+            <a:pPr algn="just"/>
+            <a:r>
+              <a:rPr lang="fr-FR" sz="2000" dirty="0" smtClean="0"/>
+              <a:t>App </a:t>
+            </a:r>
+            <a:r>
+              <a:rPr lang="fr-FR" sz="2000" dirty="0" err="1" smtClean="0"/>
+              <a:t>previews</a:t>
+            </a:r>
+            <a:endParaRPr lang="fr-FR" sz="2000" dirty="0" smtClean="0"/>
+          </a:p>
+          <a:p>
+            <a:pPr algn="just"/>
+            <a:endParaRPr lang="fr-FR" sz="2000" dirty="0" smtClean="0"/>
+          </a:p>
+          <a:p>
+            <a:pPr algn="just"/>
+            <a:r>
+              <a:rPr lang="fr-FR" sz="2000" dirty="0" smtClean="0"/>
+              <a:t>Apple and Windows </a:t>
+            </a:r>
+            <a:r>
+              <a:rPr lang="fr-FR" sz="2000" dirty="0" err="1" smtClean="0"/>
+              <a:t>download</a:t>
+            </a:r>
+            <a:endParaRPr lang="fr-FR" sz="2000" dirty="0" smtClean="0"/>
+          </a:p>
+          <a:p>
+            <a:pPr algn="just"/>
+            <a:endParaRPr lang="fr-FR" sz="2000" dirty="0" smtClean="0"/>
+          </a:p>
+          <a:p>
+            <a:pPr algn="just"/>
+            <a:r>
+              <a:rPr lang="fr-FR" sz="2000" dirty="0" err="1" smtClean="0"/>
+              <a:t>Accessed</a:t>
+            </a:r>
+            <a:r>
+              <a:rPr lang="fr-FR" sz="2000" dirty="0" smtClean="0"/>
+              <a:t> </a:t>
+            </a:r>
+            <a:r>
+              <a:rPr lang="fr-FR" sz="2000" dirty="0" err="1" smtClean="0"/>
+              <a:t>from</a:t>
+            </a:r>
+            <a:r>
+              <a:rPr lang="fr-FR" sz="2000" dirty="0" smtClean="0"/>
+              <a:t> cellomet.com</a:t>
+            </a:r>
+          </a:p>
+          <a:p>
+            <a:pPr algn="just"/>
+            <a:endParaRPr lang="fr-FR" sz="2000" dirty="0"/>
+          </a:p>
+          <a:p>
+            <a:pPr algn="just"/>
+            <a:r>
+              <a:rPr lang="fr-FR" sz="2000" dirty="0" smtClean="0"/>
+              <a:t>Connexion </a:t>
+            </a:r>
+            <a:r>
+              <a:rPr lang="fr-FR" sz="2000" dirty="0" err="1" smtClean="0"/>
+              <a:t>button</a:t>
+            </a:r>
+            <a:r>
+              <a:rPr lang="fr-FR" sz="2000" dirty="0" smtClean="0"/>
+              <a:t> for the client</a:t>
+            </a:r>
+          </a:p>
+          <a:p>
+            <a:pPr marL="0" indent="0" algn="just">
+              <a:buNone/>
+            </a:pPr>
+            <a:endParaRPr lang="fr-FR" sz="2000" dirty="0" smtClean="0"/>
+          </a:p>
+        </p:txBody>
+      </p:sp>
+    </p:spTree>
+    <p:extLst>
+      <p:ext uri="{BB962C8B-B14F-4D97-AF65-F5344CB8AC3E}">
+        <p14:creationId xmlns:p14="http://schemas.microsoft.com/office/powerpoint/2010/main" val="57920603"/>
+      </p:ext>
+    </p:extLst>
+  </p:cSld>
+  <p:clrMapOvr>
+    <a:masterClrMapping/>
+  </p:clrMapOvr>
+  <p:timing>
+    <p:tnLst>
+      <p:par>
+        <p:cTn id="1" dur="indefinite" restart="never" nodeType="tmRoot"/>
+      </p:par>
+    </p:tnLst>
+  </p:timing>
+</p:sld>
+</file>
+
+<file path=ppt/slides/slide11.xml><?xml version="1.0" encoding="utf-8"?>
+<p:sld xmlns:a="http://schemas.openxmlformats.org/drawingml/2006/main" xmlns:r="http://schemas.openxmlformats.org/officeDocument/2006/relationships" xmlns:p="http://schemas.openxmlformats.org/presentationml/2006/main">
+  <p:cSld>
+    <p:spTree>
+      <p:nvGrpSpPr>
+        <p:cNvPr id="1" name=""/>
+        <p:cNvGrpSpPr/>
+        <p:nvPr/>
+      </p:nvGrpSpPr>
+      <p:grpSpPr>
+        <a:xfrm>
+          <a:off x="0" y="0"/>
+          <a:ext cx="0" cy="0"/>
+          <a:chOff x="0" y="0"/>
+          <a:chExt cx="0" cy="0"/>
+        </a:xfrm>
+      </p:grpSpPr>
+      <p:sp>
+        <p:nvSpPr>
           <p:cNvPr id="24" name="Rectangle 23"/>
           <p:cNvSpPr/>
           <p:nvPr/>
@@ -16304,7 +16709,7 @@
             <a:fld id="{813506F1-DB5F-4FC9-88BA-B486F30FE4BF}" type="slidenum">
               <a:rPr lang="fr-FR" smtClean="0"/>
               <a:pPr/>
-              <a:t>9</a:t>
+              <a:t>10</a:t>
             </a:fld>
             <a:endParaRPr lang="fr-FR" dirty="0"/>
           </a:p>
@@ -25020,6 +25425,205 @@
       </p:grpSpPr>
       <p:sp>
         <p:nvSpPr>
+          <p:cNvPr id="15" name="Rounded Rectangle 14"/>
+          <p:cNvSpPr/>
+          <p:nvPr/>
+        </p:nvSpPr>
+        <p:spPr>
+          <a:xfrm>
+            <a:off x="3772360" y="1718144"/>
+            <a:ext cx="8381540" cy="5107848"/>
+          </a:xfrm>
+          <a:prstGeom prst="roundRect">
+            <a:avLst/>
+          </a:prstGeom>
+          <a:solidFill>
+            <a:schemeClr val="bg2">
+              <a:lumMod val="90000"/>
+            </a:schemeClr>
+          </a:solidFill>
+          <a:ln>
+            <a:solidFill>
+              <a:schemeClr val="tx1"/>
+            </a:solidFill>
+          </a:ln>
+        </p:spPr>
+        <p:style>
+          <a:lnRef idx="2">
+            <a:schemeClr val="accent1">
+              <a:shade val="50000"/>
+            </a:schemeClr>
+          </a:lnRef>
+          <a:fillRef idx="1">
+            <a:schemeClr val="accent1"/>
+          </a:fillRef>
+          <a:effectRef idx="0">
+            <a:schemeClr val="accent1"/>
+          </a:effectRef>
+          <a:fontRef idx="minor">
+            <a:schemeClr val="lt1"/>
+          </a:fontRef>
+        </p:style>
+        <p:txBody>
+          <a:bodyPr rtlCol="0" anchor="ctr"/>
+          <a:lstStyle/>
+          <a:p>
+            <a:pPr algn="ctr"/>
+            <a:endParaRPr lang="en-CA"/>
+          </a:p>
+        </p:txBody>
+      </p:sp>
+      <p:pic>
+        <p:nvPicPr>
+          <p:cNvPr id="11" name="Picture 10"/>
+          <p:cNvPicPr>
+            <a:picLocks noChangeAspect="1"/>
+          </p:cNvPicPr>
+          <p:nvPr/>
+        </p:nvPicPr>
+        <p:blipFill>
+          <a:blip r:embed="rId2">
+            <a:extLst>
+              <a:ext uri="{28A0092B-C50C-407E-A947-70E740481C1C}">
+                <a14:useLocalDpi xmlns:a14="http://schemas.microsoft.com/office/drawing/2010/main" val="0"/>
+              </a:ext>
+            </a:extLst>
+          </a:blip>
+          <a:stretch>
+            <a:fillRect/>
+          </a:stretch>
+        </p:blipFill>
+        <p:spPr>
+          <a:xfrm>
+            <a:off x="4523410" y="1880191"/>
+            <a:ext cx="7075630" cy="4783754"/>
+          </a:xfrm>
+          <a:prstGeom prst="rect">
+            <a:avLst/>
+          </a:prstGeom>
+        </p:spPr>
+      </p:pic>
+      <p:pic>
+        <p:nvPicPr>
+          <p:cNvPr id="12" name="Picture 11"/>
+          <p:cNvPicPr>
+            <a:picLocks noChangeAspect="1"/>
+          </p:cNvPicPr>
+          <p:nvPr/>
+        </p:nvPicPr>
+        <p:blipFill>
+          <a:blip r:embed="rId3">
+            <a:extLst>
+              <a:ext uri="{28A0092B-C50C-407E-A947-70E740481C1C}">
+                <a14:useLocalDpi xmlns:a14="http://schemas.microsoft.com/office/drawing/2010/main" val="0"/>
+              </a:ext>
+            </a:extLst>
+          </a:blip>
+          <a:stretch>
+            <a:fillRect/>
+          </a:stretch>
+        </p:blipFill>
+        <p:spPr>
+          <a:xfrm>
+            <a:off x="3886284" y="2323303"/>
+            <a:ext cx="8197024" cy="3897530"/>
+          </a:xfrm>
+          <a:prstGeom prst="rect">
+            <a:avLst/>
+          </a:prstGeom>
+        </p:spPr>
+      </p:pic>
+      <p:pic>
+        <p:nvPicPr>
+          <p:cNvPr id="13" name="Picture 12"/>
+          <p:cNvPicPr>
+            <a:picLocks noChangeAspect="1"/>
+          </p:cNvPicPr>
+          <p:nvPr/>
+        </p:nvPicPr>
+        <p:blipFill rotWithShape="1">
+          <a:blip r:embed="rId4">
+            <a:extLst>
+              <a:ext uri="{28A0092B-C50C-407E-A947-70E740481C1C}">
+                <a14:useLocalDpi xmlns:a14="http://schemas.microsoft.com/office/drawing/2010/main" val="0"/>
+              </a:ext>
+            </a:extLst>
+          </a:blip>
+          <a:srcRect r="38189"/>
+          <a:stretch/>
+        </p:blipFill>
+        <p:spPr>
+          <a:xfrm>
+            <a:off x="4240206" y="1960605"/>
+            <a:ext cx="7489180" cy="4608215"/>
+          </a:xfrm>
+          <a:prstGeom prst="rect">
+            <a:avLst/>
+          </a:prstGeom>
+        </p:spPr>
+      </p:pic>
+      <p:pic>
+        <p:nvPicPr>
+          <p:cNvPr id="10" name="Picture 9"/>
+          <p:cNvPicPr>
+            <a:picLocks noChangeAspect="1"/>
+          </p:cNvPicPr>
+          <p:nvPr/>
+        </p:nvPicPr>
+        <p:blipFill>
+          <a:blip r:embed="rId5">
+            <a:extLst>
+              <a:ext uri="{28A0092B-C50C-407E-A947-70E740481C1C}">
+                <a14:useLocalDpi xmlns:a14="http://schemas.microsoft.com/office/drawing/2010/main" val="0"/>
+              </a:ext>
+            </a:extLst>
+          </a:blip>
+          <a:stretch>
+            <a:fillRect/>
+          </a:stretch>
+        </p:blipFill>
+        <p:spPr>
+          <a:xfrm>
+            <a:off x="5325291" y="1718144"/>
+            <a:ext cx="5471869" cy="5107848"/>
+          </a:xfrm>
+          <a:prstGeom prst="rect">
+            <a:avLst/>
+          </a:prstGeom>
+        </p:spPr>
+      </p:pic>
+      <p:pic>
+        <p:nvPicPr>
+          <p:cNvPr id="14" name="Picture 13"/>
+          <p:cNvPicPr>
+            <a:picLocks noChangeAspect="1"/>
+          </p:cNvPicPr>
+          <p:nvPr/>
+        </p:nvPicPr>
+        <p:blipFill>
+          <a:blip r:embed="rId6">
+            <a:extLst>
+              <a:ext uri="{28A0092B-C50C-407E-A947-70E740481C1C}">
+                <a14:useLocalDpi xmlns:a14="http://schemas.microsoft.com/office/drawing/2010/main" val="0"/>
+              </a:ext>
+            </a:extLst>
+          </a:blip>
+          <a:stretch>
+            <a:fillRect/>
+          </a:stretch>
+        </p:blipFill>
+        <p:spPr>
+          <a:xfrm>
+            <a:off x="5710640" y="1803838"/>
+            <a:ext cx="4936460" cy="4936460"/>
+          </a:xfrm>
+          <a:prstGeom prst="rect">
+            <a:avLst/>
+          </a:prstGeom>
+        </p:spPr>
+      </p:pic>
+      <p:sp>
+        <p:nvSpPr>
           <p:cNvPr id="2" name="Slide Number Placeholder 1"/>
           <p:cNvSpPr>
             <a:spLocks noGrp="1"/>
@@ -25037,6 +25641,752 @@
               <a:rPr lang="fr-FR" smtClean="0"/>
               <a:pPr/>
               <a:t>5</a:t>
+            </a:fld>
+            <a:endParaRPr lang="fr-FR" dirty="0"/>
+          </a:p>
+        </p:txBody>
+      </p:sp>
+      <p:sp>
+        <p:nvSpPr>
+          <p:cNvPr id="3" name="Title 1"/>
+          <p:cNvSpPr txBox="1">
+            <a:spLocks/>
+          </p:cNvSpPr>
+          <p:nvPr/>
+        </p:nvSpPr>
+        <p:spPr>
+          <a:xfrm>
+            <a:off x="648394" y="2101646"/>
+            <a:ext cx="2573777" cy="733833"/>
+          </a:xfrm>
+          <a:prstGeom prst="rect">
+            <a:avLst/>
+          </a:prstGeom>
+        </p:spPr>
+        <p:txBody>
+          <a:bodyPr/>
+          <a:lstStyle>
+            <a:lvl1pPr algn="l" defTabSz="914400" rtl="0" eaLnBrk="1" latinLnBrk="0" hangingPunct="1">
+              <a:lnSpc>
+                <a:spcPct val="90000"/>
+              </a:lnSpc>
+              <a:spcBef>
+                <a:spcPct val="0"/>
+              </a:spcBef>
+              <a:buNone/>
+              <a:defRPr sz="4400" kern="1200">
+                <a:solidFill>
+                  <a:schemeClr val="tx1"/>
+                </a:solidFill>
+                <a:latin typeface="+mj-lt"/>
+                <a:ea typeface="+mj-ea"/>
+                <a:cs typeface="+mj-cs"/>
+              </a:defRPr>
+            </a:lvl1pPr>
+          </a:lstStyle>
+          <a:p>
+            <a:r>
+              <a:rPr lang="fr-FR" dirty="0" err="1" smtClean="0"/>
+              <a:t>GitKraken</a:t>
+            </a:r>
+            <a:endParaRPr lang="fr-FR" dirty="0"/>
+          </a:p>
+        </p:txBody>
+      </p:sp>
+      <p:sp>
+        <p:nvSpPr>
+          <p:cNvPr id="4" name="Content Placeholder 2"/>
+          <p:cNvSpPr txBox="1">
+            <a:spLocks/>
+          </p:cNvSpPr>
+          <p:nvPr/>
+        </p:nvSpPr>
+        <p:spPr>
+          <a:xfrm>
+            <a:off x="1236683" y="2835479"/>
+            <a:ext cx="3706792" cy="3842158"/>
+          </a:xfrm>
+          <a:prstGeom prst="rect">
+            <a:avLst/>
+          </a:prstGeom>
+        </p:spPr>
+        <p:txBody>
+          <a:bodyPr>
+            <a:normAutofit/>
+          </a:bodyPr>
+          <a:lstStyle>
+            <a:lvl1pPr marL="228600" indent="-228600" algn="l" defTabSz="914400" rtl="0" eaLnBrk="1" latinLnBrk="0" hangingPunct="1">
+              <a:lnSpc>
+                <a:spcPct val="90000"/>
+              </a:lnSpc>
+              <a:spcBef>
+                <a:spcPts val="1000"/>
+              </a:spcBef>
+              <a:buFont typeface="Arial" panose="020B0604020202020204" pitchFamily="34" charset="0"/>
+              <a:buChar char="•"/>
+              <a:defRPr sz="2800" kern="1200">
+                <a:solidFill>
+                  <a:schemeClr val="tx1"/>
+                </a:solidFill>
+                <a:latin typeface="+mn-lt"/>
+                <a:ea typeface="+mn-ea"/>
+                <a:cs typeface="+mn-cs"/>
+              </a:defRPr>
+            </a:lvl1pPr>
+            <a:lvl2pPr marL="685800" indent="-228600" algn="l" defTabSz="914400" rtl="0" eaLnBrk="1" latinLnBrk="0" hangingPunct="1">
+              <a:lnSpc>
+                <a:spcPct val="90000"/>
+              </a:lnSpc>
+              <a:spcBef>
+                <a:spcPts val="500"/>
+              </a:spcBef>
+              <a:buFont typeface="Arial" panose="020B0604020202020204" pitchFamily="34" charset="0"/>
+              <a:buChar char="•"/>
+              <a:defRPr sz="2400" kern="1200">
+                <a:solidFill>
+                  <a:schemeClr val="tx1"/>
+                </a:solidFill>
+                <a:latin typeface="+mn-lt"/>
+                <a:ea typeface="+mn-ea"/>
+                <a:cs typeface="+mn-cs"/>
+              </a:defRPr>
+            </a:lvl2pPr>
+            <a:lvl3pPr marL="1143000" indent="-228600" algn="l" defTabSz="914400" rtl="0" eaLnBrk="1" latinLnBrk="0" hangingPunct="1">
+              <a:lnSpc>
+                <a:spcPct val="90000"/>
+              </a:lnSpc>
+              <a:spcBef>
+                <a:spcPts val="500"/>
+              </a:spcBef>
+              <a:buFont typeface="Arial" panose="020B0604020202020204" pitchFamily="34" charset="0"/>
+              <a:buChar char="•"/>
+              <a:defRPr sz="2000" kern="1200">
+                <a:solidFill>
+                  <a:schemeClr val="tx1"/>
+                </a:solidFill>
+                <a:latin typeface="+mn-lt"/>
+                <a:ea typeface="+mn-ea"/>
+                <a:cs typeface="+mn-cs"/>
+              </a:defRPr>
+            </a:lvl3pPr>
+            <a:lvl4pPr marL="1600200" indent="-228600" algn="l" defTabSz="914400" rtl="0" eaLnBrk="1" latinLnBrk="0" hangingPunct="1">
+              <a:lnSpc>
+                <a:spcPct val="90000"/>
+              </a:lnSpc>
+              <a:spcBef>
+                <a:spcPts val="500"/>
+              </a:spcBef>
+              <a:buFont typeface="Arial" panose="020B0604020202020204" pitchFamily="34" charset="0"/>
+              <a:buChar char="•"/>
+              <a:defRPr sz="1800" kern="1200">
+                <a:solidFill>
+                  <a:schemeClr val="tx1"/>
+                </a:solidFill>
+                <a:latin typeface="+mn-lt"/>
+                <a:ea typeface="+mn-ea"/>
+                <a:cs typeface="+mn-cs"/>
+              </a:defRPr>
+            </a:lvl4pPr>
+            <a:lvl5pPr marL="2057400" indent="-228600" algn="l" defTabSz="914400" rtl="0" eaLnBrk="1" latinLnBrk="0" hangingPunct="1">
+              <a:lnSpc>
+                <a:spcPct val="90000"/>
+              </a:lnSpc>
+              <a:spcBef>
+                <a:spcPts val="500"/>
+              </a:spcBef>
+              <a:buFont typeface="Arial" panose="020B0604020202020204" pitchFamily="34" charset="0"/>
+              <a:buChar char="•"/>
+              <a:defRPr sz="1800" kern="1200">
+                <a:solidFill>
+                  <a:schemeClr val="tx1"/>
+                </a:solidFill>
+                <a:latin typeface="+mn-lt"/>
+                <a:ea typeface="+mn-ea"/>
+                <a:cs typeface="+mn-cs"/>
+              </a:defRPr>
+            </a:lvl5pPr>
+            <a:lvl6pPr marL="2514600" indent="-228600" algn="l" defTabSz="914400" rtl="0" eaLnBrk="1" latinLnBrk="0" hangingPunct="1">
+              <a:lnSpc>
+                <a:spcPct val="90000"/>
+              </a:lnSpc>
+              <a:spcBef>
+                <a:spcPts val="500"/>
+              </a:spcBef>
+              <a:buFont typeface="Arial" panose="020B0604020202020204" pitchFamily="34" charset="0"/>
+              <a:buChar char="•"/>
+              <a:defRPr sz="1800" kern="1200">
+                <a:solidFill>
+                  <a:schemeClr val="tx1"/>
+                </a:solidFill>
+                <a:latin typeface="+mn-lt"/>
+                <a:ea typeface="+mn-ea"/>
+                <a:cs typeface="+mn-cs"/>
+              </a:defRPr>
+            </a:lvl6pPr>
+            <a:lvl7pPr marL="2971800" indent="-228600" algn="l" defTabSz="914400" rtl="0" eaLnBrk="1" latinLnBrk="0" hangingPunct="1">
+              <a:lnSpc>
+                <a:spcPct val="90000"/>
+              </a:lnSpc>
+              <a:spcBef>
+                <a:spcPts val="500"/>
+              </a:spcBef>
+              <a:buFont typeface="Arial" panose="020B0604020202020204" pitchFamily="34" charset="0"/>
+              <a:buChar char="•"/>
+              <a:defRPr sz="1800" kern="1200">
+                <a:solidFill>
+                  <a:schemeClr val="tx1"/>
+                </a:solidFill>
+                <a:latin typeface="+mn-lt"/>
+                <a:ea typeface="+mn-ea"/>
+                <a:cs typeface="+mn-cs"/>
+              </a:defRPr>
+            </a:lvl7pPr>
+            <a:lvl8pPr marL="3429000" indent="-228600" algn="l" defTabSz="914400" rtl="0" eaLnBrk="1" latinLnBrk="0" hangingPunct="1">
+              <a:lnSpc>
+                <a:spcPct val="90000"/>
+              </a:lnSpc>
+              <a:spcBef>
+                <a:spcPts val="500"/>
+              </a:spcBef>
+              <a:buFont typeface="Arial" panose="020B0604020202020204" pitchFamily="34" charset="0"/>
+              <a:buChar char="•"/>
+              <a:defRPr sz="1800" kern="1200">
+                <a:solidFill>
+                  <a:schemeClr val="tx1"/>
+                </a:solidFill>
+                <a:latin typeface="+mn-lt"/>
+                <a:ea typeface="+mn-ea"/>
+                <a:cs typeface="+mn-cs"/>
+              </a:defRPr>
+            </a:lvl8pPr>
+            <a:lvl9pPr marL="3886200" indent="-228600" algn="l" defTabSz="914400" rtl="0" eaLnBrk="1" latinLnBrk="0" hangingPunct="1">
+              <a:lnSpc>
+                <a:spcPct val="90000"/>
+              </a:lnSpc>
+              <a:spcBef>
+                <a:spcPts val="500"/>
+              </a:spcBef>
+              <a:buFont typeface="Arial" panose="020B0604020202020204" pitchFamily="34" charset="0"/>
+              <a:buChar char="•"/>
+              <a:defRPr sz="1800" kern="1200">
+                <a:solidFill>
+                  <a:schemeClr val="tx1"/>
+                </a:solidFill>
+                <a:latin typeface="+mn-lt"/>
+                <a:ea typeface="+mn-ea"/>
+                <a:cs typeface="+mn-cs"/>
+              </a:defRPr>
+            </a:lvl9pPr>
+          </a:lstStyle>
+          <a:p>
+            <a:r>
+              <a:rPr lang="fr-FR" sz="2000" dirty="0" err="1" smtClean="0"/>
+              <a:t>KanBan</a:t>
+            </a:r>
+            <a:endParaRPr lang="fr-FR" sz="2000" dirty="0"/>
+          </a:p>
+          <a:p>
+            <a:pPr lvl="1"/>
+            <a:r>
+              <a:rPr lang="fr-FR" sz="1600" dirty="0" err="1" smtClean="0"/>
+              <a:t>Traditional</a:t>
+            </a:r>
+            <a:endParaRPr lang="fr-FR" sz="1600" dirty="0" smtClean="0"/>
+          </a:p>
+          <a:p>
+            <a:pPr lvl="1"/>
+            <a:r>
+              <a:rPr lang="fr-FR" sz="1600" dirty="0" err="1" smtClean="0"/>
+              <a:t>Calendar</a:t>
+            </a:r>
+            <a:endParaRPr lang="fr-FR" sz="1600" dirty="0" smtClean="0"/>
+          </a:p>
+          <a:p>
+            <a:pPr lvl="1"/>
+            <a:r>
+              <a:rPr lang="fr-FR" sz="1600" dirty="0" err="1" smtClean="0"/>
+              <a:t>Timeline</a:t>
+            </a:r>
+            <a:endParaRPr lang="fr-FR" sz="1600" dirty="0"/>
+          </a:p>
+          <a:p>
+            <a:endParaRPr lang="fr-FR" sz="2000" dirty="0"/>
+          </a:p>
+          <a:p>
+            <a:r>
+              <a:rPr lang="fr-FR" sz="2000" dirty="0" err="1" smtClean="0"/>
+              <a:t>Github</a:t>
+            </a:r>
+            <a:r>
+              <a:rPr lang="fr-FR" sz="2000" dirty="0" smtClean="0"/>
+              <a:t> GUI</a:t>
+            </a:r>
+          </a:p>
+          <a:p>
+            <a:endParaRPr lang="fr-FR" sz="2000" dirty="0" smtClean="0"/>
+          </a:p>
+          <a:p>
+            <a:r>
+              <a:rPr lang="fr-FR" sz="2000" dirty="0" err="1" smtClean="0"/>
+              <a:t>Merge</a:t>
+            </a:r>
+            <a:r>
+              <a:rPr lang="fr-FR" sz="2000" dirty="0" smtClean="0"/>
+              <a:t> </a:t>
+            </a:r>
+            <a:r>
+              <a:rPr lang="fr-FR" sz="2000" dirty="0" err="1" smtClean="0"/>
+              <a:t>conflict</a:t>
+            </a:r>
+            <a:r>
+              <a:rPr lang="fr-FR" sz="2000" dirty="0" smtClean="0"/>
+              <a:t> </a:t>
+            </a:r>
+            <a:r>
+              <a:rPr lang="fr-FR" sz="2000" dirty="0" err="1" smtClean="0"/>
+              <a:t>finder</a:t>
+            </a:r>
+            <a:endParaRPr lang="fr-FR" sz="2000" dirty="0" smtClean="0"/>
+          </a:p>
+          <a:p>
+            <a:pPr marL="0" indent="0">
+              <a:buNone/>
+            </a:pPr>
+            <a:endParaRPr lang="fr-FR" sz="2000" dirty="0" smtClean="0"/>
+          </a:p>
+        </p:txBody>
+      </p:sp>
+    </p:spTree>
+    <p:extLst>
+      <p:ext uri="{BB962C8B-B14F-4D97-AF65-F5344CB8AC3E}">
+        <p14:creationId xmlns:p14="http://schemas.microsoft.com/office/powerpoint/2010/main" val="347486927"/>
+      </p:ext>
+    </p:extLst>
+  </p:cSld>
+  <p:clrMapOvr>
+    <a:masterClrMapping/>
+  </p:clrMapOvr>
+  <p:timing>
+    <p:tnLst>
+      <p:par>
+        <p:cTn id="1" dur="indefinite" restart="never" nodeType="tmRoot">
+          <p:childTnLst>
+            <p:seq concurrent="1" nextAc="seek">
+              <p:cTn id="2" dur="indefinite" nodeType="mainSeq">
+                <p:childTnLst>
+                  <p:par>
+                    <p:cTn id="3" fill="hold">
+                      <p:stCondLst>
+                        <p:cond delay="indefinite"/>
+                      </p:stCondLst>
+                      <p:childTnLst>
+                        <p:par>
+                          <p:cTn id="4" fill="hold">
+                            <p:stCondLst>
+                              <p:cond delay="0"/>
+                            </p:stCondLst>
+                            <p:childTnLst>
+                              <p:par>
+                                <p:cTn id="5" presetID="10" presetClass="exit" presetSubtype="0" fill="hold" nodeType="clickEffect">
+                                  <p:stCondLst>
+                                    <p:cond delay="0"/>
+                                  </p:stCondLst>
+                                  <p:childTnLst>
+                                    <p:animEffect transition="out" filter="fade">
+                                      <p:cBhvr>
+                                        <p:cTn id="6" dur="500"/>
+                                        <p:tgtEl>
+                                          <p:spTgt spid="14"/>
+                                        </p:tgtEl>
+                                      </p:cBhvr>
+                                    </p:animEffect>
+                                    <p:set>
+                                      <p:cBhvr>
+                                        <p:cTn id="7" dur="1" fill="hold">
+                                          <p:stCondLst>
+                                            <p:cond delay="499"/>
+                                          </p:stCondLst>
+                                        </p:cTn>
+                                        <p:tgtEl>
+                                          <p:spTgt spid="14"/>
+                                        </p:tgtEl>
+                                        <p:attrNameLst>
+                                          <p:attrName>style.visibility</p:attrName>
+                                        </p:attrNameLst>
+                                      </p:cBhvr>
+                                      <p:to>
+                                        <p:strVal val="hidden"/>
+                                      </p:to>
+                                    </p:set>
+                                  </p:childTnLst>
+                                </p:cTn>
+                              </p:par>
+                              <p:par>
+                                <p:cTn id="8" presetID="10" presetClass="entr" presetSubtype="0" fill="hold" nodeType="withEffect">
+                                  <p:stCondLst>
+                                    <p:cond delay="0"/>
+                                  </p:stCondLst>
+                                  <p:childTnLst>
+                                    <p:set>
+                                      <p:cBhvr>
+                                        <p:cTn id="9" dur="1" fill="hold">
+                                          <p:stCondLst>
+                                            <p:cond delay="0"/>
+                                          </p:stCondLst>
+                                        </p:cTn>
+                                        <p:tgtEl>
+                                          <p:spTgt spid="10"/>
+                                        </p:tgtEl>
+                                        <p:attrNameLst>
+                                          <p:attrName>style.visibility</p:attrName>
+                                        </p:attrNameLst>
+                                      </p:cBhvr>
+                                      <p:to>
+                                        <p:strVal val="visible"/>
+                                      </p:to>
+                                    </p:set>
+                                    <p:animEffect transition="in" filter="fade">
+                                      <p:cBhvr>
+                                        <p:cTn id="10" dur="500"/>
+                                        <p:tgtEl>
+                                          <p:spTgt spid="10"/>
+                                        </p:tgtEl>
+                                      </p:cBhvr>
+                                    </p:animEffect>
+                                  </p:childTnLst>
+                                </p:cTn>
+                              </p:par>
+                            </p:childTnLst>
+                          </p:cTn>
+                        </p:par>
+                      </p:childTnLst>
+                    </p:cTn>
+                  </p:par>
+                  <p:par>
+                    <p:cTn id="11" fill="hold">
+                      <p:stCondLst>
+                        <p:cond delay="indefinite"/>
+                      </p:stCondLst>
+                      <p:childTnLst>
+                        <p:par>
+                          <p:cTn id="12" fill="hold">
+                            <p:stCondLst>
+                              <p:cond delay="0"/>
+                            </p:stCondLst>
+                            <p:childTnLst>
+                              <p:par>
+                                <p:cTn id="13" presetID="10" presetClass="exit" presetSubtype="0" fill="hold" nodeType="clickEffect">
+                                  <p:stCondLst>
+                                    <p:cond delay="0"/>
+                                  </p:stCondLst>
+                                  <p:childTnLst>
+                                    <p:animEffect transition="out" filter="fade">
+                                      <p:cBhvr>
+                                        <p:cTn id="14" dur="500"/>
+                                        <p:tgtEl>
+                                          <p:spTgt spid="10"/>
+                                        </p:tgtEl>
+                                      </p:cBhvr>
+                                    </p:animEffect>
+                                    <p:set>
+                                      <p:cBhvr>
+                                        <p:cTn id="15" dur="1" fill="hold">
+                                          <p:stCondLst>
+                                            <p:cond delay="499"/>
+                                          </p:stCondLst>
+                                        </p:cTn>
+                                        <p:tgtEl>
+                                          <p:spTgt spid="10"/>
+                                        </p:tgtEl>
+                                        <p:attrNameLst>
+                                          <p:attrName>style.visibility</p:attrName>
+                                        </p:attrNameLst>
+                                      </p:cBhvr>
+                                      <p:to>
+                                        <p:strVal val="hidden"/>
+                                      </p:to>
+                                    </p:set>
+                                  </p:childTnLst>
+                                </p:cTn>
+                              </p:par>
+                              <p:par>
+                                <p:cTn id="16" presetID="10" presetClass="entr" presetSubtype="0" fill="hold" nodeType="withEffect">
+                                  <p:stCondLst>
+                                    <p:cond delay="0"/>
+                                  </p:stCondLst>
+                                  <p:childTnLst>
+                                    <p:set>
+                                      <p:cBhvr>
+                                        <p:cTn id="17" dur="1" fill="hold">
+                                          <p:stCondLst>
+                                            <p:cond delay="0"/>
+                                          </p:stCondLst>
+                                        </p:cTn>
+                                        <p:tgtEl>
+                                          <p:spTgt spid="11"/>
+                                        </p:tgtEl>
+                                        <p:attrNameLst>
+                                          <p:attrName>style.visibility</p:attrName>
+                                        </p:attrNameLst>
+                                      </p:cBhvr>
+                                      <p:to>
+                                        <p:strVal val="visible"/>
+                                      </p:to>
+                                    </p:set>
+                                    <p:animEffect transition="in" filter="fade">
+                                      <p:cBhvr>
+                                        <p:cTn id="18" dur="500"/>
+                                        <p:tgtEl>
+                                          <p:spTgt spid="11"/>
+                                        </p:tgtEl>
+                                      </p:cBhvr>
+                                    </p:animEffect>
+                                  </p:childTnLst>
+                                </p:cTn>
+                              </p:par>
+                            </p:childTnLst>
+                          </p:cTn>
+                        </p:par>
+                      </p:childTnLst>
+                    </p:cTn>
+                  </p:par>
+                  <p:par>
+                    <p:cTn id="19" fill="hold">
+                      <p:stCondLst>
+                        <p:cond delay="indefinite"/>
+                      </p:stCondLst>
+                      <p:childTnLst>
+                        <p:par>
+                          <p:cTn id="20" fill="hold">
+                            <p:stCondLst>
+                              <p:cond delay="0"/>
+                            </p:stCondLst>
+                            <p:childTnLst>
+                              <p:par>
+                                <p:cTn id="21" presetID="10" presetClass="exit" presetSubtype="0" fill="hold" nodeType="clickEffect">
+                                  <p:stCondLst>
+                                    <p:cond delay="0"/>
+                                  </p:stCondLst>
+                                  <p:childTnLst>
+                                    <p:animEffect transition="out" filter="fade">
+                                      <p:cBhvr>
+                                        <p:cTn id="22" dur="500"/>
+                                        <p:tgtEl>
+                                          <p:spTgt spid="11"/>
+                                        </p:tgtEl>
+                                      </p:cBhvr>
+                                    </p:animEffect>
+                                    <p:set>
+                                      <p:cBhvr>
+                                        <p:cTn id="23" dur="1" fill="hold">
+                                          <p:stCondLst>
+                                            <p:cond delay="499"/>
+                                          </p:stCondLst>
+                                        </p:cTn>
+                                        <p:tgtEl>
+                                          <p:spTgt spid="11"/>
+                                        </p:tgtEl>
+                                        <p:attrNameLst>
+                                          <p:attrName>style.visibility</p:attrName>
+                                        </p:attrNameLst>
+                                      </p:cBhvr>
+                                      <p:to>
+                                        <p:strVal val="hidden"/>
+                                      </p:to>
+                                    </p:set>
+                                  </p:childTnLst>
+                                </p:cTn>
+                              </p:par>
+                              <p:par>
+                                <p:cTn id="24" presetID="10" presetClass="entr" presetSubtype="0" fill="hold" nodeType="withEffect">
+                                  <p:stCondLst>
+                                    <p:cond delay="0"/>
+                                  </p:stCondLst>
+                                  <p:childTnLst>
+                                    <p:set>
+                                      <p:cBhvr>
+                                        <p:cTn id="25" dur="1" fill="hold">
+                                          <p:stCondLst>
+                                            <p:cond delay="0"/>
+                                          </p:stCondLst>
+                                        </p:cTn>
+                                        <p:tgtEl>
+                                          <p:spTgt spid="12"/>
+                                        </p:tgtEl>
+                                        <p:attrNameLst>
+                                          <p:attrName>style.visibility</p:attrName>
+                                        </p:attrNameLst>
+                                      </p:cBhvr>
+                                      <p:to>
+                                        <p:strVal val="visible"/>
+                                      </p:to>
+                                    </p:set>
+                                    <p:animEffect transition="in" filter="fade">
+                                      <p:cBhvr>
+                                        <p:cTn id="26" dur="500"/>
+                                        <p:tgtEl>
+                                          <p:spTgt spid="12"/>
+                                        </p:tgtEl>
+                                      </p:cBhvr>
+                                    </p:animEffect>
+                                  </p:childTnLst>
+                                </p:cTn>
+                              </p:par>
+                            </p:childTnLst>
+                          </p:cTn>
+                        </p:par>
+                      </p:childTnLst>
+                    </p:cTn>
+                  </p:par>
+                  <p:par>
+                    <p:cTn id="27" fill="hold">
+                      <p:stCondLst>
+                        <p:cond delay="indefinite"/>
+                      </p:stCondLst>
+                      <p:childTnLst>
+                        <p:par>
+                          <p:cTn id="28" fill="hold">
+                            <p:stCondLst>
+                              <p:cond delay="0"/>
+                            </p:stCondLst>
+                            <p:childTnLst>
+                              <p:par>
+                                <p:cTn id="29" presetID="10" presetClass="exit" presetSubtype="0" fill="hold" nodeType="clickEffect">
+                                  <p:stCondLst>
+                                    <p:cond delay="0"/>
+                                  </p:stCondLst>
+                                  <p:childTnLst>
+                                    <p:animEffect transition="out" filter="fade">
+                                      <p:cBhvr>
+                                        <p:cTn id="30" dur="500"/>
+                                        <p:tgtEl>
+                                          <p:spTgt spid="12"/>
+                                        </p:tgtEl>
+                                      </p:cBhvr>
+                                    </p:animEffect>
+                                    <p:set>
+                                      <p:cBhvr>
+                                        <p:cTn id="31" dur="1" fill="hold">
+                                          <p:stCondLst>
+                                            <p:cond delay="499"/>
+                                          </p:stCondLst>
+                                        </p:cTn>
+                                        <p:tgtEl>
+                                          <p:spTgt spid="12"/>
+                                        </p:tgtEl>
+                                        <p:attrNameLst>
+                                          <p:attrName>style.visibility</p:attrName>
+                                        </p:attrNameLst>
+                                      </p:cBhvr>
+                                      <p:to>
+                                        <p:strVal val="hidden"/>
+                                      </p:to>
+                                    </p:set>
+                                  </p:childTnLst>
+                                </p:cTn>
+                              </p:par>
+                              <p:par>
+                                <p:cTn id="32" presetID="10" presetClass="entr" presetSubtype="0" fill="hold" nodeType="withEffect">
+                                  <p:stCondLst>
+                                    <p:cond delay="0"/>
+                                  </p:stCondLst>
+                                  <p:childTnLst>
+                                    <p:set>
+                                      <p:cBhvr>
+                                        <p:cTn id="33" dur="1" fill="hold">
+                                          <p:stCondLst>
+                                            <p:cond delay="0"/>
+                                          </p:stCondLst>
+                                        </p:cTn>
+                                        <p:tgtEl>
+                                          <p:spTgt spid="13"/>
+                                        </p:tgtEl>
+                                        <p:attrNameLst>
+                                          <p:attrName>style.visibility</p:attrName>
+                                        </p:attrNameLst>
+                                      </p:cBhvr>
+                                      <p:to>
+                                        <p:strVal val="visible"/>
+                                      </p:to>
+                                    </p:set>
+                                    <p:animEffect transition="in" filter="fade">
+                                      <p:cBhvr>
+                                        <p:cTn id="34" dur="500"/>
+                                        <p:tgtEl>
+                                          <p:spTgt spid="13"/>
+                                        </p:tgtEl>
+                                      </p:cBhvr>
+                                    </p:animEffect>
+                                  </p:childTnLst>
+                                </p:cTn>
+                              </p:par>
+                            </p:childTnLst>
+                          </p:cTn>
+                        </p:par>
+                      </p:childTnLst>
+                    </p:cTn>
+                  </p:par>
+                </p:childTnLst>
+              </p:cTn>
+              <p:prevCondLst>
+                <p:cond evt="onPrev" delay="0">
+                  <p:tgtEl>
+                    <p:sldTgt/>
+                  </p:tgtEl>
+                </p:cond>
+              </p:prevCondLst>
+              <p:nextCondLst>
+                <p:cond evt="onNext" delay="0">
+                  <p:tgtEl>
+                    <p:sldTgt/>
+                  </p:tgtEl>
+                </p:cond>
+              </p:nextCondLst>
+            </p:seq>
+          </p:childTnLst>
+        </p:cTn>
+      </p:par>
+    </p:tnLst>
+  </p:timing>
+</p:sld>
+</file>
+
+<file path=ppt/slides/slide7.xml><?xml version="1.0" encoding="utf-8"?>
+<p:sld xmlns:a="http://schemas.openxmlformats.org/drawingml/2006/main" xmlns:r="http://schemas.openxmlformats.org/officeDocument/2006/relationships" xmlns:p="http://schemas.openxmlformats.org/presentationml/2006/main">
+  <p:cSld>
+    <p:spTree>
+      <p:nvGrpSpPr>
+        <p:cNvPr id="1" name=""/>
+        <p:cNvGrpSpPr/>
+        <p:nvPr/>
+      </p:nvGrpSpPr>
+      <p:grpSpPr>
+        <a:xfrm>
+          <a:off x="0" y="0"/>
+          <a:ext cx="0" cy="0"/>
+          <a:chOff x="0" y="0"/>
+          <a:chExt cx="0" cy="0"/>
+        </a:xfrm>
+      </p:grpSpPr>
+      <p:sp>
+        <p:nvSpPr>
+          <p:cNvPr id="2" name="Slide Number Placeholder 1"/>
+          <p:cNvSpPr>
+            <a:spLocks noGrp="1"/>
+          </p:cNvSpPr>
+          <p:nvPr>
+            <p:ph type="sldNum" sz="quarter" idx="4"/>
+          </p:nvPr>
+        </p:nvSpPr>
+        <p:spPr/>
+        <p:txBody>
+          <a:bodyPr/>
+          <a:lstStyle/>
+          <a:p>
+            <a:fld id="{813506F1-DB5F-4FC9-88BA-B486F30FE4BF}" type="slidenum">
+              <a:rPr lang="fr-FR" smtClean="0"/>
+              <a:pPr/>
+              <a:t>6</a:t>
             </a:fld>
             <a:endParaRPr lang="fr-FR" dirty="0"/>
           </a:p>
@@ -27806,7 +29156,7 @@
 </p:sld>
 </file>
 
-<file path=ppt/slides/slide7.xml><?xml version="1.0" encoding="utf-8"?>
+<file path=ppt/slides/slide8.xml><?xml version="1.0" encoding="utf-8"?>
 <p:sld xmlns:a="http://schemas.openxmlformats.org/drawingml/2006/main" xmlns:r="http://schemas.openxmlformats.org/officeDocument/2006/relationships" xmlns:p="http://schemas.openxmlformats.org/presentationml/2006/main">
   <p:cSld>
     <p:spTree>
@@ -27841,7 +29191,7 @@
             <a:fld id="{813506F1-DB5F-4FC9-88BA-B486F30FE4BF}" type="slidenum">
               <a:rPr lang="fr-FR" smtClean="0"/>
               <a:pPr/>
-              <a:t>6</a:t>
+              <a:t>7</a:t>
             </a:fld>
             <a:endParaRPr lang="fr-FR" dirty="0"/>
           </a:p>
@@ -28502,7 +29852,7 @@
 </p:sld>
 </file>
 
-<file path=ppt/slides/slide8.xml><?xml version="1.0" encoding="utf-8"?>
+<file path=ppt/slides/slide9.xml><?xml version="1.0" encoding="utf-8"?>
 <p:sld xmlns:a="http://schemas.openxmlformats.org/drawingml/2006/main" xmlns:r="http://schemas.openxmlformats.org/officeDocument/2006/relationships" xmlns:p="http://schemas.openxmlformats.org/presentationml/2006/main">
   <p:cSld>
     <p:spTree>
@@ -28537,7 +29887,7 @@
             <a:fld id="{813506F1-DB5F-4FC9-88BA-B486F30FE4BF}" type="slidenum">
               <a:rPr lang="fr-FR" smtClean="0"/>
               <a:pPr/>
-              <a:t>7</a:t>
+              <a:t>8</a:t>
             </a:fld>
             <a:endParaRPr lang="fr-FR" dirty="0"/>
           </a:p>
@@ -28697,410 +30047,6 @@
     <p:extLst>
       <p:ext uri="{BB962C8B-B14F-4D97-AF65-F5344CB8AC3E}">
         <p14:creationId xmlns:p14="http://schemas.microsoft.com/office/powerpoint/2010/main" val="3275783859"/>
-      </p:ext>
-    </p:extLst>
-  </p:cSld>
-  <p:clrMapOvr>
-    <a:masterClrMapping/>
-  </p:clrMapOvr>
-  <p:timing>
-    <p:tnLst>
-      <p:par>
-        <p:cTn id="1" dur="indefinite" restart="never" nodeType="tmRoot"/>
-      </p:par>
-    </p:tnLst>
-  </p:timing>
-</p:sld>
-</file>
-
-<file path=ppt/slides/slide9.xml><?xml version="1.0" encoding="utf-8"?>
-<p:sld xmlns:a="http://schemas.openxmlformats.org/drawingml/2006/main" xmlns:r="http://schemas.openxmlformats.org/officeDocument/2006/relationships" xmlns:p="http://schemas.openxmlformats.org/presentationml/2006/main">
-  <p:cSld>
-    <p:spTree>
-      <p:nvGrpSpPr>
-        <p:cNvPr id="1" name=""/>
-        <p:cNvGrpSpPr/>
-        <p:nvPr/>
-      </p:nvGrpSpPr>
-      <p:grpSpPr>
-        <a:xfrm>
-          <a:off x="0" y="0"/>
-          <a:ext cx="0" cy="0"/>
-          <a:chOff x="0" y="0"/>
-          <a:chExt cx="0" cy="0"/>
-        </a:xfrm>
-      </p:grpSpPr>
-      <p:sp>
-        <p:nvSpPr>
-          <p:cNvPr id="2" name="Slide Number Placeholder 1"/>
-          <p:cNvSpPr>
-            <a:spLocks noGrp="1"/>
-          </p:cNvSpPr>
-          <p:nvPr>
-            <p:ph type="sldNum" sz="quarter" idx="4"/>
-          </p:nvPr>
-        </p:nvSpPr>
-        <p:spPr/>
-        <p:txBody>
-          <a:bodyPr/>
-          <a:lstStyle/>
-          <a:p>
-            <a:fld id="{813506F1-DB5F-4FC9-88BA-B486F30FE4BF}" type="slidenum">
-              <a:rPr lang="fr-FR" smtClean="0"/>
-              <a:pPr/>
-              <a:t>8</a:t>
-            </a:fld>
-            <a:endParaRPr lang="fr-FR" dirty="0"/>
-          </a:p>
-        </p:txBody>
-      </p:sp>
-      <p:pic>
-        <p:nvPicPr>
-          <p:cNvPr id="3" name="Image 2"/>
-          <p:cNvPicPr>
-            <a:picLocks noChangeAspect="1"/>
-          </p:cNvPicPr>
-          <p:nvPr/>
-        </p:nvPicPr>
-        <p:blipFill>
-          <a:blip r:embed="rId2"/>
-          <a:stretch>
-            <a:fillRect/>
-          </a:stretch>
-        </p:blipFill>
-        <p:spPr>
-          <a:xfrm>
-            <a:off x="5606587" y="1874730"/>
-            <a:ext cx="6290138" cy="4531498"/>
-          </a:xfrm>
-          <a:prstGeom prst="rect">
-            <a:avLst/>
-          </a:prstGeom>
-          <a:ln>
-            <a:solidFill>
-              <a:schemeClr val="tx1"/>
-            </a:solidFill>
-          </a:ln>
-        </p:spPr>
-      </p:pic>
-      <p:sp>
-        <p:nvSpPr>
-          <p:cNvPr id="4" name="Title 1"/>
-          <p:cNvSpPr txBox="1">
-            <a:spLocks/>
-          </p:cNvSpPr>
-          <p:nvPr/>
-        </p:nvSpPr>
-        <p:spPr>
-          <a:xfrm>
-            <a:off x="648394" y="2101646"/>
-            <a:ext cx="4866581" cy="733833"/>
-          </a:xfrm>
-          <a:prstGeom prst="rect">
-            <a:avLst/>
-          </a:prstGeom>
-        </p:spPr>
-        <p:txBody>
-          <a:bodyPr/>
-          <a:lstStyle>
-            <a:lvl1pPr algn="l" defTabSz="914400" rtl="0" eaLnBrk="1" latinLnBrk="0" hangingPunct="1">
-              <a:lnSpc>
-                <a:spcPct val="90000"/>
-              </a:lnSpc>
-              <a:spcBef>
-                <a:spcPct val="0"/>
-              </a:spcBef>
-              <a:buNone/>
-              <a:defRPr sz="4400" kern="1200">
-                <a:solidFill>
-                  <a:schemeClr val="tx1"/>
-                </a:solidFill>
-                <a:latin typeface="+mj-lt"/>
-                <a:ea typeface="+mj-ea"/>
-                <a:cs typeface="+mj-cs"/>
-              </a:defRPr>
-            </a:lvl1pPr>
-          </a:lstStyle>
-          <a:p>
-            <a:r>
-              <a:rPr lang="fr-FR" dirty="0" smtClean="0"/>
-              <a:t>App – User </a:t>
-            </a:r>
-            <a:r>
-              <a:rPr lang="fr-FR" dirty="0" err="1" smtClean="0"/>
-              <a:t>webpage</a:t>
-            </a:r>
-            <a:endParaRPr lang="fr-FR" dirty="0"/>
-          </a:p>
-        </p:txBody>
-      </p:sp>
-      <p:sp>
-        <p:nvSpPr>
-          <p:cNvPr id="5" name="Content Placeholder 2"/>
-          <p:cNvSpPr txBox="1">
-            <a:spLocks/>
-          </p:cNvSpPr>
-          <p:nvPr/>
-        </p:nvSpPr>
-        <p:spPr>
-          <a:xfrm>
-            <a:off x="1236684" y="2835479"/>
-            <a:ext cx="4161226" cy="3842158"/>
-          </a:xfrm>
-          <a:prstGeom prst="rect">
-            <a:avLst/>
-          </a:prstGeom>
-        </p:spPr>
-        <p:txBody>
-          <a:bodyPr>
-            <a:normAutofit/>
-          </a:bodyPr>
-          <a:lstStyle>
-            <a:lvl1pPr marL="228600" indent="-228600" algn="l" defTabSz="914400" rtl="0" eaLnBrk="1" latinLnBrk="0" hangingPunct="1">
-              <a:lnSpc>
-                <a:spcPct val="90000"/>
-              </a:lnSpc>
-              <a:spcBef>
-                <a:spcPts val="1000"/>
-              </a:spcBef>
-              <a:buFont typeface="Arial" panose="020B0604020202020204" pitchFamily="34" charset="0"/>
-              <a:buChar char="•"/>
-              <a:defRPr sz="2800" kern="1200">
-                <a:solidFill>
-                  <a:schemeClr val="tx1"/>
-                </a:solidFill>
-                <a:latin typeface="+mn-lt"/>
-                <a:ea typeface="+mn-ea"/>
-                <a:cs typeface="+mn-cs"/>
-              </a:defRPr>
-            </a:lvl1pPr>
-            <a:lvl2pPr marL="685800" indent="-228600" algn="l" defTabSz="914400" rtl="0" eaLnBrk="1" latinLnBrk="0" hangingPunct="1">
-              <a:lnSpc>
-                <a:spcPct val="90000"/>
-              </a:lnSpc>
-              <a:spcBef>
-                <a:spcPts val="500"/>
-              </a:spcBef>
-              <a:buFont typeface="Arial" panose="020B0604020202020204" pitchFamily="34" charset="0"/>
-              <a:buChar char="•"/>
-              <a:defRPr sz="2400" kern="1200">
-                <a:solidFill>
-                  <a:schemeClr val="tx1"/>
-                </a:solidFill>
-                <a:latin typeface="+mn-lt"/>
-                <a:ea typeface="+mn-ea"/>
-                <a:cs typeface="+mn-cs"/>
-              </a:defRPr>
-            </a:lvl2pPr>
-            <a:lvl3pPr marL="1143000" indent="-228600" algn="l" defTabSz="914400" rtl="0" eaLnBrk="1" latinLnBrk="0" hangingPunct="1">
-              <a:lnSpc>
-                <a:spcPct val="90000"/>
-              </a:lnSpc>
-              <a:spcBef>
-                <a:spcPts val="500"/>
-              </a:spcBef>
-              <a:buFont typeface="Arial" panose="020B0604020202020204" pitchFamily="34" charset="0"/>
-              <a:buChar char="•"/>
-              <a:defRPr sz="2000" kern="1200">
-                <a:solidFill>
-                  <a:schemeClr val="tx1"/>
-                </a:solidFill>
-                <a:latin typeface="+mn-lt"/>
-                <a:ea typeface="+mn-ea"/>
-                <a:cs typeface="+mn-cs"/>
-              </a:defRPr>
-            </a:lvl3pPr>
-            <a:lvl4pPr marL="1600200" indent="-228600" algn="l" defTabSz="914400" rtl="0" eaLnBrk="1" latinLnBrk="0" hangingPunct="1">
-              <a:lnSpc>
-                <a:spcPct val="90000"/>
-              </a:lnSpc>
-              <a:spcBef>
-                <a:spcPts val="500"/>
-              </a:spcBef>
-              <a:buFont typeface="Arial" panose="020B0604020202020204" pitchFamily="34" charset="0"/>
-              <a:buChar char="•"/>
-              <a:defRPr sz="1800" kern="1200">
-                <a:solidFill>
-                  <a:schemeClr val="tx1"/>
-                </a:solidFill>
-                <a:latin typeface="+mn-lt"/>
-                <a:ea typeface="+mn-ea"/>
-                <a:cs typeface="+mn-cs"/>
-              </a:defRPr>
-            </a:lvl4pPr>
-            <a:lvl5pPr marL="2057400" indent="-228600" algn="l" defTabSz="914400" rtl="0" eaLnBrk="1" latinLnBrk="0" hangingPunct="1">
-              <a:lnSpc>
-                <a:spcPct val="90000"/>
-              </a:lnSpc>
-              <a:spcBef>
-                <a:spcPts val="500"/>
-              </a:spcBef>
-              <a:buFont typeface="Arial" panose="020B0604020202020204" pitchFamily="34" charset="0"/>
-              <a:buChar char="•"/>
-              <a:defRPr sz="1800" kern="1200">
-                <a:solidFill>
-                  <a:schemeClr val="tx1"/>
-                </a:solidFill>
-                <a:latin typeface="+mn-lt"/>
-                <a:ea typeface="+mn-ea"/>
-                <a:cs typeface="+mn-cs"/>
-              </a:defRPr>
-            </a:lvl5pPr>
-            <a:lvl6pPr marL="2514600" indent="-228600" algn="l" defTabSz="914400" rtl="0" eaLnBrk="1" latinLnBrk="0" hangingPunct="1">
-              <a:lnSpc>
-                <a:spcPct val="90000"/>
-              </a:lnSpc>
-              <a:spcBef>
-                <a:spcPts val="500"/>
-              </a:spcBef>
-              <a:buFont typeface="Arial" panose="020B0604020202020204" pitchFamily="34" charset="0"/>
-              <a:buChar char="•"/>
-              <a:defRPr sz="1800" kern="1200">
-                <a:solidFill>
-                  <a:schemeClr val="tx1"/>
-                </a:solidFill>
-                <a:latin typeface="+mn-lt"/>
-                <a:ea typeface="+mn-ea"/>
-                <a:cs typeface="+mn-cs"/>
-              </a:defRPr>
-            </a:lvl6pPr>
-            <a:lvl7pPr marL="2971800" indent="-228600" algn="l" defTabSz="914400" rtl="0" eaLnBrk="1" latinLnBrk="0" hangingPunct="1">
-              <a:lnSpc>
-                <a:spcPct val="90000"/>
-              </a:lnSpc>
-              <a:spcBef>
-                <a:spcPts val="500"/>
-              </a:spcBef>
-              <a:buFont typeface="Arial" panose="020B0604020202020204" pitchFamily="34" charset="0"/>
-              <a:buChar char="•"/>
-              <a:defRPr sz="1800" kern="1200">
-                <a:solidFill>
-                  <a:schemeClr val="tx1"/>
-                </a:solidFill>
-                <a:latin typeface="+mn-lt"/>
-                <a:ea typeface="+mn-ea"/>
-                <a:cs typeface="+mn-cs"/>
-              </a:defRPr>
-            </a:lvl7pPr>
-            <a:lvl8pPr marL="3429000" indent="-228600" algn="l" defTabSz="914400" rtl="0" eaLnBrk="1" latinLnBrk="0" hangingPunct="1">
-              <a:lnSpc>
-                <a:spcPct val="90000"/>
-              </a:lnSpc>
-              <a:spcBef>
-                <a:spcPts val="500"/>
-              </a:spcBef>
-              <a:buFont typeface="Arial" panose="020B0604020202020204" pitchFamily="34" charset="0"/>
-              <a:buChar char="•"/>
-              <a:defRPr sz="1800" kern="1200">
-                <a:solidFill>
-                  <a:schemeClr val="tx1"/>
-                </a:solidFill>
-                <a:latin typeface="+mn-lt"/>
-                <a:ea typeface="+mn-ea"/>
-                <a:cs typeface="+mn-cs"/>
-              </a:defRPr>
-            </a:lvl8pPr>
-            <a:lvl9pPr marL="3886200" indent="-228600" algn="l" defTabSz="914400" rtl="0" eaLnBrk="1" latinLnBrk="0" hangingPunct="1">
-              <a:lnSpc>
-                <a:spcPct val="90000"/>
-              </a:lnSpc>
-              <a:spcBef>
-                <a:spcPts val="500"/>
-              </a:spcBef>
-              <a:buFont typeface="Arial" panose="020B0604020202020204" pitchFamily="34" charset="0"/>
-              <a:buChar char="•"/>
-              <a:defRPr sz="1800" kern="1200">
-                <a:solidFill>
-                  <a:schemeClr val="tx1"/>
-                </a:solidFill>
-                <a:latin typeface="+mn-lt"/>
-                <a:ea typeface="+mn-ea"/>
-                <a:cs typeface="+mn-cs"/>
-              </a:defRPr>
-            </a:lvl9pPr>
-          </a:lstStyle>
-          <a:p>
-            <a:pPr algn="just"/>
-            <a:r>
-              <a:rPr lang="fr-FR" sz="2000" dirty="0" smtClean="0"/>
-              <a:t>App </a:t>
-            </a:r>
-            <a:r>
-              <a:rPr lang="fr-FR" sz="2000" dirty="0" err="1" smtClean="0"/>
-              <a:t>previews</a:t>
-            </a:r>
-            <a:endParaRPr lang="fr-FR" sz="2000" dirty="0" smtClean="0"/>
-          </a:p>
-          <a:p>
-            <a:pPr algn="just"/>
-            <a:endParaRPr lang="fr-FR" sz="2000" dirty="0" smtClean="0"/>
-          </a:p>
-          <a:p>
-            <a:pPr algn="just"/>
-            <a:r>
-              <a:rPr lang="fr-FR" sz="2000" dirty="0" smtClean="0"/>
-              <a:t>Apple and Windows </a:t>
-            </a:r>
-            <a:r>
-              <a:rPr lang="fr-FR" sz="2000" dirty="0" err="1" smtClean="0"/>
-              <a:t>download</a:t>
-            </a:r>
-            <a:endParaRPr lang="fr-FR" sz="2000" dirty="0" smtClean="0"/>
-          </a:p>
-          <a:p>
-            <a:pPr algn="just"/>
-            <a:endParaRPr lang="fr-FR" sz="2000" dirty="0" smtClean="0"/>
-          </a:p>
-          <a:p>
-            <a:pPr algn="just"/>
-            <a:r>
-              <a:rPr lang="fr-FR" sz="2000" dirty="0" err="1" smtClean="0"/>
-              <a:t>Accessed</a:t>
-            </a:r>
-            <a:r>
-              <a:rPr lang="fr-FR" sz="2000" dirty="0" smtClean="0"/>
-              <a:t> </a:t>
-            </a:r>
-            <a:r>
-              <a:rPr lang="fr-FR" sz="2000" dirty="0" err="1" smtClean="0"/>
-              <a:t>from</a:t>
-            </a:r>
-            <a:r>
-              <a:rPr lang="fr-FR" sz="2000" dirty="0" smtClean="0"/>
-              <a:t> cellomet.com</a:t>
-            </a:r>
-          </a:p>
-          <a:p>
-            <a:pPr algn="just"/>
-            <a:endParaRPr lang="fr-FR" sz="2000" dirty="0"/>
-          </a:p>
-          <a:p>
-            <a:pPr algn="just"/>
-            <a:r>
-              <a:rPr lang="fr-FR" sz="2000" dirty="0" smtClean="0"/>
-              <a:t>Connexion </a:t>
-            </a:r>
-            <a:r>
-              <a:rPr lang="fr-FR" sz="2000" dirty="0" err="1" smtClean="0"/>
-              <a:t>button</a:t>
-            </a:r>
-            <a:r>
-              <a:rPr lang="fr-FR" sz="2000" dirty="0" smtClean="0"/>
-              <a:t> for the client</a:t>
-            </a:r>
-          </a:p>
-          <a:p>
-            <a:pPr marL="0" indent="0" algn="just">
-              <a:buNone/>
-            </a:pPr>
-            <a:endParaRPr lang="fr-FR" sz="2000" dirty="0" smtClean="0"/>
-          </a:p>
-        </p:txBody>
-      </p:sp>
-    </p:spTree>
-    <p:extLst>
-      <p:ext uri="{BB962C8B-B14F-4D97-AF65-F5344CB8AC3E}">
-        <p14:creationId xmlns:p14="http://schemas.microsoft.com/office/powerpoint/2010/main" val="57920603"/>
       </p:ext>
     </p:extLst>
   </p:cSld>

</xml_diff>

<commit_message>
Finished 'suivit projet' and added a lot to final presentation
</commit_message>
<xml_diff>
--- a/Slides/Diapos_Suivit_projet.pptx
+++ b/Slides/Diapos_Suivit_projet.pptx
@@ -13,15 +13,15 @@
   <p:sldIdLst>
     <p:sldId id="288" r:id="rId2"/>
     <p:sldId id="270" r:id="rId3"/>
-    <p:sldId id="285" r:id="rId4"/>
-    <p:sldId id="284" r:id="rId5"/>
-    <p:sldId id="283" r:id="rId6"/>
+    <p:sldId id="290" r:id="rId4"/>
+    <p:sldId id="291" r:id="rId5"/>
+    <p:sldId id="292" r:id="rId6"/>
     <p:sldId id="289" r:id="rId7"/>
-    <p:sldId id="282" r:id="rId8"/>
+    <p:sldId id="293" r:id="rId8"/>
     <p:sldId id="273" r:id="rId9"/>
     <p:sldId id="278" r:id="rId10"/>
-    <p:sldId id="287" r:id="rId11"/>
-    <p:sldId id="286" r:id="rId12"/>
+    <p:sldId id="294" r:id="rId11"/>
+    <p:sldId id="295" r:id="rId12"/>
   </p:sldIdLst>
   <p:sldSz cx="12192000" cy="6858000"/>
   <p:notesSz cx="6858000" cy="9144000"/>
@@ -3849,12 +3849,16 @@
         <a:lstStyle/>
         <a:p>
           <a:r>
-            <a:rPr lang="fr-FR" dirty="0" err="1"/>
+            <a:rPr lang="en-CA" noProof="0" dirty="0" smtClean="0"/>
             <a:t>Risk</a:t>
           </a:r>
           <a:r>
+            <a:rPr lang="fr-FR" dirty="0" smtClean="0"/>
+            <a:t> </a:t>
+          </a:r>
+          <a:r>
             <a:rPr lang="fr-FR" dirty="0"/>
-            <a:t> of high </a:t>
+            <a:t>of high </a:t>
           </a:r>
           <a:r>
             <a:rPr lang="fr-FR" dirty="0" err="1"/>
@@ -4639,79 +4643,79 @@
     </dgm:pt>
   </dgm:ptLst>
   <dgm:cxnLst>
+    <dgm:cxn modelId="{5DC2DB55-F097-4294-8B9E-72B598743DA3}" srcId="{8BEA78FF-204F-4428-9092-659961DC247C}" destId="{850DD825-7D08-4BBC-94B9-7E217910F9A2}" srcOrd="1" destOrd="0" parTransId="{D847AE72-61FF-43C4-BFB0-3E6EC0A79B26}" sibTransId="{DD66B6EB-9ADC-44F2-A7C2-DA4869ECDFFE}"/>
+    <dgm:cxn modelId="{D79BD4AC-CD35-4E87-8443-8235F4AC53D7}" type="presOf" srcId="{1981BF8C-ABB4-462F-BD54-45D3229B3478}" destId="{FFCC9154-8E22-496A-ADF8-EA81D4AB5D77}" srcOrd="1" destOrd="0" presId="urn:microsoft.com/office/officeart/2005/8/layout/cycle4"/>
+    <dgm:cxn modelId="{12D2BC70-9702-4DE8-AD36-65613209EF1E}" type="presOf" srcId="{1981BF8C-ABB4-462F-BD54-45D3229B3478}" destId="{05478942-E273-4856-8553-F0FD8F015AA2}" srcOrd="0" destOrd="0" presId="urn:microsoft.com/office/officeart/2005/8/layout/cycle4"/>
+    <dgm:cxn modelId="{4DC70C66-ACF9-417F-9532-2272E88B7A80}" type="presOf" srcId="{0916D3E2-7950-4B1E-A80A-B1A0DFE4D7BE}" destId="{CF4FC7F6-A89C-4633-A10E-BFE92B369DCD}" srcOrd="0" destOrd="0" presId="urn:microsoft.com/office/officeart/2005/8/layout/cycle4"/>
+    <dgm:cxn modelId="{CE2AF7AB-2949-4DCD-9C29-6B60E91D8468}" srcId="{0916D3E2-7950-4B1E-A80A-B1A0DFE4D7BE}" destId="{B8F4B4B5-48BB-4436-A4C8-0772D59377AC}" srcOrd="2" destOrd="0" parTransId="{EEB7DF95-B1E1-4355-BDED-67254F3A40BF}" sibTransId="{07F8EC93-687D-4C25-BBFA-77894EDF7DA2}"/>
+    <dgm:cxn modelId="{13DB7B7F-2B71-4B39-9D7E-500A9DEEC9CF}" type="presOf" srcId="{6446DC96-6D1C-4742-A646-C454D61C5C9D}" destId="{FFCC9154-8E22-496A-ADF8-EA81D4AB5D77}" srcOrd="1" destOrd="2" presId="urn:microsoft.com/office/officeart/2005/8/layout/cycle4"/>
+    <dgm:cxn modelId="{7BD1B129-960F-48DB-8D07-27A5E4D7535B}" type="presOf" srcId="{850DD825-7D08-4BBC-94B9-7E217910F9A2}" destId="{53088BBF-CDFB-43AD-88FA-A16B4FDD4AEA}" srcOrd="1" destOrd="1" presId="urn:microsoft.com/office/officeart/2005/8/layout/cycle4"/>
+    <dgm:cxn modelId="{AC7AAD78-331F-43CB-AB37-361548CBCDDA}" type="presOf" srcId="{21C7A246-DDB5-40DD-9118-CC4963BF878A}" destId="{8128ED5B-798D-45C7-BB11-A0996A8BF223}" srcOrd="1" destOrd="1" presId="urn:microsoft.com/office/officeart/2005/8/layout/cycle4"/>
+    <dgm:cxn modelId="{5F7AD9D5-E7E6-4F46-A4C5-3A0CE6F62C8E}" srcId="{8FEE133A-1A79-4187-9AFD-4F06B42A70BC}" destId="{35F1F2D2-FC47-4990-98DB-731AFE036343}" srcOrd="0" destOrd="0" parTransId="{D8C3661F-62F4-45E8-BB01-35BAAF924AEB}" sibTransId="{4EFE689A-014D-4F95-82DA-3254DF013F6C}"/>
+    <dgm:cxn modelId="{47858DE6-F2DC-49FE-86A9-3E6E0DE62A13}" type="presOf" srcId="{5A50A77D-7959-4302-B136-B1316B3CEC1D}" destId="{53088BBF-CDFB-43AD-88FA-A16B4FDD4AEA}" srcOrd="1" destOrd="2" presId="urn:microsoft.com/office/officeart/2005/8/layout/cycle4"/>
+    <dgm:cxn modelId="{023984A2-CB11-430A-AEC2-B2B80DC94006}" type="presOf" srcId="{DCE41F30-8A4B-4090-95D5-6CBD1CFA1EEC}" destId="{A67A60E5-5291-49E4-B3E5-53A58B528285}" srcOrd="0" destOrd="0" presId="urn:microsoft.com/office/officeart/2005/8/layout/cycle4"/>
+    <dgm:cxn modelId="{A075CE85-5595-4859-A6BA-53D921007C6A}" srcId="{8BEA78FF-204F-4428-9092-659961DC247C}" destId="{5A50A77D-7959-4302-B136-B1316B3CEC1D}" srcOrd="2" destOrd="0" parTransId="{D56876BE-429C-478F-B26B-EE6C114C7CCE}" sibTransId="{5909CF64-4028-4CB9-9607-23629C5D37FB}"/>
+    <dgm:cxn modelId="{B79DABB8-69F2-46AA-A3E4-19A7B3320787}" type="presOf" srcId="{7F397B27-ED42-4C0B-84EB-F42483A443DB}" destId="{60120B91-D76F-4101-857D-B9B656863593}" srcOrd="1" destOrd="1" presId="urn:microsoft.com/office/officeart/2005/8/layout/cycle4"/>
+    <dgm:cxn modelId="{1F81745B-4264-4419-A288-904F4505D53C}" type="presOf" srcId="{6446DC96-6D1C-4742-A646-C454D61C5C9D}" destId="{05478942-E273-4856-8553-F0FD8F015AA2}" srcOrd="0" destOrd="2" presId="urn:microsoft.com/office/officeart/2005/8/layout/cycle4"/>
+    <dgm:cxn modelId="{2A978431-31E1-4224-82B5-F00BFCF03DBA}" type="presOf" srcId="{B8F4B4B5-48BB-4436-A4C8-0772D59377AC}" destId="{60120B91-D76F-4101-857D-B9B656863593}" srcOrd="1" destOrd="2" presId="urn:microsoft.com/office/officeart/2005/8/layout/cycle4"/>
+    <dgm:cxn modelId="{F7CBC7F7-FBF9-4329-A3B5-F8A568558D6C}" srcId="{DCE41F30-8A4B-4090-95D5-6CBD1CFA1EEC}" destId="{6446DC96-6D1C-4742-A646-C454D61C5C9D}" srcOrd="2" destOrd="0" parTransId="{F1EB376B-DD8F-4D0A-B475-0137A25A9B1D}" sibTransId="{2E4D0765-7F9C-4470-8414-926AC02E2CE2}"/>
+    <dgm:cxn modelId="{4BE5508B-FDD9-47D5-8BF7-1A7559B6E1B4}" type="presOf" srcId="{850DD825-7D08-4BBC-94B9-7E217910F9A2}" destId="{431C4C2F-7F42-4D62-8EEF-918E7AD22EA0}" srcOrd="0" destOrd="1" presId="urn:microsoft.com/office/officeart/2005/8/layout/cycle4"/>
+    <dgm:cxn modelId="{08978BA1-AE5A-4DFF-A0C3-92D4A0078A98}" srcId="{0916D3E2-7950-4B1E-A80A-B1A0DFE4D7BE}" destId="{9B35DA45-8824-4EE3-89F0-3F4E07F980E3}" srcOrd="0" destOrd="0" parTransId="{F26E0BCB-616E-4F5C-9212-B89461307743}" sibTransId="{6FFF208B-A136-4388-9736-DE2BA4AFD5AF}"/>
+    <dgm:cxn modelId="{2D7DE33D-C3DB-49E5-ADF6-52C214CF1C59}" srcId="{0916D3E2-7950-4B1E-A80A-B1A0DFE4D7BE}" destId="{7F397B27-ED42-4C0B-84EB-F42483A443DB}" srcOrd="1" destOrd="0" parTransId="{DD81B84C-4525-4615-9233-87E402AFBABC}" sibTransId="{97EBF3C2-DAC2-40A4-AE80-264E3F21FCCC}"/>
+    <dgm:cxn modelId="{F4FBC6FB-58FD-4D8C-B047-CA2DADB87F36}" type="presOf" srcId="{21C7A246-DDB5-40DD-9118-CC4963BF878A}" destId="{BC6F0824-1351-49BA-BADB-F02B71A91728}" srcOrd="0" destOrd="1" presId="urn:microsoft.com/office/officeart/2005/8/layout/cycle4"/>
+    <dgm:cxn modelId="{F775C20D-AB6E-4712-989A-D3BFF703DEAF}" type="presOf" srcId="{5A50A77D-7959-4302-B136-B1316B3CEC1D}" destId="{431C4C2F-7F42-4D62-8EEF-918E7AD22EA0}" srcOrd="0" destOrd="2" presId="urn:microsoft.com/office/officeart/2005/8/layout/cycle4"/>
+    <dgm:cxn modelId="{280C9354-B1BA-4A20-83C3-8F03CAE8CFB7}" type="presOf" srcId="{8BEA78FF-204F-4428-9092-659961DC247C}" destId="{C0852406-3DC0-4222-A1F8-184593FC4596}" srcOrd="0" destOrd="0" presId="urn:microsoft.com/office/officeart/2005/8/layout/cycle4"/>
+    <dgm:cxn modelId="{5E45B507-1330-428C-A195-37581AAE5A63}" srcId="{8FEE133A-1A79-4187-9AFD-4F06B42A70BC}" destId="{21C7A246-DDB5-40DD-9118-CC4963BF878A}" srcOrd="1" destOrd="0" parTransId="{CD9E23AD-A863-49AB-83BE-431D89C28AF8}" sibTransId="{9EFEBC15-1E66-4CAC-95AE-73B08C514600}"/>
+    <dgm:cxn modelId="{499CF585-CFA3-45A4-B45D-825078E8845A}" type="presOf" srcId="{2B6A55A5-45D3-4E17-9C60-8FB16C933545}" destId="{05478942-E273-4856-8553-F0FD8F015AA2}" srcOrd="0" destOrd="1" presId="urn:microsoft.com/office/officeart/2005/8/layout/cycle4"/>
+    <dgm:cxn modelId="{F3DC86B6-474F-4BE6-A324-3FE9F9B8844A}" srcId="{CC293B1C-4CF8-4FF0-BBC7-4942ED2D7F88}" destId="{8FEE133A-1A79-4187-9AFD-4F06B42A70BC}" srcOrd="0" destOrd="0" parTransId="{7D947A46-F0B2-4D95-921D-7768A2A81535}" sibTransId="{A16446F1-3DF9-49B1-92C9-2E546FABE218}"/>
+    <dgm:cxn modelId="{59B883C3-D14A-42C2-A39F-9C383E4EA209}" type="presOf" srcId="{35F1F2D2-FC47-4990-98DB-731AFE036343}" destId="{BC6F0824-1351-49BA-BADB-F02B71A91728}" srcOrd="0" destOrd="0" presId="urn:microsoft.com/office/officeart/2005/8/layout/cycle4"/>
+    <dgm:cxn modelId="{55DC147B-C695-4F35-89C5-C0662D0F2251}" type="presOf" srcId="{49454F30-2B75-445A-845F-7473D893477D}" destId="{53088BBF-CDFB-43AD-88FA-A16B4FDD4AEA}" srcOrd="1" destOrd="0" presId="urn:microsoft.com/office/officeart/2005/8/layout/cycle4"/>
+    <dgm:cxn modelId="{6FEE2B86-0BD3-4386-A538-EE6E56E66CC3}" type="presOf" srcId="{8FEE133A-1A79-4187-9AFD-4F06B42A70BC}" destId="{E72BDFA6-376E-4614-9D7C-A68241E884D9}" srcOrd="0" destOrd="0" presId="urn:microsoft.com/office/officeart/2005/8/layout/cycle4"/>
+    <dgm:cxn modelId="{CF69C848-4781-4D4D-B25F-B4D5A4E36B83}" type="presOf" srcId="{35F1F2D2-FC47-4990-98DB-731AFE036343}" destId="{8128ED5B-798D-45C7-BB11-A0996A8BF223}" srcOrd="1" destOrd="0" presId="urn:microsoft.com/office/officeart/2005/8/layout/cycle4"/>
+    <dgm:cxn modelId="{873A3803-B8DA-4FC5-BC33-F8C410A4D637}" srcId="{DCE41F30-8A4B-4090-95D5-6CBD1CFA1EEC}" destId="{2B6A55A5-45D3-4E17-9C60-8FB16C933545}" srcOrd="1" destOrd="0" parTransId="{39E63537-B578-4C3D-8704-A072006EF998}" sibTransId="{0D1774AF-0E34-4AE0-B5A3-8DBDBFA17414}"/>
     <dgm:cxn modelId="{2F545677-CE33-4761-99ED-0F7D3431F1B7}" srcId="{DCE41F30-8A4B-4090-95D5-6CBD1CFA1EEC}" destId="{1981BF8C-ABB4-462F-BD54-45D3229B3478}" srcOrd="0" destOrd="0" parTransId="{420AF548-7339-428B-B062-F64CBEBA21A3}" sibTransId="{314ADFC2-8DB9-4517-A22A-D1F9C188BEE4}"/>
-    <dgm:cxn modelId="{89D0B3FB-B9CD-4764-B589-7798A97071B4}" type="presOf" srcId="{62885FA7-E7FB-4933-9935-6A8AA90289B4}" destId="{8128ED5B-798D-45C7-BB11-A0996A8BF223}" srcOrd="1" destOrd="2" presId="urn:microsoft.com/office/officeart/2005/8/layout/cycle4"/>
-    <dgm:cxn modelId="{B7269B33-2027-41D2-877C-9C09FF6D1AFA}" type="presOf" srcId="{DCE41F30-8A4B-4090-95D5-6CBD1CFA1EEC}" destId="{A67A60E5-5291-49E4-B3E5-53A58B528285}" srcOrd="0" destOrd="0" presId="urn:microsoft.com/office/officeart/2005/8/layout/cycle4"/>
-    <dgm:cxn modelId="{E2754B57-2984-4FD2-B783-8552C8246FA1}" type="presOf" srcId="{CC293B1C-4CF8-4FF0-BBC7-4942ED2D7F88}" destId="{39401A14-B365-4553-9A3D-A401D3183747}" srcOrd="0" destOrd="0" presId="urn:microsoft.com/office/officeart/2005/8/layout/cycle4"/>
-    <dgm:cxn modelId="{C9309115-721C-48C4-9369-542B8A264ABE}" type="presOf" srcId="{6446DC96-6D1C-4742-A646-C454D61C5C9D}" destId="{05478942-E273-4856-8553-F0FD8F015AA2}" srcOrd="0" destOrd="2" presId="urn:microsoft.com/office/officeart/2005/8/layout/cycle4"/>
+    <dgm:cxn modelId="{5C3CA9C0-D06E-45D4-BF6D-18C00F0931E5}" type="presOf" srcId="{2B6A55A5-45D3-4E17-9C60-8FB16C933545}" destId="{FFCC9154-8E22-496A-ADF8-EA81D4AB5D77}" srcOrd="1" destOrd="1" presId="urn:microsoft.com/office/officeart/2005/8/layout/cycle4"/>
+    <dgm:cxn modelId="{58755D72-6A8A-4181-8EB5-41F1412B480B}" srcId="{8FEE133A-1A79-4187-9AFD-4F06B42A70BC}" destId="{62885FA7-E7FB-4933-9935-6A8AA90289B4}" srcOrd="2" destOrd="0" parTransId="{9870B421-E3D6-4556-A843-2F0EDB4F207B}" sibTransId="{EB0831C9-645B-4C0B-8FAE-4F47D0F4E0C7}"/>
+    <dgm:cxn modelId="{53AC87D2-059F-41E4-9687-356523E16653}" type="presOf" srcId="{62885FA7-E7FB-4933-9935-6A8AA90289B4}" destId="{8128ED5B-798D-45C7-BB11-A0996A8BF223}" srcOrd="1" destOrd="2" presId="urn:microsoft.com/office/officeart/2005/8/layout/cycle4"/>
+    <dgm:cxn modelId="{A9B36F8A-C74B-47A9-B539-806F6BB77A1A}" srcId="{CC293B1C-4CF8-4FF0-BBC7-4942ED2D7F88}" destId="{0916D3E2-7950-4B1E-A80A-B1A0DFE4D7BE}" srcOrd="2" destOrd="0" parTransId="{78ED7DF1-7D14-4D64-A8E3-CBD6C30B03FB}" sibTransId="{402F8436-663D-4DB8-A22F-0A8F501EB425}"/>
+    <dgm:cxn modelId="{5CD8A52B-3655-4143-B2C6-890615C8791A}" type="presOf" srcId="{7F397B27-ED42-4C0B-84EB-F42483A443DB}" destId="{68AC0C8C-6683-4490-8F38-983C8CB47C3F}" srcOrd="0" destOrd="1" presId="urn:microsoft.com/office/officeart/2005/8/layout/cycle4"/>
+    <dgm:cxn modelId="{54C3CB4C-28A1-41F3-9323-ADBB6FB1E0B0}" type="presOf" srcId="{62885FA7-E7FB-4933-9935-6A8AA90289B4}" destId="{BC6F0824-1351-49BA-BADB-F02B71A91728}" srcOrd="0" destOrd="2" presId="urn:microsoft.com/office/officeart/2005/8/layout/cycle4"/>
+    <dgm:cxn modelId="{CB51040F-06BD-4592-8302-40704CAB501E}" type="presOf" srcId="{B8F4B4B5-48BB-4436-A4C8-0772D59377AC}" destId="{68AC0C8C-6683-4490-8F38-983C8CB47C3F}" srcOrd="0" destOrd="2" presId="urn:microsoft.com/office/officeart/2005/8/layout/cycle4"/>
     <dgm:cxn modelId="{6484E426-69AA-42DF-977B-A67A73203BD9}" srcId="{8BEA78FF-204F-4428-9092-659961DC247C}" destId="{49454F30-2B75-445A-845F-7473D893477D}" srcOrd="0" destOrd="0" parTransId="{347F498C-146E-4A53-8576-856FB00E3649}" sibTransId="{FAF60BDA-D885-4200-9740-D21B994BE362}"/>
-    <dgm:cxn modelId="{C3E8D53F-9F19-4D6D-8520-8C7F3D75E371}" type="presOf" srcId="{1981BF8C-ABB4-462F-BD54-45D3229B3478}" destId="{05478942-E273-4856-8553-F0FD8F015AA2}" srcOrd="0" destOrd="0" presId="urn:microsoft.com/office/officeart/2005/8/layout/cycle4"/>
-    <dgm:cxn modelId="{F3DC86B6-474F-4BE6-A324-3FE9F9B8844A}" srcId="{CC293B1C-4CF8-4FF0-BBC7-4942ED2D7F88}" destId="{8FEE133A-1A79-4187-9AFD-4F06B42A70BC}" srcOrd="0" destOrd="0" parTransId="{7D947A46-F0B2-4D95-921D-7768A2A81535}" sibTransId="{A16446F1-3DF9-49B1-92C9-2E546FABE218}"/>
-    <dgm:cxn modelId="{903B2690-11E5-47AD-BCC6-61ACBE650952}" type="presOf" srcId="{7F397B27-ED42-4C0B-84EB-F42483A443DB}" destId="{60120B91-D76F-4101-857D-B9B656863593}" srcOrd="1" destOrd="1" presId="urn:microsoft.com/office/officeart/2005/8/layout/cycle4"/>
-    <dgm:cxn modelId="{27155828-56A7-4BF4-8458-F295A9014509}" type="presOf" srcId="{49454F30-2B75-445A-845F-7473D893477D}" destId="{53088BBF-CDFB-43AD-88FA-A16B4FDD4AEA}" srcOrd="1" destOrd="0" presId="urn:microsoft.com/office/officeart/2005/8/layout/cycle4"/>
-    <dgm:cxn modelId="{1055A9D0-9C78-4F22-9ACE-90E8B5CF69D8}" type="presOf" srcId="{62885FA7-E7FB-4933-9935-6A8AA90289B4}" destId="{BC6F0824-1351-49BA-BADB-F02B71A91728}" srcOrd="0" destOrd="2" presId="urn:microsoft.com/office/officeart/2005/8/layout/cycle4"/>
-    <dgm:cxn modelId="{AB5765CF-0167-4FE2-BF9A-07ED0B2F26E9}" type="presOf" srcId="{0916D3E2-7950-4B1E-A80A-B1A0DFE4D7BE}" destId="{CF4FC7F6-A89C-4633-A10E-BFE92B369DCD}" srcOrd="0" destOrd="0" presId="urn:microsoft.com/office/officeart/2005/8/layout/cycle4"/>
-    <dgm:cxn modelId="{16B43346-203E-404D-8530-860C599DFB3F}" type="presOf" srcId="{8BEA78FF-204F-4428-9092-659961DC247C}" destId="{C0852406-3DC0-4222-A1F8-184593FC4596}" srcOrd="0" destOrd="0" presId="urn:microsoft.com/office/officeart/2005/8/layout/cycle4"/>
-    <dgm:cxn modelId="{C5F1050C-6E9E-4C54-966B-703AF570D023}" type="presOf" srcId="{850DD825-7D08-4BBC-94B9-7E217910F9A2}" destId="{53088BBF-CDFB-43AD-88FA-A16B4FDD4AEA}" srcOrd="1" destOrd="1" presId="urn:microsoft.com/office/officeart/2005/8/layout/cycle4"/>
-    <dgm:cxn modelId="{0CC69F44-D607-40E7-840F-972AE0C732F5}" type="presOf" srcId="{850DD825-7D08-4BBC-94B9-7E217910F9A2}" destId="{431C4C2F-7F42-4D62-8EEF-918E7AD22EA0}" srcOrd="0" destOrd="1" presId="urn:microsoft.com/office/officeart/2005/8/layout/cycle4"/>
-    <dgm:cxn modelId="{5DC2DB55-F097-4294-8B9E-72B598743DA3}" srcId="{8BEA78FF-204F-4428-9092-659961DC247C}" destId="{850DD825-7D08-4BBC-94B9-7E217910F9A2}" srcOrd="1" destOrd="0" parTransId="{D847AE72-61FF-43C4-BFB0-3E6EC0A79B26}" sibTransId="{DD66B6EB-9ADC-44F2-A7C2-DA4869ECDFFE}"/>
-    <dgm:cxn modelId="{5E45B507-1330-428C-A195-37581AAE5A63}" srcId="{8FEE133A-1A79-4187-9AFD-4F06B42A70BC}" destId="{21C7A246-DDB5-40DD-9118-CC4963BF878A}" srcOrd="1" destOrd="0" parTransId="{CD9E23AD-A863-49AB-83BE-431D89C28AF8}" sibTransId="{9EFEBC15-1E66-4CAC-95AE-73B08C514600}"/>
-    <dgm:cxn modelId="{266426E9-0DF4-450D-A48C-4EFDAB10A528}" type="presOf" srcId="{35F1F2D2-FC47-4990-98DB-731AFE036343}" destId="{BC6F0824-1351-49BA-BADB-F02B71A91728}" srcOrd="0" destOrd="0" presId="urn:microsoft.com/office/officeart/2005/8/layout/cycle4"/>
-    <dgm:cxn modelId="{68FB5C9D-DDC8-4910-B2E5-E22BB93FDB98}" type="presOf" srcId="{7F397B27-ED42-4C0B-84EB-F42483A443DB}" destId="{68AC0C8C-6683-4490-8F38-983C8CB47C3F}" srcOrd="0" destOrd="1" presId="urn:microsoft.com/office/officeart/2005/8/layout/cycle4"/>
-    <dgm:cxn modelId="{A9B36F8A-C74B-47A9-B539-806F6BB77A1A}" srcId="{CC293B1C-4CF8-4FF0-BBC7-4942ED2D7F88}" destId="{0916D3E2-7950-4B1E-A80A-B1A0DFE4D7BE}" srcOrd="2" destOrd="0" parTransId="{78ED7DF1-7D14-4D64-A8E3-CBD6C30B03FB}" sibTransId="{402F8436-663D-4DB8-A22F-0A8F501EB425}"/>
-    <dgm:cxn modelId="{414CD220-C59F-4661-8172-F038F66587EA}" type="presOf" srcId="{5A50A77D-7959-4302-B136-B1316B3CEC1D}" destId="{431C4C2F-7F42-4D62-8EEF-918E7AD22EA0}" srcOrd="0" destOrd="2" presId="urn:microsoft.com/office/officeart/2005/8/layout/cycle4"/>
-    <dgm:cxn modelId="{566BE653-B770-4199-A086-63C9C0FABF06}" type="presOf" srcId="{5A50A77D-7959-4302-B136-B1316B3CEC1D}" destId="{53088BBF-CDFB-43AD-88FA-A16B4FDD4AEA}" srcOrd="1" destOrd="2" presId="urn:microsoft.com/office/officeart/2005/8/layout/cycle4"/>
-    <dgm:cxn modelId="{A2BBFC70-EC5F-4207-B2BA-2AAE56D317DC}" type="presOf" srcId="{9B35DA45-8824-4EE3-89F0-3F4E07F980E3}" destId="{60120B91-D76F-4101-857D-B9B656863593}" srcOrd="1" destOrd="0" presId="urn:microsoft.com/office/officeart/2005/8/layout/cycle4"/>
-    <dgm:cxn modelId="{8A65DEA3-CD5A-4164-9FF0-75D085D4963C}" type="presOf" srcId="{21C7A246-DDB5-40DD-9118-CC4963BF878A}" destId="{BC6F0824-1351-49BA-BADB-F02B71A91728}" srcOrd="0" destOrd="1" presId="urn:microsoft.com/office/officeart/2005/8/layout/cycle4"/>
-    <dgm:cxn modelId="{121AB52D-0394-4FA4-9EF7-82DA7D790C6C}" type="presOf" srcId="{35F1F2D2-FC47-4990-98DB-731AFE036343}" destId="{8128ED5B-798D-45C7-BB11-A0996A8BF223}" srcOrd="1" destOrd="0" presId="urn:microsoft.com/office/officeart/2005/8/layout/cycle4"/>
-    <dgm:cxn modelId="{428F15AF-99F9-482D-BD31-313434250C80}" type="presOf" srcId="{B8F4B4B5-48BB-4436-A4C8-0772D59377AC}" destId="{68AC0C8C-6683-4490-8F38-983C8CB47C3F}" srcOrd="0" destOrd="2" presId="urn:microsoft.com/office/officeart/2005/8/layout/cycle4"/>
-    <dgm:cxn modelId="{5F7AD9D5-E7E6-4F46-A4C5-3A0CE6F62C8E}" srcId="{8FEE133A-1A79-4187-9AFD-4F06B42A70BC}" destId="{35F1F2D2-FC47-4990-98DB-731AFE036343}" srcOrd="0" destOrd="0" parTransId="{D8C3661F-62F4-45E8-BB01-35BAAF924AEB}" sibTransId="{4EFE689A-014D-4F95-82DA-3254DF013F6C}"/>
-    <dgm:cxn modelId="{3B991839-62B0-437F-ABDE-F4C1C596D307}" type="presOf" srcId="{1981BF8C-ABB4-462F-BD54-45D3229B3478}" destId="{FFCC9154-8E22-496A-ADF8-EA81D4AB5D77}" srcOrd="1" destOrd="0" presId="urn:microsoft.com/office/officeart/2005/8/layout/cycle4"/>
-    <dgm:cxn modelId="{7218C120-B69C-4A7A-BFBB-3F0F6D56C7F9}" type="presOf" srcId="{2B6A55A5-45D3-4E17-9C60-8FB16C933545}" destId="{FFCC9154-8E22-496A-ADF8-EA81D4AB5D77}" srcOrd="1" destOrd="1" presId="urn:microsoft.com/office/officeart/2005/8/layout/cycle4"/>
-    <dgm:cxn modelId="{58755D72-6A8A-4181-8EB5-41F1412B480B}" srcId="{8FEE133A-1A79-4187-9AFD-4F06B42A70BC}" destId="{62885FA7-E7FB-4933-9935-6A8AA90289B4}" srcOrd="2" destOrd="0" parTransId="{9870B421-E3D6-4556-A843-2F0EDB4F207B}" sibTransId="{EB0831C9-645B-4C0B-8FAE-4F47D0F4E0C7}"/>
-    <dgm:cxn modelId="{F7CBC7F7-FBF9-4329-A3B5-F8A568558D6C}" srcId="{DCE41F30-8A4B-4090-95D5-6CBD1CFA1EEC}" destId="{6446DC96-6D1C-4742-A646-C454D61C5C9D}" srcOrd="2" destOrd="0" parTransId="{F1EB376B-DD8F-4D0A-B475-0137A25A9B1D}" sibTransId="{2E4D0765-7F9C-4470-8414-926AC02E2CE2}"/>
-    <dgm:cxn modelId="{3E82771C-0B66-4E74-9190-DF73756B0079}" type="presOf" srcId="{9B35DA45-8824-4EE3-89F0-3F4E07F980E3}" destId="{68AC0C8C-6683-4490-8F38-983C8CB47C3F}" srcOrd="0" destOrd="0" presId="urn:microsoft.com/office/officeart/2005/8/layout/cycle4"/>
-    <dgm:cxn modelId="{CE2AF7AB-2949-4DCD-9C29-6B60E91D8468}" srcId="{0916D3E2-7950-4B1E-A80A-B1A0DFE4D7BE}" destId="{B8F4B4B5-48BB-4436-A4C8-0772D59377AC}" srcOrd="2" destOrd="0" parTransId="{EEB7DF95-B1E1-4355-BDED-67254F3A40BF}" sibTransId="{07F8EC93-687D-4C25-BBFA-77894EDF7DA2}"/>
     <dgm:cxn modelId="{856CCC98-4D42-4940-9913-BB20C5217489}" srcId="{CC293B1C-4CF8-4FF0-BBC7-4942ED2D7F88}" destId="{DCE41F30-8A4B-4090-95D5-6CBD1CFA1EEC}" srcOrd="1" destOrd="0" parTransId="{480265E7-8542-40B5-95A1-EC04B55B8C68}" sibTransId="{005E5E72-5BE1-4DC4-AD1C-48C242521B93}"/>
-    <dgm:cxn modelId="{873A3803-B8DA-4FC5-BC33-F8C410A4D637}" srcId="{DCE41F30-8A4B-4090-95D5-6CBD1CFA1EEC}" destId="{2B6A55A5-45D3-4E17-9C60-8FB16C933545}" srcOrd="1" destOrd="0" parTransId="{39E63537-B578-4C3D-8704-A072006EF998}" sibTransId="{0D1774AF-0E34-4AE0-B5A3-8DBDBFA17414}"/>
-    <dgm:cxn modelId="{08978BA1-AE5A-4DFF-A0C3-92D4A0078A98}" srcId="{0916D3E2-7950-4B1E-A80A-B1A0DFE4D7BE}" destId="{9B35DA45-8824-4EE3-89F0-3F4E07F980E3}" srcOrd="0" destOrd="0" parTransId="{F26E0BCB-616E-4F5C-9212-B89461307743}" sibTransId="{6FFF208B-A136-4388-9736-DE2BA4AFD5AF}"/>
-    <dgm:cxn modelId="{880D0322-3BCC-4373-B5CC-28A59B1C01C8}" type="presOf" srcId="{8FEE133A-1A79-4187-9AFD-4F06B42A70BC}" destId="{E72BDFA6-376E-4614-9D7C-A68241E884D9}" srcOrd="0" destOrd="0" presId="urn:microsoft.com/office/officeart/2005/8/layout/cycle4"/>
-    <dgm:cxn modelId="{0CDC6E4C-D4C6-410A-AF0C-236AC9D58E85}" type="presOf" srcId="{49454F30-2B75-445A-845F-7473D893477D}" destId="{431C4C2F-7F42-4D62-8EEF-918E7AD22EA0}" srcOrd="0" destOrd="0" presId="urn:microsoft.com/office/officeart/2005/8/layout/cycle4"/>
-    <dgm:cxn modelId="{A075CE85-5595-4859-A6BA-53D921007C6A}" srcId="{8BEA78FF-204F-4428-9092-659961DC247C}" destId="{5A50A77D-7959-4302-B136-B1316B3CEC1D}" srcOrd="2" destOrd="0" parTransId="{D56876BE-429C-478F-B26B-EE6C114C7CCE}" sibTransId="{5909CF64-4028-4CB9-9607-23629C5D37FB}"/>
+    <dgm:cxn modelId="{DC74F7C2-4ADD-4692-BFFE-12C4C7E99B03}" type="presOf" srcId="{CC293B1C-4CF8-4FF0-BBC7-4942ED2D7F88}" destId="{39401A14-B365-4553-9A3D-A401D3183747}" srcOrd="0" destOrd="0" presId="urn:microsoft.com/office/officeart/2005/8/layout/cycle4"/>
+    <dgm:cxn modelId="{324E4FD3-F4B7-4352-855F-A3B362DCFDA5}" type="presOf" srcId="{9B35DA45-8824-4EE3-89F0-3F4E07F980E3}" destId="{68AC0C8C-6683-4490-8F38-983C8CB47C3F}" srcOrd="0" destOrd="0" presId="urn:microsoft.com/office/officeart/2005/8/layout/cycle4"/>
     <dgm:cxn modelId="{A5D3F3DB-629E-46CD-AA76-C52C0C251A66}" srcId="{CC293B1C-4CF8-4FF0-BBC7-4942ED2D7F88}" destId="{8BEA78FF-204F-4428-9092-659961DC247C}" srcOrd="3" destOrd="0" parTransId="{41090789-956B-42C9-B909-44B2D62666F5}" sibTransId="{F0DB2DD3-51DB-4551-8E87-8440876EF808}"/>
-    <dgm:cxn modelId="{95B5D13D-EC31-405A-B94A-D19BE8153AD7}" type="presOf" srcId="{2B6A55A5-45D3-4E17-9C60-8FB16C933545}" destId="{05478942-E273-4856-8553-F0FD8F015AA2}" srcOrd="0" destOrd="1" presId="urn:microsoft.com/office/officeart/2005/8/layout/cycle4"/>
-    <dgm:cxn modelId="{E2D839A8-A246-4BFE-8C62-59A978A4AE65}" type="presOf" srcId="{6446DC96-6D1C-4742-A646-C454D61C5C9D}" destId="{FFCC9154-8E22-496A-ADF8-EA81D4AB5D77}" srcOrd="1" destOrd="2" presId="urn:microsoft.com/office/officeart/2005/8/layout/cycle4"/>
-    <dgm:cxn modelId="{AC846C45-BD23-47C6-830C-DB7B38427447}" type="presOf" srcId="{21C7A246-DDB5-40DD-9118-CC4963BF878A}" destId="{8128ED5B-798D-45C7-BB11-A0996A8BF223}" srcOrd="1" destOrd="1" presId="urn:microsoft.com/office/officeart/2005/8/layout/cycle4"/>
-    <dgm:cxn modelId="{D00AE9DD-6598-4D17-9501-51424D49EECF}" type="presOf" srcId="{B8F4B4B5-48BB-4436-A4C8-0772D59377AC}" destId="{60120B91-D76F-4101-857D-B9B656863593}" srcOrd="1" destOrd="2" presId="urn:microsoft.com/office/officeart/2005/8/layout/cycle4"/>
-    <dgm:cxn modelId="{2D7DE33D-C3DB-49E5-ADF6-52C214CF1C59}" srcId="{0916D3E2-7950-4B1E-A80A-B1A0DFE4D7BE}" destId="{7F397B27-ED42-4C0B-84EB-F42483A443DB}" srcOrd="1" destOrd="0" parTransId="{DD81B84C-4525-4615-9233-87E402AFBABC}" sibTransId="{97EBF3C2-DAC2-40A4-AE80-264E3F21FCCC}"/>
-    <dgm:cxn modelId="{B1E069C3-9DD3-4EEB-A9B1-5E2D53207CE5}" type="presParOf" srcId="{39401A14-B365-4553-9A3D-A401D3183747}" destId="{D7E58549-68A7-4F21-BF0D-84F7636DCD92}" srcOrd="0" destOrd="0" presId="urn:microsoft.com/office/officeart/2005/8/layout/cycle4"/>
-    <dgm:cxn modelId="{4079B0D3-B13D-4703-803A-77CE7F7A9C17}" type="presParOf" srcId="{D7E58549-68A7-4F21-BF0D-84F7636DCD92}" destId="{5D458377-8CFE-43EB-BDF2-7CB3F0D876C1}" srcOrd="0" destOrd="0" presId="urn:microsoft.com/office/officeart/2005/8/layout/cycle4"/>
-    <dgm:cxn modelId="{C9FF3A53-9225-470B-9DC4-DDEF2A15114A}" type="presParOf" srcId="{5D458377-8CFE-43EB-BDF2-7CB3F0D876C1}" destId="{BC6F0824-1351-49BA-BADB-F02B71A91728}" srcOrd="0" destOrd="0" presId="urn:microsoft.com/office/officeart/2005/8/layout/cycle4"/>
-    <dgm:cxn modelId="{32FF5024-F3A0-4017-B5E7-1E4A85B56AA4}" type="presParOf" srcId="{5D458377-8CFE-43EB-BDF2-7CB3F0D876C1}" destId="{8128ED5B-798D-45C7-BB11-A0996A8BF223}" srcOrd="1" destOrd="0" presId="urn:microsoft.com/office/officeart/2005/8/layout/cycle4"/>
-    <dgm:cxn modelId="{208C1258-4F59-4F37-9B55-5507A08361D8}" type="presParOf" srcId="{D7E58549-68A7-4F21-BF0D-84F7636DCD92}" destId="{D1CAC0FF-E414-4230-81F1-48A389FCAA90}" srcOrd="1" destOrd="0" presId="urn:microsoft.com/office/officeart/2005/8/layout/cycle4"/>
-    <dgm:cxn modelId="{B3F89FE8-929B-4AA3-9F55-93D39E35E25F}" type="presParOf" srcId="{D1CAC0FF-E414-4230-81F1-48A389FCAA90}" destId="{05478942-E273-4856-8553-F0FD8F015AA2}" srcOrd="0" destOrd="0" presId="urn:microsoft.com/office/officeart/2005/8/layout/cycle4"/>
-    <dgm:cxn modelId="{312E9CFA-45CC-440E-9630-FD0C16E87221}" type="presParOf" srcId="{D1CAC0FF-E414-4230-81F1-48A389FCAA90}" destId="{FFCC9154-8E22-496A-ADF8-EA81D4AB5D77}" srcOrd="1" destOrd="0" presId="urn:microsoft.com/office/officeart/2005/8/layout/cycle4"/>
-    <dgm:cxn modelId="{611DC188-F390-480E-B7FA-432BE2808F3E}" type="presParOf" srcId="{D7E58549-68A7-4F21-BF0D-84F7636DCD92}" destId="{AC6B2FBF-7301-4489-8CBA-C72E325139A7}" srcOrd="2" destOrd="0" presId="urn:microsoft.com/office/officeart/2005/8/layout/cycle4"/>
-    <dgm:cxn modelId="{0C384FC3-DF99-4E2E-AE69-90C4BF30B22B}" type="presParOf" srcId="{AC6B2FBF-7301-4489-8CBA-C72E325139A7}" destId="{68AC0C8C-6683-4490-8F38-983C8CB47C3F}" srcOrd="0" destOrd="0" presId="urn:microsoft.com/office/officeart/2005/8/layout/cycle4"/>
-    <dgm:cxn modelId="{DB192723-CADE-4A51-BF0E-1CCB6A7A12AB}" type="presParOf" srcId="{AC6B2FBF-7301-4489-8CBA-C72E325139A7}" destId="{60120B91-D76F-4101-857D-B9B656863593}" srcOrd="1" destOrd="0" presId="urn:microsoft.com/office/officeart/2005/8/layout/cycle4"/>
-    <dgm:cxn modelId="{B9616B29-2AC8-4BD6-BC45-EB23D2D5D1AA}" type="presParOf" srcId="{D7E58549-68A7-4F21-BF0D-84F7636DCD92}" destId="{FE4735BA-FC16-4D11-8D7D-854C3BB49539}" srcOrd="3" destOrd="0" presId="urn:microsoft.com/office/officeart/2005/8/layout/cycle4"/>
-    <dgm:cxn modelId="{4EB96866-A2D2-4CA8-9B35-AA8568884D6D}" type="presParOf" srcId="{FE4735BA-FC16-4D11-8D7D-854C3BB49539}" destId="{431C4C2F-7F42-4D62-8EEF-918E7AD22EA0}" srcOrd="0" destOrd="0" presId="urn:microsoft.com/office/officeart/2005/8/layout/cycle4"/>
-    <dgm:cxn modelId="{F1686BD8-0BFA-43AE-807C-01AEAECADEAF}" type="presParOf" srcId="{FE4735BA-FC16-4D11-8D7D-854C3BB49539}" destId="{53088BBF-CDFB-43AD-88FA-A16B4FDD4AEA}" srcOrd="1" destOrd="0" presId="urn:microsoft.com/office/officeart/2005/8/layout/cycle4"/>
-    <dgm:cxn modelId="{F544447E-1DE6-4E9E-B6D9-C23A69A933E7}" type="presParOf" srcId="{D7E58549-68A7-4F21-BF0D-84F7636DCD92}" destId="{4C71D571-69A8-40F3-850A-97D36405B4CD}" srcOrd="4" destOrd="0" presId="urn:microsoft.com/office/officeart/2005/8/layout/cycle4"/>
-    <dgm:cxn modelId="{97E8767C-3ACB-4534-9585-B267EB4FC049}" type="presParOf" srcId="{39401A14-B365-4553-9A3D-A401D3183747}" destId="{BFB0D660-5BF3-4B91-8837-C379A331C3C8}" srcOrd="1" destOrd="0" presId="urn:microsoft.com/office/officeart/2005/8/layout/cycle4"/>
-    <dgm:cxn modelId="{BF180665-6C13-4546-B1DC-666F0D9585F5}" type="presParOf" srcId="{BFB0D660-5BF3-4B91-8837-C379A331C3C8}" destId="{E72BDFA6-376E-4614-9D7C-A68241E884D9}" srcOrd="0" destOrd="0" presId="urn:microsoft.com/office/officeart/2005/8/layout/cycle4"/>
-    <dgm:cxn modelId="{47AAD99C-8B73-45A4-8F24-22962417D1CD}" type="presParOf" srcId="{BFB0D660-5BF3-4B91-8837-C379A331C3C8}" destId="{A67A60E5-5291-49E4-B3E5-53A58B528285}" srcOrd="1" destOrd="0" presId="urn:microsoft.com/office/officeart/2005/8/layout/cycle4"/>
-    <dgm:cxn modelId="{F61C284D-1717-415F-9D03-EF94A4DC2ECC}" type="presParOf" srcId="{BFB0D660-5BF3-4B91-8837-C379A331C3C8}" destId="{CF4FC7F6-A89C-4633-A10E-BFE92B369DCD}" srcOrd="2" destOrd="0" presId="urn:microsoft.com/office/officeart/2005/8/layout/cycle4"/>
-    <dgm:cxn modelId="{496F0D79-A9D5-4885-8ACB-F5E9E8356003}" type="presParOf" srcId="{BFB0D660-5BF3-4B91-8837-C379A331C3C8}" destId="{C0852406-3DC0-4222-A1F8-184593FC4596}" srcOrd="3" destOrd="0" presId="urn:microsoft.com/office/officeart/2005/8/layout/cycle4"/>
-    <dgm:cxn modelId="{C58586B8-8079-4ABF-9FEC-156811F5FF15}" type="presParOf" srcId="{BFB0D660-5BF3-4B91-8837-C379A331C3C8}" destId="{B569151F-8995-4BD7-A8F3-A948642763E3}" srcOrd="4" destOrd="0" presId="urn:microsoft.com/office/officeart/2005/8/layout/cycle4"/>
-    <dgm:cxn modelId="{222A19FF-CEE0-4B33-84A5-43AFAE1ABB3D}" type="presParOf" srcId="{39401A14-B365-4553-9A3D-A401D3183747}" destId="{3B6382B4-DDDF-482E-9E6A-38E6F7DB930C}" srcOrd="2" destOrd="0" presId="urn:microsoft.com/office/officeart/2005/8/layout/cycle4"/>
-    <dgm:cxn modelId="{F088471A-D70E-4ACA-82A8-EDBF314DDD84}" type="presParOf" srcId="{39401A14-B365-4553-9A3D-A401D3183747}" destId="{72B333DC-EBE8-4650-A713-61338E0F2C2D}" srcOrd="3" destOrd="0" presId="urn:microsoft.com/office/officeart/2005/8/layout/cycle4"/>
+    <dgm:cxn modelId="{D38CFA5B-0B49-4D77-B418-C4531A821F34}" type="presOf" srcId="{49454F30-2B75-445A-845F-7473D893477D}" destId="{431C4C2F-7F42-4D62-8EEF-918E7AD22EA0}" srcOrd="0" destOrd="0" presId="urn:microsoft.com/office/officeart/2005/8/layout/cycle4"/>
+    <dgm:cxn modelId="{E1EEB7EA-60EC-4AD5-8E3D-D3EEBF5157CF}" type="presOf" srcId="{9B35DA45-8824-4EE3-89F0-3F4E07F980E3}" destId="{60120B91-D76F-4101-857D-B9B656863593}" srcOrd="1" destOrd="0" presId="urn:microsoft.com/office/officeart/2005/8/layout/cycle4"/>
+    <dgm:cxn modelId="{94F90DC7-15A1-4F13-8EC9-D3547B750D84}" type="presParOf" srcId="{39401A14-B365-4553-9A3D-A401D3183747}" destId="{D7E58549-68A7-4F21-BF0D-84F7636DCD92}" srcOrd="0" destOrd="0" presId="urn:microsoft.com/office/officeart/2005/8/layout/cycle4"/>
+    <dgm:cxn modelId="{246D9BF7-D5B0-42E3-B7C2-EE241B75F2E0}" type="presParOf" srcId="{D7E58549-68A7-4F21-BF0D-84F7636DCD92}" destId="{5D458377-8CFE-43EB-BDF2-7CB3F0D876C1}" srcOrd="0" destOrd="0" presId="urn:microsoft.com/office/officeart/2005/8/layout/cycle4"/>
+    <dgm:cxn modelId="{677C1BAB-0C03-4DE8-BA3B-C42DA0775FC7}" type="presParOf" srcId="{5D458377-8CFE-43EB-BDF2-7CB3F0D876C1}" destId="{BC6F0824-1351-49BA-BADB-F02B71A91728}" srcOrd="0" destOrd="0" presId="urn:microsoft.com/office/officeart/2005/8/layout/cycle4"/>
+    <dgm:cxn modelId="{31E23233-A4BC-41CF-8906-F15192B0B2E4}" type="presParOf" srcId="{5D458377-8CFE-43EB-BDF2-7CB3F0D876C1}" destId="{8128ED5B-798D-45C7-BB11-A0996A8BF223}" srcOrd="1" destOrd="0" presId="urn:microsoft.com/office/officeart/2005/8/layout/cycle4"/>
+    <dgm:cxn modelId="{86EE5164-6376-4287-859E-68CE4A115114}" type="presParOf" srcId="{D7E58549-68A7-4F21-BF0D-84F7636DCD92}" destId="{D1CAC0FF-E414-4230-81F1-48A389FCAA90}" srcOrd="1" destOrd="0" presId="urn:microsoft.com/office/officeart/2005/8/layout/cycle4"/>
+    <dgm:cxn modelId="{CC45BD46-DCC8-4410-97D7-BEB0665942D9}" type="presParOf" srcId="{D1CAC0FF-E414-4230-81F1-48A389FCAA90}" destId="{05478942-E273-4856-8553-F0FD8F015AA2}" srcOrd="0" destOrd="0" presId="urn:microsoft.com/office/officeart/2005/8/layout/cycle4"/>
+    <dgm:cxn modelId="{8D63B1E6-1827-43A5-80AB-DE00C79E329F}" type="presParOf" srcId="{D1CAC0FF-E414-4230-81F1-48A389FCAA90}" destId="{FFCC9154-8E22-496A-ADF8-EA81D4AB5D77}" srcOrd="1" destOrd="0" presId="urn:microsoft.com/office/officeart/2005/8/layout/cycle4"/>
+    <dgm:cxn modelId="{38AA131E-7C93-47B3-97E8-CD2CACB739FF}" type="presParOf" srcId="{D7E58549-68A7-4F21-BF0D-84F7636DCD92}" destId="{AC6B2FBF-7301-4489-8CBA-C72E325139A7}" srcOrd="2" destOrd="0" presId="urn:microsoft.com/office/officeart/2005/8/layout/cycle4"/>
+    <dgm:cxn modelId="{D80AC445-C3FD-42E5-928F-C17D9C775895}" type="presParOf" srcId="{AC6B2FBF-7301-4489-8CBA-C72E325139A7}" destId="{68AC0C8C-6683-4490-8F38-983C8CB47C3F}" srcOrd="0" destOrd="0" presId="urn:microsoft.com/office/officeart/2005/8/layout/cycle4"/>
+    <dgm:cxn modelId="{D3E66F08-5C7C-48E7-95E0-42F4F626CA17}" type="presParOf" srcId="{AC6B2FBF-7301-4489-8CBA-C72E325139A7}" destId="{60120B91-D76F-4101-857D-B9B656863593}" srcOrd="1" destOrd="0" presId="urn:microsoft.com/office/officeart/2005/8/layout/cycle4"/>
+    <dgm:cxn modelId="{A821F29D-1FD3-4041-A627-83D0FA113C81}" type="presParOf" srcId="{D7E58549-68A7-4F21-BF0D-84F7636DCD92}" destId="{FE4735BA-FC16-4D11-8D7D-854C3BB49539}" srcOrd="3" destOrd="0" presId="urn:microsoft.com/office/officeart/2005/8/layout/cycle4"/>
+    <dgm:cxn modelId="{EE1120B1-08D5-418C-A785-44DF2AC4B3E8}" type="presParOf" srcId="{FE4735BA-FC16-4D11-8D7D-854C3BB49539}" destId="{431C4C2F-7F42-4D62-8EEF-918E7AD22EA0}" srcOrd="0" destOrd="0" presId="urn:microsoft.com/office/officeart/2005/8/layout/cycle4"/>
+    <dgm:cxn modelId="{EE27D8EB-0C55-46FD-8759-381C910C348A}" type="presParOf" srcId="{FE4735BA-FC16-4D11-8D7D-854C3BB49539}" destId="{53088BBF-CDFB-43AD-88FA-A16B4FDD4AEA}" srcOrd="1" destOrd="0" presId="urn:microsoft.com/office/officeart/2005/8/layout/cycle4"/>
+    <dgm:cxn modelId="{80EC892B-F8E4-4995-B57C-2EF205AF158E}" type="presParOf" srcId="{D7E58549-68A7-4F21-BF0D-84F7636DCD92}" destId="{4C71D571-69A8-40F3-850A-97D36405B4CD}" srcOrd="4" destOrd="0" presId="urn:microsoft.com/office/officeart/2005/8/layout/cycle4"/>
+    <dgm:cxn modelId="{A9331E0B-73B3-4E14-BD8B-CFA3E1EFDC71}" type="presParOf" srcId="{39401A14-B365-4553-9A3D-A401D3183747}" destId="{BFB0D660-5BF3-4B91-8837-C379A331C3C8}" srcOrd="1" destOrd="0" presId="urn:microsoft.com/office/officeart/2005/8/layout/cycle4"/>
+    <dgm:cxn modelId="{A30841DE-BFFA-4230-9482-801AD41EFA2B}" type="presParOf" srcId="{BFB0D660-5BF3-4B91-8837-C379A331C3C8}" destId="{E72BDFA6-376E-4614-9D7C-A68241E884D9}" srcOrd="0" destOrd="0" presId="urn:microsoft.com/office/officeart/2005/8/layout/cycle4"/>
+    <dgm:cxn modelId="{CACBA36F-C1F7-40FC-A2FB-FB61989D3A10}" type="presParOf" srcId="{BFB0D660-5BF3-4B91-8837-C379A331C3C8}" destId="{A67A60E5-5291-49E4-B3E5-53A58B528285}" srcOrd="1" destOrd="0" presId="urn:microsoft.com/office/officeart/2005/8/layout/cycle4"/>
+    <dgm:cxn modelId="{A0A090BA-174E-4B83-A5A3-62FB73FD6010}" type="presParOf" srcId="{BFB0D660-5BF3-4B91-8837-C379A331C3C8}" destId="{CF4FC7F6-A89C-4633-A10E-BFE92B369DCD}" srcOrd="2" destOrd="0" presId="urn:microsoft.com/office/officeart/2005/8/layout/cycle4"/>
+    <dgm:cxn modelId="{8B5C693F-2DC3-45ED-95BE-0D44780E7E2E}" type="presParOf" srcId="{BFB0D660-5BF3-4B91-8837-C379A331C3C8}" destId="{C0852406-3DC0-4222-A1F8-184593FC4596}" srcOrd="3" destOrd="0" presId="urn:microsoft.com/office/officeart/2005/8/layout/cycle4"/>
+    <dgm:cxn modelId="{D2B64713-ECE8-4C91-A7C7-3C05DD961528}" type="presParOf" srcId="{BFB0D660-5BF3-4B91-8837-C379A331C3C8}" destId="{B569151F-8995-4BD7-A8F3-A948642763E3}" srcOrd="4" destOrd="0" presId="urn:microsoft.com/office/officeart/2005/8/layout/cycle4"/>
+    <dgm:cxn modelId="{0D382917-A1F1-436E-A903-75044A1464A7}" type="presParOf" srcId="{39401A14-B365-4553-9A3D-A401D3183747}" destId="{3B6382B4-DDDF-482E-9E6A-38E6F7DB930C}" srcOrd="2" destOrd="0" presId="urn:microsoft.com/office/officeart/2005/8/layout/cycle4"/>
+    <dgm:cxn modelId="{95A47DCD-0A8D-41B9-925D-6241F1DE1AF0}" type="presParOf" srcId="{39401A14-B365-4553-9A3D-A401D3183747}" destId="{72B333DC-EBE8-4650-A713-61338E0F2C2D}" srcOrd="3" destOrd="0" presId="urn:microsoft.com/office/officeart/2005/8/layout/cycle4"/>
   </dgm:cxnLst>
   <dgm:bg/>
   <dgm:whole/>
   <dgm:extLst>
     <a:ext uri="http://schemas.microsoft.com/office/drawing/2008/diagram">
-      <dsp:dataModelExt xmlns:dsp="http://schemas.microsoft.com/office/drawing/2008/diagram" relId="rId6" minVer="http://schemas.openxmlformats.org/drawingml/2006/diagram"/>
+      <dsp:dataModelExt xmlns:dsp="http://schemas.microsoft.com/office/drawing/2008/diagram" relId="rId7" minVer="http://schemas.openxmlformats.org/drawingml/2006/diagram"/>
     </a:ext>
   </dgm:extLst>
 </dgm:dataModel>
@@ -5059,37 +5063,37 @@
     </dgm:pt>
   </dgm:ptLst>
   <dgm:cxnLst>
-    <dgm:cxn modelId="{C5B0C467-63B8-4E98-832A-9BF26145A1F5}" type="presOf" srcId="{EEB7DF95-B1E1-4355-BDED-67254F3A40BF}" destId="{156A4B50-5EBB-4BD2-8AF0-C722439DBC8D}" srcOrd="0" destOrd="0" presId="urn:microsoft.com/office/officeart/2005/8/layout/radial1"/>
+    <dgm:cxn modelId="{32466211-568E-4F4C-9A05-0F48341D77A5}" type="presOf" srcId="{B8F4B4B5-48BB-4436-A4C8-0772D59377AC}" destId="{B8775ABA-3037-409F-B1F5-5479D38AC897}" srcOrd="0" destOrd="0" presId="urn:microsoft.com/office/officeart/2005/8/layout/radial1"/>
     <dgm:cxn modelId="{CE2AF7AB-2949-4DCD-9C29-6B60E91D8468}" srcId="{0916D3E2-7950-4B1E-A80A-B1A0DFE4D7BE}" destId="{B8F4B4B5-48BB-4436-A4C8-0772D59377AC}" srcOrd="2" destOrd="0" parTransId="{EEB7DF95-B1E1-4355-BDED-67254F3A40BF}" sibTransId="{07F8EC93-687D-4C25-BBFA-77894EDF7DA2}"/>
-    <dgm:cxn modelId="{FFD69671-1326-471B-AA88-BD646D876CA6}" type="presOf" srcId="{7F397B27-ED42-4C0B-84EB-F42483A443DB}" destId="{FC75532D-1A75-4D81-A458-80C91B398F9D}" srcOrd="0" destOrd="0" presId="urn:microsoft.com/office/officeart/2005/8/layout/radial1"/>
     <dgm:cxn modelId="{2D7DE33D-C3DB-49E5-ADF6-52C214CF1C59}" srcId="{0916D3E2-7950-4B1E-A80A-B1A0DFE4D7BE}" destId="{7F397B27-ED42-4C0B-84EB-F42483A443DB}" srcOrd="1" destOrd="0" parTransId="{DD81B84C-4525-4615-9233-87E402AFBABC}" sibTransId="{97EBF3C2-DAC2-40A4-AE80-264E3F21FCCC}"/>
-    <dgm:cxn modelId="{8AA47935-1384-4442-9382-F8E987DEE2AB}" type="presOf" srcId="{B8F4B4B5-48BB-4436-A4C8-0772D59377AC}" destId="{B8775ABA-3037-409F-B1F5-5479D38AC897}" srcOrd="0" destOrd="0" presId="urn:microsoft.com/office/officeart/2005/8/layout/radial1"/>
-    <dgm:cxn modelId="{FB204E9A-D97C-4DB1-A8E6-396FB3CCCB82}" type="presOf" srcId="{EEB7DF95-B1E1-4355-BDED-67254F3A40BF}" destId="{0FA48441-B5ED-464B-AB5B-44DAB679EE64}" srcOrd="1" destOrd="0" presId="urn:microsoft.com/office/officeart/2005/8/layout/radial1"/>
+    <dgm:cxn modelId="{A360CCB1-DA94-4D5D-8885-D945B7CBB29B}" type="presOf" srcId="{7F397B27-ED42-4C0B-84EB-F42483A443DB}" destId="{FC75532D-1A75-4D81-A458-80C91B398F9D}" srcOrd="0" destOrd="0" presId="urn:microsoft.com/office/officeart/2005/8/layout/radial1"/>
+    <dgm:cxn modelId="{C156384B-7D35-4C99-9B98-AD408D2687D2}" type="presOf" srcId="{EEB7DF95-B1E1-4355-BDED-67254F3A40BF}" destId="{156A4B50-5EBB-4BD2-8AF0-C722439DBC8D}" srcOrd="0" destOrd="0" presId="urn:microsoft.com/office/officeart/2005/8/layout/radial1"/>
     <dgm:cxn modelId="{A9B36F8A-C74B-47A9-B539-806F6BB77A1A}" srcId="{CC293B1C-4CF8-4FF0-BBC7-4942ED2D7F88}" destId="{0916D3E2-7950-4B1E-A80A-B1A0DFE4D7BE}" srcOrd="0" destOrd="0" parTransId="{78ED7DF1-7D14-4D64-A8E3-CBD6C30B03FB}" sibTransId="{402F8436-663D-4DB8-A22F-0A8F501EB425}"/>
-    <dgm:cxn modelId="{FE642A5F-EF17-42F2-A1CF-5ED5F599D6F0}" type="presOf" srcId="{DD81B84C-4525-4615-9233-87E402AFBABC}" destId="{9CD455AE-EC69-44E0-B929-B59BCD7E9894}" srcOrd="1" destOrd="0" presId="urn:microsoft.com/office/officeart/2005/8/layout/radial1"/>
-    <dgm:cxn modelId="{AC3146BF-09F1-409C-B7B0-03C9080060BE}" type="presOf" srcId="{CC293B1C-4CF8-4FF0-BBC7-4942ED2D7F88}" destId="{05AAFE4B-4748-4F9C-AA5B-DEC71FC73E20}" srcOrd="0" destOrd="0" presId="urn:microsoft.com/office/officeart/2005/8/layout/radial1"/>
-    <dgm:cxn modelId="{D3C455A3-9EA0-425A-A872-8DC80E4661BC}" type="presOf" srcId="{F26E0BCB-616E-4F5C-9212-B89461307743}" destId="{B26CA117-7877-4BBB-8697-7BAA6B4D1769}" srcOrd="1" destOrd="0" presId="urn:microsoft.com/office/officeart/2005/8/layout/radial1"/>
-    <dgm:cxn modelId="{2F41581B-05FB-425C-A100-BE6F58F23B6A}" type="presOf" srcId="{9B35DA45-8824-4EE3-89F0-3F4E07F980E3}" destId="{51D4E2D9-6364-4FE7-BE7F-89898165258A}" srcOrd="0" destOrd="0" presId="urn:microsoft.com/office/officeart/2005/8/layout/radial1"/>
+    <dgm:cxn modelId="{C438704A-8C59-419E-ACDD-C306BE02FC5D}" type="presOf" srcId="{F26E0BCB-616E-4F5C-9212-B89461307743}" destId="{FB6E935B-AB56-4686-BAF4-89171D311D48}" srcOrd="0" destOrd="0" presId="urn:microsoft.com/office/officeart/2005/8/layout/radial1"/>
+    <dgm:cxn modelId="{DF372361-00BB-4771-871A-C2F83461DC6E}" type="presOf" srcId="{9B35DA45-8824-4EE3-89F0-3F4E07F980E3}" destId="{51D4E2D9-6364-4FE7-BE7F-89898165258A}" srcOrd="0" destOrd="0" presId="urn:microsoft.com/office/officeart/2005/8/layout/radial1"/>
+    <dgm:cxn modelId="{5DA21D05-9213-4A0B-A789-2F492FA0DED0}" type="presOf" srcId="{F26E0BCB-616E-4F5C-9212-B89461307743}" destId="{B26CA117-7877-4BBB-8697-7BAA6B4D1769}" srcOrd="1" destOrd="0" presId="urn:microsoft.com/office/officeart/2005/8/layout/radial1"/>
+    <dgm:cxn modelId="{EC6ED0FF-B7CF-4D29-BEBF-C58BBA27C597}" type="presOf" srcId="{0916D3E2-7950-4B1E-A80A-B1A0DFE4D7BE}" destId="{334F0DA9-4D69-40E7-AE37-8BB2E71C3ACD}" srcOrd="0" destOrd="0" presId="urn:microsoft.com/office/officeart/2005/8/layout/radial1"/>
+    <dgm:cxn modelId="{004B8983-2C9F-4A54-8F54-1EFAEA48945C}" type="presOf" srcId="{DD81B84C-4525-4615-9233-87E402AFBABC}" destId="{3134C74D-D45F-4D44-8DA9-5DD9ACC7028A}" srcOrd="0" destOrd="0" presId="urn:microsoft.com/office/officeart/2005/8/layout/radial1"/>
+    <dgm:cxn modelId="{492FA6C5-4698-4282-9B17-0C7519AF8B67}" type="presOf" srcId="{EEB7DF95-B1E1-4355-BDED-67254F3A40BF}" destId="{0FA48441-B5ED-464B-AB5B-44DAB679EE64}" srcOrd="1" destOrd="0" presId="urn:microsoft.com/office/officeart/2005/8/layout/radial1"/>
+    <dgm:cxn modelId="{453BE74D-8C9D-4350-ADE1-66B53C042D97}" type="presOf" srcId="{CC293B1C-4CF8-4FF0-BBC7-4942ED2D7F88}" destId="{05AAFE4B-4748-4F9C-AA5B-DEC71FC73E20}" srcOrd="0" destOrd="0" presId="urn:microsoft.com/office/officeart/2005/8/layout/radial1"/>
+    <dgm:cxn modelId="{0B8AF5BA-F86A-4F42-BC79-326E76277372}" type="presOf" srcId="{DD81B84C-4525-4615-9233-87E402AFBABC}" destId="{9CD455AE-EC69-44E0-B929-B59BCD7E9894}" srcOrd="1" destOrd="0" presId="urn:microsoft.com/office/officeart/2005/8/layout/radial1"/>
     <dgm:cxn modelId="{08978BA1-AE5A-4DFF-A0C3-92D4A0078A98}" srcId="{0916D3E2-7950-4B1E-A80A-B1A0DFE4D7BE}" destId="{9B35DA45-8824-4EE3-89F0-3F4E07F980E3}" srcOrd="0" destOrd="0" parTransId="{F26E0BCB-616E-4F5C-9212-B89461307743}" sibTransId="{6FFF208B-A136-4388-9736-DE2BA4AFD5AF}"/>
-    <dgm:cxn modelId="{93A4C861-874F-4F51-8A98-8BA4BBB0FAE5}" type="presOf" srcId="{F26E0BCB-616E-4F5C-9212-B89461307743}" destId="{FB6E935B-AB56-4686-BAF4-89171D311D48}" srcOrd="0" destOrd="0" presId="urn:microsoft.com/office/officeart/2005/8/layout/radial1"/>
-    <dgm:cxn modelId="{D1EDAD78-A7BF-4FB2-A40F-4DC43BB7F4F0}" type="presOf" srcId="{DD81B84C-4525-4615-9233-87E402AFBABC}" destId="{3134C74D-D45F-4D44-8DA9-5DD9ACC7028A}" srcOrd="0" destOrd="0" presId="urn:microsoft.com/office/officeart/2005/8/layout/radial1"/>
-    <dgm:cxn modelId="{5649B418-D8B7-44E2-AFA2-999EF19505C6}" type="presOf" srcId="{0916D3E2-7950-4B1E-A80A-B1A0DFE4D7BE}" destId="{334F0DA9-4D69-40E7-AE37-8BB2E71C3ACD}" srcOrd="0" destOrd="0" presId="urn:microsoft.com/office/officeart/2005/8/layout/radial1"/>
-    <dgm:cxn modelId="{838E655C-0FBD-4B57-A260-298F55A88790}" type="presParOf" srcId="{05AAFE4B-4748-4F9C-AA5B-DEC71FC73E20}" destId="{334F0DA9-4D69-40E7-AE37-8BB2E71C3ACD}" srcOrd="0" destOrd="0" presId="urn:microsoft.com/office/officeart/2005/8/layout/radial1"/>
-    <dgm:cxn modelId="{07900AF0-1300-4194-B1DC-E267CD41DC0F}" type="presParOf" srcId="{05AAFE4B-4748-4F9C-AA5B-DEC71FC73E20}" destId="{FB6E935B-AB56-4686-BAF4-89171D311D48}" srcOrd="1" destOrd="0" presId="urn:microsoft.com/office/officeart/2005/8/layout/radial1"/>
-    <dgm:cxn modelId="{7B3A9E12-7C8D-46A3-A997-3B39F83C924B}" type="presParOf" srcId="{FB6E935B-AB56-4686-BAF4-89171D311D48}" destId="{B26CA117-7877-4BBB-8697-7BAA6B4D1769}" srcOrd="0" destOrd="0" presId="urn:microsoft.com/office/officeart/2005/8/layout/radial1"/>
-    <dgm:cxn modelId="{1EBBBDC4-0C3A-4F46-A7A3-CCD8307DE048}" type="presParOf" srcId="{05AAFE4B-4748-4F9C-AA5B-DEC71FC73E20}" destId="{51D4E2D9-6364-4FE7-BE7F-89898165258A}" srcOrd="2" destOrd="0" presId="urn:microsoft.com/office/officeart/2005/8/layout/radial1"/>
-    <dgm:cxn modelId="{C005CF3E-1373-4452-B716-D38EA858B885}" type="presParOf" srcId="{05AAFE4B-4748-4F9C-AA5B-DEC71FC73E20}" destId="{3134C74D-D45F-4D44-8DA9-5DD9ACC7028A}" srcOrd="3" destOrd="0" presId="urn:microsoft.com/office/officeart/2005/8/layout/radial1"/>
-    <dgm:cxn modelId="{83B2BB80-135B-4841-920C-CA576DC1A475}" type="presParOf" srcId="{3134C74D-D45F-4D44-8DA9-5DD9ACC7028A}" destId="{9CD455AE-EC69-44E0-B929-B59BCD7E9894}" srcOrd="0" destOrd="0" presId="urn:microsoft.com/office/officeart/2005/8/layout/radial1"/>
-    <dgm:cxn modelId="{3B4CF93D-B136-4509-8916-FA3A2E6D1543}" type="presParOf" srcId="{05AAFE4B-4748-4F9C-AA5B-DEC71FC73E20}" destId="{FC75532D-1A75-4D81-A458-80C91B398F9D}" srcOrd="4" destOrd="0" presId="urn:microsoft.com/office/officeart/2005/8/layout/radial1"/>
-    <dgm:cxn modelId="{30E7E442-9D0F-4D12-B175-80BF5E4B23BA}" type="presParOf" srcId="{05AAFE4B-4748-4F9C-AA5B-DEC71FC73E20}" destId="{156A4B50-5EBB-4BD2-8AF0-C722439DBC8D}" srcOrd="5" destOrd="0" presId="urn:microsoft.com/office/officeart/2005/8/layout/radial1"/>
-    <dgm:cxn modelId="{90EC2B14-6264-4AE8-AB04-4C81893B22A7}" type="presParOf" srcId="{156A4B50-5EBB-4BD2-8AF0-C722439DBC8D}" destId="{0FA48441-B5ED-464B-AB5B-44DAB679EE64}" srcOrd="0" destOrd="0" presId="urn:microsoft.com/office/officeart/2005/8/layout/radial1"/>
-    <dgm:cxn modelId="{07E72964-0373-4D78-AF3A-8B4EEF308EDB}" type="presParOf" srcId="{05AAFE4B-4748-4F9C-AA5B-DEC71FC73E20}" destId="{B8775ABA-3037-409F-B1F5-5479D38AC897}" srcOrd="6" destOrd="0" presId="urn:microsoft.com/office/officeart/2005/8/layout/radial1"/>
+    <dgm:cxn modelId="{DFD1238C-C4B4-4204-A776-F58A3C21FD18}" type="presParOf" srcId="{05AAFE4B-4748-4F9C-AA5B-DEC71FC73E20}" destId="{334F0DA9-4D69-40E7-AE37-8BB2E71C3ACD}" srcOrd="0" destOrd="0" presId="urn:microsoft.com/office/officeart/2005/8/layout/radial1"/>
+    <dgm:cxn modelId="{A44518DE-DE00-421A-BC4D-EAC5FD533D44}" type="presParOf" srcId="{05AAFE4B-4748-4F9C-AA5B-DEC71FC73E20}" destId="{FB6E935B-AB56-4686-BAF4-89171D311D48}" srcOrd="1" destOrd="0" presId="urn:microsoft.com/office/officeart/2005/8/layout/radial1"/>
+    <dgm:cxn modelId="{77D1EC55-60E1-4F55-8D7F-93798EDE1F31}" type="presParOf" srcId="{FB6E935B-AB56-4686-BAF4-89171D311D48}" destId="{B26CA117-7877-4BBB-8697-7BAA6B4D1769}" srcOrd="0" destOrd="0" presId="urn:microsoft.com/office/officeart/2005/8/layout/radial1"/>
+    <dgm:cxn modelId="{2862FCBD-FA85-4BC5-9F3C-D7F773BECA94}" type="presParOf" srcId="{05AAFE4B-4748-4F9C-AA5B-DEC71FC73E20}" destId="{51D4E2D9-6364-4FE7-BE7F-89898165258A}" srcOrd="2" destOrd="0" presId="urn:microsoft.com/office/officeart/2005/8/layout/radial1"/>
+    <dgm:cxn modelId="{BB904535-DB04-44F7-9653-62BDF9AD9B45}" type="presParOf" srcId="{05AAFE4B-4748-4F9C-AA5B-DEC71FC73E20}" destId="{3134C74D-D45F-4D44-8DA9-5DD9ACC7028A}" srcOrd="3" destOrd="0" presId="urn:microsoft.com/office/officeart/2005/8/layout/radial1"/>
+    <dgm:cxn modelId="{DA7E49B7-8296-4E55-8CF8-08EFAFBE8B57}" type="presParOf" srcId="{3134C74D-D45F-4D44-8DA9-5DD9ACC7028A}" destId="{9CD455AE-EC69-44E0-B929-B59BCD7E9894}" srcOrd="0" destOrd="0" presId="urn:microsoft.com/office/officeart/2005/8/layout/radial1"/>
+    <dgm:cxn modelId="{A3D1199F-724A-4079-A43B-90277ABCA217}" type="presParOf" srcId="{05AAFE4B-4748-4F9C-AA5B-DEC71FC73E20}" destId="{FC75532D-1A75-4D81-A458-80C91B398F9D}" srcOrd="4" destOrd="0" presId="urn:microsoft.com/office/officeart/2005/8/layout/radial1"/>
+    <dgm:cxn modelId="{B7FF283E-F640-4CCB-859D-BF2ABB7270FE}" type="presParOf" srcId="{05AAFE4B-4748-4F9C-AA5B-DEC71FC73E20}" destId="{156A4B50-5EBB-4BD2-8AF0-C722439DBC8D}" srcOrd="5" destOrd="0" presId="urn:microsoft.com/office/officeart/2005/8/layout/radial1"/>
+    <dgm:cxn modelId="{76B4818D-BBD1-41DF-9CA6-79AFF0FE057B}" type="presParOf" srcId="{156A4B50-5EBB-4BD2-8AF0-C722439DBC8D}" destId="{0FA48441-B5ED-464B-AB5B-44DAB679EE64}" srcOrd="0" destOrd="0" presId="urn:microsoft.com/office/officeart/2005/8/layout/radial1"/>
+    <dgm:cxn modelId="{F4DBEF20-3299-4B27-9ACB-9B479F62781D}" type="presParOf" srcId="{05AAFE4B-4748-4F9C-AA5B-DEC71FC73E20}" destId="{B8775ABA-3037-409F-B1F5-5479D38AC897}" srcOrd="6" destOrd="0" presId="urn:microsoft.com/office/officeart/2005/8/layout/radial1"/>
   </dgm:cxnLst>
   <dgm:bg/>
   <dgm:whole/>
   <dgm:extLst>
     <a:ext uri="http://schemas.microsoft.com/office/drawing/2008/diagram">
-      <dsp:dataModelExt xmlns:dsp="http://schemas.microsoft.com/office/drawing/2008/diagram" relId="rId12" minVer="http://schemas.openxmlformats.org/drawingml/2006/diagram"/>
+      <dsp:dataModelExt xmlns:dsp="http://schemas.microsoft.com/office/drawing/2008/diagram" relId="rId13" minVer="http://schemas.openxmlformats.org/drawingml/2006/diagram"/>
     </a:ext>
   </dgm:extLst>
 </dgm:dataModel>
@@ -5423,37 +5427,37 @@
     </dgm:pt>
   </dgm:ptLst>
   <dgm:cxnLst>
-    <dgm:cxn modelId="{DB15E516-F42A-4C94-9AED-F13746504F9E}" type="presOf" srcId="{0916D3E2-7950-4B1E-A80A-B1A0DFE4D7BE}" destId="{334F0DA9-4D69-40E7-AE37-8BB2E71C3ACD}" srcOrd="0" destOrd="0" presId="urn:microsoft.com/office/officeart/2005/8/layout/radial1"/>
+    <dgm:cxn modelId="{5989A7C6-A109-4C5B-ACAF-87802EA9D9D2}" type="presOf" srcId="{CC293B1C-4CF8-4FF0-BBC7-4942ED2D7F88}" destId="{05AAFE4B-4748-4F9C-AA5B-DEC71FC73E20}" srcOrd="0" destOrd="0" presId="urn:microsoft.com/office/officeart/2005/8/layout/radial1"/>
+    <dgm:cxn modelId="{CD34F097-7E3C-4B79-A86A-2E68BDCDEB4A}" type="presOf" srcId="{9B35DA45-8824-4EE3-89F0-3F4E07F980E3}" destId="{51D4E2D9-6364-4FE7-BE7F-89898165258A}" srcOrd="0" destOrd="0" presId="urn:microsoft.com/office/officeart/2005/8/layout/radial1"/>
     <dgm:cxn modelId="{CE2AF7AB-2949-4DCD-9C29-6B60E91D8468}" srcId="{0916D3E2-7950-4B1E-A80A-B1A0DFE4D7BE}" destId="{B8F4B4B5-48BB-4436-A4C8-0772D59377AC}" srcOrd="2" destOrd="0" parTransId="{EEB7DF95-B1E1-4355-BDED-67254F3A40BF}" sibTransId="{07F8EC93-687D-4C25-BBFA-77894EDF7DA2}"/>
     <dgm:cxn modelId="{2D7DE33D-C3DB-49E5-ADF6-52C214CF1C59}" srcId="{0916D3E2-7950-4B1E-A80A-B1A0DFE4D7BE}" destId="{7F397B27-ED42-4C0B-84EB-F42483A443DB}" srcOrd="1" destOrd="0" parTransId="{DD81B84C-4525-4615-9233-87E402AFBABC}" sibTransId="{97EBF3C2-DAC2-40A4-AE80-264E3F21FCCC}"/>
-    <dgm:cxn modelId="{50745661-EB91-4725-8275-37B8237E19AC}" type="presOf" srcId="{EEB7DF95-B1E1-4355-BDED-67254F3A40BF}" destId="{0FA48441-B5ED-464B-AB5B-44DAB679EE64}" srcOrd="1" destOrd="0" presId="urn:microsoft.com/office/officeart/2005/8/layout/radial1"/>
-    <dgm:cxn modelId="{9E70CB9D-F179-44F2-94C8-78C50A8D7F07}" type="presOf" srcId="{9B35DA45-8824-4EE3-89F0-3F4E07F980E3}" destId="{51D4E2D9-6364-4FE7-BE7F-89898165258A}" srcOrd="0" destOrd="0" presId="urn:microsoft.com/office/officeart/2005/8/layout/radial1"/>
+    <dgm:cxn modelId="{48A45D70-AC78-4CEC-A78E-A280EA40D109}" type="presOf" srcId="{DD81B84C-4525-4615-9233-87E402AFBABC}" destId="{3134C74D-D45F-4D44-8DA9-5DD9ACC7028A}" srcOrd="0" destOrd="0" presId="urn:microsoft.com/office/officeart/2005/8/layout/radial1"/>
+    <dgm:cxn modelId="{78E03D6D-66F1-4F6C-91E6-CCE419C3436A}" type="presOf" srcId="{EEB7DF95-B1E1-4355-BDED-67254F3A40BF}" destId="{156A4B50-5EBB-4BD2-8AF0-C722439DBC8D}" srcOrd="0" destOrd="0" presId="urn:microsoft.com/office/officeart/2005/8/layout/radial1"/>
+    <dgm:cxn modelId="{DA0221DE-A876-4C6F-83A1-86327B7BF2D8}" type="presOf" srcId="{0916D3E2-7950-4B1E-A80A-B1A0DFE4D7BE}" destId="{334F0DA9-4D69-40E7-AE37-8BB2E71C3ACD}" srcOrd="0" destOrd="0" presId="urn:microsoft.com/office/officeart/2005/8/layout/radial1"/>
     <dgm:cxn modelId="{A9B36F8A-C74B-47A9-B539-806F6BB77A1A}" srcId="{CC293B1C-4CF8-4FF0-BBC7-4942ED2D7F88}" destId="{0916D3E2-7950-4B1E-A80A-B1A0DFE4D7BE}" srcOrd="0" destOrd="0" parTransId="{78ED7DF1-7D14-4D64-A8E3-CBD6C30B03FB}" sibTransId="{402F8436-663D-4DB8-A22F-0A8F501EB425}"/>
-    <dgm:cxn modelId="{B4DD1CEC-B9B7-452E-A70F-17C8EB3D45E7}" type="presOf" srcId="{EEB7DF95-B1E1-4355-BDED-67254F3A40BF}" destId="{156A4B50-5EBB-4BD2-8AF0-C722439DBC8D}" srcOrd="0" destOrd="0" presId="urn:microsoft.com/office/officeart/2005/8/layout/radial1"/>
-    <dgm:cxn modelId="{98B52D4E-2366-439A-8368-29F3492BFF93}" type="presOf" srcId="{B8F4B4B5-48BB-4436-A4C8-0772D59377AC}" destId="{B8775ABA-3037-409F-B1F5-5479D38AC897}" srcOrd="0" destOrd="0" presId="urn:microsoft.com/office/officeart/2005/8/layout/radial1"/>
-    <dgm:cxn modelId="{0282A96A-18A1-4993-939E-81A7EA21E1A7}" type="presOf" srcId="{DD81B84C-4525-4615-9233-87E402AFBABC}" destId="{3134C74D-D45F-4D44-8DA9-5DD9ACC7028A}" srcOrd="0" destOrd="0" presId="urn:microsoft.com/office/officeart/2005/8/layout/radial1"/>
-    <dgm:cxn modelId="{C410C9C9-5CFB-4AAB-B128-E5BF16260967}" type="presOf" srcId="{7F397B27-ED42-4C0B-84EB-F42483A443DB}" destId="{FC75532D-1A75-4D81-A458-80C91B398F9D}" srcOrd="0" destOrd="0" presId="urn:microsoft.com/office/officeart/2005/8/layout/radial1"/>
-    <dgm:cxn modelId="{C584A466-C23E-4C81-8632-9AF0FBB82D54}" type="presOf" srcId="{CC293B1C-4CF8-4FF0-BBC7-4942ED2D7F88}" destId="{05AAFE4B-4748-4F9C-AA5B-DEC71FC73E20}" srcOrd="0" destOrd="0" presId="urn:microsoft.com/office/officeart/2005/8/layout/radial1"/>
-    <dgm:cxn modelId="{1EE62FD5-27AB-4F44-B819-A4FE5C07BF66}" type="presOf" srcId="{F26E0BCB-616E-4F5C-9212-B89461307743}" destId="{FB6E935B-AB56-4686-BAF4-89171D311D48}" srcOrd="0" destOrd="0" presId="urn:microsoft.com/office/officeart/2005/8/layout/radial1"/>
-    <dgm:cxn modelId="{04B2CCBB-2F3E-4D49-999C-541CBB7E566F}" type="presOf" srcId="{DD81B84C-4525-4615-9233-87E402AFBABC}" destId="{9CD455AE-EC69-44E0-B929-B59BCD7E9894}" srcOrd="1" destOrd="0" presId="urn:microsoft.com/office/officeart/2005/8/layout/radial1"/>
-    <dgm:cxn modelId="{01547B4F-7DF4-4612-B269-9AD0912CC5B3}" type="presOf" srcId="{F26E0BCB-616E-4F5C-9212-B89461307743}" destId="{B26CA117-7877-4BBB-8697-7BAA6B4D1769}" srcOrd="1" destOrd="0" presId="urn:microsoft.com/office/officeart/2005/8/layout/radial1"/>
+    <dgm:cxn modelId="{82ED7906-3CA6-46E7-82BB-E81D510BFF4E}" type="presOf" srcId="{F26E0BCB-616E-4F5C-9212-B89461307743}" destId="{FB6E935B-AB56-4686-BAF4-89171D311D48}" srcOrd="0" destOrd="0" presId="urn:microsoft.com/office/officeart/2005/8/layout/radial1"/>
+    <dgm:cxn modelId="{F1E3904F-F6BD-4944-8760-13662E3EAB53}" type="presOf" srcId="{DD81B84C-4525-4615-9233-87E402AFBABC}" destId="{9CD455AE-EC69-44E0-B929-B59BCD7E9894}" srcOrd="1" destOrd="0" presId="urn:microsoft.com/office/officeart/2005/8/layout/radial1"/>
+    <dgm:cxn modelId="{A78A99A7-1C48-47BB-87D8-4B0466CE856F}" type="presOf" srcId="{F26E0BCB-616E-4F5C-9212-B89461307743}" destId="{B26CA117-7877-4BBB-8697-7BAA6B4D1769}" srcOrd="1" destOrd="0" presId="urn:microsoft.com/office/officeart/2005/8/layout/radial1"/>
+    <dgm:cxn modelId="{CB632A09-8E25-4EFA-8D3B-1A0C704630C5}" type="presOf" srcId="{EEB7DF95-B1E1-4355-BDED-67254F3A40BF}" destId="{0FA48441-B5ED-464B-AB5B-44DAB679EE64}" srcOrd="1" destOrd="0" presId="urn:microsoft.com/office/officeart/2005/8/layout/radial1"/>
+    <dgm:cxn modelId="{ED2ECB59-D0F9-43E8-9943-1A702D9205A2}" type="presOf" srcId="{B8F4B4B5-48BB-4436-A4C8-0772D59377AC}" destId="{B8775ABA-3037-409F-B1F5-5479D38AC897}" srcOrd="0" destOrd="0" presId="urn:microsoft.com/office/officeart/2005/8/layout/radial1"/>
     <dgm:cxn modelId="{08978BA1-AE5A-4DFF-A0C3-92D4A0078A98}" srcId="{0916D3E2-7950-4B1E-A80A-B1A0DFE4D7BE}" destId="{9B35DA45-8824-4EE3-89F0-3F4E07F980E3}" srcOrd="0" destOrd="0" parTransId="{F26E0BCB-616E-4F5C-9212-B89461307743}" sibTransId="{6FFF208B-A136-4388-9736-DE2BA4AFD5AF}"/>
-    <dgm:cxn modelId="{9D5BFAF3-A99D-4886-A5C2-5F4E9F019256}" type="presParOf" srcId="{05AAFE4B-4748-4F9C-AA5B-DEC71FC73E20}" destId="{334F0DA9-4D69-40E7-AE37-8BB2E71C3ACD}" srcOrd="0" destOrd="0" presId="urn:microsoft.com/office/officeart/2005/8/layout/radial1"/>
-    <dgm:cxn modelId="{C7B450B9-4615-46A1-8939-68C5D5F2DA90}" type="presParOf" srcId="{05AAFE4B-4748-4F9C-AA5B-DEC71FC73E20}" destId="{FB6E935B-AB56-4686-BAF4-89171D311D48}" srcOrd="1" destOrd="0" presId="urn:microsoft.com/office/officeart/2005/8/layout/radial1"/>
-    <dgm:cxn modelId="{7CA8D4D8-D836-4402-9E56-538FA5F97C60}" type="presParOf" srcId="{FB6E935B-AB56-4686-BAF4-89171D311D48}" destId="{B26CA117-7877-4BBB-8697-7BAA6B4D1769}" srcOrd="0" destOrd="0" presId="urn:microsoft.com/office/officeart/2005/8/layout/radial1"/>
-    <dgm:cxn modelId="{9C10E80F-122C-4B54-9AAF-345EC2E0F945}" type="presParOf" srcId="{05AAFE4B-4748-4F9C-AA5B-DEC71FC73E20}" destId="{51D4E2D9-6364-4FE7-BE7F-89898165258A}" srcOrd="2" destOrd="0" presId="urn:microsoft.com/office/officeart/2005/8/layout/radial1"/>
-    <dgm:cxn modelId="{CB403FEA-962A-4D6D-8EC6-CEB0D242EAE4}" type="presParOf" srcId="{05AAFE4B-4748-4F9C-AA5B-DEC71FC73E20}" destId="{3134C74D-D45F-4D44-8DA9-5DD9ACC7028A}" srcOrd="3" destOrd="0" presId="urn:microsoft.com/office/officeart/2005/8/layout/radial1"/>
-    <dgm:cxn modelId="{BC0C19C8-F26F-408E-A7FA-A0BAF47E00C8}" type="presParOf" srcId="{3134C74D-D45F-4D44-8DA9-5DD9ACC7028A}" destId="{9CD455AE-EC69-44E0-B929-B59BCD7E9894}" srcOrd="0" destOrd="0" presId="urn:microsoft.com/office/officeart/2005/8/layout/radial1"/>
-    <dgm:cxn modelId="{471CF14E-6CFC-4A05-86A3-D77181601DDD}" type="presParOf" srcId="{05AAFE4B-4748-4F9C-AA5B-DEC71FC73E20}" destId="{FC75532D-1A75-4D81-A458-80C91B398F9D}" srcOrd="4" destOrd="0" presId="urn:microsoft.com/office/officeart/2005/8/layout/radial1"/>
-    <dgm:cxn modelId="{6D7D15AB-445B-4069-9854-5B0C60721128}" type="presParOf" srcId="{05AAFE4B-4748-4F9C-AA5B-DEC71FC73E20}" destId="{156A4B50-5EBB-4BD2-8AF0-C722439DBC8D}" srcOrd="5" destOrd="0" presId="urn:microsoft.com/office/officeart/2005/8/layout/radial1"/>
-    <dgm:cxn modelId="{3D55ABD8-EF54-43D9-B487-EC33D8C10E14}" type="presParOf" srcId="{156A4B50-5EBB-4BD2-8AF0-C722439DBC8D}" destId="{0FA48441-B5ED-464B-AB5B-44DAB679EE64}" srcOrd="0" destOrd="0" presId="urn:microsoft.com/office/officeart/2005/8/layout/radial1"/>
-    <dgm:cxn modelId="{A5F5A5FB-678C-4682-AFF1-F9BE564FC9B7}" type="presParOf" srcId="{05AAFE4B-4748-4F9C-AA5B-DEC71FC73E20}" destId="{B8775ABA-3037-409F-B1F5-5479D38AC897}" srcOrd="6" destOrd="0" presId="urn:microsoft.com/office/officeart/2005/8/layout/radial1"/>
+    <dgm:cxn modelId="{292298ED-B3AB-4487-A3F1-6EEF422FC009}" type="presOf" srcId="{7F397B27-ED42-4C0B-84EB-F42483A443DB}" destId="{FC75532D-1A75-4D81-A458-80C91B398F9D}" srcOrd="0" destOrd="0" presId="urn:microsoft.com/office/officeart/2005/8/layout/radial1"/>
+    <dgm:cxn modelId="{4C2D499F-C9FC-42FA-B85F-B234B0055F3B}" type="presParOf" srcId="{05AAFE4B-4748-4F9C-AA5B-DEC71FC73E20}" destId="{334F0DA9-4D69-40E7-AE37-8BB2E71C3ACD}" srcOrd="0" destOrd="0" presId="urn:microsoft.com/office/officeart/2005/8/layout/radial1"/>
+    <dgm:cxn modelId="{87A23D33-9E12-4CF6-B946-941F431794BC}" type="presParOf" srcId="{05AAFE4B-4748-4F9C-AA5B-DEC71FC73E20}" destId="{FB6E935B-AB56-4686-BAF4-89171D311D48}" srcOrd="1" destOrd="0" presId="urn:microsoft.com/office/officeart/2005/8/layout/radial1"/>
+    <dgm:cxn modelId="{841DA170-B390-407F-AC31-FAAE51654139}" type="presParOf" srcId="{FB6E935B-AB56-4686-BAF4-89171D311D48}" destId="{B26CA117-7877-4BBB-8697-7BAA6B4D1769}" srcOrd="0" destOrd="0" presId="urn:microsoft.com/office/officeart/2005/8/layout/radial1"/>
+    <dgm:cxn modelId="{A33D6D5C-CF63-4BE2-B044-97C7421F16B1}" type="presParOf" srcId="{05AAFE4B-4748-4F9C-AA5B-DEC71FC73E20}" destId="{51D4E2D9-6364-4FE7-BE7F-89898165258A}" srcOrd="2" destOrd="0" presId="urn:microsoft.com/office/officeart/2005/8/layout/radial1"/>
+    <dgm:cxn modelId="{43246134-EE41-4725-A731-89DB0CB52D03}" type="presParOf" srcId="{05AAFE4B-4748-4F9C-AA5B-DEC71FC73E20}" destId="{3134C74D-D45F-4D44-8DA9-5DD9ACC7028A}" srcOrd="3" destOrd="0" presId="urn:microsoft.com/office/officeart/2005/8/layout/radial1"/>
+    <dgm:cxn modelId="{B87649A2-1FDC-4C88-BA2B-D58B0317A4F7}" type="presParOf" srcId="{3134C74D-D45F-4D44-8DA9-5DD9ACC7028A}" destId="{9CD455AE-EC69-44E0-B929-B59BCD7E9894}" srcOrd="0" destOrd="0" presId="urn:microsoft.com/office/officeart/2005/8/layout/radial1"/>
+    <dgm:cxn modelId="{9A17387F-009E-4B2C-868D-BA1CF0441796}" type="presParOf" srcId="{05AAFE4B-4748-4F9C-AA5B-DEC71FC73E20}" destId="{FC75532D-1A75-4D81-A458-80C91B398F9D}" srcOrd="4" destOrd="0" presId="urn:microsoft.com/office/officeart/2005/8/layout/radial1"/>
+    <dgm:cxn modelId="{6A41734C-17E1-4ADC-8417-808927F10F74}" type="presParOf" srcId="{05AAFE4B-4748-4F9C-AA5B-DEC71FC73E20}" destId="{156A4B50-5EBB-4BD2-8AF0-C722439DBC8D}" srcOrd="5" destOrd="0" presId="urn:microsoft.com/office/officeart/2005/8/layout/radial1"/>
+    <dgm:cxn modelId="{C2109170-BACA-47B9-87FD-AE165ABDCCFC}" type="presParOf" srcId="{156A4B50-5EBB-4BD2-8AF0-C722439DBC8D}" destId="{0FA48441-B5ED-464B-AB5B-44DAB679EE64}" srcOrd="0" destOrd="0" presId="urn:microsoft.com/office/officeart/2005/8/layout/radial1"/>
+    <dgm:cxn modelId="{0DED4196-6300-46C6-B142-F38F362E26C2}" type="presParOf" srcId="{05AAFE4B-4748-4F9C-AA5B-DEC71FC73E20}" destId="{B8775ABA-3037-409F-B1F5-5479D38AC897}" srcOrd="6" destOrd="0" presId="urn:microsoft.com/office/officeart/2005/8/layout/radial1"/>
   </dgm:cxnLst>
   <dgm:bg/>
   <dgm:whole/>
   <dgm:extLst>
     <a:ext uri="http://schemas.microsoft.com/office/drawing/2008/diagram">
-      <dsp:dataModelExt xmlns:dsp="http://schemas.microsoft.com/office/drawing/2008/diagram" relId="rId20" minVer="http://schemas.openxmlformats.org/drawingml/2006/diagram"/>
+      <dsp:dataModelExt xmlns:dsp="http://schemas.microsoft.com/office/drawing/2008/diagram" relId="rId21" minVer="http://schemas.openxmlformats.org/drawingml/2006/diagram"/>
     </a:ext>
   </dgm:extLst>
 </dgm:dataModel>
@@ -5849,53 +5853,53 @@
     </dgm:pt>
   </dgm:ptLst>
   <dgm:cxnLst>
-    <dgm:cxn modelId="{B99CEEEE-DEDD-48D3-B19D-5F7501FE6727}" type="presOf" srcId="{BA786E09-868C-446C-BCAD-1B9A337A2314}" destId="{31F77346-6636-44FE-8237-42E5F75F0855}" srcOrd="1" destOrd="0" presId="urn:microsoft.com/office/officeart/2005/8/layout/hList7"/>
-    <dgm:cxn modelId="{2BF835B8-949D-49B7-867B-7865BFFAFC40}" type="presOf" srcId="{81607F9D-ACA8-4EBC-97F3-AE620D537126}" destId="{AECDF339-533B-4319-9DD1-FE0312AA5FE7}" srcOrd="0" destOrd="0" presId="urn:microsoft.com/office/officeart/2005/8/layout/hList7"/>
-    <dgm:cxn modelId="{8E11DAFE-A12F-4255-A923-717A27CEA661}" type="presOf" srcId="{5EE301F9-AA62-4FDD-BBD4-EB5F68D85FEC}" destId="{6B2B5E85-AAEA-413B-89EF-96FC0B61D0DB}" srcOrd="1" destOrd="0" presId="urn:microsoft.com/office/officeart/2005/8/layout/hList7"/>
+    <dgm:cxn modelId="{8C1BC575-FAC1-4014-816E-DB56582E5905}" type="presOf" srcId="{47253CFC-4569-4709-81D3-DEEB42841B34}" destId="{65C1CC62-47DD-4AE0-BB4E-E1AA4210EAD1}" srcOrd="1" destOrd="0" presId="urn:microsoft.com/office/officeart/2005/8/layout/hList7"/>
+    <dgm:cxn modelId="{97F9A8A2-B397-4492-A248-42CFC61400E4}" type="presOf" srcId="{2F25E3F7-E9EB-4C08-9116-69D5C4FD6E2A}" destId="{2845AC54-25A9-480C-BA9C-51BB56258253}" srcOrd="0" destOrd="0" presId="urn:microsoft.com/office/officeart/2005/8/layout/hList7"/>
+    <dgm:cxn modelId="{197988CE-F5BE-4319-A0D3-C05F5C22CF66}" type="presOf" srcId="{7A2D0BBB-4796-4683-A258-869CCE2EFDEE}" destId="{46B8E31D-92A9-4F7C-AC64-291B22E56C19}" srcOrd="0" destOrd="0" presId="urn:microsoft.com/office/officeart/2005/8/layout/hList7"/>
     <dgm:cxn modelId="{2E016A71-4A74-45F5-AD15-07D3B1D0466D}" srcId="{95C89F30-E4C0-41F0-9F78-CFBA2BC6B6E7}" destId="{47253CFC-4569-4709-81D3-DEEB42841B34}" srcOrd="2" destOrd="0" parTransId="{790D9CA9-D5EB-4ABB-B3FF-C076CA534420}" sibTransId="{2F25E3F7-E9EB-4C08-9116-69D5C4FD6E2A}"/>
-    <dgm:cxn modelId="{071A92E1-79D7-49E2-8F2B-E48D666D5D4C}" type="presOf" srcId="{81607F9D-ACA8-4EBC-97F3-AE620D537126}" destId="{FCBD48AD-6356-4016-B622-1476036943D2}" srcOrd="1" destOrd="0" presId="urn:microsoft.com/office/officeart/2005/8/layout/hList7"/>
-    <dgm:cxn modelId="{27233627-9D0A-4338-8F73-F218246B87B2}" type="presOf" srcId="{95C89F30-E4C0-41F0-9F78-CFBA2BC6B6E7}" destId="{68497B09-3716-4EBD-AC6B-8AE2BDCC8972}" srcOrd="0" destOrd="0" presId="urn:microsoft.com/office/officeart/2005/8/layout/hList7"/>
+    <dgm:cxn modelId="{CBFA5B2F-FA2B-40C7-9AF9-BAACF290EBC3}" type="presOf" srcId="{94CA40FB-60B0-465C-89DE-37B57251E362}" destId="{6A4D6A8E-A18C-499A-84BC-74FED5388C93}" srcOrd="0" destOrd="0" presId="urn:microsoft.com/office/officeart/2005/8/layout/hList7"/>
+    <dgm:cxn modelId="{207FA6B7-B1DD-4863-9611-D73E08238824}" type="presOf" srcId="{47253CFC-4569-4709-81D3-DEEB42841B34}" destId="{18E220CA-4E07-4273-9F20-D66E44D1CC15}" srcOrd="0" destOrd="0" presId="urn:microsoft.com/office/officeart/2005/8/layout/hList7"/>
+    <dgm:cxn modelId="{58E42A6D-20E2-4E84-974B-27D9B62969DF}" type="presOf" srcId="{95C89F30-E4C0-41F0-9F78-CFBA2BC6B6E7}" destId="{68497B09-3716-4EBD-AC6B-8AE2BDCC8972}" srcOrd="0" destOrd="0" presId="urn:microsoft.com/office/officeart/2005/8/layout/hList7"/>
     <dgm:cxn modelId="{4E004507-C92D-4D0B-9DBB-DB4591A9B903}" srcId="{95C89F30-E4C0-41F0-9F78-CFBA2BC6B6E7}" destId="{BA786E09-868C-446C-BCAD-1B9A337A2314}" srcOrd="3" destOrd="0" parTransId="{59BE49D1-A09D-46A0-A218-5983A849445B}" sibTransId="{870FB8E6-A3E1-4439-9131-142A0512FE32}"/>
-    <dgm:cxn modelId="{635D1813-ED9C-4050-9146-E2AE7665EFB6}" type="presOf" srcId="{47253CFC-4569-4709-81D3-DEEB42841B34}" destId="{65C1CC62-47DD-4AE0-BB4E-E1AA4210EAD1}" srcOrd="1" destOrd="0" presId="urn:microsoft.com/office/officeart/2005/8/layout/hList7"/>
-    <dgm:cxn modelId="{030AF9D1-8327-4346-BE29-0A65EEDAE4CD}" type="presOf" srcId="{94CA40FB-60B0-465C-89DE-37B57251E362}" destId="{6A4D6A8E-A18C-499A-84BC-74FED5388C93}" srcOrd="0" destOrd="0" presId="urn:microsoft.com/office/officeart/2005/8/layout/hList7"/>
-    <dgm:cxn modelId="{1B8D7EA4-9447-476C-9EEA-7DEDAC84D044}" type="presOf" srcId="{5EE301F9-AA62-4FDD-BBD4-EB5F68D85FEC}" destId="{90FFEDE6-D24B-46AA-AC61-5A2CA3E513CC}" srcOrd="0" destOrd="0" presId="urn:microsoft.com/office/officeart/2005/8/layout/hList7"/>
-    <dgm:cxn modelId="{65F30421-397A-4BC0-B49B-6868293A16F5}" type="presOf" srcId="{BA786E09-868C-446C-BCAD-1B9A337A2314}" destId="{9B6DBF9B-EFA6-45E8-AAE9-1FBCC2922B5E}" srcOrd="0" destOrd="0" presId="urn:microsoft.com/office/officeart/2005/8/layout/hList7"/>
-    <dgm:cxn modelId="{F2642CDE-7779-4F28-B681-2A53F90E41A2}" type="presOf" srcId="{2F25E3F7-E9EB-4C08-9116-69D5C4FD6E2A}" destId="{2845AC54-25A9-480C-BA9C-51BB56258253}" srcOrd="0" destOrd="0" presId="urn:microsoft.com/office/officeart/2005/8/layout/hList7"/>
+    <dgm:cxn modelId="{2CE5E27C-5004-4B58-ADD8-DCA170362FC1}" type="presOf" srcId="{BA786E09-868C-446C-BCAD-1B9A337A2314}" destId="{31F77346-6636-44FE-8237-42E5F75F0855}" srcOrd="1" destOrd="0" presId="urn:microsoft.com/office/officeart/2005/8/layout/hList7"/>
+    <dgm:cxn modelId="{11CB129D-C73C-466B-852B-00EBFF871B75}" type="presOf" srcId="{BA786E09-868C-446C-BCAD-1B9A337A2314}" destId="{9B6DBF9B-EFA6-45E8-AAE9-1FBCC2922B5E}" srcOrd="0" destOrd="0" presId="urn:microsoft.com/office/officeart/2005/8/layout/hList7"/>
+    <dgm:cxn modelId="{245D1EDB-FC67-43CD-882B-F5B6D4980590}" type="presOf" srcId="{5EE301F9-AA62-4FDD-BBD4-EB5F68D85FEC}" destId="{90FFEDE6-D24B-46AA-AC61-5A2CA3E513CC}" srcOrd="0" destOrd="0" presId="urn:microsoft.com/office/officeart/2005/8/layout/hList7"/>
+    <dgm:cxn modelId="{E53B2165-E749-413E-9F1A-C9CC76DA6A5C}" srcId="{95C89F30-E4C0-41F0-9F78-CFBA2BC6B6E7}" destId="{5EE301F9-AA62-4FDD-BBD4-EB5F68D85FEC}" srcOrd="0" destOrd="0" parTransId="{752A3FC9-4F42-4B45-864D-D48201C144BC}" sibTransId="{7A2D0BBB-4796-4683-A258-869CCE2EFDEE}"/>
+    <dgm:cxn modelId="{841764A3-A684-4839-833E-519A2364C46B}" type="presOf" srcId="{81607F9D-ACA8-4EBC-97F3-AE620D537126}" destId="{FCBD48AD-6356-4016-B622-1476036943D2}" srcOrd="1" destOrd="0" presId="urn:microsoft.com/office/officeart/2005/8/layout/hList7"/>
+    <dgm:cxn modelId="{70F1C897-A929-4BFF-8FAC-4E9868843D62}" type="presOf" srcId="{81607F9D-ACA8-4EBC-97F3-AE620D537126}" destId="{AECDF339-533B-4319-9DD1-FE0312AA5FE7}" srcOrd="0" destOrd="0" presId="urn:microsoft.com/office/officeart/2005/8/layout/hList7"/>
+    <dgm:cxn modelId="{B5A72FE1-C260-40A6-910B-EF746EE99AB8}" type="presOf" srcId="{5EE301F9-AA62-4FDD-BBD4-EB5F68D85FEC}" destId="{6B2B5E85-AAEA-413B-89EF-96FC0B61D0DB}" srcOrd="1" destOrd="0" presId="urn:microsoft.com/office/officeart/2005/8/layout/hList7"/>
     <dgm:cxn modelId="{C503CDFC-F7CF-4B5B-9CB9-D0B888450B80}" srcId="{95C89F30-E4C0-41F0-9F78-CFBA2BC6B6E7}" destId="{81607F9D-ACA8-4EBC-97F3-AE620D537126}" srcOrd="1" destOrd="0" parTransId="{5614C387-4578-47E1-B8ED-4C19C139B6D6}" sibTransId="{94CA40FB-60B0-465C-89DE-37B57251E362}"/>
-    <dgm:cxn modelId="{E0D6D583-1BC7-48F4-930E-EE5B40002EDD}" type="presOf" srcId="{47253CFC-4569-4709-81D3-DEEB42841B34}" destId="{18E220CA-4E07-4273-9F20-D66E44D1CC15}" srcOrd="0" destOrd="0" presId="urn:microsoft.com/office/officeart/2005/8/layout/hList7"/>
-    <dgm:cxn modelId="{150DBCA5-511C-4C1C-BB5B-1B5416A3E9BE}" type="presOf" srcId="{7A2D0BBB-4796-4683-A258-869CCE2EFDEE}" destId="{46B8E31D-92A9-4F7C-AC64-291B22E56C19}" srcOrd="0" destOrd="0" presId="urn:microsoft.com/office/officeart/2005/8/layout/hList7"/>
-    <dgm:cxn modelId="{E53B2165-E749-413E-9F1A-C9CC76DA6A5C}" srcId="{95C89F30-E4C0-41F0-9F78-CFBA2BC6B6E7}" destId="{5EE301F9-AA62-4FDD-BBD4-EB5F68D85FEC}" srcOrd="0" destOrd="0" parTransId="{752A3FC9-4F42-4B45-864D-D48201C144BC}" sibTransId="{7A2D0BBB-4796-4683-A258-869CCE2EFDEE}"/>
-    <dgm:cxn modelId="{D3A2E9D8-A408-462B-BB47-E56CDC2A5F37}" type="presParOf" srcId="{68497B09-3716-4EBD-AC6B-8AE2BDCC8972}" destId="{5C007895-D27B-4555-8633-C9BBD58A106D}" srcOrd="0" destOrd="0" presId="urn:microsoft.com/office/officeart/2005/8/layout/hList7"/>
-    <dgm:cxn modelId="{AA924A70-7D4E-4D4A-9273-8ECC5376E0BD}" type="presParOf" srcId="{68497B09-3716-4EBD-AC6B-8AE2BDCC8972}" destId="{851E5CC9-679F-4CF6-B00F-A025B4DEF2B3}" srcOrd="1" destOrd="0" presId="urn:microsoft.com/office/officeart/2005/8/layout/hList7"/>
-    <dgm:cxn modelId="{D40F062E-7B5D-4145-AE62-906133381E41}" type="presParOf" srcId="{851E5CC9-679F-4CF6-B00F-A025B4DEF2B3}" destId="{02F5FF00-4C9F-4B29-8EE7-22E5EFD6E9BE}" srcOrd="0" destOrd="0" presId="urn:microsoft.com/office/officeart/2005/8/layout/hList7"/>
-    <dgm:cxn modelId="{28361826-B3EC-4424-BA07-88DCFC35EEC4}" type="presParOf" srcId="{02F5FF00-4C9F-4B29-8EE7-22E5EFD6E9BE}" destId="{90FFEDE6-D24B-46AA-AC61-5A2CA3E513CC}" srcOrd="0" destOrd="0" presId="urn:microsoft.com/office/officeart/2005/8/layout/hList7"/>
-    <dgm:cxn modelId="{8458C12B-6F57-4FC9-AE7A-FDF8C62DBEAF}" type="presParOf" srcId="{02F5FF00-4C9F-4B29-8EE7-22E5EFD6E9BE}" destId="{6B2B5E85-AAEA-413B-89EF-96FC0B61D0DB}" srcOrd="1" destOrd="0" presId="urn:microsoft.com/office/officeart/2005/8/layout/hList7"/>
-    <dgm:cxn modelId="{46955F0C-5150-46CA-B36E-12AFAA57BE73}" type="presParOf" srcId="{02F5FF00-4C9F-4B29-8EE7-22E5EFD6E9BE}" destId="{1A17D808-B82E-464B-B310-203813114F77}" srcOrd="2" destOrd="0" presId="urn:microsoft.com/office/officeart/2005/8/layout/hList7"/>
-    <dgm:cxn modelId="{2746B624-8A0D-40E9-921E-AF56475225F0}" type="presParOf" srcId="{02F5FF00-4C9F-4B29-8EE7-22E5EFD6E9BE}" destId="{BC5035FA-FF8E-421C-9C1A-CC3F16C8A221}" srcOrd="3" destOrd="0" presId="urn:microsoft.com/office/officeart/2005/8/layout/hList7"/>
-    <dgm:cxn modelId="{2C39CE97-B1C8-4C82-B29A-6FC785391875}" type="presParOf" srcId="{851E5CC9-679F-4CF6-B00F-A025B4DEF2B3}" destId="{46B8E31D-92A9-4F7C-AC64-291B22E56C19}" srcOrd="1" destOrd="0" presId="urn:microsoft.com/office/officeart/2005/8/layout/hList7"/>
-    <dgm:cxn modelId="{A49662BD-1730-4EB5-8FC3-7DFE12AE97F1}" type="presParOf" srcId="{851E5CC9-679F-4CF6-B00F-A025B4DEF2B3}" destId="{F6BAADEA-493B-4EE4-AE53-A0D19801A5FF}" srcOrd="2" destOrd="0" presId="urn:microsoft.com/office/officeart/2005/8/layout/hList7"/>
-    <dgm:cxn modelId="{254C6C0F-B513-4EAE-BCEE-5DD0F55FBFDA}" type="presParOf" srcId="{F6BAADEA-493B-4EE4-AE53-A0D19801A5FF}" destId="{AECDF339-533B-4319-9DD1-FE0312AA5FE7}" srcOrd="0" destOrd="0" presId="urn:microsoft.com/office/officeart/2005/8/layout/hList7"/>
-    <dgm:cxn modelId="{66C1C81D-A0B0-4153-B546-22F29B7EA75D}" type="presParOf" srcId="{F6BAADEA-493B-4EE4-AE53-A0D19801A5FF}" destId="{FCBD48AD-6356-4016-B622-1476036943D2}" srcOrd="1" destOrd="0" presId="urn:microsoft.com/office/officeart/2005/8/layout/hList7"/>
-    <dgm:cxn modelId="{EC15F1CE-D53B-4E0E-BB01-9A75A3196BC2}" type="presParOf" srcId="{F6BAADEA-493B-4EE4-AE53-A0D19801A5FF}" destId="{55F313B5-1C13-438A-8D2E-76E44D379C51}" srcOrd="2" destOrd="0" presId="urn:microsoft.com/office/officeart/2005/8/layout/hList7"/>
-    <dgm:cxn modelId="{08D7167B-40B4-4852-B0C5-2563F9E08537}" type="presParOf" srcId="{F6BAADEA-493B-4EE4-AE53-A0D19801A5FF}" destId="{78D9365F-3E8A-4A62-874D-E842D8E395C6}" srcOrd="3" destOrd="0" presId="urn:microsoft.com/office/officeart/2005/8/layout/hList7"/>
-    <dgm:cxn modelId="{40A4CFA0-D0CE-4EE3-A57E-5E0D576A9086}" type="presParOf" srcId="{851E5CC9-679F-4CF6-B00F-A025B4DEF2B3}" destId="{6A4D6A8E-A18C-499A-84BC-74FED5388C93}" srcOrd="3" destOrd="0" presId="urn:microsoft.com/office/officeart/2005/8/layout/hList7"/>
-    <dgm:cxn modelId="{BB90A66B-2701-4F9D-A750-EF6680B81748}" type="presParOf" srcId="{851E5CC9-679F-4CF6-B00F-A025B4DEF2B3}" destId="{2FB6D45F-392C-4BF4-A210-495F746B00A0}" srcOrd="4" destOrd="0" presId="urn:microsoft.com/office/officeart/2005/8/layout/hList7"/>
-    <dgm:cxn modelId="{FBADA11D-DDAC-4270-9391-9D726B93E881}" type="presParOf" srcId="{2FB6D45F-392C-4BF4-A210-495F746B00A0}" destId="{18E220CA-4E07-4273-9F20-D66E44D1CC15}" srcOrd="0" destOrd="0" presId="urn:microsoft.com/office/officeart/2005/8/layout/hList7"/>
-    <dgm:cxn modelId="{D5229153-280E-46D3-8F68-438EC498347F}" type="presParOf" srcId="{2FB6D45F-392C-4BF4-A210-495F746B00A0}" destId="{65C1CC62-47DD-4AE0-BB4E-E1AA4210EAD1}" srcOrd="1" destOrd="0" presId="urn:microsoft.com/office/officeart/2005/8/layout/hList7"/>
-    <dgm:cxn modelId="{65B1E80C-9CEB-45FD-81DB-9E25A0EC36DC}" type="presParOf" srcId="{2FB6D45F-392C-4BF4-A210-495F746B00A0}" destId="{4B410C47-050F-4A04-B28A-4915525EEFC9}" srcOrd="2" destOrd="0" presId="urn:microsoft.com/office/officeart/2005/8/layout/hList7"/>
-    <dgm:cxn modelId="{5931AF2A-701C-4B78-9021-7D955B79B573}" type="presParOf" srcId="{2FB6D45F-392C-4BF4-A210-495F746B00A0}" destId="{EF6C3C73-EE47-41C6-84F9-732FE297AA13}" srcOrd="3" destOrd="0" presId="urn:microsoft.com/office/officeart/2005/8/layout/hList7"/>
-    <dgm:cxn modelId="{0BDABE97-489C-4D18-8E55-2E5A78204754}" type="presParOf" srcId="{851E5CC9-679F-4CF6-B00F-A025B4DEF2B3}" destId="{2845AC54-25A9-480C-BA9C-51BB56258253}" srcOrd="5" destOrd="0" presId="urn:microsoft.com/office/officeart/2005/8/layout/hList7"/>
-    <dgm:cxn modelId="{BB9B3051-261E-4EEC-9F6B-DE94C5AD8D6C}" type="presParOf" srcId="{851E5CC9-679F-4CF6-B00F-A025B4DEF2B3}" destId="{D1EC1FEF-15C3-4F9A-9D53-270133EEC1D0}" srcOrd="6" destOrd="0" presId="urn:microsoft.com/office/officeart/2005/8/layout/hList7"/>
-    <dgm:cxn modelId="{FB64BFDE-6354-41A3-A0A7-3B97BEFB1A42}" type="presParOf" srcId="{D1EC1FEF-15C3-4F9A-9D53-270133EEC1D0}" destId="{9B6DBF9B-EFA6-45E8-AAE9-1FBCC2922B5E}" srcOrd="0" destOrd="0" presId="urn:microsoft.com/office/officeart/2005/8/layout/hList7"/>
-    <dgm:cxn modelId="{64FB9486-53A8-41D2-9F77-75C86D71A54B}" type="presParOf" srcId="{D1EC1FEF-15C3-4F9A-9D53-270133EEC1D0}" destId="{31F77346-6636-44FE-8237-42E5F75F0855}" srcOrd="1" destOrd="0" presId="urn:microsoft.com/office/officeart/2005/8/layout/hList7"/>
-    <dgm:cxn modelId="{E8BE040B-88DB-43DF-95A1-393744CC8B19}" type="presParOf" srcId="{D1EC1FEF-15C3-4F9A-9D53-270133EEC1D0}" destId="{4E622C03-85B3-4DA6-8471-5CC42DD79CA7}" srcOrd="2" destOrd="0" presId="urn:microsoft.com/office/officeart/2005/8/layout/hList7"/>
-    <dgm:cxn modelId="{93A800CF-1AAE-4F89-8E78-A3451061A16B}" type="presParOf" srcId="{D1EC1FEF-15C3-4F9A-9D53-270133EEC1D0}" destId="{E493E5FB-AA9A-42DE-9CCE-474EDF63F26C}" srcOrd="3" destOrd="0" presId="urn:microsoft.com/office/officeart/2005/8/layout/hList7"/>
+    <dgm:cxn modelId="{C9F6B07E-5747-4E39-A8BB-29EF3C20D3AE}" type="presParOf" srcId="{68497B09-3716-4EBD-AC6B-8AE2BDCC8972}" destId="{5C007895-D27B-4555-8633-C9BBD58A106D}" srcOrd="0" destOrd="0" presId="urn:microsoft.com/office/officeart/2005/8/layout/hList7"/>
+    <dgm:cxn modelId="{A00C98AF-5A7B-45CE-9BB9-85E5E95A8BC5}" type="presParOf" srcId="{68497B09-3716-4EBD-AC6B-8AE2BDCC8972}" destId="{851E5CC9-679F-4CF6-B00F-A025B4DEF2B3}" srcOrd="1" destOrd="0" presId="urn:microsoft.com/office/officeart/2005/8/layout/hList7"/>
+    <dgm:cxn modelId="{829749FF-A336-4590-BE4A-FD90FF3BE8CE}" type="presParOf" srcId="{851E5CC9-679F-4CF6-B00F-A025B4DEF2B3}" destId="{02F5FF00-4C9F-4B29-8EE7-22E5EFD6E9BE}" srcOrd="0" destOrd="0" presId="urn:microsoft.com/office/officeart/2005/8/layout/hList7"/>
+    <dgm:cxn modelId="{FAC05CAC-94DA-48F4-8D77-A4403C784A80}" type="presParOf" srcId="{02F5FF00-4C9F-4B29-8EE7-22E5EFD6E9BE}" destId="{90FFEDE6-D24B-46AA-AC61-5A2CA3E513CC}" srcOrd="0" destOrd="0" presId="urn:microsoft.com/office/officeart/2005/8/layout/hList7"/>
+    <dgm:cxn modelId="{FE94D531-7501-4541-BFB4-67A33A107906}" type="presParOf" srcId="{02F5FF00-4C9F-4B29-8EE7-22E5EFD6E9BE}" destId="{6B2B5E85-AAEA-413B-89EF-96FC0B61D0DB}" srcOrd="1" destOrd="0" presId="urn:microsoft.com/office/officeart/2005/8/layout/hList7"/>
+    <dgm:cxn modelId="{8D8F3A7C-0351-4916-AD52-412CEAE24CEE}" type="presParOf" srcId="{02F5FF00-4C9F-4B29-8EE7-22E5EFD6E9BE}" destId="{1A17D808-B82E-464B-B310-203813114F77}" srcOrd="2" destOrd="0" presId="urn:microsoft.com/office/officeart/2005/8/layout/hList7"/>
+    <dgm:cxn modelId="{C1F1632E-B7E0-41E1-A05C-983397B15615}" type="presParOf" srcId="{02F5FF00-4C9F-4B29-8EE7-22E5EFD6E9BE}" destId="{BC5035FA-FF8E-421C-9C1A-CC3F16C8A221}" srcOrd="3" destOrd="0" presId="urn:microsoft.com/office/officeart/2005/8/layout/hList7"/>
+    <dgm:cxn modelId="{BAB1BF25-9605-432E-8E4A-70B4ED1BEAD6}" type="presParOf" srcId="{851E5CC9-679F-4CF6-B00F-A025B4DEF2B3}" destId="{46B8E31D-92A9-4F7C-AC64-291B22E56C19}" srcOrd="1" destOrd="0" presId="urn:microsoft.com/office/officeart/2005/8/layout/hList7"/>
+    <dgm:cxn modelId="{6CD6B044-7F6B-44B3-A726-085AC225E425}" type="presParOf" srcId="{851E5CC9-679F-4CF6-B00F-A025B4DEF2B3}" destId="{F6BAADEA-493B-4EE4-AE53-A0D19801A5FF}" srcOrd="2" destOrd="0" presId="urn:microsoft.com/office/officeart/2005/8/layout/hList7"/>
+    <dgm:cxn modelId="{F8145F78-F6A6-4A9A-A036-28C7D5E64AC6}" type="presParOf" srcId="{F6BAADEA-493B-4EE4-AE53-A0D19801A5FF}" destId="{AECDF339-533B-4319-9DD1-FE0312AA5FE7}" srcOrd="0" destOrd="0" presId="urn:microsoft.com/office/officeart/2005/8/layout/hList7"/>
+    <dgm:cxn modelId="{04467557-6BAF-48D2-94BC-A4175688AD0D}" type="presParOf" srcId="{F6BAADEA-493B-4EE4-AE53-A0D19801A5FF}" destId="{FCBD48AD-6356-4016-B622-1476036943D2}" srcOrd="1" destOrd="0" presId="urn:microsoft.com/office/officeart/2005/8/layout/hList7"/>
+    <dgm:cxn modelId="{900764EC-0C99-4695-B957-44711CCA3641}" type="presParOf" srcId="{F6BAADEA-493B-4EE4-AE53-A0D19801A5FF}" destId="{55F313B5-1C13-438A-8D2E-76E44D379C51}" srcOrd="2" destOrd="0" presId="urn:microsoft.com/office/officeart/2005/8/layout/hList7"/>
+    <dgm:cxn modelId="{23F54A8E-D6C8-4782-B639-1E57C6ED32F1}" type="presParOf" srcId="{F6BAADEA-493B-4EE4-AE53-A0D19801A5FF}" destId="{78D9365F-3E8A-4A62-874D-E842D8E395C6}" srcOrd="3" destOrd="0" presId="urn:microsoft.com/office/officeart/2005/8/layout/hList7"/>
+    <dgm:cxn modelId="{5795AEAE-D55C-42C5-A1DF-45DB3825B12F}" type="presParOf" srcId="{851E5CC9-679F-4CF6-B00F-A025B4DEF2B3}" destId="{6A4D6A8E-A18C-499A-84BC-74FED5388C93}" srcOrd="3" destOrd="0" presId="urn:microsoft.com/office/officeart/2005/8/layout/hList7"/>
+    <dgm:cxn modelId="{C81BE42E-F2FD-4FF6-A5C9-B3BF50D2407F}" type="presParOf" srcId="{851E5CC9-679F-4CF6-B00F-A025B4DEF2B3}" destId="{2FB6D45F-392C-4BF4-A210-495F746B00A0}" srcOrd="4" destOrd="0" presId="urn:microsoft.com/office/officeart/2005/8/layout/hList7"/>
+    <dgm:cxn modelId="{42AE0AA1-6EA3-4F87-A0A1-3CAF75828F40}" type="presParOf" srcId="{2FB6D45F-392C-4BF4-A210-495F746B00A0}" destId="{18E220CA-4E07-4273-9F20-D66E44D1CC15}" srcOrd="0" destOrd="0" presId="urn:microsoft.com/office/officeart/2005/8/layout/hList7"/>
+    <dgm:cxn modelId="{A0A6A35E-9A33-4744-A34C-24F234C6CD19}" type="presParOf" srcId="{2FB6D45F-392C-4BF4-A210-495F746B00A0}" destId="{65C1CC62-47DD-4AE0-BB4E-E1AA4210EAD1}" srcOrd="1" destOrd="0" presId="urn:microsoft.com/office/officeart/2005/8/layout/hList7"/>
+    <dgm:cxn modelId="{20D78C35-9155-4C4A-94D4-75B33F00D26F}" type="presParOf" srcId="{2FB6D45F-392C-4BF4-A210-495F746B00A0}" destId="{4B410C47-050F-4A04-B28A-4915525EEFC9}" srcOrd="2" destOrd="0" presId="urn:microsoft.com/office/officeart/2005/8/layout/hList7"/>
+    <dgm:cxn modelId="{FC96B3EB-6852-405C-B544-300CD2640601}" type="presParOf" srcId="{2FB6D45F-392C-4BF4-A210-495F746B00A0}" destId="{EF6C3C73-EE47-41C6-84F9-732FE297AA13}" srcOrd="3" destOrd="0" presId="urn:microsoft.com/office/officeart/2005/8/layout/hList7"/>
+    <dgm:cxn modelId="{6511509F-BAA3-4046-B3BC-8CD3ABF9B72C}" type="presParOf" srcId="{851E5CC9-679F-4CF6-B00F-A025B4DEF2B3}" destId="{2845AC54-25A9-480C-BA9C-51BB56258253}" srcOrd="5" destOrd="0" presId="urn:microsoft.com/office/officeart/2005/8/layout/hList7"/>
+    <dgm:cxn modelId="{693EFAE3-4A67-4F6C-B773-4701125713E6}" type="presParOf" srcId="{851E5CC9-679F-4CF6-B00F-A025B4DEF2B3}" destId="{D1EC1FEF-15C3-4F9A-9D53-270133EEC1D0}" srcOrd="6" destOrd="0" presId="urn:microsoft.com/office/officeart/2005/8/layout/hList7"/>
+    <dgm:cxn modelId="{CB422099-085E-4DEB-A583-AE5BE91ADD44}" type="presParOf" srcId="{D1EC1FEF-15C3-4F9A-9D53-270133EEC1D0}" destId="{9B6DBF9B-EFA6-45E8-AAE9-1FBCC2922B5E}" srcOrd="0" destOrd="0" presId="urn:microsoft.com/office/officeart/2005/8/layout/hList7"/>
+    <dgm:cxn modelId="{A936DA44-C155-44EF-B83F-01D4BA9443B7}" type="presParOf" srcId="{D1EC1FEF-15C3-4F9A-9D53-270133EEC1D0}" destId="{31F77346-6636-44FE-8237-42E5F75F0855}" srcOrd="1" destOrd="0" presId="urn:microsoft.com/office/officeart/2005/8/layout/hList7"/>
+    <dgm:cxn modelId="{7F261040-910F-4F2C-9849-B2A3BE9AE9A2}" type="presParOf" srcId="{D1EC1FEF-15C3-4F9A-9D53-270133EEC1D0}" destId="{4E622C03-85B3-4DA6-8471-5CC42DD79CA7}" srcOrd="2" destOrd="0" presId="urn:microsoft.com/office/officeart/2005/8/layout/hList7"/>
+    <dgm:cxn modelId="{252B7FAB-B55E-4E2E-BD4A-58E170299FD2}" type="presParOf" srcId="{D1EC1FEF-15C3-4F9A-9D53-270133EEC1D0}" destId="{E493E5FB-AA9A-42DE-9CCE-474EDF63F26C}" srcOrd="3" destOrd="0" presId="urn:microsoft.com/office/officeart/2005/8/layout/hList7"/>
   </dgm:cxnLst>
   <dgm:bg/>
   <dgm:whole/>
   <dgm:extLst>
     <a:ext uri="http://schemas.microsoft.com/office/drawing/2008/diagram">
-      <dsp:dataModelExt xmlns:dsp="http://schemas.microsoft.com/office/drawing/2008/diagram" relId="rId6" minVer="http://schemas.openxmlformats.org/drawingml/2006/diagram"/>
+      <dsp:dataModelExt xmlns:dsp="http://schemas.microsoft.com/office/drawing/2008/diagram" relId="rId7" minVer="http://schemas.openxmlformats.org/drawingml/2006/diagram"/>
     </a:ext>
   </dgm:extLst>
 </dgm:dataModel>
@@ -5985,12 +5989,16 @@
             <a:buChar char="••"/>
           </a:pPr>
           <a:r>
-            <a:rPr lang="fr-FR" sz="1100" kern="1200" dirty="0" err="1"/>
+            <a:rPr lang="en-CA" sz="1100" kern="1200" noProof="0" dirty="0" smtClean="0"/>
             <a:t>Risk</a:t>
           </a:r>
           <a:r>
+            <a:rPr lang="fr-FR" sz="1100" kern="1200" dirty="0" smtClean="0"/>
+            <a:t> </a:t>
+          </a:r>
+          <a:r>
             <a:rPr lang="fr-FR" sz="1100" kern="1200" dirty="0"/>
-            <a:t> of high </a:t>
+            <a:t>of high </a:t>
           </a:r>
           <a:r>
             <a:rPr lang="fr-FR" sz="1100" kern="1200" dirty="0" err="1"/>
@@ -15141,6 +15149,711 @@
 </p:notes>
 </file>
 
+<file path=ppt/notesSlides/notesSlide3.xml><?xml version="1.0" encoding="utf-8"?>
+<p:notes xmlns:a="http://schemas.openxmlformats.org/drawingml/2006/main" xmlns:r="http://schemas.openxmlformats.org/officeDocument/2006/relationships" xmlns:p="http://schemas.openxmlformats.org/presentationml/2006/main">
+  <p:cSld>
+    <p:spTree>
+      <p:nvGrpSpPr>
+        <p:cNvPr id="1" name=""/>
+        <p:cNvGrpSpPr/>
+        <p:nvPr/>
+      </p:nvGrpSpPr>
+      <p:grpSpPr>
+        <a:xfrm>
+          <a:off x="0" y="0"/>
+          <a:ext cx="0" cy="0"/>
+          <a:chOff x="0" y="0"/>
+          <a:chExt cx="0" cy="0"/>
+        </a:xfrm>
+      </p:grpSpPr>
+      <p:sp>
+        <p:nvSpPr>
+          <p:cNvPr id="2" name="Slide Image Placeholder 1"/>
+          <p:cNvSpPr>
+            <a:spLocks noGrp="1" noRot="1" noChangeAspect="1"/>
+          </p:cNvSpPr>
+          <p:nvPr>
+            <p:ph type="sldImg"/>
+          </p:nvPr>
+        </p:nvSpPr>
+        <p:spPr/>
+      </p:sp>
+      <p:sp>
+        <p:nvSpPr>
+          <p:cNvPr id="3" name="Notes Placeholder 2"/>
+          <p:cNvSpPr>
+            <a:spLocks noGrp="1"/>
+          </p:cNvSpPr>
+          <p:nvPr>
+            <p:ph type="body" idx="1"/>
+          </p:nvPr>
+        </p:nvSpPr>
+        <p:spPr/>
+        <p:txBody>
+          <a:bodyPr/>
+          <a:lstStyle/>
+          <a:p>
+            <a:r>
+              <a:rPr lang="en-CA" dirty="0" smtClean="0"/>
+              <a:t>Quickly mention each element of the SWOT, however we will then focus on the Threats</a:t>
+            </a:r>
+            <a:r>
+              <a:rPr lang="en-CA" baseline="0" dirty="0" smtClean="0"/>
+              <a:t> than opportunities</a:t>
+            </a:r>
+          </a:p>
+          <a:p>
+            <a:r>
+              <a:rPr lang="en-CA" baseline="0" dirty="0" smtClean="0"/>
+              <a:t>Threats:</a:t>
+            </a:r>
+          </a:p>
+          <a:p>
+            <a:r>
+              <a:rPr lang="en-CA" baseline="0" dirty="0" smtClean="0"/>
+              <a:t>1: Risk of high demand (server)</a:t>
+            </a:r>
+          </a:p>
+          <a:p>
+            <a:r>
+              <a:rPr lang="en-CA" baseline="0" dirty="0" smtClean="0"/>
+              <a:t>	To resolve this issue, we decided to make the application  downloadable file which then connects to a database on the server</a:t>
+            </a:r>
+          </a:p>
+          <a:p>
+            <a:r>
+              <a:rPr lang="en-CA" baseline="0" dirty="0" smtClean="0"/>
+              <a:t>	This ensures that the processing power for the analyses is dependant on a users computer and not the server</a:t>
+            </a:r>
+          </a:p>
+          <a:p>
+            <a:r>
+              <a:rPr lang="en-CA" baseline="0" dirty="0" smtClean="0"/>
+              <a:t>	It is noteworthy to mention that our server is hosted on NUXIT at the lowest price, it would not be able to handle high end processing.</a:t>
+            </a:r>
+          </a:p>
+          <a:p>
+            <a:endParaRPr lang="en-CA" baseline="0" dirty="0" smtClean="0"/>
+          </a:p>
+          <a:p>
+            <a:r>
+              <a:rPr lang="en-CA" baseline="0" dirty="0" smtClean="0"/>
+              <a:t>3: Lack of control on the database:</a:t>
+            </a:r>
+          </a:p>
+          <a:p>
+            <a:r>
+              <a:rPr lang="en-CA" baseline="0" dirty="0" smtClean="0"/>
+              <a:t>	This was one of the biggest unknowns of the project as our control on the database must goes through NUXIT. The unknown was if we could have enough security in our database with the current server ‘plan’ that  	our client had. To solve this, we checked the various plans offered by NUXIT and stayed in close contact to figure out which plan would be necessary to accomplish our needs. We then obtained confirmation from our 	client to upgrade his plan. This resulted in a 3 euros per months increase from his current plan, which was 6 euros per months.</a:t>
+            </a:r>
+          </a:p>
+          <a:p>
+            <a:endParaRPr lang="en-CA" baseline="0" dirty="0" smtClean="0"/>
+          </a:p>
+          <a:p>
+            <a:r>
+              <a:rPr lang="en-CA" baseline="0" dirty="0" smtClean="0"/>
+              <a:t>2: Portability to MAC</a:t>
+            </a:r>
+          </a:p>
+          <a:p>
+            <a:r>
+              <a:rPr lang="en-CA" baseline="0" dirty="0" smtClean="0"/>
+              <a:t>	It was unknown to us if we could create a ‘executable’ app for MAC. We were certain it was possible for Windows</a:t>
+            </a:r>
+          </a:p>
+          <a:p>
+            <a:r>
+              <a:rPr lang="en-CA" baseline="0" dirty="0" smtClean="0"/>
+              <a:t>	In order to alleviate this risk we came up with a back-up solution. This was to simplify the launch of the application using R scripts and get users to download R in order to launch the simplified script with a double 	click. This single script would call all other scripts to launch the application.</a:t>
+            </a:r>
+          </a:p>
+          <a:p>
+            <a:r>
+              <a:rPr lang="en-CA" baseline="0" dirty="0" smtClean="0"/>
+              <a:t>	This was an important preparation as we did end up having to resort to this back-up solution.</a:t>
+            </a:r>
+          </a:p>
+        </p:txBody>
+      </p:sp>
+      <p:sp>
+        <p:nvSpPr>
+          <p:cNvPr id="4" name="Slide Number Placeholder 3"/>
+          <p:cNvSpPr>
+            <a:spLocks noGrp="1"/>
+          </p:cNvSpPr>
+          <p:nvPr>
+            <p:ph type="sldNum" sz="quarter" idx="10"/>
+          </p:nvPr>
+        </p:nvSpPr>
+        <p:spPr/>
+        <p:txBody>
+          <a:bodyPr/>
+          <a:lstStyle/>
+          <a:p>
+            <a:fld id="{049843D5-FBCC-450E-8A81-920AD1F49A83}" type="slidenum">
+              <a:rPr lang="fr-FR" smtClean="0"/>
+              <a:t>2</a:t>
+            </a:fld>
+            <a:endParaRPr lang="fr-FR"/>
+          </a:p>
+        </p:txBody>
+      </p:sp>
+    </p:spTree>
+    <p:extLst>
+      <p:ext uri="{BB962C8B-B14F-4D97-AF65-F5344CB8AC3E}">
+        <p14:creationId xmlns:p14="http://schemas.microsoft.com/office/powerpoint/2010/main" val="2712108534"/>
+      </p:ext>
+    </p:extLst>
+  </p:cSld>
+  <p:clrMapOvr>
+    <a:masterClrMapping/>
+  </p:clrMapOvr>
+</p:notes>
+</file>
+
+<file path=ppt/notesSlides/notesSlide4.xml><?xml version="1.0" encoding="utf-8"?>
+<p:notes xmlns:a="http://schemas.openxmlformats.org/drawingml/2006/main" xmlns:r="http://schemas.openxmlformats.org/officeDocument/2006/relationships" xmlns:p="http://schemas.openxmlformats.org/presentationml/2006/main">
+  <p:cSld>
+    <p:spTree>
+      <p:nvGrpSpPr>
+        <p:cNvPr id="1" name=""/>
+        <p:cNvGrpSpPr/>
+        <p:nvPr/>
+      </p:nvGrpSpPr>
+      <p:grpSpPr>
+        <a:xfrm>
+          <a:off x="0" y="0"/>
+          <a:ext cx="0" cy="0"/>
+          <a:chOff x="0" y="0"/>
+          <a:chExt cx="0" cy="0"/>
+        </a:xfrm>
+      </p:grpSpPr>
+      <p:sp>
+        <p:nvSpPr>
+          <p:cNvPr id="2" name="Slide Image Placeholder 1"/>
+          <p:cNvSpPr>
+            <a:spLocks noGrp="1" noRot="1" noChangeAspect="1"/>
+          </p:cNvSpPr>
+          <p:nvPr>
+            <p:ph type="sldImg"/>
+          </p:nvPr>
+        </p:nvSpPr>
+        <p:spPr/>
+      </p:sp>
+      <p:sp>
+        <p:nvSpPr>
+          <p:cNvPr id="3" name="Notes Placeholder 2"/>
+          <p:cNvSpPr>
+            <a:spLocks noGrp="1"/>
+          </p:cNvSpPr>
+          <p:nvPr>
+            <p:ph type="body" idx="1"/>
+          </p:nvPr>
+        </p:nvSpPr>
+        <p:spPr/>
+        <p:txBody>
+          <a:bodyPr/>
+          <a:lstStyle/>
+          <a:p>
+            <a:r>
+              <a:rPr lang="en-CA" dirty="0" smtClean="0"/>
+              <a:t>Mention</a:t>
+            </a:r>
+            <a:r>
+              <a:rPr lang="en-CA" baseline="0" dirty="0" smtClean="0"/>
+              <a:t> that this was our GANTT for the main points of this project, for the details we used a </a:t>
+            </a:r>
+            <a:r>
+              <a:rPr lang="en-CA" baseline="0" dirty="0" err="1" smtClean="0"/>
+              <a:t>KanBan</a:t>
+            </a:r>
+            <a:r>
+              <a:rPr lang="en-CA" baseline="0" dirty="0" smtClean="0"/>
+              <a:t> method which will be detailed later in the presentation.</a:t>
+            </a:r>
+          </a:p>
+          <a:p>
+            <a:r>
+              <a:rPr lang="en-CA" baseline="0" dirty="0" smtClean="0"/>
+              <a:t>This Gantt helps us see the planned time for each main aspects of the project as well as see who worked on which aspects. (show the ‘lined’ examples)</a:t>
+            </a:r>
+          </a:p>
+          <a:p>
+            <a:endParaRPr lang="en-CA" dirty="0"/>
+          </a:p>
+        </p:txBody>
+      </p:sp>
+      <p:sp>
+        <p:nvSpPr>
+          <p:cNvPr id="4" name="Slide Number Placeholder 3"/>
+          <p:cNvSpPr>
+            <a:spLocks noGrp="1"/>
+          </p:cNvSpPr>
+          <p:nvPr>
+            <p:ph type="sldNum" sz="quarter" idx="10"/>
+          </p:nvPr>
+        </p:nvSpPr>
+        <p:spPr/>
+        <p:txBody>
+          <a:bodyPr/>
+          <a:lstStyle/>
+          <a:p>
+            <a:fld id="{049843D5-FBCC-450E-8A81-920AD1F49A83}" type="slidenum">
+              <a:rPr lang="fr-FR" smtClean="0"/>
+              <a:t>3</a:t>
+            </a:fld>
+            <a:endParaRPr lang="fr-FR"/>
+          </a:p>
+        </p:txBody>
+      </p:sp>
+    </p:spTree>
+    <p:extLst>
+      <p:ext uri="{BB962C8B-B14F-4D97-AF65-F5344CB8AC3E}">
+        <p14:creationId xmlns:p14="http://schemas.microsoft.com/office/powerpoint/2010/main" val="2064323174"/>
+      </p:ext>
+    </p:extLst>
+  </p:cSld>
+  <p:clrMapOvr>
+    <a:masterClrMapping/>
+  </p:clrMapOvr>
+</p:notes>
+</file>
+
+<file path=ppt/notesSlides/notesSlide5.xml><?xml version="1.0" encoding="utf-8"?>
+<p:notes xmlns:a="http://schemas.openxmlformats.org/drawingml/2006/main" xmlns:r="http://schemas.openxmlformats.org/officeDocument/2006/relationships" xmlns:p="http://schemas.openxmlformats.org/presentationml/2006/main">
+  <p:cSld>
+    <p:spTree>
+      <p:nvGrpSpPr>
+        <p:cNvPr id="1" name=""/>
+        <p:cNvGrpSpPr/>
+        <p:nvPr/>
+      </p:nvGrpSpPr>
+      <p:grpSpPr>
+        <a:xfrm>
+          <a:off x="0" y="0"/>
+          <a:ext cx="0" cy="0"/>
+          <a:chOff x="0" y="0"/>
+          <a:chExt cx="0" cy="0"/>
+        </a:xfrm>
+      </p:grpSpPr>
+      <p:sp>
+        <p:nvSpPr>
+          <p:cNvPr id="2" name="Slide Image Placeholder 1"/>
+          <p:cNvSpPr>
+            <a:spLocks noGrp="1" noRot="1" noChangeAspect="1"/>
+          </p:cNvSpPr>
+          <p:nvPr>
+            <p:ph type="sldImg"/>
+          </p:nvPr>
+        </p:nvSpPr>
+        <p:spPr/>
+      </p:sp>
+      <p:sp>
+        <p:nvSpPr>
+          <p:cNvPr id="3" name="Notes Placeholder 2"/>
+          <p:cNvSpPr>
+            <a:spLocks noGrp="1"/>
+          </p:cNvSpPr>
+          <p:nvPr>
+            <p:ph type="body" idx="1"/>
+          </p:nvPr>
+        </p:nvSpPr>
+        <p:spPr/>
+        <p:txBody>
+          <a:bodyPr/>
+          <a:lstStyle/>
+          <a:p>
+            <a:r>
+              <a:rPr lang="en-CA" dirty="0" smtClean="0"/>
+              <a:t>Mention each tool </a:t>
+            </a:r>
+            <a:r>
+              <a:rPr lang="en-CA" dirty="0" err="1" smtClean="0"/>
+              <a:t>tool</a:t>
+            </a:r>
+            <a:r>
+              <a:rPr lang="en-CA" dirty="0" smtClean="0"/>
+              <a:t>, no need to dive into the specifics.</a:t>
+            </a:r>
+            <a:r>
+              <a:rPr lang="en-CA" baseline="0" dirty="0" smtClean="0"/>
+              <a:t> Mention that R was for the creation of the application, NUXIT was for everything server related, and HTML, CSS </a:t>
+            </a:r>
+            <a:r>
+              <a:rPr lang="en-CA" baseline="0" dirty="0" err="1" smtClean="0"/>
+              <a:t>etc</a:t>
+            </a:r>
+            <a:r>
+              <a:rPr lang="en-CA" baseline="0" dirty="0" smtClean="0"/>
+              <a:t>… was for web design. Git Kraken was used for project management</a:t>
+            </a:r>
+            <a:endParaRPr lang="en-CA" dirty="0"/>
+          </a:p>
+        </p:txBody>
+      </p:sp>
+      <p:sp>
+        <p:nvSpPr>
+          <p:cNvPr id="4" name="Slide Number Placeholder 3"/>
+          <p:cNvSpPr>
+            <a:spLocks noGrp="1"/>
+          </p:cNvSpPr>
+          <p:nvPr>
+            <p:ph type="sldNum" sz="quarter" idx="10"/>
+          </p:nvPr>
+        </p:nvSpPr>
+        <p:spPr/>
+        <p:txBody>
+          <a:bodyPr/>
+          <a:lstStyle/>
+          <a:p>
+            <a:fld id="{049843D5-FBCC-450E-8A81-920AD1F49A83}" type="slidenum">
+              <a:rPr lang="fr-FR" smtClean="0"/>
+              <a:t>4</a:t>
+            </a:fld>
+            <a:endParaRPr lang="fr-FR"/>
+          </a:p>
+        </p:txBody>
+      </p:sp>
+    </p:spTree>
+    <p:extLst>
+      <p:ext uri="{BB962C8B-B14F-4D97-AF65-F5344CB8AC3E}">
+        <p14:creationId xmlns:p14="http://schemas.microsoft.com/office/powerpoint/2010/main" val="1259620145"/>
+      </p:ext>
+    </p:extLst>
+  </p:cSld>
+  <p:clrMapOvr>
+    <a:masterClrMapping/>
+  </p:clrMapOvr>
+</p:notes>
+</file>
+
+<file path=ppt/notesSlides/notesSlide6.xml><?xml version="1.0" encoding="utf-8"?>
+<p:notes xmlns:a="http://schemas.openxmlformats.org/drawingml/2006/main" xmlns:r="http://schemas.openxmlformats.org/officeDocument/2006/relationships" xmlns:p="http://schemas.openxmlformats.org/presentationml/2006/main">
+  <p:cSld>
+    <p:spTree>
+      <p:nvGrpSpPr>
+        <p:cNvPr id="1" name=""/>
+        <p:cNvGrpSpPr/>
+        <p:nvPr/>
+      </p:nvGrpSpPr>
+      <p:grpSpPr>
+        <a:xfrm>
+          <a:off x="0" y="0"/>
+          <a:ext cx="0" cy="0"/>
+          <a:chOff x="0" y="0"/>
+          <a:chExt cx="0" cy="0"/>
+        </a:xfrm>
+      </p:grpSpPr>
+      <p:sp>
+        <p:nvSpPr>
+          <p:cNvPr id="2" name="Slide Image Placeholder 1"/>
+          <p:cNvSpPr>
+            <a:spLocks noGrp="1" noRot="1" noChangeAspect="1"/>
+          </p:cNvSpPr>
+          <p:nvPr>
+            <p:ph type="sldImg"/>
+          </p:nvPr>
+        </p:nvSpPr>
+        <p:spPr/>
+      </p:sp>
+      <p:sp>
+        <p:nvSpPr>
+          <p:cNvPr id="3" name="Notes Placeholder 2"/>
+          <p:cNvSpPr>
+            <a:spLocks noGrp="1"/>
+          </p:cNvSpPr>
+          <p:nvPr>
+            <p:ph type="body" idx="1"/>
+          </p:nvPr>
+        </p:nvSpPr>
+        <p:spPr/>
+        <p:txBody>
+          <a:bodyPr/>
+          <a:lstStyle/>
+          <a:p>
+            <a:r>
+              <a:rPr lang="en-CA" dirty="0" smtClean="0"/>
+              <a:t>First</a:t>
+            </a:r>
+            <a:r>
+              <a:rPr lang="en-CA" baseline="0" dirty="0" smtClean="0"/>
+              <a:t> we show the Kanban in it’s traditional form, followed by it’s calendar form, noting that the cards are on the days on which the tasks are due. The timeline view is also an option and is very useful to visualize the progress of the project.</a:t>
+            </a:r>
+          </a:p>
+          <a:p>
+            <a:r>
+              <a:rPr lang="en-CA" baseline="0" dirty="0" smtClean="0"/>
+              <a:t>Also, </a:t>
+            </a:r>
+            <a:r>
+              <a:rPr lang="en-CA" baseline="0" dirty="0" err="1" smtClean="0"/>
+              <a:t>GitKraken</a:t>
+            </a:r>
+            <a:r>
+              <a:rPr lang="en-CA" baseline="0" dirty="0" smtClean="0"/>
+              <a:t> offers a git GUI (graphical user interface) which shows the various pushes as well the correction of merge conflicts </a:t>
+            </a:r>
+            <a:endParaRPr lang="en-CA" dirty="0"/>
+          </a:p>
+        </p:txBody>
+      </p:sp>
+      <p:sp>
+        <p:nvSpPr>
+          <p:cNvPr id="4" name="Slide Number Placeholder 3"/>
+          <p:cNvSpPr>
+            <a:spLocks noGrp="1"/>
+          </p:cNvSpPr>
+          <p:nvPr>
+            <p:ph type="sldNum" sz="quarter" idx="10"/>
+          </p:nvPr>
+        </p:nvSpPr>
+        <p:spPr/>
+        <p:txBody>
+          <a:bodyPr/>
+          <a:lstStyle/>
+          <a:p>
+            <a:fld id="{049843D5-FBCC-450E-8A81-920AD1F49A83}" type="slidenum">
+              <a:rPr lang="fr-FR" smtClean="0"/>
+              <a:t>5</a:t>
+            </a:fld>
+            <a:endParaRPr lang="fr-FR"/>
+          </a:p>
+        </p:txBody>
+      </p:sp>
+    </p:spTree>
+    <p:extLst>
+      <p:ext uri="{BB962C8B-B14F-4D97-AF65-F5344CB8AC3E}">
+        <p14:creationId xmlns:p14="http://schemas.microsoft.com/office/powerpoint/2010/main" val="1631459696"/>
+      </p:ext>
+    </p:extLst>
+  </p:cSld>
+  <p:clrMapOvr>
+    <a:masterClrMapping/>
+  </p:clrMapOvr>
+</p:notes>
+</file>
+
+<file path=ppt/notesSlides/notesSlide7.xml><?xml version="1.0" encoding="utf-8"?>
+<p:notes xmlns:a="http://schemas.openxmlformats.org/drawingml/2006/main" xmlns:r="http://schemas.openxmlformats.org/officeDocument/2006/relationships" xmlns:p="http://schemas.openxmlformats.org/presentationml/2006/main">
+  <p:cSld>
+    <p:spTree>
+      <p:nvGrpSpPr>
+        <p:cNvPr id="1" name=""/>
+        <p:cNvGrpSpPr/>
+        <p:nvPr/>
+      </p:nvGrpSpPr>
+      <p:grpSpPr>
+        <a:xfrm>
+          <a:off x="0" y="0"/>
+          <a:ext cx="0" cy="0"/>
+          <a:chOff x="0" y="0"/>
+          <a:chExt cx="0" cy="0"/>
+        </a:xfrm>
+      </p:grpSpPr>
+      <p:sp>
+        <p:nvSpPr>
+          <p:cNvPr id="2" name="Slide Image Placeholder 1"/>
+          <p:cNvSpPr>
+            <a:spLocks noGrp="1" noRot="1" noChangeAspect="1"/>
+          </p:cNvSpPr>
+          <p:nvPr>
+            <p:ph type="sldImg"/>
+          </p:nvPr>
+        </p:nvSpPr>
+        <p:spPr/>
+      </p:sp>
+      <p:sp>
+        <p:nvSpPr>
+          <p:cNvPr id="3" name="Notes Placeholder 2"/>
+          <p:cNvSpPr>
+            <a:spLocks noGrp="1"/>
+          </p:cNvSpPr>
+          <p:nvPr>
+            <p:ph type="body" idx="1"/>
+          </p:nvPr>
+        </p:nvSpPr>
+        <p:spPr/>
+        <p:txBody>
+          <a:bodyPr/>
+          <a:lstStyle/>
+          <a:p>
+            <a:r>
+              <a:rPr lang="en-CA" dirty="0" smtClean="0"/>
+              <a:t>Start by showing the </a:t>
+            </a:r>
+            <a:r>
+              <a:rPr lang="en-CA" dirty="0" err="1" smtClean="0"/>
+              <a:t>glyconeogenesis</a:t>
+            </a:r>
+            <a:r>
+              <a:rPr lang="en-CA" dirty="0" smtClean="0"/>
+              <a:t> pathway (from pyruvate to glucose) focusing on a</a:t>
+            </a:r>
+            <a:r>
+              <a:rPr lang="en-CA" baseline="0" dirty="0" smtClean="0"/>
+              <a:t> specific step, the one handled by FBP1 and FBP2..</a:t>
+            </a:r>
+          </a:p>
+          <a:p>
+            <a:r>
+              <a:rPr lang="en-CA" baseline="0" dirty="0" smtClean="0"/>
+              <a:t>We then show a separate pathway, one cause by CCRC, which increases hypoxia-inducible factors (HIT) which increases production in various pathways, thus increasing the proliferation of cancerous cells.</a:t>
+            </a:r>
+          </a:p>
+          <a:p>
+            <a:r>
+              <a:rPr lang="en-CA" baseline="0" dirty="0" smtClean="0"/>
+              <a:t>A non-canonical effect of FBP1 is it’s binding to HITs, inhibiting it’s effect and preventing the proliferation of CCRC cells.</a:t>
+            </a:r>
+          </a:p>
+          <a:p>
+            <a:r>
+              <a:rPr lang="en-CA" baseline="0" dirty="0" smtClean="0"/>
+              <a:t>This would be a non-canonical pathway.</a:t>
+            </a:r>
+            <a:endParaRPr lang="en-CA" dirty="0"/>
+          </a:p>
+        </p:txBody>
+      </p:sp>
+      <p:sp>
+        <p:nvSpPr>
+          <p:cNvPr id="4" name="Slide Number Placeholder 3"/>
+          <p:cNvSpPr>
+            <a:spLocks noGrp="1"/>
+          </p:cNvSpPr>
+          <p:nvPr>
+            <p:ph type="sldNum" sz="quarter" idx="10"/>
+          </p:nvPr>
+        </p:nvSpPr>
+        <p:spPr/>
+        <p:txBody>
+          <a:bodyPr/>
+          <a:lstStyle/>
+          <a:p>
+            <a:fld id="{049843D5-FBCC-450E-8A81-920AD1F49A83}" type="slidenum">
+              <a:rPr lang="fr-FR" smtClean="0"/>
+              <a:t>6</a:t>
+            </a:fld>
+            <a:endParaRPr lang="fr-FR"/>
+          </a:p>
+        </p:txBody>
+      </p:sp>
+    </p:spTree>
+    <p:extLst>
+      <p:ext uri="{BB962C8B-B14F-4D97-AF65-F5344CB8AC3E}">
+        <p14:creationId xmlns:p14="http://schemas.microsoft.com/office/powerpoint/2010/main" val="2734424480"/>
+      </p:ext>
+    </p:extLst>
+  </p:cSld>
+  <p:clrMapOvr>
+    <a:masterClrMapping/>
+  </p:clrMapOvr>
+</p:notes>
+</file>
+
+<file path=ppt/notesSlides/notesSlide8.xml><?xml version="1.0" encoding="utf-8"?>
+<p:notes xmlns:a="http://schemas.openxmlformats.org/drawingml/2006/main" xmlns:r="http://schemas.openxmlformats.org/officeDocument/2006/relationships" xmlns:p="http://schemas.openxmlformats.org/presentationml/2006/main">
+  <p:cSld>
+    <p:spTree>
+      <p:nvGrpSpPr>
+        <p:cNvPr id="1" name=""/>
+        <p:cNvGrpSpPr/>
+        <p:nvPr/>
+      </p:nvGrpSpPr>
+      <p:grpSpPr>
+        <a:xfrm>
+          <a:off x="0" y="0"/>
+          <a:ext cx="0" cy="0"/>
+          <a:chOff x="0" y="0"/>
+          <a:chExt cx="0" cy="0"/>
+        </a:xfrm>
+      </p:grpSpPr>
+      <p:sp>
+        <p:nvSpPr>
+          <p:cNvPr id="2" name="Slide Image Placeholder 1"/>
+          <p:cNvSpPr>
+            <a:spLocks noGrp="1" noRot="1" noChangeAspect="1"/>
+          </p:cNvSpPr>
+          <p:nvPr>
+            <p:ph type="sldImg"/>
+          </p:nvPr>
+        </p:nvSpPr>
+        <p:spPr/>
+      </p:sp>
+      <p:sp>
+        <p:nvSpPr>
+          <p:cNvPr id="3" name="Notes Placeholder 2"/>
+          <p:cNvSpPr>
+            <a:spLocks noGrp="1"/>
+          </p:cNvSpPr>
+          <p:nvPr>
+            <p:ph type="body" idx="1"/>
+          </p:nvPr>
+        </p:nvSpPr>
+        <p:spPr/>
+        <p:txBody>
+          <a:bodyPr/>
+          <a:lstStyle/>
+          <a:p>
+            <a:r>
+              <a:rPr lang="en-CA" dirty="0" smtClean="0"/>
+              <a:t>The initial page of the </a:t>
+            </a:r>
+            <a:r>
+              <a:rPr lang="en-CA" dirty="0" err="1" smtClean="0"/>
+              <a:t>CelloMap</a:t>
+            </a:r>
+            <a:r>
+              <a:rPr lang="en-CA" baseline="0" dirty="0" smtClean="0"/>
+              <a:t> website, either found independently or accessed via Cellomet.com</a:t>
+            </a:r>
+          </a:p>
+          <a:p>
+            <a:r>
+              <a:rPr lang="en-CA" baseline="0" dirty="0" smtClean="0"/>
+              <a:t>This webpage shows a potential user the different aspects of the application, thus showing the different functionalities it presents. Users can also access the user-guide of the application through this page. The guide allows them to have a complete understanding on what the application is, how to install, as well as how to use it.</a:t>
+            </a:r>
+            <a:endParaRPr lang="en-CA" dirty="0"/>
+          </a:p>
+        </p:txBody>
+      </p:sp>
+      <p:sp>
+        <p:nvSpPr>
+          <p:cNvPr id="4" name="Slide Number Placeholder 3"/>
+          <p:cNvSpPr>
+            <a:spLocks noGrp="1"/>
+          </p:cNvSpPr>
+          <p:nvPr>
+            <p:ph type="sldNum" sz="quarter" idx="10"/>
+          </p:nvPr>
+        </p:nvSpPr>
+        <p:spPr/>
+        <p:txBody>
+          <a:bodyPr/>
+          <a:lstStyle/>
+          <a:p>
+            <a:fld id="{049843D5-FBCC-450E-8A81-920AD1F49A83}" type="slidenum">
+              <a:rPr lang="fr-FR" smtClean="0"/>
+              <a:t>9</a:t>
+            </a:fld>
+            <a:endParaRPr lang="fr-FR"/>
+          </a:p>
+        </p:txBody>
+      </p:sp>
+    </p:spTree>
+    <p:extLst>
+      <p:ext uri="{BB962C8B-B14F-4D97-AF65-F5344CB8AC3E}">
+        <p14:creationId xmlns:p14="http://schemas.microsoft.com/office/powerpoint/2010/main" val="1026350136"/>
+      </p:ext>
+    </p:extLst>
+  </p:cSld>
+  <p:clrMapOvr>
+    <a:masterClrMapping/>
+  </p:clrMapOvr>
+</p:notes>
+</file>
+
 <file path=ppt/slideLayouts/slideLayout1.xml><?xml version="1.0" encoding="utf-8"?>
 <p:sldLayout xmlns:a="http://schemas.openxmlformats.org/drawingml/2006/main" xmlns:r="http://schemas.openxmlformats.org/officeDocument/2006/relationships" xmlns:p="http://schemas.openxmlformats.org/presentationml/2006/main" preserve="1" userDrawn="1">
   <p:cSld name="Title Slide">
@@ -15606,16 +16319,239 @@
           <a:chExt cx="0" cy="0"/>
         </a:xfrm>
       </p:grpSpPr>
+      <p:pic>
+        <p:nvPicPr>
+          <p:cNvPr id="2" name="Picture 1"/>
+          <p:cNvPicPr>
+            <a:picLocks noChangeAspect="1"/>
+          </p:cNvPicPr>
+          <p:nvPr userDrawn="1"/>
+        </p:nvPicPr>
+        <p:blipFill>
+          <a:blip r:embed="rId2" cstate="print">
+            <a:extLst>
+              <a:ext uri="{28A0092B-C50C-407E-A947-70E740481C1C}">
+                <a14:useLocalDpi xmlns:a14="http://schemas.microsoft.com/office/drawing/2010/main" val="0"/>
+              </a:ext>
+            </a:extLst>
+          </a:blip>
+          <a:stretch>
+            <a:fillRect/>
+          </a:stretch>
+        </p:blipFill>
+        <p:spPr>
+          <a:xfrm>
+            <a:off x="9996056" y="5064666"/>
+            <a:ext cx="1656925" cy="1623731"/>
+          </a:xfrm>
+          <a:prstGeom prst="rect">
+            <a:avLst/>
+          </a:prstGeom>
+        </p:spPr>
+      </p:pic>
+      <p:pic>
+        <p:nvPicPr>
+          <p:cNvPr id="3" name="Picture 2"/>
+          <p:cNvPicPr>
+            <a:picLocks noChangeAspect="1"/>
+          </p:cNvPicPr>
+          <p:nvPr userDrawn="1"/>
+        </p:nvPicPr>
+        <p:blipFill>
+          <a:blip r:embed="rId3">
+            <a:extLst>
+              <a:ext uri="{28A0092B-C50C-407E-A947-70E740481C1C}">
+                <a14:useLocalDpi xmlns:a14="http://schemas.microsoft.com/office/drawing/2010/main" val="0"/>
+              </a:ext>
+            </a:extLst>
+          </a:blip>
+          <a:stretch>
+            <a:fillRect/>
+          </a:stretch>
+        </p:blipFill>
+        <p:spPr>
+          <a:xfrm>
+            <a:off x="506311" y="5175938"/>
+            <a:ext cx="2964796" cy="1410085"/>
+          </a:xfrm>
+          <a:prstGeom prst="rect">
+            <a:avLst/>
+          </a:prstGeom>
+        </p:spPr>
+      </p:pic>
+      <p:pic>
+        <p:nvPicPr>
+          <p:cNvPr id="4" name="Picture 3"/>
+          <p:cNvPicPr>
+            <a:picLocks noChangeAspect="1"/>
+          </p:cNvPicPr>
+          <p:nvPr userDrawn="1"/>
+        </p:nvPicPr>
+        <p:blipFill>
+          <a:blip r:embed="rId4">
+            <a:extLst>
+              <a:ext uri="{28A0092B-C50C-407E-A947-70E740481C1C}">
+                <a14:useLocalDpi xmlns:a14="http://schemas.microsoft.com/office/drawing/2010/main" val="0"/>
+              </a:ext>
+            </a:extLst>
+          </a:blip>
+          <a:stretch>
+            <a:fillRect/>
+          </a:stretch>
+        </p:blipFill>
+        <p:spPr>
+          <a:xfrm>
+            <a:off x="3766047" y="5156480"/>
+            <a:ext cx="1803542" cy="1448999"/>
+          </a:xfrm>
+          <a:prstGeom prst="rect">
+            <a:avLst/>
+          </a:prstGeom>
+        </p:spPr>
+      </p:pic>
+      <p:pic>
+        <p:nvPicPr>
+          <p:cNvPr id="5" name="Picture 4"/>
+          <p:cNvPicPr>
+            <a:picLocks noChangeAspect="1"/>
+          </p:cNvPicPr>
+          <p:nvPr userDrawn="1"/>
+        </p:nvPicPr>
+        <p:blipFill>
+          <a:blip r:embed="rId5">
+            <a:extLst>
+              <a:ext uri="{28A0092B-C50C-407E-A947-70E740481C1C}">
+                <a14:useLocalDpi xmlns:a14="http://schemas.microsoft.com/office/drawing/2010/main" val="0"/>
+              </a:ext>
+            </a:extLst>
+          </a:blip>
+          <a:stretch>
+            <a:fillRect/>
+          </a:stretch>
+        </p:blipFill>
+        <p:spPr>
+          <a:xfrm>
+            <a:off x="5861471" y="5073565"/>
+            <a:ext cx="3842703" cy="1614832"/>
+          </a:xfrm>
+          <a:prstGeom prst="rect">
+            <a:avLst/>
+          </a:prstGeom>
+        </p:spPr>
+      </p:pic>
+      <p:sp>
+        <p:nvSpPr>
+          <p:cNvPr id="6" name="Rectangle 5"/>
+          <p:cNvSpPr/>
+          <p:nvPr userDrawn="1"/>
+        </p:nvSpPr>
+        <p:spPr>
+          <a:xfrm>
+            <a:off x="506311" y="304799"/>
+            <a:ext cx="2183026" cy="1128585"/>
+          </a:xfrm>
+          <a:prstGeom prst="rect">
+            <a:avLst/>
+          </a:prstGeom>
+          <a:solidFill>
+            <a:schemeClr val="accent1">
+              <a:lumMod val="75000"/>
+            </a:schemeClr>
+          </a:solidFill>
+          <a:ln>
+            <a:noFill/>
+          </a:ln>
+        </p:spPr>
+        <p:style>
+          <a:lnRef idx="2">
+            <a:schemeClr val="accent1">
+              <a:shade val="50000"/>
+            </a:schemeClr>
+          </a:lnRef>
+          <a:fillRef idx="1">
+            <a:schemeClr val="accent1"/>
+          </a:fillRef>
+          <a:effectRef idx="0">
+            <a:schemeClr val="accent1"/>
+          </a:effectRef>
+          <a:fontRef idx="minor">
+            <a:schemeClr val="lt1"/>
+          </a:fontRef>
+        </p:style>
+        <p:txBody>
+          <a:bodyPr rtlCol="0" anchor="ctr"/>
+          <a:lstStyle/>
+          <a:p>
+            <a:pPr algn="ctr"/>
+            <a:endParaRPr lang="en-CA"/>
+          </a:p>
+        </p:txBody>
+      </p:sp>
+      <p:sp>
+        <p:nvSpPr>
+          <p:cNvPr id="11" name="Rectangle 10"/>
+          <p:cNvSpPr/>
+          <p:nvPr userDrawn="1"/>
+        </p:nvSpPr>
+        <p:spPr>
+          <a:xfrm>
+            <a:off x="9251092" y="304799"/>
+            <a:ext cx="2841737" cy="1128585"/>
+          </a:xfrm>
+          <a:prstGeom prst="rect">
+            <a:avLst/>
+          </a:prstGeom>
+          <a:solidFill>
+            <a:schemeClr val="accent1">
+              <a:lumMod val="75000"/>
+            </a:schemeClr>
+          </a:solidFill>
+          <a:ln>
+            <a:noFill/>
+          </a:ln>
+        </p:spPr>
+        <p:style>
+          <a:lnRef idx="2">
+            <a:schemeClr val="accent1">
+              <a:shade val="50000"/>
+            </a:schemeClr>
+          </a:lnRef>
+          <a:fillRef idx="1">
+            <a:schemeClr val="accent1"/>
+          </a:fillRef>
+          <a:effectRef idx="0">
+            <a:schemeClr val="accent1"/>
+          </a:effectRef>
+          <a:fontRef idx="minor">
+            <a:schemeClr val="lt1"/>
+          </a:fontRef>
+        </p:style>
+        <p:txBody>
+          <a:bodyPr rtlCol="0" anchor="ctr"/>
+          <a:lstStyle/>
+          <a:p>
+            <a:pPr algn="ctr"/>
+            <a:endParaRPr lang="en-CA"/>
+          </a:p>
+        </p:txBody>
+      </p:sp>
     </p:spTree>
     <p:extLst>
       <p:ext uri="{BB962C8B-B14F-4D97-AF65-F5344CB8AC3E}">
-        <p14:creationId xmlns:p14="http://schemas.microsoft.com/office/powerpoint/2010/main" val="2007886810"/>
+        <p14:creationId xmlns:p14="http://schemas.microsoft.com/office/powerpoint/2010/main" val="1890487422"/>
       </p:ext>
     </p:extLst>
   </p:cSld>
   <p:clrMapOvr>
     <a:masterClrMapping/>
   </p:clrMapOvr>
+  <p:timing>
+    <p:tnLst>
+      <p:par>
+        <p:cTn id="1" dur="indefinite" restart="never" nodeType="tmRoot"/>
+      </p:par>
+    </p:tnLst>
+  </p:timing>
 </p:sldLayout>
 </file>
 
@@ -16261,35 +17197,6 @@
           </a:p>
         </p:txBody>
       </p:sp>
-      <p:pic>
-        <p:nvPicPr>
-          <p:cNvPr id="3" name="Image 2"/>
-          <p:cNvPicPr>
-            <a:picLocks noChangeAspect="1"/>
-          </p:cNvPicPr>
-          <p:nvPr/>
-        </p:nvPicPr>
-        <p:blipFill>
-          <a:blip r:embed="rId2"/>
-          <a:stretch>
-            <a:fillRect/>
-          </a:stretch>
-        </p:blipFill>
-        <p:spPr>
-          <a:xfrm>
-            <a:off x="5606587" y="1874730"/>
-            <a:ext cx="6290138" cy="4531498"/>
-          </a:xfrm>
-          <a:prstGeom prst="rect">
-            <a:avLst/>
-          </a:prstGeom>
-          <a:ln>
-            <a:solidFill>
-              <a:schemeClr val="tx1"/>
-            </a:solidFill>
-          </a:ln>
-        </p:spPr>
-      </p:pic>
       <p:sp>
         <p:nvSpPr>
           <p:cNvPr id="4" name="Title 1"/>
@@ -16301,7 +17208,7 @@
         <p:spPr>
           <a:xfrm>
             <a:off x="648394" y="2101646"/>
-            <a:ext cx="4866581" cy="733833"/>
+            <a:ext cx="5050657" cy="733833"/>
           </a:xfrm>
           <a:prstGeom prst="rect">
             <a:avLst/>
@@ -16331,7 +17238,11 @@
           <a:p>
             <a:r>
               <a:rPr lang="fr-FR" dirty="0" smtClean="0"/>
-              <a:t>App – User </a:t>
+              <a:t>Web – </a:t>
+            </a:r>
+            <a:r>
+              <a:rPr lang="fr-FR" dirty="0" smtClean="0"/>
+              <a:t>User </a:t>
             </a:r>
             <a:r>
               <a:rPr lang="fr-FR" dirty="0" err="1" smtClean="0"/>
@@ -16604,10 +17515,44 @@
           </a:p>
         </p:txBody>
       </p:sp>
+      <p:pic>
+        <p:nvPicPr>
+          <p:cNvPr id="6" name="Picture 5"/>
+          <p:cNvPicPr>
+            <a:picLocks noChangeAspect="1"/>
+          </p:cNvPicPr>
+          <p:nvPr/>
+        </p:nvPicPr>
+        <p:blipFill rotWithShape="1">
+          <a:blip r:embed="rId3">
+            <a:extLst>
+              <a:ext uri="{28A0092B-C50C-407E-A947-70E740481C1C}">
+                <a14:useLocalDpi xmlns:a14="http://schemas.microsoft.com/office/drawing/2010/main" val="0"/>
+              </a:ext>
+            </a:extLst>
+          </a:blip>
+          <a:srcRect l="870" t="7982" r="2803"/>
+          <a:stretch/>
+        </p:blipFill>
+        <p:spPr>
+          <a:xfrm>
+            <a:off x="6315741" y="1749426"/>
+            <a:ext cx="4848446" cy="5021927"/>
+          </a:xfrm>
+          <a:prstGeom prst="rect">
+            <a:avLst/>
+          </a:prstGeom>
+          <a:ln>
+            <a:solidFill>
+              <a:schemeClr val="tx1"/>
+            </a:solidFill>
+          </a:ln>
+        </p:spPr>
+      </p:pic>
     </p:spTree>
     <p:extLst>
       <p:ext uri="{BB962C8B-B14F-4D97-AF65-F5344CB8AC3E}">
-        <p14:creationId xmlns:p14="http://schemas.microsoft.com/office/powerpoint/2010/main" val="57920603"/>
+        <p14:creationId xmlns:p14="http://schemas.microsoft.com/office/powerpoint/2010/main" val="3627710955"/>
       </p:ext>
     </p:extLst>
   </p:cSld>
@@ -16641,475 +17586,16 @@
           <a:chExt cx="0" cy="0"/>
         </a:xfrm>
       </p:grpSpPr>
-      <p:sp>
-        <p:nvSpPr>
-          <p:cNvPr id="24" name="Rectangle 23"/>
-          <p:cNvSpPr/>
-          <p:nvPr/>
-        </p:nvSpPr>
-        <p:spPr>
-          <a:xfrm>
-            <a:off x="5057775" y="2008120"/>
-            <a:ext cx="6511048" cy="4134489"/>
-          </a:xfrm>
-          <a:prstGeom prst="rect">
-            <a:avLst/>
-          </a:prstGeom>
-          <a:solidFill>
-            <a:schemeClr val="bg2">
-              <a:lumMod val="90000"/>
-            </a:schemeClr>
-          </a:solidFill>
-          <a:ln>
-            <a:solidFill>
-              <a:schemeClr val="tx1"/>
-            </a:solidFill>
-          </a:ln>
-        </p:spPr>
-        <p:style>
-          <a:lnRef idx="2">
-            <a:schemeClr val="accent1">
-              <a:shade val="50000"/>
-            </a:schemeClr>
-          </a:lnRef>
-          <a:fillRef idx="1">
-            <a:schemeClr val="accent1"/>
-          </a:fillRef>
-          <a:effectRef idx="0">
-            <a:schemeClr val="accent1"/>
-          </a:effectRef>
-          <a:fontRef idx="minor">
-            <a:schemeClr val="lt1"/>
-          </a:fontRef>
-        </p:style>
-        <p:txBody>
-          <a:bodyPr rtlCol="0" anchor="ctr"/>
-          <a:lstStyle/>
-          <a:p>
-            <a:pPr algn="ctr"/>
-            <a:endParaRPr lang="en-CA"/>
-          </a:p>
-        </p:txBody>
-      </p:sp>
-      <p:sp>
-        <p:nvSpPr>
-          <p:cNvPr id="2" name="Slide Number Placeholder 1"/>
-          <p:cNvSpPr>
-            <a:spLocks noGrp="1"/>
-          </p:cNvSpPr>
-          <p:nvPr>
-            <p:ph type="sldNum" sz="quarter" idx="4"/>
-          </p:nvPr>
-        </p:nvSpPr>
-        <p:spPr/>
-        <p:txBody>
-          <a:bodyPr/>
-          <a:lstStyle/>
-          <a:p>
-            <a:fld id="{813506F1-DB5F-4FC9-88BA-B486F30FE4BF}" type="slidenum">
-              <a:rPr lang="fr-FR" smtClean="0"/>
-              <a:pPr/>
-              <a:t>10</a:t>
-            </a:fld>
-            <a:endParaRPr lang="fr-FR" dirty="0"/>
-          </a:p>
-        </p:txBody>
-      </p:sp>
-      <p:sp>
-        <p:nvSpPr>
-          <p:cNvPr id="3" name="Title 1"/>
-          <p:cNvSpPr txBox="1">
-            <a:spLocks/>
-          </p:cNvSpPr>
-          <p:nvPr/>
-        </p:nvSpPr>
-        <p:spPr>
-          <a:xfrm>
-            <a:off x="648393" y="2101646"/>
-            <a:ext cx="4028381" cy="733833"/>
-          </a:xfrm>
-          <a:prstGeom prst="rect">
-            <a:avLst/>
-          </a:prstGeom>
-        </p:spPr>
-        <p:txBody>
-          <a:bodyPr/>
-          <a:lstStyle>
-            <a:lvl1pPr algn="l" defTabSz="914400" rtl="0" eaLnBrk="1" latinLnBrk="0" hangingPunct="1">
-              <a:lnSpc>
-                <a:spcPct val="90000"/>
-              </a:lnSpc>
-              <a:spcBef>
-                <a:spcPct val="0"/>
-              </a:spcBef>
-              <a:buNone/>
-              <a:defRPr sz="4400" kern="1200">
-                <a:solidFill>
-                  <a:schemeClr val="tx1"/>
-                </a:solidFill>
-                <a:latin typeface="+mj-lt"/>
-                <a:ea typeface="+mj-ea"/>
-                <a:cs typeface="+mj-cs"/>
-              </a:defRPr>
-            </a:lvl1pPr>
-          </a:lstStyle>
-          <a:p>
-            <a:r>
-              <a:rPr lang="fr-FR" dirty="0" err="1" smtClean="0"/>
-              <a:t>Client’s</a:t>
-            </a:r>
-            <a:r>
-              <a:rPr lang="fr-FR" dirty="0" smtClean="0"/>
-              <a:t> </a:t>
-            </a:r>
-            <a:r>
-              <a:rPr lang="fr-FR" dirty="0" err="1" smtClean="0"/>
-              <a:t>webpage</a:t>
-            </a:r>
-            <a:endParaRPr lang="fr-FR" dirty="0"/>
-          </a:p>
-        </p:txBody>
-      </p:sp>
-      <p:sp>
-        <p:nvSpPr>
-          <p:cNvPr id="4" name="Content Placeholder 2"/>
-          <p:cNvSpPr txBox="1">
-            <a:spLocks/>
-          </p:cNvSpPr>
-          <p:nvPr/>
-        </p:nvSpPr>
-        <p:spPr>
-          <a:xfrm>
-            <a:off x="1236684" y="2835479"/>
-            <a:ext cx="3830616" cy="3765346"/>
-          </a:xfrm>
-          <a:prstGeom prst="rect">
-            <a:avLst/>
-          </a:prstGeom>
-        </p:spPr>
-        <p:txBody>
-          <a:bodyPr>
-            <a:normAutofit/>
-          </a:bodyPr>
-          <a:lstStyle>
-            <a:lvl1pPr marL="228600" indent="-228600" algn="l" defTabSz="914400" rtl="0" eaLnBrk="1" latinLnBrk="0" hangingPunct="1">
-              <a:lnSpc>
-                <a:spcPct val="90000"/>
-              </a:lnSpc>
-              <a:spcBef>
-                <a:spcPts val="1000"/>
-              </a:spcBef>
-              <a:buFont typeface="Arial" panose="020B0604020202020204" pitchFamily="34" charset="0"/>
-              <a:buChar char="•"/>
-              <a:defRPr sz="2800" kern="1200">
-                <a:solidFill>
-                  <a:schemeClr val="tx1"/>
-                </a:solidFill>
-                <a:latin typeface="+mn-lt"/>
-                <a:ea typeface="+mn-ea"/>
-                <a:cs typeface="+mn-cs"/>
-              </a:defRPr>
-            </a:lvl1pPr>
-            <a:lvl2pPr marL="685800" indent="-228600" algn="l" defTabSz="914400" rtl="0" eaLnBrk="1" latinLnBrk="0" hangingPunct="1">
-              <a:lnSpc>
-                <a:spcPct val="90000"/>
-              </a:lnSpc>
-              <a:spcBef>
-                <a:spcPts val="500"/>
-              </a:spcBef>
-              <a:buFont typeface="Arial" panose="020B0604020202020204" pitchFamily="34" charset="0"/>
-              <a:buChar char="•"/>
-              <a:defRPr sz="2400" kern="1200">
-                <a:solidFill>
-                  <a:schemeClr val="tx1"/>
-                </a:solidFill>
-                <a:latin typeface="+mn-lt"/>
-                <a:ea typeface="+mn-ea"/>
-                <a:cs typeface="+mn-cs"/>
-              </a:defRPr>
-            </a:lvl2pPr>
-            <a:lvl3pPr marL="1143000" indent="-228600" algn="l" defTabSz="914400" rtl="0" eaLnBrk="1" latinLnBrk="0" hangingPunct="1">
-              <a:lnSpc>
-                <a:spcPct val="90000"/>
-              </a:lnSpc>
-              <a:spcBef>
-                <a:spcPts val="500"/>
-              </a:spcBef>
-              <a:buFont typeface="Arial" panose="020B0604020202020204" pitchFamily="34" charset="0"/>
-              <a:buChar char="•"/>
-              <a:defRPr sz="2000" kern="1200">
-                <a:solidFill>
-                  <a:schemeClr val="tx1"/>
-                </a:solidFill>
-                <a:latin typeface="+mn-lt"/>
-                <a:ea typeface="+mn-ea"/>
-                <a:cs typeface="+mn-cs"/>
-              </a:defRPr>
-            </a:lvl3pPr>
-            <a:lvl4pPr marL="1600200" indent="-228600" algn="l" defTabSz="914400" rtl="0" eaLnBrk="1" latinLnBrk="0" hangingPunct="1">
-              <a:lnSpc>
-                <a:spcPct val="90000"/>
-              </a:lnSpc>
-              <a:spcBef>
-                <a:spcPts val="500"/>
-              </a:spcBef>
-              <a:buFont typeface="Arial" panose="020B0604020202020204" pitchFamily="34" charset="0"/>
-              <a:buChar char="•"/>
-              <a:defRPr sz="1800" kern="1200">
-                <a:solidFill>
-                  <a:schemeClr val="tx1"/>
-                </a:solidFill>
-                <a:latin typeface="+mn-lt"/>
-                <a:ea typeface="+mn-ea"/>
-                <a:cs typeface="+mn-cs"/>
-              </a:defRPr>
-            </a:lvl4pPr>
-            <a:lvl5pPr marL="2057400" indent="-228600" algn="l" defTabSz="914400" rtl="0" eaLnBrk="1" latinLnBrk="0" hangingPunct="1">
-              <a:lnSpc>
-                <a:spcPct val="90000"/>
-              </a:lnSpc>
-              <a:spcBef>
-                <a:spcPts val="500"/>
-              </a:spcBef>
-              <a:buFont typeface="Arial" panose="020B0604020202020204" pitchFamily="34" charset="0"/>
-              <a:buChar char="•"/>
-              <a:defRPr sz="1800" kern="1200">
-                <a:solidFill>
-                  <a:schemeClr val="tx1"/>
-                </a:solidFill>
-                <a:latin typeface="+mn-lt"/>
-                <a:ea typeface="+mn-ea"/>
-                <a:cs typeface="+mn-cs"/>
-              </a:defRPr>
-            </a:lvl5pPr>
-            <a:lvl6pPr marL="2514600" indent="-228600" algn="l" defTabSz="914400" rtl="0" eaLnBrk="1" latinLnBrk="0" hangingPunct="1">
-              <a:lnSpc>
-                <a:spcPct val="90000"/>
-              </a:lnSpc>
-              <a:spcBef>
-                <a:spcPts val="500"/>
-              </a:spcBef>
-              <a:buFont typeface="Arial" panose="020B0604020202020204" pitchFamily="34" charset="0"/>
-              <a:buChar char="•"/>
-              <a:defRPr sz="1800" kern="1200">
-                <a:solidFill>
-                  <a:schemeClr val="tx1"/>
-                </a:solidFill>
-                <a:latin typeface="+mn-lt"/>
-                <a:ea typeface="+mn-ea"/>
-                <a:cs typeface="+mn-cs"/>
-              </a:defRPr>
-            </a:lvl6pPr>
-            <a:lvl7pPr marL="2971800" indent="-228600" algn="l" defTabSz="914400" rtl="0" eaLnBrk="1" latinLnBrk="0" hangingPunct="1">
-              <a:lnSpc>
-                <a:spcPct val="90000"/>
-              </a:lnSpc>
-              <a:spcBef>
-                <a:spcPts val="500"/>
-              </a:spcBef>
-              <a:buFont typeface="Arial" panose="020B0604020202020204" pitchFamily="34" charset="0"/>
-              <a:buChar char="•"/>
-              <a:defRPr sz="1800" kern="1200">
-                <a:solidFill>
-                  <a:schemeClr val="tx1"/>
-                </a:solidFill>
-                <a:latin typeface="+mn-lt"/>
-                <a:ea typeface="+mn-ea"/>
-                <a:cs typeface="+mn-cs"/>
-              </a:defRPr>
-            </a:lvl7pPr>
-            <a:lvl8pPr marL="3429000" indent="-228600" algn="l" defTabSz="914400" rtl="0" eaLnBrk="1" latinLnBrk="0" hangingPunct="1">
-              <a:lnSpc>
-                <a:spcPct val="90000"/>
-              </a:lnSpc>
-              <a:spcBef>
-                <a:spcPts val="500"/>
-              </a:spcBef>
-              <a:buFont typeface="Arial" panose="020B0604020202020204" pitchFamily="34" charset="0"/>
-              <a:buChar char="•"/>
-              <a:defRPr sz="1800" kern="1200">
-                <a:solidFill>
-                  <a:schemeClr val="tx1"/>
-                </a:solidFill>
-                <a:latin typeface="+mn-lt"/>
-                <a:ea typeface="+mn-ea"/>
-                <a:cs typeface="+mn-cs"/>
-              </a:defRPr>
-            </a:lvl8pPr>
-            <a:lvl9pPr marL="3886200" indent="-228600" algn="l" defTabSz="914400" rtl="0" eaLnBrk="1" latinLnBrk="0" hangingPunct="1">
-              <a:lnSpc>
-                <a:spcPct val="90000"/>
-              </a:lnSpc>
-              <a:spcBef>
-                <a:spcPts val="500"/>
-              </a:spcBef>
-              <a:buFont typeface="Arial" panose="020B0604020202020204" pitchFamily="34" charset="0"/>
-              <a:buChar char="•"/>
-              <a:defRPr sz="1800" kern="1200">
-                <a:solidFill>
-                  <a:schemeClr val="tx1"/>
-                </a:solidFill>
-                <a:latin typeface="+mn-lt"/>
-                <a:ea typeface="+mn-ea"/>
-                <a:cs typeface="+mn-cs"/>
-              </a:defRPr>
-            </a:lvl9pPr>
-          </a:lstStyle>
-          <a:p>
-            <a:pPr algn="just"/>
-            <a:r>
-              <a:rPr lang="fr-FR" sz="2000" dirty="0" smtClean="0"/>
-              <a:t>Manage </a:t>
-            </a:r>
-            <a:r>
-              <a:rPr lang="fr-FR" sz="2000" dirty="0" err="1" smtClean="0"/>
-              <a:t>database</a:t>
-            </a:r>
-            <a:endParaRPr lang="fr-FR" sz="2000" dirty="0" smtClean="0"/>
-          </a:p>
-          <a:p>
-            <a:pPr lvl="1" algn="just"/>
-            <a:r>
-              <a:rPr lang="fr-FR" sz="1600" dirty="0" err="1" smtClean="0"/>
-              <a:t>Add</a:t>
-            </a:r>
-            <a:r>
-              <a:rPr lang="fr-FR" sz="1600" dirty="0" smtClean="0"/>
-              <a:t> </a:t>
-            </a:r>
-            <a:r>
-              <a:rPr lang="fr-FR" sz="1600" dirty="0" err="1" smtClean="0"/>
-              <a:t>genes</a:t>
-            </a:r>
-            <a:endParaRPr lang="fr-FR" sz="1600" dirty="0" smtClean="0"/>
-          </a:p>
-          <a:p>
-            <a:pPr lvl="1" algn="just"/>
-            <a:endParaRPr lang="fr-FR" sz="1600" dirty="0"/>
-          </a:p>
-          <a:p>
-            <a:pPr lvl="1" algn="just"/>
-            <a:r>
-              <a:rPr lang="fr-FR" sz="1600" dirty="0" err="1" smtClean="0"/>
-              <a:t>Remove</a:t>
-            </a:r>
-            <a:r>
-              <a:rPr lang="fr-FR" sz="1600" dirty="0" smtClean="0"/>
-              <a:t> </a:t>
-            </a:r>
-            <a:r>
-              <a:rPr lang="fr-FR" sz="1600" dirty="0" err="1" smtClean="0"/>
-              <a:t>genes</a:t>
-            </a:r>
-            <a:endParaRPr lang="fr-FR" sz="1600" dirty="0" smtClean="0"/>
-          </a:p>
-          <a:p>
-            <a:pPr lvl="1" algn="just"/>
-            <a:endParaRPr lang="fr-FR" sz="1600" dirty="0"/>
-          </a:p>
-          <a:p>
-            <a:pPr lvl="1" algn="just"/>
-            <a:r>
-              <a:rPr lang="fr-FR" sz="1600" dirty="0" err="1" smtClean="0"/>
-              <a:t>Modify</a:t>
-            </a:r>
-            <a:r>
-              <a:rPr lang="fr-FR" sz="1600" dirty="0" smtClean="0"/>
-              <a:t> </a:t>
-            </a:r>
-            <a:r>
-              <a:rPr lang="fr-FR" sz="1600" dirty="0" err="1" smtClean="0"/>
-              <a:t>genes</a:t>
-            </a:r>
-            <a:endParaRPr lang="fr-FR" sz="1600" dirty="0" smtClean="0"/>
-          </a:p>
-          <a:p>
-            <a:pPr lvl="1" algn="just"/>
-            <a:endParaRPr lang="fr-FR" sz="1600" dirty="0"/>
-          </a:p>
-          <a:p>
-            <a:pPr lvl="1" algn="just"/>
-            <a:r>
-              <a:rPr lang="fr-FR" sz="1600" dirty="0" err="1" smtClean="0"/>
-              <a:t>Download</a:t>
-            </a:r>
-            <a:r>
-              <a:rPr lang="fr-FR" sz="1600" dirty="0" smtClean="0"/>
-              <a:t> </a:t>
-            </a:r>
-            <a:r>
-              <a:rPr lang="fr-FR" sz="1600" dirty="0" err="1" smtClean="0"/>
-              <a:t>survey</a:t>
-            </a:r>
-            <a:r>
-              <a:rPr lang="fr-FR" sz="1600" dirty="0" smtClean="0"/>
-              <a:t> </a:t>
-            </a:r>
-            <a:r>
-              <a:rPr lang="fr-FR" sz="1600" dirty="0" err="1" smtClean="0"/>
-              <a:t>answers</a:t>
-            </a:r>
-            <a:endParaRPr lang="fr-FR" sz="1600" dirty="0" smtClean="0"/>
-          </a:p>
-          <a:p>
-            <a:pPr marL="0" indent="0" algn="just">
-              <a:buNone/>
-            </a:pPr>
-            <a:endParaRPr lang="fr-FR" sz="2000" dirty="0"/>
-          </a:p>
-          <a:p>
-            <a:pPr marL="0" indent="0" algn="just">
-              <a:buFont typeface="Arial" panose="020B0604020202020204" pitchFamily="34" charset="0"/>
-              <a:buNone/>
-            </a:pPr>
-            <a:endParaRPr lang="fr-FR" sz="2000" dirty="0"/>
-          </a:p>
-        </p:txBody>
-      </p:sp>
       <p:pic>
         <p:nvPicPr>
-          <p:cNvPr id="11" name="Picture 10"/>
-          <p:cNvPicPr>
-            <a:picLocks noChangeAspect="1"/>
-          </p:cNvPicPr>
-          <p:nvPr/>
-        </p:nvPicPr>
-        <p:blipFill rotWithShape="1">
-          <a:blip r:embed="rId2">
-            <a:extLst>
-              <a:ext uri="{28A0092B-C50C-407E-A947-70E740481C1C}">
-                <a14:useLocalDpi xmlns:a14="http://schemas.microsoft.com/office/drawing/2010/main" val="0"/>
-              </a:ext>
-            </a:extLst>
-          </a:blip>
-          <a:srcRect r="18760"/>
-          <a:stretch/>
-        </p:blipFill>
-        <p:spPr>
-          <a:xfrm>
-            <a:off x="5067300" y="2017645"/>
-            <a:ext cx="6501523" cy="4124965"/>
-          </a:xfrm>
-          <a:prstGeom prst="rect">
-            <a:avLst/>
-          </a:prstGeom>
-          <a:ln>
-            <a:solidFill>
-              <a:schemeClr val="tx1"/>
-            </a:solidFill>
-          </a:ln>
-        </p:spPr>
-      </p:pic>
-      <p:pic>
-        <p:nvPicPr>
-          <p:cNvPr id="12" name="Picture 11"/>
+          <p:cNvPr id="4" name="Picture 3"/>
           <p:cNvPicPr>
             <a:picLocks noChangeAspect="1"/>
           </p:cNvPicPr>
           <p:nvPr/>
         </p:nvPicPr>
         <p:blipFill>
-          <a:blip r:embed="rId3">
+          <a:blip r:embed="rId2" cstate="print">
             <a:extLst>
               <a:ext uri="{28A0092B-C50C-407E-A947-70E740481C1C}">
                 <a14:useLocalDpi xmlns:a14="http://schemas.microsoft.com/office/drawing/2010/main" val="0"/>
@@ -17122,22 +17608,76 @@
         </p:blipFill>
         <p:spPr>
           <a:xfrm>
-            <a:off x="6038556" y="2835479"/>
-            <a:ext cx="4937668" cy="2803321"/>
+            <a:off x="3770318" y="303186"/>
+            <a:ext cx="4480548" cy="1153082"/>
           </a:xfrm>
           <a:prstGeom prst="rect">
             <a:avLst/>
           </a:prstGeom>
-          <a:ln>
-            <a:solidFill>
-              <a:schemeClr val="tx1"/>
-            </a:solidFill>
-          </a:ln>
+        </p:spPr>
+      </p:pic>
+      <p:sp>
+        <p:nvSpPr>
+          <p:cNvPr id="5" name="TextBox 4"/>
+          <p:cNvSpPr txBox="1"/>
+          <p:nvPr/>
+        </p:nvSpPr>
+        <p:spPr>
+          <a:xfrm>
+            <a:off x="2445193" y="2296620"/>
+            <a:ext cx="7130798" cy="830997"/>
+          </a:xfrm>
+          <a:prstGeom prst="rect">
+            <a:avLst/>
+          </a:prstGeom>
+          <a:noFill/>
+        </p:spPr>
+        <p:txBody>
+          <a:bodyPr wrap="none" rtlCol="0">
+            <a:spAutoFit/>
+          </a:bodyPr>
+          <a:lstStyle/>
+          <a:p>
+            <a:r>
+              <a:rPr lang="en-CA" sz="4800" dirty="0" smtClean="0"/>
+              <a:t>Thank you for you attention</a:t>
+            </a:r>
+            <a:endParaRPr lang="en-CA" sz="4800" dirty="0"/>
+          </a:p>
+        </p:txBody>
+      </p:sp>
+      <p:pic>
+        <p:nvPicPr>
+          <p:cNvPr id="6" name="Picture 5"/>
+          <p:cNvPicPr>
+            <a:picLocks noChangeAspect="1"/>
+          </p:cNvPicPr>
+          <p:nvPr/>
+        </p:nvPicPr>
+        <p:blipFill rotWithShape="1">
+          <a:blip r:embed="rId3">
+            <a:extLst>
+              <a:ext uri="{28A0092B-C50C-407E-A947-70E740481C1C}">
+                <a14:useLocalDpi xmlns:a14="http://schemas.microsoft.com/office/drawing/2010/main" val="0"/>
+              </a:ext>
+            </a:extLst>
+          </a:blip>
+          <a:srcRect t="3527" r="79252" b="47990"/>
+          <a:stretch/>
+        </p:blipFill>
+        <p:spPr>
+          <a:xfrm>
+            <a:off x="2445193" y="3457239"/>
+            <a:ext cx="1513663" cy="1630303"/>
+          </a:xfrm>
+          <a:prstGeom prst="rect">
+            <a:avLst/>
+          </a:prstGeom>
         </p:spPr>
       </p:pic>
       <p:pic>
         <p:nvPicPr>
-          <p:cNvPr id="19" name="Picture 18"/>
+          <p:cNvPr id="7" name="Picture 6"/>
           <p:cNvPicPr>
             <a:picLocks noChangeAspect="1"/>
           </p:cNvPicPr>
@@ -17157,128 +17697,18 @@
         </p:blipFill>
         <p:spPr>
           <a:xfrm>
-            <a:off x="5286705" y="2952355"/>
-            <a:ext cx="6219768" cy="1870572"/>
+            <a:off x="5528930" y="3643740"/>
+            <a:ext cx="4876800" cy="1257300"/>
           </a:xfrm>
           <a:prstGeom prst="rect">
             <a:avLst/>
           </a:prstGeom>
-          <a:ln>
-            <a:solidFill>
-              <a:schemeClr val="tx1"/>
-            </a:solidFill>
-          </a:ln>
-        </p:spPr>
-      </p:pic>
-      <p:pic>
-        <p:nvPicPr>
-          <p:cNvPr id="20" name="Picture 19"/>
-          <p:cNvPicPr>
-            <a:picLocks noChangeAspect="1"/>
-          </p:cNvPicPr>
-          <p:nvPr/>
-        </p:nvPicPr>
-        <p:blipFill>
-          <a:blip r:embed="rId5" cstate="print">
-            <a:extLst>
-              <a:ext uri="{28A0092B-C50C-407E-A947-70E740481C1C}">
-                <a14:useLocalDpi xmlns:a14="http://schemas.microsoft.com/office/drawing/2010/main" val="0"/>
-              </a:ext>
-            </a:extLst>
-          </a:blip>
-          <a:stretch>
-            <a:fillRect/>
-          </a:stretch>
-        </p:blipFill>
-        <p:spPr>
-          <a:xfrm>
-            <a:off x="5457826" y="2737493"/>
-            <a:ext cx="5877527" cy="1150148"/>
-          </a:xfrm>
-          <a:prstGeom prst="rect">
-            <a:avLst/>
-          </a:prstGeom>
-          <a:ln>
-            <a:solidFill>
-              <a:schemeClr val="tx1"/>
-            </a:solidFill>
-          </a:ln>
-        </p:spPr>
-      </p:pic>
-      <p:pic>
-        <p:nvPicPr>
-          <p:cNvPr id="21" name="Picture 20"/>
-          <p:cNvPicPr>
-            <a:picLocks noChangeAspect="1"/>
-          </p:cNvPicPr>
-          <p:nvPr/>
-        </p:nvPicPr>
-        <p:blipFill>
-          <a:blip r:embed="rId6">
-            <a:extLst>
-              <a:ext uri="{28A0092B-C50C-407E-A947-70E740481C1C}">
-                <a14:useLocalDpi xmlns:a14="http://schemas.microsoft.com/office/drawing/2010/main" val="0"/>
-              </a:ext>
-            </a:extLst>
-          </a:blip>
-          <a:stretch>
-            <a:fillRect/>
-          </a:stretch>
-        </p:blipFill>
-        <p:spPr>
-          <a:xfrm>
-            <a:off x="8229435" y="2101646"/>
-            <a:ext cx="3277038" cy="3984646"/>
-          </a:xfrm>
-          <a:prstGeom prst="rect">
-            <a:avLst/>
-          </a:prstGeom>
-          <a:ln>
-            <a:solidFill>
-              <a:schemeClr val="tx1"/>
-            </a:solidFill>
-          </a:ln>
-        </p:spPr>
-      </p:pic>
-      <p:pic>
-        <p:nvPicPr>
-          <p:cNvPr id="23" name="Picture 22"/>
-          <p:cNvPicPr>
-            <a:picLocks noChangeAspect="1"/>
-          </p:cNvPicPr>
-          <p:nvPr/>
-        </p:nvPicPr>
-        <p:blipFill>
-          <a:blip r:embed="rId7" cstate="print">
-            <a:extLst>
-              <a:ext uri="{28A0092B-C50C-407E-A947-70E740481C1C}">
-                <a14:useLocalDpi xmlns:a14="http://schemas.microsoft.com/office/drawing/2010/main" val="0"/>
-              </a:ext>
-            </a:extLst>
-          </a:blip>
-          <a:stretch>
-            <a:fillRect/>
-          </a:stretch>
-        </p:blipFill>
-        <p:spPr>
-          <a:xfrm>
-            <a:off x="5101314" y="2705000"/>
-            <a:ext cx="6405159" cy="1182641"/>
-          </a:xfrm>
-          <a:prstGeom prst="rect">
-            <a:avLst/>
-          </a:prstGeom>
-          <a:ln>
-            <a:solidFill>
-              <a:schemeClr val="tx1"/>
-            </a:solidFill>
-          </a:ln>
         </p:spPr>
       </p:pic>
     </p:spTree>
     <p:extLst>
       <p:ext uri="{BB962C8B-B14F-4D97-AF65-F5344CB8AC3E}">
-        <p14:creationId xmlns:p14="http://schemas.microsoft.com/office/powerpoint/2010/main" val="2321400333"/>
+        <p14:creationId xmlns:p14="http://schemas.microsoft.com/office/powerpoint/2010/main" val="623569666"/>
       </p:ext>
     </p:extLst>
   </p:cSld>
@@ -17288,634 +17718,9 @@
   <p:timing>
     <p:tnLst>
       <p:par>
-        <p:cTn id="1" dur="indefinite" restart="never" nodeType="tmRoot">
-          <p:childTnLst>
-            <p:seq concurrent="1" nextAc="seek">
-              <p:cTn id="2" dur="indefinite" nodeType="mainSeq">
-                <p:childTnLst>
-                  <p:par>
-                    <p:cTn id="3" fill="hold">
-                      <p:stCondLst>
-                        <p:cond delay="indefinite"/>
-                      </p:stCondLst>
-                      <p:childTnLst>
-                        <p:par>
-                          <p:cTn id="4" fill="hold">
-                            <p:stCondLst>
-                              <p:cond delay="0"/>
-                            </p:stCondLst>
-                            <p:childTnLst>
-                              <p:par>
-                                <p:cTn id="5" presetID="10" presetClass="entr" presetSubtype="0" fill="hold" grpId="0" nodeType="clickEffect">
-                                  <p:stCondLst>
-                                    <p:cond delay="0"/>
-                                  </p:stCondLst>
-                                  <p:childTnLst>
-                                    <p:set>
-                                      <p:cBhvr>
-                                        <p:cTn id="6" dur="1" fill="hold">
-                                          <p:stCondLst>
-                                            <p:cond delay="0"/>
-                                          </p:stCondLst>
-                                        </p:cTn>
-                                        <p:tgtEl>
-                                          <p:spTgt spid="24"/>
-                                        </p:tgtEl>
-                                        <p:attrNameLst>
-                                          <p:attrName>style.visibility</p:attrName>
-                                        </p:attrNameLst>
-                                      </p:cBhvr>
-                                      <p:to>
-                                        <p:strVal val="visible"/>
-                                      </p:to>
-                                    </p:set>
-                                    <p:animEffect transition="in" filter="fade">
-                                      <p:cBhvr>
-                                        <p:cTn id="7" dur="500"/>
-                                        <p:tgtEl>
-                                          <p:spTgt spid="24"/>
-                                        </p:tgtEl>
-                                      </p:cBhvr>
-                                    </p:animEffect>
-                                  </p:childTnLst>
-                                </p:cTn>
-                              </p:par>
-                              <p:par>
-                                <p:cTn id="8" presetID="10" presetClass="exit" presetSubtype="0" fill="hold" nodeType="withEffect">
-                                  <p:stCondLst>
-                                    <p:cond delay="0"/>
-                                  </p:stCondLst>
-                                  <p:childTnLst>
-                                    <p:animEffect transition="out" filter="fade">
-                                      <p:cBhvr>
-                                        <p:cTn id="9" dur="500"/>
-                                        <p:tgtEl>
-                                          <p:spTgt spid="11"/>
-                                        </p:tgtEl>
-                                      </p:cBhvr>
-                                    </p:animEffect>
-                                    <p:set>
-                                      <p:cBhvr>
-                                        <p:cTn id="10" dur="1" fill="hold">
-                                          <p:stCondLst>
-                                            <p:cond delay="499"/>
-                                          </p:stCondLst>
-                                        </p:cTn>
-                                        <p:tgtEl>
-                                          <p:spTgt spid="11"/>
-                                        </p:tgtEl>
-                                        <p:attrNameLst>
-                                          <p:attrName>style.visibility</p:attrName>
-                                        </p:attrNameLst>
-                                      </p:cBhvr>
-                                      <p:to>
-                                        <p:strVal val="hidden"/>
-                                      </p:to>
-                                    </p:set>
-                                  </p:childTnLst>
-                                </p:cTn>
-                              </p:par>
-                              <p:par>
-                                <p:cTn id="11" presetID="10" presetClass="entr" presetSubtype="0" fill="hold" nodeType="withEffect">
-                                  <p:stCondLst>
-                                    <p:cond delay="0"/>
-                                  </p:stCondLst>
-                                  <p:childTnLst>
-                                    <p:set>
-                                      <p:cBhvr>
-                                        <p:cTn id="12" dur="1" fill="hold">
-                                          <p:stCondLst>
-                                            <p:cond delay="0"/>
-                                          </p:stCondLst>
-                                        </p:cTn>
-                                        <p:tgtEl>
-                                          <p:spTgt spid="12"/>
-                                        </p:tgtEl>
-                                        <p:attrNameLst>
-                                          <p:attrName>style.visibility</p:attrName>
-                                        </p:attrNameLst>
-                                      </p:cBhvr>
-                                      <p:to>
-                                        <p:strVal val="visible"/>
-                                      </p:to>
-                                    </p:set>
-                                    <p:animEffect transition="in" filter="fade">
-                                      <p:cBhvr>
-                                        <p:cTn id="13" dur="500"/>
-                                        <p:tgtEl>
-                                          <p:spTgt spid="12"/>
-                                        </p:tgtEl>
-                                      </p:cBhvr>
-                                    </p:animEffect>
-                                  </p:childTnLst>
-                                </p:cTn>
-                              </p:par>
-                            </p:childTnLst>
-                          </p:cTn>
-                        </p:par>
-                      </p:childTnLst>
-                    </p:cTn>
-                  </p:par>
-                  <p:par>
-                    <p:cTn id="14" fill="hold">
-                      <p:stCondLst>
-                        <p:cond delay="indefinite"/>
-                      </p:stCondLst>
-                      <p:childTnLst>
-                        <p:par>
-                          <p:cTn id="15" fill="hold">
-                            <p:stCondLst>
-                              <p:cond delay="0"/>
-                            </p:stCondLst>
-                            <p:childTnLst>
-                              <p:par>
-                                <p:cTn id="16" presetID="10" presetClass="exit" presetSubtype="0" fill="hold" nodeType="clickEffect">
-                                  <p:stCondLst>
-                                    <p:cond delay="0"/>
-                                  </p:stCondLst>
-                                  <p:childTnLst>
-                                    <p:animEffect transition="out" filter="fade">
-                                      <p:cBhvr>
-                                        <p:cTn id="17" dur="500"/>
-                                        <p:tgtEl>
-                                          <p:spTgt spid="12"/>
-                                        </p:tgtEl>
-                                      </p:cBhvr>
-                                    </p:animEffect>
-                                    <p:set>
-                                      <p:cBhvr>
-                                        <p:cTn id="18" dur="1" fill="hold">
-                                          <p:stCondLst>
-                                            <p:cond delay="499"/>
-                                          </p:stCondLst>
-                                        </p:cTn>
-                                        <p:tgtEl>
-                                          <p:spTgt spid="12"/>
-                                        </p:tgtEl>
-                                        <p:attrNameLst>
-                                          <p:attrName>style.visibility</p:attrName>
-                                        </p:attrNameLst>
-                                      </p:cBhvr>
-                                      <p:to>
-                                        <p:strVal val="hidden"/>
-                                      </p:to>
-                                    </p:set>
-                                  </p:childTnLst>
-                                </p:cTn>
-                              </p:par>
-                              <p:par>
-                                <p:cTn id="19" presetID="10" presetClass="entr" presetSubtype="0" fill="hold" nodeType="withEffect">
-                                  <p:stCondLst>
-                                    <p:cond delay="0"/>
-                                  </p:stCondLst>
-                                  <p:childTnLst>
-                                    <p:set>
-                                      <p:cBhvr>
-                                        <p:cTn id="20" dur="1" fill="hold">
-                                          <p:stCondLst>
-                                            <p:cond delay="0"/>
-                                          </p:stCondLst>
-                                        </p:cTn>
-                                        <p:tgtEl>
-                                          <p:spTgt spid="19"/>
-                                        </p:tgtEl>
-                                        <p:attrNameLst>
-                                          <p:attrName>style.visibility</p:attrName>
-                                        </p:attrNameLst>
-                                      </p:cBhvr>
-                                      <p:to>
-                                        <p:strVal val="visible"/>
-                                      </p:to>
-                                    </p:set>
-                                    <p:animEffect transition="in" filter="fade">
-                                      <p:cBhvr>
-                                        <p:cTn id="21" dur="500"/>
-                                        <p:tgtEl>
-                                          <p:spTgt spid="19"/>
-                                        </p:tgtEl>
-                                      </p:cBhvr>
-                                    </p:animEffect>
-                                  </p:childTnLst>
-                                </p:cTn>
-                              </p:par>
-                            </p:childTnLst>
-                          </p:cTn>
-                        </p:par>
-                      </p:childTnLst>
-                    </p:cTn>
-                  </p:par>
-                  <p:par>
-                    <p:cTn id="22" fill="hold">
-                      <p:stCondLst>
-                        <p:cond delay="indefinite"/>
-                      </p:stCondLst>
-                      <p:childTnLst>
-                        <p:par>
-                          <p:cTn id="23" fill="hold">
-                            <p:stCondLst>
-                              <p:cond delay="0"/>
-                            </p:stCondLst>
-                            <p:childTnLst>
-                              <p:par>
-                                <p:cTn id="24" presetID="10" presetClass="exit" presetSubtype="0" fill="hold" nodeType="clickEffect">
-                                  <p:stCondLst>
-                                    <p:cond delay="0"/>
-                                  </p:stCondLst>
-                                  <p:childTnLst>
-                                    <p:animEffect transition="out" filter="fade">
-                                      <p:cBhvr>
-                                        <p:cTn id="25" dur="500"/>
-                                        <p:tgtEl>
-                                          <p:spTgt spid="19"/>
-                                        </p:tgtEl>
-                                      </p:cBhvr>
-                                    </p:animEffect>
-                                    <p:set>
-                                      <p:cBhvr>
-                                        <p:cTn id="26" dur="1" fill="hold">
-                                          <p:stCondLst>
-                                            <p:cond delay="499"/>
-                                          </p:stCondLst>
-                                        </p:cTn>
-                                        <p:tgtEl>
-                                          <p:spTgt spid="19"/>
-                                        </p:tgtEl>
-                                        <p:attrNameLst>
-                                          <p:attrName>style.visibility</p:attrName>
-                                        </p:attrNameLst>
-                                      </p:cBhvr>
-                                      <p:to>
-                                        <p:strVal val="hidden"/>
-                                      </p:to>
-                                    </p:set>
-                                  </p:childTnLst>
-                                </p:cTn>
-                              </p:par>
-                              <p:par>
-                                <p:cTn id="27" presetID="10" presetClass="entr" presetSubtype="0" fill="hold" nodeType="withEffect">
-                                  <p:stCondLst>
-                                    <p:cond delay="0"/>
-                                  </p:stCondLst>
-                                  <p:childTnLst>
-                                    <p:set>
-                                      <p:cBhvr>
-                                        <p:cTn id="28" dur="1" fill="hold">
-                                          <p:stCondLst>
-                                            <p:cond delay="0"/>
-                                          </p:stCondLst>
-                                        </p:cTn>
-                                        <p:tgtEl>
-                                          <p:spTgt spid="20"/>
-                                        </p:tgtEl>
-                                        <p:attrNameLst>
-                                          <p:attrName>style.visibility</p:attrName>
-                                        </p:attrNameLst>
-                                      </p:cBhvr>
-                                      <p:to>
-                                        <p:strVal val="visible"/>
-                                      </p:to>
-                                    </p:set>
-                                    <p:animEffect transition="in" filter="fade">
-                                      <p:cBhvr>
-                                        <p:cTn id="29" dur="500"/>
-                                        <p:tgtEl>
-                                          <p:spTgt spid="20"/>
-                                        </p:tgtEl>
-                                      </p:cBhvr>
-                                    </p:animEffect>
-                                  </p:childTnLst>
-                                </p:cTn>
-                              </p:par>
-                            </p:childTnLst>
-                          </p:cTn>
-                        </p:par>
-                      </p:childTnLst>
-                    </p:cTn>
-                  </p:par>
-                  <p:par>
-                    <p:cTn id="30" fill="hold">
-                      <p:stCondLst>
-                        <p:cond delay="indefinite"/>
-                      </p:stCondLst>
-                      <p:childTnLst>
-                        <p:par>
-                          <p:cTn id="31" fill="hold">
-                            <p:stCondLst>
-                              <p:cond delay="0"/>
-                            </p:stCondLst>
-                            <p:childTnLst>
-                              <p:par>
-                                <p:cTn id="32" presetID="10" presetClass="entr" presetSubtype="0" fill="hold" nodeType="clickEffect">
-                                  <p:stCondLst>
-                                    <p:cond delay="0"/>
-                                  </p:stCondLst>
-                                  <p:childTnLst>
-                                    <p:set>
-                                      <p:cBhvr>
-                                        <p:cTn id="33" dur="1" fill="hold">
-                                          <p:stCondLst>
-                                            <p:cond delay="0"/>
-                                          </p:stCondLst>
-                                        </p:cTn>
-                                        <p:tgtEl>
-                                          <p:spTgt spid="21"/>
-                                        </p:tgtEl>
-                                        <p:attrNameLst>
-                                          <p:attrName>style.visibility</p:attrName>
-                                        </p:attrNameLst>
-                                      </p:cBhvr>
-                                      <p:to>
-                                        <p:strVal val="visible"/>
-                                      </p:to>
-                                    </p:set>
-                                    <p:animEffect transition="in" filter="fade">
-                                      <p:cBhvr>
-                                        <p:cTn id="34" dur="500"/>
-                                        <p:tgtEl>
-                                          <p:spTgt spid="21"/>
-                                        </p:tgtEl>
-                                      </p:cBhvr>
-                                    </p:animEffect>
-                                  </p:childTnLst>
-                                </p:cTn>
-                              </p:par>
-                            </p:childTnLst>
-                          </p:cTn>
-                        </p:par>
-                      </p:childTnLst>
-                    </p:cTn>
-                  </p:par>
-                  <p:par>
-                    <p:cTn id="35" fill="hold">
-                      <p:stCondLst>
-                        <p:cond delay="indefinite"/>
-                      </p:stCondLst>
-                      <p:childTnLst>
-                        <p:par>
-                          <p:cTn id="36" fill="hold">
-                            <p:stCondLst>
-                              <p:cond delay="0"/>
-                            </p:stCondLst>
-                            <p:childTnLst>
-                              <p:par>
-                                <p:cTn id="37" presetID="10" presetClass="exit" presetSubtype="0" fill="hold" nodeType="clickEffect">
-                                  <p:stCondLst>
-                                    <p:cond delay="0"/>
-                                  </p:stCondLst>
-                                  <p:childTnLst>
-                                    <p:animEffect transition="out" filter="fade">
-                                      <p:cBhvr>
-                                        <p:cTn id="38" dur="500"/>
-                                        <p:tgtEl>
-                                          <p:spTgt spid="20"/>
-                                        </p:tgtEl>
-                                      </p:cBhvr>
-                                    </p:animEffect>
-                                    <p:set>
-                                      <p:cBhvr>
-                                        <p:cTn id="39" dur="1" fill="hold">
-                                          <p:stCondLst>
-                                            <p:cond delay="499"/>
-                                          </p:stCondLst>
-                                        </p:cTn>
-                                        <p:tgtEl>
-                                          <p:spTgt spid="20"/>
-                                        </p:tgtEl>
-                                        <p:attrNameLst>
-                                          <p:attrName>style.visibility</p:attrName>
-                                        </p:attrNameLst>
-                                      </p:cBhvr>
-                                      <p:to>
-                                        <p:strVal val="hidden"/>
-                                      </p:to>
-                                    </p:set>
-                                  </p:childTnLst>
-                                </p:cTn>
-                              </p:par>
-                              <p:par>
-                                <p:cTn id="40" presetID="10" presetClass="exit" presetSubtype="0" fill="hold" nodeType="withEffect">
-                                  <p:stCondLst>
-                                    <p:cond delay="0"/>
-                                  </p:stCondLst>
-                                  <p:childTnLst>
-                                    <p:animEffect transition="out" filter="fade">
-                                      <p:cBhvr>
-                                        <p:cTn id="41" dur="500"/>
-                                        <p:tgtEl>
-                                          <p:spTgt spid="21"/>
-                                        </p:tgtEl>
-                                      </p:cBhvr>
-                                    </p:animEffect>
-                                    <p:set>
-                                      <p:cBhvr>
-                                        <p:cTn id="42" dur="1" fill="hold">
-                                          <p:stCondLst>
-                                            <p:cond delay="499"/>
-                                          </p:stCondLst>
-                                        </p:cTn>
-                                        <p:tgtEl>
-                                          <p:spTgt spid="21"/>
-                                        </p:tgtEl>
-                                        <p:attrNameLst>
-                                          <p:attrName>style.visibility</p:attrName>
-                                        </p:attrNameLst>
-                                      </p:cBhvr>
-                                      <p:to>
-                                        <p:strVal val="hidden"/>
-                                      </p:to>
-                                    </p:set>
-                                  </p:childTnLst>
-                                </p:cTn>
-                              </p:par>
-                              <p:par>
-                                <p:cTn id="43" presetID="10" presetClass="entr" presetSubtype="0" fill="hold" nodeType="withEffect">
-                                  <p:stCondLst>
-                                    <p:cond delay="0"/>
-                                  </p:stCondLst>
-                                  <p:childTnLst>
-                                    <p:set>
-                                      <p:cBhvr>
-                                        <p:cTn id="44" dur="1" fill="hold">
-                                          <p:stCondLst>
-                                            <p:cond delay="0"/>
-                                          </p:stCondLst>
-                                        </p:cTn>
-                                        <p:tgtEl>
-                                          <p:spTgt spid="23"/>
-                                        </p:tgtEl>
-                                        <p:attrNameLst>
-                                          <p:attrName>style.visibility</p:attrName>
-                                        </p:attrNameLst>
-                                      </p:cBhvr>
-                                      <p:to>
-                                        <p:strVal val="visible"/>
-                                      </p:to>
-                                    </p:set>
-                                    <p:animEffect transition="in" filter="fade">
-                                      <p:cBhvr>
-                                        <p:cTn id="45" dur="500"/>
-                                        <p:tgtEl>
-                                          <p:spTgt spid="23"/>
-                                        </p:tgtEl>
-                                      </p:cBhvr>
-                                    </p:animEffect>
-                                  </p:childTnLst>
-                                </p:cTn>
-                              </p:par>
-                            </p:childTnLst>
-                          </p:cTn>
-                        </p:par>
-                      </p:childTnLst>
-                    </p:cTn>
-                  </p:par>
-                  <p:par>
-                    <p:cTn id="46" fill="hold">
-                      <p:stCondLst>
-                        <p:cond delay="indefinite"/>
-                      </p:stCondLst>
-                      <p:childTnLst>
-                        <p:par>
-                          <p:cTn id="47" fill="hold">
-                            <p:stCondLst>
-                              <p:cond delay="0"/>
-                            </p:stCondLst>
-                            <p:childTnLst>
-                              <p:par>
-                                <p:cTn id="48" presetID="10" presetClass="exit" presetSubtype="0" fill="hold" nodeType="clickEffect">
-                                  <p:stCondLst>
-                                    <p:cond delay="0"/>
-                                  </p:stCondLst>
-                                  <p:childTnLst>
-                                    <p:animEffect transition="out" filter="fade">
-                                      <p:cBhvr>
-                                        <p:cTn id="49" dur="500"/>
-                                        <p:tgtEl>
-                                          <p:spTgt spid="23"/>
-                                        </p:tgtEl>
-                                      </p:cBhvr>
-                                    </p:animEffect>
-                                    <p:set>
-                                      <p:cBhvr>
-                                        <p:cTn id="50" dur="1" fill="hold">
-                                          <p:stCondLst>
-                                            <p:cond delay="499"/>
-                                          </p:stCondLst>
-                                        </p:cTn>
-                                        <p:tgtEl>
-                                          <p:spTgt spid="23"/>
-                                        </p:tgtEl>
-                                        <p:attrNameLst>
-                                          <p:attrName>style.visibility</p:attrName>
-                                        </p:attrNameLst>
-                                      </p:cBhvr>
-                                      <p:to>
-                                        <p:strVal val="hidden"/>
-                                      </p:to>
-                                    </p:set>
-                                  </p:childTnLst>
-                                </p:cTn>
-                              </p:par>
-                              <p:par>
-                                <p:cTn id="51" presetID="10" presetClass="exit" presetSubtype="0" fill="hold" grpId="1" nodeType="withEffect">
-                                  <p:stCondLst>
-                                    <p:cond delay="0"/>
-                                  </p:stCondLst>
-                                  <p:childTnLst>
-                                    <p:animEffect transition="out" filter="fade">
-                                      <p:cBhvr>
-                                        <p:cTn id="52" dur="500"/>
-                                        <p:tgtEl>
-                                          <p:spTgt spid="24"/>
-                                        </p:tgtEl>
-                                      </p:cBhvr>
-                                    </p:animEffect>
-                                    <p:set>
-                                      <p:cBhvr>
-                                        <p:cTn id="53" dur="1" fill="hold">
-                                          <p:stCondLst>
-                                            <p:cond delay="499"/>
-                                          </p:stCondLst>
-                                        </p:cTn>
-                                        <p:tgtEl>
-                                          <p:spTgt spid="24"/>
-                                        </p:tgtEl>
-                                        <p:attrNameLst>
-                                          <p:attrName>style.visibility</p:attrName>
-                                        </p:attrNameLst>
-                                      </p:cBhvr>
-                                      <p:to>
-                                        <p:strVal val="hidden"/>
-                                      </p:to>
-                                    </p:set>
-                                  </p:childTnLst>
-                                </p:cTn>
-                              </p:par>
-                              <p:par>
-                                <p:cTn id="54" presetID="10" presetClass="entr" presetSubtype="0" fill="hold" nodeType="withEffect">
-                                  <p:stCondLst>
-                                    <p:cond delay="0"/>
-                                  </p:stCondLst>
-                                  <p:childTnLst>
-                                    <p:set>
-                                      <p:cBhvr>
-                                        <p:cTn id="55" dur="1" fill="hold">
-                                          <p:stCondLst>
-                                            <p:cond delay="0"/>
-                                          </p:stCondLst>
-                                        </p:cTn>
-                                        <p:tgtEl>
-                                          <p:spTgt spid="11"/>
-                                        </p:tgtEl>
-                                        <p:attrNameLst>
-                                          <p:attrName>style.visibility</p:attrName>
-                                        </p:attrNameLst>
-                                      </p:cBhvr>
-                                      <p:to>
-                                        <p:strVal val="visible"/>
-                                      </p:to>
-                                    </p:set>
-                                    <p:animEffect transition="in" filter="fade">
-                                      <p:cBhvr>
-                                        <p:cTn id="56" dur="500"/>
-                                        <p:tgtEl>
-                                          <p:spTgt spid="11"/>
-                                        </p:tgtEl>
-                                      </p:cBhvr>
-                                    </p:animEffect>
-                                  </p:childTnLst>
-                                </p:cTn>
-                              </p:par>
-                            </p:childTnLst>
-                          </p:cTn>
-                        </p:par>
-                      </p:childTnLst>
-                    </p:cTn>
-                  </p:par>
-                </p:childTnLst>
-              </p:cTn>
-              <p:prevCondLst>
-                <p:cond evt="onPrev" delay="0">
-                  <p:tgtEl>
-                    <p:sldTgt/>
-                  </p:tgtEl>
-                </p:cond>
-              </p:prevCondLst>
-              <p:nextCondLst>
-                <p:cond evt="onNext" delay="0">
-                  <p:tgtEl>
-                    <p:sldTgt/>
-                  </p:tgtEl>
-                </p:cond>
-              </p:nextCondLst>
-            </p:seq>
-          </p:childTnLst>
-        </p:cTn>
+        <p:cTn id="1" dur="indefinite" restart="never" nodeType="tmRoot"/>
       </p:par>
     </p:tnLst>
-    <p:bldLst>
-      <p:bldP spid="24" grpId="0" animBg="1"/>
-      <p:bldP spid="24" grpId="1" animBg="1"/>
-    </p:bldLst>
   </p:timing>
 </p:sld>
 </file>
@@ -18451,7 +18256,7 @@
         </p:xfrm>
         <a:graphic>
           <a:graphicData uri="http://schemas.openxmlformats.org/drawingml/2006/diagram">
-            <dgm:relIds xmlns:dgm="http://schemas.openxmlformats.org/drawingml/2006/diagram" xmlns:r="http://schemas.openxmlformats.org/officeDocument/2006/relationships" r:dm="rId2" r:lo="rId3" r:qs="rId4" r:cs="rId5"/>
+            <dgm:relIds xmlns:dgm="http://schemas.openxmlformats.org/drawingml/2006/diagram" xmlns:r="http://schemas.openxmlformats.org/officeDocument/2006/relationships" r:dm="rId3" r:lo="rId4" r:qs="rId5" r:cs="rId6"/>
           </a:graphicData>
         </a:graphic>
       </p:graphicFrame>
@@ -18464,7 +18269,7 @@
           <p:nvPr/>
         </p:nvPicPr>
         <p:blipFill>
-          <a:blip r:embed="rId7">
+          <a:blip r:embed="rId8">
             <a:extLst>
               <a:ext uri="{28A0092B-C50C-407E-A947-70E740481C1C}">
                 <a14:useLocalDpi xmlns:a14="http://schemas.microsoft.com/office/drawing/2010/main" val="0"/>
@@ -18510,7 +18315,7 @@
         </p:xfrm>
         <a:graphic>
           <a:graphicData uri="http://schemas.openxmlformats.org/drawingml/2006/diagram">
-            <dgm:relIds xmlns:dgm="http://schemas.openxmlformats.org/drawingml/2006/diagram" xmlns:r="http://schemas.openxmlformats.org/officeDocument/2006/relationships" r:dm="rId8" r:lo="rId9" r:qs="rId10" r:cs="rId11"/>
+            <dgm:relIds xmlns:dgm="http://schemas.openxmlformats.org/drawingml/2006/diagram" xmlns:r="http://schemas.openxmlformats.org/officeDocument/2006/relationships" r:dm="rId9" r:lo="rId10" r:qs="rId11" r:cs="rId12"/>
           </a:graphicData>
         </a:graphic>
       </p:graphicFrame>
@@ -18523,7 +18328,7 @@
           <p:nvPr/>
         </p:nvPicPr>
         <p:blipFill rotWithShape="1">
-          <a:blip r:embed="rId13">
+          <a:blip r:embed="rId14">
             <a:extLst>
               <a:ext uri="{28A0092B-C50C-407E-A947-70E740481C1C}">
                 <a14:useLocalDpi xmlns:a14="http://schemas.microsoft.com/office/drawing/2010/main" val="0"/>
@@ -18552,7 +18357,7 @@
           <p:nvPr/>
         </p:nvPicPr>
         <p:blipFill>
-          <a:blip r:embed="rId14" cstate="print">
+          <a:blip r:embed="rId15" cstate="print">
             <a:extLst>
               <a:ext uri="{28A0092B-C50C-407E-A947-70E740481C1C}">
                 <a14:useLocalDpi xmlns:a14="http://schemas.microsoft.com/office/drawing/2010/main" val="0"/>
@@ -18582,7 +18387,7 @@
           <p:nvPr/>
         </p:nvPicPr>
         <p:blipFill>
-          <a:blip r:embed="rId15" cstate="print">
+          <a:blip r:embed="rId16" cstate="print">
             <a:extLst>
               <a:ext uri="{28A0092B-C50C-407E-A947-70E740481C1C}">
                 <a14:useLocalDpi xmlns:a14="http://schemas.microsoft.com/office/drawing/2010/main" val="0"/>
@@ -18617,7 +18422,7 @@
         </p:xfrm>
         <a:graphic>
           <a:graphicData uri="http://schemas.openxmlformats.org/drawingml/2006/diagram">
-            <dgm:relIds xmlns:dgm="http://schemas.openxmlformats.org/drawingml/2006/diagram" xmlns:r="http://schemas.openxmlformats.org/officeDocument/2006/relationships" r:dm="rId16" r:lo="rId17" r:qs="rId18" r:cs="rId19"/>
+            <dgm:relIds xmlns:dgm="http://schemas.openxmlformats.org/drawingml/2006/diagram" xmlns:r="http://schemas.openxmlformats.org/officeDocument/2006/relationships" r:dm="rId17" r:lo="rId18" r:qs="rId19" r:cs="rId20"/>
           </a:graphicData>
         </a:graphic>
       </p:graphicFrame>
@@ -18630,7 +18435,7 @@
           <p:nvPr/>
         </p:nvPicPr>
         <p:blipFill>
-          <a:blip r:embed="rId21" cstate="print">
+          <a:blip r:embed="rId22" cstate="print">
             <a:extLst>
               <a:ext uri="{28A0092B-C50C-407E-A947-70E740481C1C}">
                 <a14:useLocalDpi xmlns:a14="http://schemas.microsoft.com/office/drawing/2010/main" val="0"/>
@@ -18660,7 +18465,7 @@
           <p:nvPr/>
         </p:nvPicPr>
         <p:blipFill>
-          <a:blip r:embed="rId22" cstate="print">
+          <a:blip r:embed="rId23" cstate="print">
             <a:extLst>
               <a:ext uri="{28A0092B-C50C-407E-A947-70E740481C1C}">
                 <a14:useLocalDpi xmlns:a14="http://schemas.microsoft.com/office/drawing/2010/main" val="0"/>
@@ -18690,7 +18495,7 @@
           <p:nvPr/>
         </p:nvPicPr>
         <p:blipFill>
-          <a:blip r:embed="rId23" cstate="print">
+          <a:blip r:embed="rId24" cstate="print">
             <a:extLst>
               <a:ext uri="{28A0092B-C50C-407E-A947-70E740481C1C}">
                 <a14:useLocalDpi xmlns:a14="http://schemas.microsoft.com/office/drawing/2010/main" val="0"/>
@@ -18714,7 +18519,7 @@
     </p:spTree>
     <p:extLst>
       <p:ext uri="{BB962C8B-B14F-4D97-AF65-F5344CB8AC3E}">
-        <p14:creationId xmlns:p14="http://schemas.microsoft.com/office/powerpoint/2010/main" val="3739728578"/>
+        <p14:creationId xmlns:p14="http://schemas.microsoft.com/office/powerpoint/2010/main" val="1449805805"/>
       </p:ext>
     </p:extLst>
   </p:cSld>
@@ -21544,7 +21349,7 @@
         <p:spPr>
           <a:xfrm>
             <a:off x="844465" y="5664598"/>
-            <a:ext cx="9056131" cy="381000"/>
+            <a:ext cx="9137308" cy="381000"/>
           </a:xfrm>
           <a:prstGeom prst="rect">
             <a:avLst/>
@@ -21619,7 +21424,7 @@
         <p:spPr>
           <a:xfrm>
             <a:off x="844465" y="2034261"/>
-            <a:ext cx="9056131" cy="3630337"/>
+            <a:ext cx="9137308" cy="3630337"/>
           </a:xfrm>
           <a:prstGeom prst="rect">
             <a:avLst/>
@@ -21697,7 +21502,7 @@
         </p:nvSpPr>
         <p:spPr>
           <a:xfrm>
-            <a:off x="9854454" y="6045598"/>
+            <a:off x="9930678" y="6045598"/>
             <a:ext cx="114300" cy="127000"/>
           </a:xfrm>
           <a:prstGeom prst="triangle">
@@ -21763,7 +21568,7 @@
         </p:nvSpPr>
         <p:spPr>
           <a:xfrm>
-            <a:off x="9728755" y="6172598"/>
+            <a:off x="9804979" y="6172598"/>
             <a:ext cx="368300" cy="186055"/>
           </a:xfrm>
           <a:prstGeom prst="rect">
@@ -24494,7 +24299,7 @@
         </p:nvSpPr>
         <p:spPr>
           <a:xfrm>
-            <a:off x="2788757" y="3752697"/>
+            <a:off x="2788757" y="3745554"/>
             <a:ext cx="1362525" cy="285749"/>
           </a:xfrm>
           <a:prstGeom prst="rect">
@@ -24800,7 +24605,7 @@
     </p:spTree>
     <p:extLst>
       <p:ext uri="{BB962C8B-B14F-4D97-AF65-F5344CB8AC3E}">
-        <p14:creationId xmlns:p14="http://schemas.microsoft.com/office/powerpoint/2010/main" val="3441523186"/>
+        <p14:creationId xmlns:p14="http://schemas.microsoft.com/office/powerpoint/2010/main" val="2783239285"/>
       </p:ext>
     </p:extLst>
   </p:cSld>
@@ -24918,7 +24723,7 @@
         </p:xfrm>
         <a:graphic>
           <a:graphicData uri="http://schemas.openxmlformats.org/drawingml/2006/diagram">
-            <dgm:relIds xmlns:dgm="http://schemas.openxmlformats.org/drawingml/2006/diagram" xmlns:r="http://schemas.openxmlformats.org/officeDocument/2006/relationships" r:dm="rId2" r:lo="rId3" r:qs="rId4" r:cs="rId5"/>
+            <dgm:relIds xmlns:dgm="http://schemas.openxmlformats.org/drawingml/2006/diagram" xmlns:r="http://schemas.openxmlformats.org/officeDocument/2006/relationships" r:dm="rId3" r:lo="rId4" r:qs="rId5" r:cs="rId6"/>
           </a:graphicData>
         </a:graphic>
       </p:graphicFrame>
@@ -24931,7 +24736,7 @@
           <p:nvPr/>
         </p:nvPicPr>
         <p:blipFill>
-          <a:blip r:embed="rId7" cstate="print">
+          <a:blip r:embed="rId8" cstate="print">
             <a:extLst>
               <a:ext uri="{28A0092B-C50C-407E-A947-70E740481C1C}">
                 <a14:useLocalDpi xmlns:a14="http://schemas.microsoft.com/office/drawing/2010/main" val="0"/>
@@ -24961,7 +24766,7 @@
           <p:nvPr/>
         </p:nvPicPr>
         <p:blipFill>
-          <a:blip r:embed="rId8" cstate="print">
+          <a:blip r:embed="rId9" cstate="print">
             <a:extLst>
               <a:ext uri="{28A0092B-C50C-407E-A947-70E740481C1C}">
                 <a14:useLocalDpi xmlns:a14="http://schemas.microsoft.com/office/drawing/2010/main" val="0"/>
@@ -24991,7 +24796,7 @@
           <p:nvPr/>
         </p:nvPicPr>
         <p:blipFill>
-          <a:blip r:embed="rId9" cstate="print">
+          <a:blip r:embed="rId10" cstate="print">
             <a:extLst>
               <a:ext uri="{28A0092B-C50C-407E-A947-70E740481C1C}">
                 <a14:useLocalDpi xmlns:a14="http://schemas.microsoft.com/office/drawing/2010/main" val="0"/>
@@ -25021,7 +24826,7 @@
           <p:nvPr/>
         </p:nvPicPr>
         <p:blipFill>
-          <a:blip r:embed="rId10">
+          <a:blip r:embed="rId11">
             <a:extLst>
               <a:ext uri="{28A0092B-C50C-407E-A947-70E740481C1C}">
                 <a14:useLocalDpi xmlns:a14="http://schemas.microsoft.com/office/drawing/2010/main" val="0"/>
@@ -25051,7 +24856,7 @@
           <p:nvPr/>
         </p:nvPicPr>
         <p:blipFill>
-          <a:blip r:embed="rId11" cstate="print">
+          <a:blip r:embed="rId12" cstate="print">
             <a:extLst>
               <a:ext uri="{28A0092B-C50C-407E-A947-70E740481C1C}">
                 <a14:useLocalDpi xmlns:a14="http://schemas.microsoft.com/office/drawing/2010/main" val="0"/>
@@ -25081,7 +24886,7 @@
           <p:nvPr/>
         </p:nvPicPr>
         <p:blipFill>
-          <a:blip r:embed="rId12" cstate="print">
+          <a:blip r:embed="rId13" cstate="print">
             <a:extLst>
               <a:ext uri="{28A0092B-C50C-407E-A947-70E740481C1C}">
                 <a14:useLocalDpi xmlns:a14="http://schemas.microsoft.com/office/drawing/2010/main" val="0"/>
@@ -25111,7 +24916,7 @@
           <p:nvPr/>
         </p:nvPicPr>
         <p:blipFill>
-          <a:blip r:embed="rId13" cstate="print">
+          <a:blip r:embed="rId14" cstate="print">
             <a:extLst>
               <a:ext uri="{28A0092B-C50C-407E-A947-70E740481C1C}">
                 <a14:useLocalDpi xmlns:a14="http://schemas.microsoft.com/office/drawing/2010/main" val="0"/>
@@ -25389,7 +25194,7 @@
     </p:spTree>
     <p:extLst>
       <p:ext uri="{BB962C8B-B14F-4D97-AF65-F5344CB8AC3E}">
-        <p14:creationId xmlns:p14="http://schemas.microsoft.com/office/powerpoint/2010/main" val="3855356196"/>
+        <p14:creationId xmlns:p14="http://schemas.microsoft.com/office/powerpoint/2010/main" val="28948741"/>
       </p:ext>
     </p:extLst>
   </p:cSld>
@@ -25482,7 +25287,7 @@
           <p:nvPr/>
         </p:nvPicPr>
         <p:blipFill>
-          <a:blip r:embed="rId2">
+          <a:blip r:embed="rId3">
             <a:extLst>
               <a:ext uri="{28A0092B-C50C-407E-A947-70E740481C1C}">
                 <a14:useLocalDpi xmlns:a14="http://schemas.microsoft.com/office/drawing/2010/main" val="0"/>
@@ -25512,7 +25317,7 @@
           <p:nvPr/>
         </p:nvPicPr>
         <p:blipFill>
-          <a:blip r:embed="rId3">
+          <a:blip r:embed="rId4">
             <a:extLst>
               <a:ext uri="{28A0092B-C50C-407E-A947-70E740481C1C}">
                 <a14:useLocalDpi xmlns:a14="http://schemas.microsoft.com/office/drawing/2010/main" val="0"/>
@@ -25542,7 +25347,7 @@
           <p:nvPr/>
         </p:nvPicPr>
         <p:blipFill rotWithShape="1">
-          <a:blip r:embed="rId4">
+          <a:blip r:embed="rId5">
             <a:extLst>
               <a:ext uri="{28A0092B-C50C-407E-A947-70E740481C1C}">
                 <a14:useLocalDpi xmlns:a14="http://schemas.microsoft.com/office/drawing/2010/main" val="0"/>
@@ -25571,7 +25376,7 @@
           <p:nvPr/>
         </p:nvPicPr>
         <p:blipFill>
-          <a:blip r:embed="rId5">
+          <a:blip r:embed="rId6">
             <a:extLst>
               <a:ext uri="{28A0092B-C50C-407E-A947-70E740481C1C}">
                 <a14:useLocalDpi xmlns:a14="http://schemas.microsoft.com/office/drawing/2010/main" val="0"/>
@@ -25601,7 +25406,7 @@
           <p:nvPr/>
         </p:nvPicPr>
         <p:blipFill>
-          <a:blip r:embed="rId6">
+          <a:blip r:embed="rId7">
             <a:extLst>
               <a:ext uri="{28A0092B-C50C-407E-A947-70E740481C1C}">
                 <a14:useLocalDpi xmlns:a14="http://schemas.microsoft.com/office/drawing/2010/main" val="0"/>
@@ -25959,7 +25764,7 @@
     </p:spTree>
     <p:extLst>
       <p:ext uri="{BB962C8B-B14F-4D97-AF65-F5344CB8AC3E}">
-        <p14:creationId xmlns:p14="http://schemas.microsoft.com/office/powerpoint/2010/main" val="347486927"/>
+        <p14:creationId xmlns:p14="http://schemas.microsoft.com/office/powerpoint/2010/main" val="3861606753"/>
       </p:ext>
     </p:extLst>
   </p:cSld>
@@ -27581,7 +27386,7 @@
             <p:nvPr/>
           </p:nvPicPr>
           <p:blipFill>
-            <a:blip r:embed="rId2" cstate="print">
+            <a:blip r:embed="rId3" cstate="print">
               <a:extLst>
                 <a:ext uri="{28A0092B-C50C-407E-A947-70E740481C1C}">
                   <a14:useLocalDpi xmlns:a14="http://schemas.microsoft.com/office/drawing/2010/main" val="0"/>
@@ -27611,7 +27416,7 @@
             <p:nvPr/>
           </p:nvPicPr>
           <p:blipFill>
-            <a:blip r:embed="rId2" cstate="print">
+            <a:blip r:embed="rId3" cstate="print">
               <a:extLst>
                 <a:ext uri="{28A0092B-C50C-407E-A947-70E740481C1C}">
                   <a14:useLocalDpi xmlns:a14="http://schemas.microsoft.com/office/drawing/2010/main" val="0"/>
@@ -27641,7 +27446,7 @@
             <p:nvPr/>
           </p:nvPicPr>
           <p:blipFill>
-            <a:blip r:embed="rId2" cstate="print">
+            <a:blip r:embed="rId3" cstate="print">
               <a:extLst>
                 <a:ext uri="{28A0092B-C50C-407E-A947-70E740481C1C}">
                   <a14:useLocalDpi xmlns:a14="http://schemas.microsoft.com/office/drawing/2010/main" val="0"/>
@@ -27671,7 +27476,7 @@
             <p:nvPr/>
           </p:nvPicPr>
           <p:blipFill>
-            <a:blip r:embed="rId2" cstate="print">
+            <a:blip r:embed="rId3" cstate="print">
               <a:extLst>
                 <a:ext uri="{28A0092B-C50C-407E-A947-70E740481C1C}">
                   <a14:useLocalDpi xmlns:a14="http://schemas.microsoft.com/office/drawing/2010/main" val="0"/>
@@ -27701,7 +27506,7 @@
             <p:nvPr/>
           </p:nvPicPr>
           <p:blipFill>
-            <a:blip r:embed="rId2" cstate="print">
+            <a:blip r:embed="rId3" cstate="print">
               <a:extLst>
                 <a:ext uri="{28A0092B-C50C-407E-A947-70E740481C1C}">
                   <a14:useLocalDpi xmlns:a14="http://schemas.microsoft.com/office/drawing/2010/main" val="0"/>
@@ -27731,7 +27536,7 @@
             <p:nvPr/>
           </p:nvPicPr>
           <p:blipFill>
-            <a:blip r:embed="rId2" cstate="print">
+            <a:blip r:embed="rId3" cstate="print">
               <a:extLst>
                 <a:ext uri="{28A0092B-C50C-407E-A947-70E740481C1C}">
                   <a14:useLocalDpi xmlns:a14="http://schemas.microsoft.com/office/drawing/2010/main" val="0"/>
@@ -28558,7 +28363,7 @@
     </p:spTree>
     <p:extLst>
       <p:ext uri="{BB962C8B-B14F-4D97-AF65-F5344CB8AC3E}">
-        <p14:creationId xmlns:p14="http://schemas.microsoft.com/office/powerpoint/2010/main" val="2936368288"/>
+        <p14:creationId xmlns:p14="http://schemas.microsoft.com/office/powerpoint/2010/main" val="2776271672"/>
       </p:ext>
     </p:extLst>
   </p:cSld>
@@ -29914,8 +29719,8 @@
         </p:blipFill>
         <p:spPr>
           <a:xfrm>
-            <a:off x="1358265" y="2139193"/>
-            <a:ext cx="4609089" cy="4632160"/>
+            <a:off x="6182003" y="1912566"/>
+            <a:ext cx="4733204" cy="4756896"/>
           </a:xfrm>
           <a:prstGeom prst="rect">
             <a:avLst/>
@@ -29943,8 +29748,8 @@
         </p:blipFill>
         <p:spPr>
           <a:xfrm>
-            <a:off x="6296664" y="2139194"/>
-            <a:ext cx="4586534" cy="4632160"/>
+            <a:off x="6182003" y="1912566"/>
+            <a:ext cx="4733205" cy="4780291"/>
           </a:xfrm>
           <a:prstGeom prst="rect">
             <a:avLst/>
@@ -29953,93 +29758,333 @@
       </p:pic>
       <p:sp>
         <p:nvSpPr>
-          <p:cNvPr id="11" name="Rectangle 10"/>
-          <p:cNvSpPr/>
+          <p:cNvPr id="7" name="Title 1"/>
+          <p:cNvSpPr txBox="1">
+            <a:spLocks/>
+          </p:cNvSpPr>
           <p:nvPr/>
         </p:nvSpPr>
         <p:spPr>
           <a:xfrm>
-            <a:off x="6327199" y="3649444"/>
-            <a:ext cx="1045369" cy="186531"/>
+            <a:off x="648394" y="2101646"/>
+            <a:ext cx="5050657" cy="733833"/>
           </a:xfrm>
           <a:prstGeom prst="rect">
             <a:avLst/>
           </a:prstGeom>
-          <a:noFill/>
-          <a:ln w="57150">
-            <a:solidFill>
-              <a:srgbClr val="FF0000"/>
-            </a:solidFill>
-          </a:ln>
         </p:spPr>
-        <p:style>
-          <a:lnRef idx="2">
-            <a:schemeClr val="accent1">
-              <a:shade val="50000"/>
-            </a:schemeClr>
-          </a:lnRef>
-          <a:fillRef idx="1">
-            <a:schemeClr val="accent1"/>
-          </a:fillRef>
-          <a:effectRef idx="0">
-            <a:schemeClr val="accent1"/>
-          </a:effectRef>
-          <a:fontRef idx="minor">
-            <a:schemeClr val="lt1"/>
-          </a:fontRef>
-        </p:style>
         <p:txBody>
-          <a:bodyPr rtlCol="0" anchor="ctr"/>
-          <a:lstStyle/>
+          <a:bodyPr/>
+          <a:lstStyle>
+            <a:lvl1pPr algn="l" defTabSz="914400" rtl="0" eaLnBrk="1" latinLnBrk="0" hangingPunct="1">
+              <a:lnSpc>
+                <a:spcPct val="90000"/>
+              </a:lnSpc>
+              <a:spcBef>
+                <a:spcPct val="0"/>
+              </a:spcBef>
+              <a:buNone/>
+              <a:defRPr sz="4400" kern="1200">
+                <a:solidFill>
+                  <a:schemeClr val="tx1"/>
+                </a:solidFill>
+                <a:latin typeface="+mj-lt"/>
+                <a:ea typeface="+mj-ea"/>
+                <a:cs typeface="+mj-cs"/>
+              </a:defRPr>
+            </a:lvl1pPr>
+          </a:lstStyle>
           <a:p>
-            <a:pPr algn="ctr"/>
-            <a:endParaRPr lang="en-CA"/>
+            <a:r>
+              <a:rPr lang="fr-FR" dirty="0" smtClean="0"/>
+              <a:t>App – </a:t>
+            </a:r>
+            <a:r>
+              <a:rPr lang="fr-FR" dirty="0" err="1" smtClean="0"/>
+              <a:t>Examples</a:t>
+            </a:r>
+            <a:endParaRPr lang="fr-FR" dirty="0"/>
           </a:p>
         </p:txBody>
       </p:sp>
       <p:sp>
         <p:nvSpPr>
-          <p:cNvPr id="12" name="Rectangle 11"/>
-          <p:cNvSpPr/>
+          <p:cNvPr id="9" name="Content Placeholder 2"/>
+          <p:cNvSpPr txBox="1">
+            <a:spLocks/>
+          </p:cNvSpPr>
           <p:nvPr/>
         </p:nvSpPr>
         <p:spPr>
           <a:xfrm>
-            <a:off x="1386840" y="2402426"/>
-            <a:ext cx="1051560" cy="186531"/>
+            <a:off x="1236684" y="2835479"/>
+            <a:ext cx="4161226" cy="3842158"/>
           </a:xfrm>
           <a:prstGeom prst="rect">
             <a:avLst/>
           </a:prstGeom>
-          <a:noFill/>
-          <a:ln w="57150">
-            <a:solidFill>
-              <a:srgbClr val="FF0000"/>
-            </a:solidFill>
-          </a:ln>
         </p:spPr>
-        <p:style>
-          <a:lnRef idx="2">
-            <a:schemeClr val="accent1">
-              <a:shade val="50000"/>
-            </a:schemeClr>
-          </a:lnRef>
-          <a:fillRef idx="1">
-            <a:schemeClr val="accent1"/>
-          </a:fillRef>
-          <a:effectRef idx="0">
-            <a:schemeClr val="accent1"/>
-          </a:effectRef>
-          <a:fontRef idx="minor">
-            <a:schemeClr val="lt1"/>
-          </a:fontRef>
-        </p:style>
         <p:txBody>
-          <a:bodyPr rtlCol="0" anchor="ctr"/>
-          <a:lstStyle/>
+          <a:bodyPr>
+            <a:normAutofit/>
+          </a:bodyPr>
+          <a:lstStyle>
+            <a:lvl1pPr marL="228600" indent="-228600" algn="l" defTabSz="914400" rtl="0" eaLnBrk="1" latinLnBrk="0" hangingPunct="1">
+              <a:lnSpc>
+                <a:spcPct val="90000"/>
+              </a:lnSpc>
+              <a:spcBef>
+                <a:spcPts val="1000"/>
+              </a:spcBef>
+              <a:buFont typeface="Arial" panose="020B0604020202020204" pitchFamily="34" charset="0"/>
+              <a:buChar char="•"/>
+              <a:defRPr sz="2800" kern="1200">
+                <a:solidFill>
+                  <a:schemeClr val="tx1"/>
+                </a:solidFill>
+                <a:latin typeface="+mn-lt"/>
+                <a:ea typeface="+mn-ea"/>
+                <a:cs typeface="+mn-cs"/>
+              </a:defRPr>
+            </a:lvl1pPr>
+            <a:lvl2pPr marL="685800" indent="-228600" algn="l" defTabSz="914400" rtl="0" eaLnBrk="1" latinLnBrk="0" hangingPunct="1">
+              <a:lnSpc>
+                <a:spcPct val="90000"/>
+              </a:lnSpc>
+              <a:spcBef>
+                <a:spcPts val="500"/>
+              </a:spcBef>
+              <a:buFont typeface="Arial" panose="020B0604020202020204" pitchFamily="34" charset="0"/>
+              <a:buChar char="•"/>
+              <a:defRPr sz="2400" kern="1200">
+                <a:solidFill>
+                  <a:schemeClr val="tx1"/>
+                </a:solidFill>
+                <a:latin typeface="+mn-lt"/>
+                <a:ea typeface="+mn-ea"/>
+                <a:cs typeface="+mn-cs"/>
+              </a:defRPr>
+            </a:lvl2pPr>
+            <a:lvl3pPr marL="1143000" indent="-228600" algn="l" defTabSz="914400" rtl="0" eaLnBrk="1" latinLnBrk="0" hangingPunct="1">
+              <a:lnSpc>
+                <a:spcPct val="90000"/>
+              </a:lnSpc>
+              <a:spcBef>
+                <a:spcPts val="500"/>
+              </a:spcBef>
+              <a:buFont typeface="Arial" panose="020B0604020202020204" pitchFamily="34" charset="0"/>
+              <a:buChar char="•"/>
+              <a:defRPr sz="2000" kern="1200">
+                <a:solidFill>
+                  <a:schemeClr val="tx1"/>
+                </a:solidFill>
+                <a:latin typeface="+mn-lt"/>
+                <a:ea typeface="+mn-ea"/>
+                <a:cs typeface="+mn-cs"/>
+              </a:defRPr>
+            </a:lvl3pPr>
+            <a:lvl4pPr marL="1600200" indent="-228600" algn="l" defTabSz="914400" rtl="0" eaLnBrk="1" latinLnBrk="0" hangingPunct="1">
+              <a:lnSpc>
+                <a:spcPct val="90000"/>
+              </a:lnSpc>
+              <a:spcBef>
+                <a:spcPts val="500"/>
+              </a:spcBef>
+              <a:buFont typeface="Arial" panose="020B0604020202020204" pitchFamily="34" charset="0"/>
+              <a:buChar char="•"/>
+              <a:defRPr sz="1800" kern="1200">
+                <a:solidFill>
+                  <a:schemeClr val="tx1"/>
+                </a:solidFill>
+                <a:latin typeface="+mn-lt"/>
+                <a:ea typeface="+mn-ea"/>
+                <a:cs typeface="+mn-cs"/>
+              </a:defRPr>
+            </a:lvl4pPr>
+            <a:lvl5pPr marL="2057400" indent="-228600" algn="l" defTabSz="914400" rtl="0" eaLnBrk="1" latinLnBrk="0" hangingPunct="1">
+              <a:lnSpc>
+                <a:spcPct val="90000"/>
+              </a:lnSpc>
+              <a:spcBef>
+                <a:spcPts val="500"/>
+              </a:spcBef>
+              <a:buFont typeface="Arial" panose="020B0604020202020204" pitchFamily="34" charset="0"/>
+              <a:buChar char="•"/>
+              <a:defRPr sz="1800" kern="1200">
+                <a:solidFill>
+                  <a:schemeClr val="tx1"/>
+                </a:solidFill>
+                <a:latin typeface="+mn-lt"/>
+                <a:ea typeface="+mn-ea"/>
+                <a:cs typeface="+mn-cs"/>
+              </a:defRPr>
+            </a:lvl5pPr>
+            <a:lvl6pPr marL="2514600" indent="-228600" algn="l" defTabSz="914400" rtl="0" eaLnBrk="1" latinLnBrk="0" hangingPunct="1">
+              <a:lnSpc>
+                <a:spcPct val="90000"/>
+              </a:lnSpc>
+              <a:spcBef>
+                <a:spcPts val="500"/>
+              </a:spcBef>
+              <a:buFont typeface="Arial" panose="020B0604020202020204" pitchFamily="34" charset="0"/>
+              <a:buChar char="•"/>
+              <a:defRPr sz="1800" kern="1200">
+                <a:solidFill>
+                  <a:schemeClr val="tx1"/>
+                </a:solidFill>
+                <a:latin typeface="+mn-lt"/>
+                <a:ea typeface="+mn-ea"/>
+                <a:cs typeface="+mn-cs"/>
+              </a:defRPr>
+            </a:lvl6pPr>
+            <a:lvl7pPr marL="2971800" indent="-228600" algn="l" defTabSz="914400" rtl="0" eaLnBrk="1" latinLnBrk="0" hangingPunct="1">
+              <a:lnSpc>
+                <a:spcPct val="90000"/>
+              </a:lnSpc>
+              <a:spcBef>
+                <a:spcPts val="500"/>
+              </a:spcBef>
+              <a:buFont typeface="Arial" panose="020B0604020202020204" pitchFamily="34" charset="0"/>
+              <a:buChar char="•"/>
+              <a:defRPr sz="1800" kern="1200">
+                <a:solidFill>
+                  <a:schemeClr val="tx1"/>
+                </a:solidFill>
+                <a:latin typeface="+mn-lt"/>
+                <a:ea typeface="+mn-ea"/>
+                <a:cs typeface="+mn-cs"/>
+              </a:defRPr>
+            </a:lvl7pPr>
+            <a:lvl8pPr marL="3429000" indent="-228600" algn="l" defTabSz="914400" rtl="0" eaLnBrk="1" latinLnBrk="0" hangingPunct="1">
+              <a:lnSpc>
+                <a:spcPct val="90000"/>
+              </a:lnSpc>
+              <a:spcBef>
+                <a:spcPts val="500"/>
+              </a:spcBef>
+              <a:buFont typeface="Arial" panose="020B0604020202020204" pitchFamily="34" charset="0"/>
+              <a:buChar char="•"/>
+              <a:defRPr sz="1800" kern="1200">
+                <a:solidFill>
+                  <a:schemeClr val="tx1"/>
+                </a:solidFill>
+                <a:latin typeface="+mn-lt"/>
+                <a:ea typeface="+mn-ea"/>
+                <a:cs typeface="+mn-cs"/>
+              </a:defRPr>
+            </a:lvl8pPr>
+            <a:lvl9pPr marL="3886200" indent="-228600" algn="l" defTabSz="914400" rtl="0" eaLnBrk="1" latinLnBrk="0" hangingPunct="1">
+              <a:lnSpc>
+                <a:spcPct val="90000"/>
+              </a:lnSpc>
+              <a:spcBef>
+                <a:spcPts val="500"/>
+              </a:spcBef>
+              <a:buFont typeface="Arial" panose="020B0604020202020204" pitchFamily="34" charset="0"/>
+              <a:buChar char="•"/>
+              <a:defRPr sz="1800" kern="1200">
+                <a:solidFill>
+                  <a:schemeClr val="tx1"/>
+                </a:solidFill>
+                <a:latin typeface="+mn-lt"/>
+                <a:ea typeface="+mn-ea"/>
+                <a:cs typeface="+mn-cs"/>
+              </a:defRPr>
+            </a:lvl9pPr>
+          </a:lstStyle>
           <a:p>
-            <a:pPr algn="ctr"/>
-            <a:endParaRPr lang="en-CA"/>
+            <a:pPr algn="just"/>
+            <a:r>
+              <a:rPr lang="fr-FR" sz="2000" dirty="0" err="1" smtClean="0"/>
+              <a:t>Showcase</a:t>
+            </a:r>
+            <a:r>
+              <a:rPr lang="fr-FR" sz="2000" dirty="0" smtClean="0"/>
+              <a:t> of </a:t>
+            </a:r>
+            <a:r>
+              <a:rPr lang="fr-FR" sz="2000" dirty="0" err="1" smtClean="0"/>
+              <a:t>two</a:t>
+            </a:r>
+            <a:r>
+              <a:rPr lang="fr-FR" sz="2000" dirty="0" smtClean="0"/>
+              <a:t> of the </a:t>
+            </a:r>
+            <a:r>
+              <a:rPr lang="fr-FR" sz="2000" dirty="0" err="1" smtClean="0"/>
+              <a:t>tabs</a:t>
+            </a:r>
+            <a:endParaRPr lang="fr-FR" sz="2000" dirty="0" smtClean="0"/>
+          </a:p>
+          <a:p>
+            <a:pPr algn="just"/>
+            <a:endParaRPr lang="fr-FR" sz="2000" dirty="0" smtClean="0"/>
+          </a:p>
+          <a:p>
+            <a:pPr algn="just"/>
+            <a:r>
+              <a:rPr lang="fr-FR" sz="2000" dirty="0" err="1" smtClean="0"/>
+              <a:t>Embeded</a:t>
+            </a:r>
+            <a:r>
+              <a:rPr lang="fr-FR" sz="2000" dirty="0" smtClean="0"/>
+              <a:t> user guide</a:t>
+            </a:r>
+            <a:endParaRPr lang="fr-FR" sz="2000" dirty="0" smtClean="0"/>
+          </a:p>
+          <a:p>
+            <a:pPr algn="just"/>
+            <a:endParaRPr lang="fr-FR" sz="2000" dirty="0" smtClean="0"/>
+          </a:p>
+          <a:p>
+            <a:pPr algn="just"/>
+            <a:r>
+              <a:rPr lang="fr-FR" sz="2000" dirty="0" smtClean="0"/>
+              <a:t>Custom </a:t>
+            </a:r>
+            <a:r>
+              <a:rPr lang="fr-FR" sz="2000" dirty="0" err="1" smtClean="0"/>
+              <a:t>creation</a:t>
+            </a:r>
+            <a:r>
+              <a:rPr lang="fr-FR" sz="2000" dirty="0" smtClean="0"/>
+              <a:t> of </a:t>
+            </a:r>
+            <a:r>
+              <a:rPr lang="fr-FR" sz="2000" dirty="0" err="1" smtClean="0"/>
+              <a:t>volcano</a:t>
+            </a:r>
+            <a:r>
+              <a:rPr lang="fr-FR" sz="2000" dirty="0" smtClean="0"/>
+              <a:t> plots</a:t>
+            </a:r>
+            <a:endParaRPr lang="fr-FR" sz="2000" dirty="0" smtClean="0"/>
+          </a:p>
+          <a:p>
+            <a:pPr algn="just"/>
+            <a:endParaRPr lang="fr-FR" sz="2000" dirty="0" smtClean="0"/>
+          </a:p>
+          <a:p>
+            <a:pPr algn="just"/>
+            <a:r>
+              <a:rPr lang="fr-FR" sz="2000" dirty="0" smtClean="0"/>
+              <a:t>And </a:t>
+            </a:r>
+            <a:r>
+              <a:rPr lang="fr-FR" sz="2000" dirty="0" err="1" smtClean="0"/>
+              <a:t>much</a:t>
+            </a:r>
+            <a:r>
+              <a:rPr lang="fr-FR" sz="2000" dirty="0" smtClean="0"/>
+              <a:t> more</a:t>
+            </a:r>
+            <a:endParaRPr lang="fr-FR" sz="2000" dirty="0"/>
+          </a:p>
+          <a:p>
+            <a:pPr marL="0" indent="0" algn="just">
+              <a:buNone/>
+            </a:pPr>
+            <a:endParaRPr lang="fr-FR" sz="2000" dirty="0" smtClean="0"/>
           </a:p>
         </p:txBody>
       </p:sp>
@@ -30056,7 +30101,118 @@
   <p:timing>
     <p:tnLst>
       <p:par>
-        <p:cTn id="1" dur="indefinite" restart="never" nodeType="tmRoot"/>
+        <p:cTn id="1" dur="indefinite" restart="never" nodeType="tmRoot">
+          <p:childTnLst>
+            <p:seq concurrent="1" nextAc="seek">
+              <p:cTn id="2" dur="indefinite" nodeType="mainSeq">
+                <p:childTnLst>
+                  <p:par>
+                    <p:cTn id="3" fill="hold">
+                      <p:stCondLst>
+                        <p:cond delay="indefinite"/>
+                      </p:stCondLst>
+                      <p:childTnLst>
+                        <p:par>
+                          <p:cTn id="4" fill="hold">
+                            <p:stCondLst>
+                              <p:cond delay="0"/>
+                            </p:stCondLst>
+                            <p:childTnLst>
+                              <p:par>
+                                <p:cTn id="5" presetID="10" presetClass="exit" presetSubtype="0" fill="hold" nodeType="clickEffect">
+                                  <p:stCondLst>
+                                    <p:cond delay="0"/>
+                                  </p:stCondLst>
+                                  <p:childTnLst>
+                                    <p:animEffect transition="out" filter="fade">
+                                      <p:cBhvr>
+                                        <p:cTn id="6" dur="500"/>
+                                        <p:tgtEl>
+                                          <p:spTgt spid="8"/>
+                                        </p:tgtEl>
+                                      </p:cBhvr>
+                                    </p:animEffect>
+                                    <p:set>
+                                      <p:cBhvr>
+                                        <p:cTn id="7" dur="1" fill="hold">
+                                          <p:stCondLst>
+                                            <p:cond delay="499"/>
+                                          </p:stCondLst>
+                                        </p:cTn>
+                                        <p:tgtEl>
+                                          <p:spTgt spid="8"/>
+                                        </p:tgtEl>
+                                        <p:attrNameLst>
+                                          <p:attrName>style.visibility</p:attrName>
+                                        </p:attrNameLst>
+                                      </p:cBhvr>
+                                      <p:to>
+                                        <p:strVal val="hidden"/>
+                                      </p:to>
+                                    </p:set>
+                                  </p:childTnLst>
+                                </p:cTn>
+                              </p:par>
+                              <p:par>
+                                <p:cTn id="8" presetID="10" presetClass="entr" presetSubtype="0" fill="hold" nodeType="withEffect">
+                                  <p:stCondLst>
+                                    <p:cond delay="0"/>
+                                  </p:stCondLst>
+                                  <p:childTnLst>
+                                    <p:set>
+                                      <p:cBhvr>
+                                        <p:cTn id="9" dur="1" fill="hold">
+                                          <p:stCondLst>
+                                            <p:cond delay="0"/>
+                                          </p:stCondLst>
+                                        </p:cTn>
+                                        <p:tgtEl>
+                                          <p:spTgt spid="10"/>
+                                        </p:tgtEl>
+                                        <p:attrNameLst>
+                                          <p:attrName>style.visibility</p:attrName>
+                                        </p:attrNameLst>
+                                      </p:cBhvr>
+                                      <p:to>
+                                        <p:strVal val="visible"/>
+                                      </p:to>
+                                    </p:set>
+                                    <p:animEffect transition="in" filter="fade">
+                                      <p:cBhvr>
+                                        <p:cTn id="10" dur="500"/>
+                                        <p:tgtEl>
+                                          <p:spTgt spid="10"/>
+                                        </p:tgtEl>
+                                      </p:cBhvr>
+                                    </p:animEffect>
+                                  </p:childTnLst>
+                                </p:cTn>
+                              </p:par>
+                            </p:childTnLst>
+                          </p:cTn>
+                        </p:par>
+                      </p:childTnLst>
+                    </p:cTn>
+                  </p:par>
+                </p:childTnLst>
+              </p:cTn>
+              <p:prevCondLst>
+                <p:cond evt="onPrev" delay="0">
+                  <p:tgtEl>
+                    <p:sldTgt/>
+                  </p:tgtEl>
+                </p:cond>
+              </p:prevCondLst>
+              <p:nextCondLst>
+                <p:cond evt="onNext" delay="0">
+                  <p:tgtEl>
+                    <p:sldTgt/>
+                  </p:tgtEl>
+                </p:cond>
+              </p:nextCondLst>
+            </p:seq>
+          </p:childTnLst>
+        </p:cTn>
       </p:par>
     </p:tnLst>
   </p:timing>

</xml_diff>

<commit_message>
Small fix to 'suivit projet'
</commit_message>
<xml_diff>
--- a/Slides/Diapos_Suivit_projet.pptx
+++ b/Slides/Diapos_Suivit_projet.pptx
@@ -5,10 +5,10 @@
     <p:sldMasterId id="2147483648" r:id="rId1"/>
   </p:sldMasterIdLst>
   <p:notesMasterIdLst>
-    <p:notesMasterId r:id="rId13"/>
+    <p:notesMasterId r:id="rId14"/>
   </p:notesMasterIdLst>
   <p:handoutMasterIdLst>
-    <p:handoutMasterId r:id="rId14"/>
+    <p:handoutMasterId r:id="rId15"/>
   </p:handoutMasterIdLst>
   <p:sldIdLst>
     <p:sldId id="288" r:id="rId2"/>
@@ -21,7 +21,8 @@
     <p:sldId id="273" r:id="rId9"/>
     <p:sldId id="278" r:id="rId10"/>
     <p:sldId id="294" r:id="rId11"/>
-    <p:sldId id="295" r:id="rId12"/>
+    <p:sldId id="296" r:id="rId12"/>
+    <p:sldId id="295" r:id="rId13"/>
   </p:sldIdLst>
   <p:sldSz cx="12192000" cy="6858000"/>
   <p:notesSz cx="6858000" cy="9144000"/>
@@ -4643,51 +4644,51 @@
     </dgm:pt>
   </dgm:ptLst>
   <dgm:cxnLst>
+    <dgm:cxn modelId="{47858DE6-F2DC-49FE-86A9-3E6E0DE62A13}" type="presOf" srcId="{5A50A77D-7959-4302-B136-B1316B3CEC1D}" destId="{53088BBF-CDFB-43AD-88FA-A16B4FDD4AEA}" srcOrd="1" destOrd="2" presId="urn:microsoft.com/office/officeart/2005/8/layout/cycle4"/>
+    <dgm:cxn modelId="{59B883C3-D14A-42C2-A39F-9C383E4EA209}" type="presOf" srcId="{35F1F2D2-FC47-4990-98DB-731AFE036343}" destId="{BC6F0824-1351-49BA-BADB-F02B71A91728}" srcOrd="0" destOrd="0" presId="urn:microsoft.com/office/officeart/2005/8/layout/cycle4"/>
+    <dgm:cxn modelId="{1F81745B-4264-4419-A288-904F4505D53C}" type="presOf" srcId="{6446DC96-6D1C-4742-A646-C454D61C5C9D}" destId="{05478942-E273-4856-8553-F0FD8F015AA2}" srcOrd="0" destOrd="2" presId="urn:microsoft.com/office/officeart/2005/8/layout/cycle4"/>
+    <dgm:cxn modelId="{08978BA1-AE5A-4DFF-A0C3-92D4A0078A98}" srcId="{0916D3E2-7950-4B1E-A80A-B1A0DFE4D7BE}" destId="{9B35DA45-8824-4EE3-89F0-3F4E07F980E3}" srcOrd="0" destOrd="0" parTransId="{F26E0BCB-616E-4F5C-9212-B89461307743}" sibTransId="{6FFF208B-A136-4388-9736-DE2BA4AFD5AF}"/>
+    <dgm:cxn modelId="{12D2BC70-9702-4DE8-AD36-65613209EF1E}" type="presOf" srcId="{1981BF8C-ABB4-462F-BD54-45D3229B3478}" destId="{05478942-E273-4856-8553-F0FD8F015AA2}" srcOrd="0" destOrd="0" presId="urn:microsoft.com/office/officeart/2005/8/layout/cycle4"/>
+    <dgm:cxn modelId="{AC7AAD78-331F-43CB-AB37-361548CBCDDA}" type="presOf" srcId="{21C7A246-DDB5-40DD-9118-CC4963BF878A}" destId="{8128ED5B-798D-45C7-BB11-A0996A8BF223}" srcOrd="1" destOrd="1" presId="urn:microsoft.com/office/officeart/2005/8/layout/cycle4"/>
+    <dgm:cxn modelId="{CF69C848-4781-4D4D-B25F-B4D5A4E36B83}" type="presOf" srcId="{35F1F2D2-FC47-4990-98DB-731AFE036343}" destId="{8128ED5B-798D-45C7-BB11-A0996A8BF223}" srcOrd="1" destOrd="0" presId="urn:microsoft.com/office/officeart/2005/8/layout/cycle4"/>
+    <dgm:cxn modelId="{4BE5508B-FDD9-47D5-8BF7-1A7559B6E1B4}" type="presOf" srcId="{850DD825-7D08-4BBC-94B9-7E217910F9A2}" destId="{431C4C2F-7F42-4D62-8EEF-918E7AD22EA0}" srcOrd="0" destOrd="1" presId="urn:microsoft.com/office/officeart/2005/8/layout/cycle4"/>
+    <dgm:cxn modelId="{280C9354-B1BA-4A20-83C3-8F03CAE8CFB7}" type="presOf" srcId="{8BEA78FF-204F-4428-9092-659961DC247C}" destId="{C0852406-3DC0-4222-A1F8-184593FC4596}" srcOrd="0" destOrd="0" presId="urn:microsoft.com/office/officeart/2005/8/layout/cycle4"/>
+    <dgm:cxn modelId="{A5D3F3DB-629E-46CD-AA76-C52C0C251A66}" srcId="{CC293B1C-4CF8-4FF0-BBC7-4942ED2D7F88}" destId="{8BEA78FF-204F-4428-9092-659961DC247C}" srcOrd="3" destOrd="0" parTransId="{41090789-956B-42C9-B909-44B2D62666F5}" sibTransId="{F0DB2DD3-51DB-4551-8E87-8440876EF808}"/>
+    <dgm:cxn modelId="{324E4FD3-F4B7-4352-855F-A3B362DCFDA5}" type="presOf" srcId="{9B35DA45-8824-4EE3-89F0-3F4E07F980E3}" destId="{68AC0C8C-6683-4490-8F38-983C8CB47C3F}" srcOrd="0" destOrd="0" presId="urn:microsoft.com/office/officeart/2005/8/layout/cycle4"/>
+    <dgm:cxn modelId="{5E45B507-1330-428C-A195-37581AAE5A63}" srcId="{8FEE133A-1A79-4187-9AFD-4F06B42A70BC}" destId="{21C7A246-DDB5-40DD-9118-CC4963BF878A}" srcOrd="1" destOrd="0" parTransId="{CD9E23AD-A863-49AB-83BE-431D89C28AF8}" sibTransId="{9EFEBC15-1E66-4CAC-95AE-73B08C514600}"/>
+    <dgm:cxn modelId="{CB51040F-06BD-4592-8302-40704CAB501E}" type="presOf" srcId="{B8F4B4B5-48BB-4436-A4C8-0772D59377AC}" destId="{68AC0C8C-6683-4490-8F38-983C8CB47C3F}" srcOrd="0" destOrd="2" presId="urn:microsoft.com/office/officeart/2005/8/layout/cycle4"/>
+    <dgm:cxn modelId="{7BD1B129-960F-48DB-8D07-27A5E4D7535B}" type="presOf" srcId="{850DD825-7D08-4BBC-94B9-7E217910F9A2}" destId="{53088BBF-CDFB-43AD-88FA-A16B4FDD4AEA}" srcOrd="1" destOrd="1" presId="urn:microsoft.com/office/officeart/2005/8/layout/cycle4"/>
+    <dgm:cxn modelId="{D79BD4AC-CD35-4E87-8443-8235F4AC53D7}" type="presOf" srcId="{1981BF8C-ABB4-462F-BD54-45D3229B3478}" destId="{FFCC9154-8E22-496A-ADF8-EA81D4AB5D77}" srcOrd="1" destOrd="0" presId="urn:microsoft.com/office/officeart/2005/8/layout/cycle4"/>
+    <dgm:cxn modelId="{53AC87D2-059F-41E4-9687-356523E16653}" type="presOf" srcId="{62885FA7-E7FB-4933-9935-6A8AA90289B4}" destId="{8128ED5B-798D-45C7-BB11-A0996A8BF223}" srcOrd="1" destOrd="2" presId="urn:microsoft.com/office/officeart/2005/8/layout/cycle4"/>
+    <dgm:cxn modelId="{B79DABB8-69F2-46AA-A3E4-19A7B3320787}" type="presOf" srcId="{7F397B27-ED42-4C0B-84EB-F42483A443DB}" destId="{60120B91-D76F-4101-857D-B9B656863593}" srcOrd="1" destOrd="1" presId="urn:microsoft.com/office/officeart/2005/8/layout/cycle4"/>
+    <dgm:cxn modelId="{A9B36F8A-C74B-47A9-B539-806F6BB77A1A}" srcId="{CC293B1C-4CF8-4FF0-BBC7-4942ED2D7F88}" destId="{0916D3E2-7950-4B1E-A80A-B1A0DFE4D7BE}" srcOrd="2" destOrd="0" parTransId="{78ED7DF1-7D14-4D64-A8E3-CBD6C30B03FB}" sibTransId="{402F8436-663D-4DB8-A22F-0A8F501EB425}"/>
+    <dgm:cxn modelId="{A075CE85-5595-4859-A6BA-53D921007C6A}" srcId="{8BEA78FF-204F-4428-9092-659961DC247C}" destId="{5A50A77D-7959-4302-B136-B1316B3CEC1D}" srcOrd="2" destOrd="0" parTransId="{D56876BE-429C-478F-B26B-EE6C114C7CCE}" sibTransId="{5909CF64-4028-4CB9-9607-23629C5D37FB}"/>
+    <dgm:cxn modelId="{499CF585-CFA3-45A4-B45D-825078E8845A}" type="presOf" srcId="{2B6A55A5-45D3-4E17-9C60-8FB16C933545}" destId="{05478942-E273-4856-8553-F0FD8F015AA2}" srcOrd="0" destOrd="1" presId="urn:microsoft.com/office/officeart/2005/8/layout/cycle4"/>
+    <dgm:cxn modelId="{F4FBC6FB-58FD-4D8C-B047-CA2DADB87F36}" type="presOf" srcId="{21C7A246-DDB5-40DD-9118-CC4963BF878A}" destId="{BC6F0824-1351-49BA-BADB-F02B71A91728}" srcOrd="0" destOrd="1" presId="urn:microsoft.com/office/officeart/2005/8/layout/cycle4"/>
+    <dgm:cxn modelId="{5F7AD9D5-E7E6-4F46-A4C5-3A0CE6F62C8E}" srcId="{8FEE133A-1A79-4187-9AFD-4F06B42A70BC}" destId="{35F1F2D2-FC47-4990-98DB-731AFE036343}" srcOrd="0" destOrd="0" parTransId="{D8C3661F-62F4-45E8-BB01-35BAAF924AEB}" sibTransId="{4EFE689A-014D-4F95-82DA-3254DF013F6C}"/>
+    <dgm:cxn modelId="{13DB7B7F-2B71-4B39-9D7E-500A9DEEC9CF}" type="presOf" srcId="{6446DC96-6D1C-4742-A646-C454D61C5C9D}" destId="{FFCC9154-8E22-496A-ADF8-EA81D4AB5D77}" srcOrd="1" destOrd="2" presId="urn:microsoft.com/office/officeart/2005/8/layout/cycle4"/>
+    <dgm:cxn modelId="{2D7DE33D-C3DB-49E5-ADF6-52C214CF1C59}" srcId="{0916D3E2-7950-4B1E-A80A-B1A0DFE4D7BE}" destId="{7F397B27-ED42-4C0B-84EB-F42483A443DB}" srcOrd="1" destOrd="0" parTransId="{DD81B84C-4525-4615-9233-87E402AFBABC}" sibTransId="{97EBF3C2-DAC2-40A4-AE80-264E3F21FCCC}"/>
+    <dgm:cxn modelId="{55DC147B-C695-4F35-89C5-C0662D0F2251}" type="presOf" srcId="{49454F30-2B75-445A-845F-7473D893477D}" destId="{53088BBF-CDFB-43AD-88FA-A16B4FDD4AEA}" srcOrd="1" destOrd="0" presId="urn:microsoft.com/office/officeart/2005/8/layout/cycle4"/>
+    <dgm:cxn modelId="{873A3803-B8DA-4FC5-BC33-F8C410A4D637}" srcId="{DCE41F30-8A4B-4090-95D5-6CBD1CFA1EEC}" destId="{2B6A55A5-45D3-4E17-9C60-8FB16C933545}" srcOrd="1" destOrd="0" parTransId="{39E63537-B578-4C3D-8704-A072006EF998}" sibTransId="{0D1774AF-0E34-4AE0-B5A3-8DBDBFA17414}"/>
+    <dgm:cxn modelId="{D38CFA5B-0B49-4D77-B418-C4531A821F34}" type="presOf" srcId="{49454F30-2B75-445A-845F-7473D893477D}" destId="{431C4C2F-7F42-4D62-8EEF-918E7AD22EA0}" srcOrd="0" destOrd="0" presId="urn:microsoft.com/office/officeart/2005/8/layout/cycle4"/>
+    <dgm:cxn modelId="{E1EEB7EA-60EC-4AD5-8E3D-D3EEBF5157CF}" type="presOf" srcId="{9B35DA45-8824-4EE3-89F0-3F4E07F980E3}" destId="{60120B91-D76F-4101-857D-B9B656863593}" srcOrd="1" destOrd="0" presId="urn:microsoft.com/office/officeart/2005/8/layout/cycle4"/>
+    <dgm:cxn modelId="{F775C20D-AB6E-4712-989A-D3BFF703DEAF}" type="presOf" srcId="{5A50A77D-7959-4302-B136-B1316B3CEC1D}" destId="{431C4C2F-7F42-4D62-8EEF-918E7AD22EA0}" srcOrd="0" destOrd="2" presId="urn:microsoft.com/office/officeart/2005/8/layout/cycle4"/>
+    <dgm:cxn modelId="{2F545677-CE33-4761-99ED-0F7D3431F1B7}" srcId="{DCE41F30-8A4B-4090-95D5-6CBD1CFA1EEC}" destId="{1981BF8C-ABB4-462F-BD54-45D3229B3478}" srcOrd="0" destOrd="0" parTransId="{420AF548-7339-428B-B062-F64CBEBA21A3}" sibTransId="{314ADFC2-8DB9-4517-A22A-D1F9C188BEE4}"/>
     <dgm:cxn modelId="{5DC2DB55-F097-4294-8B9E-72B598743DA3}" srcId="{8BEA78FF-204F-4428-9092-659961DC247C}" destId="{850DD825-7D08-4BBC-94B9-7E217910F9A2}" srcOrd="1" destOrd="0" parTransId="{D847AE72-61FF-43C4-BFB0-3E6EC0A79B26}" sibTransId="{DD66B6EB-9ADC-44F2-A7C2-DA4869ECDFFE}"/>
-    <dgm:cxn modelId="{D79BD4AC-CD35-4E87-8443-8235F4AC53D7}" type="presOf" srcId="{1981BF8C-ABB4-462F-BD54-45D3229B3478}" destId="{FFCC9154-8E22-496A-ADF8-EA81D4AB5D77}" srcOrd="1" destOrd="0" presId="urn:microsoft.com/office/officeart/2005/8/layout/cycle4"/>
-    <dgm:cxn modelId="{12D2BC70-9702-4DE8-AD36-65613209EF1E}" type="presOf" srcId="{1981BF8C-ABB4-462F-BD54-45D3229B3478}" destId="{05478942-E273-4856-8553-F0FD8F015AA2}" srcOrd="0" destOrd="0" presId="urn:microsoft.com/office/officeart/2005/8/layout/cycle4"/>
+    <dgm:cxn modelId="{F3DC86B6-474F-4BE6-A324-3FE9F9B8844A}" srcId="{CC293B1C-4CF8-4FF0-BBC7-4942ED2D7F88}" destId="{8FEE133A-1A79-4187-9AFD-4F06B42A70BC}" srcOrd="0" destOrd="0" parTransId="{7D947A46-F0B2-4D95-921D-7768A2A81535}" sibTransId="{A16446F1-3DF9-49B1-92C9-2E546FABE218}"/>
+    <dgm:cxn modelId="{6484E426-69AA-42DF-977B-A67A73203BD9}" srcId="{8BEA78FF-204F-4428-9092-659961DC247C}" destId="{49454F30-2B75-445A-845F-7473D893477D}" srcOrd="0" destOrd="0" parTransId="{347F498C-146E-4A53-8576-856FB00E3649}" sibTransId="{FAF60BDA-D885-4200-9740-D21B994BE362}"/>
+    <dgm:cxn modelId="{F7CBC7F7-FBF9-4329-A3B5-F8A568558D6C}" srcId="{DCE41F30-8A4B-4090-95D5-6CBD1CFA1EEC}" destId="{6446DC96-6D1C-4742-A646-C454D61C5C9D}" srcOrd="2" destOrd="0" parTransId="{F1EB376B-DD8F-4D0A-B475-0137A25A9B1D}" sibTransId="{2E4D0765-7F9C-4470-8414-926AC02E2CE2}"/>
+    <dgm:cxn modelId="{58755D72-6A8A-4181-8EB5-41F1412B480B}" srcId="{8FEE133A-1A79-4187-9AFD-4F06B42A70BC}" destId="{62885FA7-E7FB-4933-9935-6A8AA90289B4}" srcOrd="2" destOrd="0" parTransId="{9870B421-E3D6-4556-A843-2F0EDB4F207B}" sibTransId="{EB0831C9-645B-4C0B-8FAE-4F47D0F4E0C7}"/>
     <dgm:cxn modelId="{4DC70C66-ACF9-417F-9532-2272E88B7A80}" type="presOf" srcId="{0916D3E2-7950-4B1E-A80A-B1A0DFE4D7BE}" destId="{CF4FC7F6-A89C-4633-A10E-BFE92B369DCD}" srcOrd="0" destOrd="0" presId="urn:microsoft.com/office/officeart/2005/8/layout/cycle4"/>
-    <dgm:cxn modelId="{CE2AF7AB-2949-4DCD-9C29-6B60E91D8468}" srcId="{0916D3E2-7950-4B1E-A80A-B1A0DFE4D7BE}" destId="{B8F4B4B5-48BB-4436-A4C8-0772D59377AC}" srcOrd="2" destOrd="0" parTransId="{EEB7DF95-B1E1-4355-BDED-67254F3A40BF}" sibTransId="{07F8EC93-687D-4C25-BBFA-77894EDF7DA2}"/>
-    <dgm:cxn modelId="{13DB7B7F-2B71-4B39-9D7E-500A9DEEC9CF}" type="presOf" srcId="{6446DC96-6D1C-4742-A646-C454D61C5C9D}" destId="{FFCC9154-8E22-496A-ADF8-EA81D4AB5D77}" srcOrd="1" destOrd="2" presId="urn:microsoft.com/office/officeart/2005/8/layout/cycle4"/>
-    <dgm:cxn modelId="{7BD1B129-960F-48DB-8D07-27A5E4D7535B}" type="presOf" srcId="{850DD825-7D08-4BBC-94B9-7E217910F9A2}" destId="{53088BBF-CDFB-43AD-88FA-A16B4FDD4AEA}" srcOrd="1" destOrd="1" presId="urn:microsoft.com/office/officeart/2005/8/layout/cycle4"/>
-    <dgm:cxn modelId="{AC7AAD78-331F-43CB-AB37-361548CBCDDA}" type="presOf" srcId="{21C7A246-DDB5-40DD-9118-CC4963BF878A}" destId="{8128ED5B-798D-45C7-BB11-A0996A8BF223}" srcOrd="1" destOrd="1" presId="urn:microsoft.com/office/officeart/2005/8/layout/cycle4"/>
-    <dgm:cxn modelId="{5F7AD9D5-E7E6-4F46-A4C5-3A0CE6F62C8E}" srcId="{8FEE133A-1A79-4187-9AFD-4F06B42A70BC}" destId="{35F1F2D2-FC47-4990-98DB-731AFE036343}" srcOrd="0" destOrd="0" parTransId="{D8C3661F-62F4-45E8-BB01-35BAAF924AEB}" sibTransId="{4EFE689A-014D-4F95-82DA-3254DF013F6C}"/>
-    <dgm:cxn modelId="{47858DE6-F2DC-49FE-86A9-3E6E0DE62A13}" type="presOf" srcId="{5A50A77D-7959-4302-B136-B1316B3CEC1D}" destId="{53088BBF-CDFB-43AD-88FA-A16B4FDD4AEA}" srcOrd="1" destOrd="2" presId="urn:microsoft.com/office/officeart/2005/8/layout/cycle4"/>
     <dgm:cxn modelId="{023984A2-CB11-430A-AEC2-B2B80DC94006}" type="presOf" srcId="{DCE41F30-8A4B-4090-95D5-6CBD1CFA1EEC}" destId="{A67A60E5-5291-49E4-B3E5-53A58B528285}" srcOrd="0" destOrd="0" presId="urn:microsoft.com/office/officeart/2005/8/layout/cycle4"/>
-    <dgm:cxn modelId="{A075CE85-5595-4859-A6BA-53D921007C6A}" srcId="{8BEA78FF-204F-4428-9092-659961DC247C}" destId="{5A50A77D-7959-4302-B136-B1316B3CEC1D}" srcOrd="2" destOrd="0" parTransId="{D56876BE-429C-478F-B26B-EE6C114C7CCE}" sibTransId="{5909CF64-4028-4CB9-9607-23629C5D37FB}"/>
-    <dgm:cxn modelId="{B79DABB8-69F2-46AA-A3E4-19A7B3320787}" type="presOf" srcId="{7F397B27-ED42-4C0B-84EB-F42483A443DB}" destId="{60120B91-D76F-4101-857D-B9B656863593}" srcOrd="1" destOrd="1" presId="urn:microsoft.com/office/officeart/2005/8/layout/cycle4"/>
-    <dgm:cxn modelId="{1F81745B-4264-4419-A288-904F4505D53C}" type="presOf" srcId="{6446DC96-6D1C-4742-A646-C454D61C5C9D}" destId="{05478942-E273-4856-8553-F0FD8F015AA2}" srcOrd="0" destOrd="2" presId="urn:microsoft.com/office/officeart/2005/8/layout/cycle4"/>
+    <dgm:cxn modelId="{6FEE2B86-0BD3-4386-A538-EE6E56E66CC3}" type="presOf" srcId="{8FEE133A-1A79-4187-9AFD-4F06B42A70BC}" destId="{E72BDFA6-376E-4614-9D7C-A68241E884D9}" srcOrd="0" destOrd="0" presId="urn:microsoft.com/office/officeart/2005/8/layout/cycle4"/>
+    <dgm:cxn modelId="{856CCC98-4D42-4940-9913-BB20C5217489}" srcId="{CC293B1C-4CF8-4FF0-BBC7-4942ED2D7F88}" destId="{DCE41F30-8A4B-4090-95D5-6CBD1CFA1EEC}" srcOrd="1" destOrd="0" parTransId="{480265E7-8542-40B5-95A1-EC04B55B8C68}" sibTransId="{005E5E72-5BE1-4DC4-AD1C-48C242521B93}"/>
     <dgm:cxn modelId="{2A978431-31E1-4224-82B5-F00BFCF03DBA}" type="presOf" srcId="{B8F4B4B5-48BB-4436-A4C8-0772D59377AC}" destId="{60120B91-D76F-4101-857D-B9B656863593}" srcOrd="1" destOrd="2" presId="urn:microsoft.com/office/officeart/2005/8/layout/cycle4"/>
-    <dgm:cxn modelId="{F7CBC7F7-FBF9-4329-A3B5-F8A568558D6C}" srcId="{DCE41F30-8A4B-4090-95D5-6CBD1CFA1EEC}" destId="{6446DC96-6D1C-4742-A646-C454D61C5C9D}" srcOrd="2" destOrd="0" parTransId="{F1EB376B-DD8F-4D0A-B475-0137A25A9B1D}" sibTransId="{2E4D0765-7F9C-4470-8414-926AC02E2CE2}"/>
-    <dgm:cxn modelId="{4BE5508B-FDD9-47D5-8BF7-1A7559B6E1B4}" type="presOf" srcId="{850DD825-7D08-4BBC-94B9-7E217910F9A2}" destId="{431C4C2F-7F42-4D62-8EEF-918E7AD22EA0}" srcOrd="0" destOrd="1" presId="urn:microsoft.com/office/officeart/2005/8/layout/cycle4"/>
-    <dgm:cxn modelId="{08978BA1-AE5A-4DFF-A0C3-92D4A0078A98}" srcId="{0916D3E2-7950-4B1E-A80A-B1A0DFE4D7BE}" destId="{9B35DA45-8824-4EE3-89F0-3F4E07F980E3}" srcOrd="0" destOrd="0" parTransId="{F26E0BCB-616E-4F5C-9212-B89461307743}" sibTransId="{6FFF208B-A136-4388-9736-DE2BA4AFD5AF}"/>
-    <dgm:cxn modelId="{2D7DE33D-C3DB-49E5-ADF6-52C214CF1C59}" srcId="{0916D3E2-7950-4B1E-A80A-B1A0DFE4D7BE}" destId="{7F397B27-ED42-4C0B-84EB-F42483A443DB}" srcOrd="1" destOrd="0" parTransId="{DD81B84C-4525-4615-9233-87E402AFBABC}" sibTransId="{97EBF3C2-DAC2-40A4-AE80-264E3F21FCCC}"/>
-    <dgm:cxn modelId="{F4FBC6FB-58FD-4D8C-B047-CA2DADB87F36}" type="presOf" srcId="{21C7A246-DDB5-40DD-9118-CC4963BF878A}" destId="{BC6F0824-1351-49BA-BADB-F02B71A91728}" srcOrd="0" destOrd="1" presId="urn:microsoft.com/office/officeart/2005/8/layout/cycle4"/>
-    <dgm:cxn modelId="{F775C20D-AB6E-4712-989A-D3BFF703DEAF}" type="presOf" srcId="{5A50A77D-7959-4302-B136-B1316B3CEC1D}" destId="{431C4C2F-7F42-4D62-8EEF-918E7AD22EA0}" srcOrd="0" destOrd="2" presId="urn:microsoft.com/office/officeart/2005/8/layout/cycle4"/>
-    <dgm:cxn modelId="{280C9354-B1BA-4A20-83C3-8F03CAE8CFB7}" type="presOf" srcId="{8BEA78FF-204F-4428-9092-659961DC247C}" destId="{C0852406-3DC0-4222-A1F8-184593FC4596}" srcOrd="0" destOrd="0" presId="urn:microsoft.com/office/officeart/2005/8/layout/cycle4"/>
-    <dgm:cxn modelId="{5E45B507-1330-428C-A195-37581AAE5A63}" srcId="{8FEE133A-1A79-4187-9AFD-4F06B42A70BC}" destId="{21C7A246-DDB5-40DD-9118-CC4963BF878A}" srcOrd="1" destOrd="0" parTransId="{CD9E23AD-A863-49AB-83BE-431D89C28AF8}" sibTransId="{9EFEBC15-1E66-4CAC-95AE-73B08C514600}"/>
-    <dgm:cxn modelId="{499CF585-CFA3-45A4-B45D-825078E8845A}" type="presOf" srcId="{2B6A55A5-45D3-4E17-9C60-8FB16C933545}" destId="{05478942-E273-4856-8553-F0FD8F015AA2}" srcOrd="0" destOrd="1" presId="urn:microsoft.com/office/officeart/2005/8/layout/cycle4"/>
-    <dgm:cxn modelId="{F3DC86B6-474F-4BE6-A324-3FE9F9B8844A}" srcId="{CC293B1C-4CF8-4FF0-BBC7-4942ED2D7F88}" destId="{8FEE133A-1A79-4187-9AFD-4F06B42A70BC}" srcOrd="0" destOrd="0" parTransId="{7D947A46-F0B2-4D95-921D-7768A2A81535}" sibTransId="{A16446F1-3DF9-49B1-92C9-2E546FABE218}"/>
-    <dgm:cxn modelId="{59B883C3-D14A-42C2-A39F-9C383E4EA209}" type="presOf" srcId="{35F1F2D2-FC47-4990-98DB-731AFE036343}" destId="{BC6F0824-1351-49BA-BADB-F02B71A91728}" srcOrd="0" destOrd="0" presId="urn:microsoft.com/office/officeart/2005/8/layout/cycle4"/>
-    <dgm:cxn modelId="{55DC147B-C695-4F35-89C5-C0662D0F2251}" type="presOf" srcId="{49454F30-2B75-445A-845F-7473D893477D}" destId="{53088BBF-CDFB-43AD-88FA-A16B4FDD4AEA}" srcOrd="1" destOrd="0" presId="urn:microsoft.com/office/officeart/2005/8/layout/cycle4"/>
-    <dgm:cxn modelId="{6FEE2B86-0BD3-4386-A538-EE6E56E66CC3}" type="presOf" srcId="{8FEE133A-1A79-4187-9AFD-4F06B42A70BC}" destId="{E72BDFA6-376E-4614-9D7C-A68241E884D9}" srcOrd="0" destOrd="0" presId="urn:microsoft.com/office/officeart/2005/8/layout/cycle4"/>
-    <dgm:cxn modelId="{CF69C848-4781-4D4D-B25F-B4D5A4E36B83}" type="presOf" srcId="{35F1F2D2-FC47-4990-98DB-731AFE036343}" destId="{8128ED5B-798D-45C7-BB11-A0996A8BF223}" srcOrd="1" destOrd="0" presId="urn:microsoft.com/office/officeart/2005/8/layout/cycle4"/>
-    <dgm:cxn modelId="{873A3803-B8DA-4FC5-BC33-F8C410A4D637}" srcId="{DCE41F30-8A4B-4090-95D5-6CBD1CFA1EEC}" destId="{2B6A55A5-45D3-4E17-9C60-8FB16C933545}" srcOrd="1" destOrd="0" parTransId="{39E63537-B578-4C3D-8704-A072006EF998}" sibTransId="{0D1774AF-0E34-4AE0-B5A3-8DBDBFA17414}"/>
-    <dgm:cxn modelId="{2F545677-CE33-4761-99ED-0F7D3431F1B7}" srcId="{DCE41F30-8A4B-4090-95D5-6CBD1CFA1EEC}" destId="{1981BF8C-ABB4-462F-BD54-45D3229B3478}" srcOrd="0" destOrd="0" parTransId="{420AF548-7339-428B-B062-F64CBEBA21A3}" sibTransId="{314ADFC2-8DB9-4517-A22A-D1F9C188BEE4}"/>
     <dgm:cxn modelId="{5C3CA9C0-D06E-45D4-BF6D-18C00F0931E5}" type="presOf" srcId="{2B6A55A5-45D3-4E17-9C60-8FB16C933545}" destId="{FFCC9154-8E22-496A-ADF8-EA81D4AB5D77}" srcOrd="1" destOrd="1" presId="urn:microsoft.com/office/officeart/2005/8/layout/cycle4"/>
-    <dgm:cxn modelId="{58755D72-6A8A-4181-8EB5-41F1412B480B}" srcId="{8FEE133A-1A79-4187-9AFD-4F06B42A70BC}" destId="{62885FA7-E7FB-4933-9935-6A8AA90289B4}" srcOrd="2" destOrd="0" parTransId="{9870B421-E3D6-4556-A843-2F0EDB4F207B}" sibTransId="{EB0831C9-645B-4C0B-8FAE-4F47D0F4E0C7}"/>
-    <dgm:cxn modelId="{53AC87D2-059F-41E4-9687-356523E16653}" type="presOf" srcId="{62885FA7-E7FB-4933-9935-6A8AA90289B4}" destId="{8128ED5B-798D-45C7-BB11-A0996A8BF223}" srcOrd="1" destOrd="2" presId="urn:microsoft.com/office/officeart/2005/8/layout/cycle4"/>
-    <dgm:cxn modelId="{A9B36F8A-C74B-47A9-B539-806F6BB77A1A}" srcId="{CC293B1C-4CF8-4FF0-BBC7-4942ED2D7F88}" destId="{0916D3E2-7950-4B1E-A80A-B1A0DFE4D7BE}" srcOrd="2" destOrd="0" parTransId="{78ED7DF1-7D14-4D64-A8E3-CBD6C30B03FB}" sibTransId="{402F8436-663D-4DB8-A22F-0A8F501EB425}"/>
+    <dgm:cxn modelId="{DC74F7C2-4ADD-4692-BFFE-12C4C7E99B03}" type="presOf" srcId="{CC293B1C-4CF8-4FF0-BBC7-4942ED2D7F88}" destId="{39401A14-B365-4553-9A3D-A401D3183747}" srcOrd="0" destOrd="0" presId="urn:microsoft.com/office/officeart/2005/8/layout/cycle4"/>
     <dgm:cxn modelId="{5CD8A52B-3655-4143-B2C6-890615C8791A}" type="presOf" srcId="{7F397B27-ED42-4C0B-84EB-F42483A443DB}" destId="{68AC0C8C-6683-4490-8F38-983C8CB47C3F}" srcOrd="0" destOrd="1" presId="urn:microsoft.com/office/officeart/2005/8/layout/cycle4"/>
     <dgm:cxn modelId="{54C3CB4C-28A1-41F3-9323-ADBB6FB1E0B0}" type="presOf" srcId="{62885FA7-E7FB-4933-9935-6A8AA90289B4}" destId="{BC6F0824-1351-49BA-BADB-F02B71A91728}" srcOrd="0" destOrd="2" presId="urn:microsoft.com/office/officeart/2005/8/layout/cycle4"/>
-    <dgm:cxn modelId="{CB51040F-06BD-4592-8302-40704CAB501E}" type="presOf" srcId="{B8F4B4B5-48BB-4436-A4C8-0772D59377AC}" destId="{68AC0C8C-6683-4490-8F38-983C8CB47C3F}" srcOrd="0" destOrd="2" presId="urn:microsoft.com/office/officeart/2005/8/layout/cycle4"/>
-    <dgm:cxn modelId="{6484E426-69AA-42DF-977B-A67A73203BD9}" srcId="{8BEA78FF-204F-4428-9092-659961DC247C}" destId="{49454F30-2B75-445A-845F-7473D893477D}" srcOrd="0" destOrd="0" parTransId="{347F498C-146E-4A53-8576-856FB00E3649}" sibTransId="{FAF60BDA-D885-4200-9740-D21B994BE362}"/>
-    <dgm:cxn modelId="{856CCC98-4D42-4940-9913-BB20C5217489}" srcId="{CC293B1C-4CF8-4FF0-BBC7-4942ED2D7F88}" destId="{DCE41F30-8A4B-4090-95D5-6CBD1CFA1EEC}" srcOrd="1" destOrd="0" parTransId="{480265E7-8542-40B5-95A1-EC04B55B8C68}" sibTransId="{005E5E72-5BE1-4DC4-AD1C-48C242521B93}"/>
-    <dgm:cxn modelId="{DC74F7C2-4ADD-4692-BFFE-12C4C7E99B03}" type="presOf" srcId="{CC293B1C-4CF8-4FF0-BBC7-4942ED2D7F88}" destId="{39401A14-B365-4553-9A3D-A401D3183747}" srcOrd="0" destOrd="0" presId="urn:microsoft.com/office/officeart/2005/8/layout/cycle4"/>
-    <dgm:cxn modelId="{324E4FD3-F4B7-4352-855F-A3B362DCFDA5}" type="presOf" srcId="{9B35DA45-8824-4EE3-89F0-3F4E07F980E3}" destId="{68AC0C8C-6683-4490-8F38-983C8CB47C3F}" srcOrd="0" destOrd="0" presId="urn:microsoft.com/office/officeart/2005/8/layout/cycle4"/>
-    <dgm:cxn modelId="{A5D3F3DB-629E-46CD-AA76-C52C0C251A66}" srcId="{CC293B1C-4CF8-4FF0-BBC7-4942ED2D7F88}" destId="{8BEA78FF-204F-4428-9092-659961DC247C}" srcOrd="3" destOrd="0" parTransId="{41090789-956B-42C9-B909-44B2D62666F5}" sibTransId="{F0DB2DD3-51DB-4551-8E87-8440876EF808}"/>
-    <dgm:cxn modelId="{D38CFA5B-0B49-4D77-B418-C4531A821F34}" type="presOf" srcId="{49454F30-2B75-445A-845F-7473D893477D}" destId="{431C4C2F-7F42-4D62-8EEF-918E7AD22EA0}" srcOrd="0" destOrd="0" presId="urn:microsoft.com/office/officeart/2005/8/layout/cycle4"/>
-    <dgm:cxn modelId="{E1EEB7EA-60EC-4AD5-8E3D-D3EEBF5157CF}" type="presOf" srcId="{9B35DA45-8824-4EE3-89F0-3F4E07F980E3}" destId="{60120B91-D76F-4101-857D-B9B656863593}" srcOrd="1" destOrd="0" presId="urn:microsoft.com/office/officeart/2005/8/layout/cycle4"/>
+    <dgm:cxn modelId="{CE2AF7AB-2949-4DCD-9C29-6B60E91D8468}" srcId="{0916D3E2-7950-4B1E-A80A-B1A0DFE4D7BE}" destId="{B8F4B4B5-48BB-4436-A4C8-0772D59377AC}" srcOrd="2" destOrd="0" parTransId="{EEB7DF95-B1E1-4355-BDED-67254F3A40BF}" sibTransId="{07F8EC93-687D-4C25-BBFA-77894EDF7DA2}"/>
     <dgm:cxn modelId="{94F90DC7-15A1-4F13-8EC9-D3547B750D84}" type="presParOf" srcId="{39401A14-B365-4553-9A3D-A401D3183747}" destId="{D7E58549-68A7-4F21-BF0D-84F7636DCD92}" srcOrd="0" destOrd="0" presId="urn:microsoft.com/office/officeart/2005/8/layout/cycle4"/>
     <dgm:cxn modelId="{246D9BF7-D5B0-42E3-B7C2-EE241B75F2E0}" type="presParOf" srcId="{D7E58549-68A7-4F21-BF0D-84F7636DCD92}" destId="{5D458377-8CFE-43EB-BDF2-7CB3F0D876C1}" srcOrd="0" destOrd="0" presId="urn:microsoft.com/office/officeart/2005/8/layout/cycle4"/>
     <dgm:cxn modelId="{677C1BAB-0C03-4DE8-BA3B-C42DA0775FC7}" type="presParOf" srcId="{5D458377-8CFE-43EB-BDF2-7CB3F0D876C1}" destId="{BC6F0824-1351-49BA-BADB-F02B71A91728}" srcOrd="0" destOrd="0" presId="urn:microsoft.com/office/officeart/2005/8/layout/cycle4"/>
@@ -5073,8 +5074,8 @@
     <dgm:cxn modelId="{DF372361-00BB-4771-871A-C2F83461DC6E}" type="presOf" srcId="{9B35DA45-8824-4EE3-89F0-3F4E07F980E3}" destId="{51D4E2D9-6364-4FE7-BE7F-89898165258A}" srcOrd="0" destOrd="0" presId="urn:microsoft.com/office/officeart/2005/8/layout/radial1"/>
     <dgm:cxn modelId="{5DA21D05-9213-4A0B-A789-2F492FA0DED0}" type="presOf" srcId="{F26E0BCB-616E-4F5C-9212-B89461307743}" destId="{B26CA117-7877-4BBB-8697-7BAA6B4D1769}" srcOrd="1" destOrd="0" presId="urn:microsoft.com/office/officeart/2005/8/layout/radial1"/>
     <dgm:cxn modelId="{EC6ED0FF-B7CF-4D29-BEBF-C58BBA27C597}" type="presOf" srcId="{0916D3E2-7950-4B1E-A80A-B1A0DFE4D7BE}" destId="{334F0DA9-4D69-40E7-AE37-8BB2E71C3ACD}" srcOrd="0" destOrd="0" presId="urn:microsoft.com/office/officeart/2005/8/layout/radial1"/>
+    <dgm:cxn modelId="{492FA6C5-4698-4282-9B17-0C7519AF8B67}" type="presOf" srcId="{EEB7DF95-B1E1-4355-BDED-67254F3A40BF}" destId="{0FA48441-B5ED-464B-AB5B-44DAB679EE64}" srcOrd="1" destOrd="0" presId="urn:microsoft.com/office/officeart/2005/8/layout/radial1"/>
     <dgm:cxn modelId="{004B8983-2C9F-4A54-8F54-1EFAEA48945C}" type="presOf" srcId="{DD81B84C-4525-4615-9233-87E402AFBABC}" destId="{3134C74D-D45F-4D44-8DA9-5DD9ACC7028A}" srcOrd="0" destOrd="0" presId="urn:microsoft.com/office/officeart/2005/8/layout/radial1"/>
-    <dgm:cxn modelId="{492FA6C5-4698-4282-9B17-0C7519AF8B67}" type="presOf" srcId="{EEB7DF95-B1E1-4355-BDED-67254F3A40BF}" destId="{0FA48441-B5ED-464B-AB5B-44DAB679EE64}" srcOrd="1" destOrd="0" presId="urn:microsoft.com/office/officeart/2005/8/layout/radial1"/>
     <dgm:cxn modelId="{453BE74D-8C9D-4350-ADE1-66B53C042D97}" type="presOf" srcId="{CC293B1C-4CF8-4FF0-BBC7-4942ED2D7F88}" destId="{05AAFE4B-4748-4F9C-AA5B-DEC71FC73E20}" srcOrd="0" destOrd="0" presId="urn:microsoft.com/office/officeart/2005/8/layout/radial1"/>
     <dgm:cxn modelId="{0B8AF5BA-F86A-4F42-BC79-326E76277372}" type="presOf" srcId="{DD81B84C-4525-4615-9233-87E402AFBABC}" destId="{9CD455AE-EC69-44E0-B929-B59BCD7E9894}" srcOrd="1" destOrd="0" presId="urn:microsoft.com/office/officeart/2005/8/layout/radial1"/>
     <dgm:cxn modelId="{08978BA1-AE5A-4DFF-A0C3-92D4A0078A98}" srcId="{0916D3E2-7950-4B1E-A80A-B1A0DFE4D7BE}" destId="{9B35DA45-8824-4EE3-89F0-3F4E07F980E3}" srcOrd="0" destOrd="0" parTransId="{F26E0BCB-616E-4F5C-9212-B89461307743}" sibTransId="{6FFF208B-A136-4388-9736-DE2BA4AFD5AF}"/>
@@ -5853,8 +5854,8 @@
     </dgm:pt>
   </dgm:ptLst>
   <dgm:cxnLst>
+    <dgm:cxn modelId="{97F9A8A2-B397-4492-A248-42CFC61400E4}" type="presOf" srcId="{2F25E3F7-E9EB-4C08-9116-69D5C4FD6E2A}" destId="{2845AC54-25A9-480C-BA9C-51BB56258253}" srcOrd="0" destOrd="0" presId="urn:microsoft.com/office/officeart/2005/8/layout/hList7"/>
     <dgm:cxn modelId="{8C1BC575-FAC1-4014-816E-DB56582E5905}" type="presOf" srcId="{47253CFC-4569-4709-81D3-DEEB42841B34}" destId="{65C1CC62-47DD-4AE0-BB4E-E1AA4210EAD1}" srcOrd="1" destOrd="0" presId="urn:microsoft.com/office/officeart/2005/8/layout/hList7"/>
-    <dgm:cxn modelId="{97F9A8A2-B397-4492-A248-42CFC61400E4}" type="presOf" srcId="{2F25E3F7-E9EB-4C08-9116-69D5C4FD6E2A}" destId="{2845AC54-25A9-480C-BA9C-51BB56258253}" srcOrd="0" destOrd="0" presId="urn:microsoft.com/office/officeart/2005/8/layout/hList7"/>
     <dgm:cxn modelId="{197988CE-F5BE-4319-A0D3-C05F5C22CF66}" type="presOf" srcId="{7A2D0BBB-4796-4683-A258-869CCE2EFDEE}" destId="{46B8E31D-92A9-4F7C-AC64-291B22E56C19}" srcOrd="0" destOrd="0" presId="urn:microsoft.com/office/officeart/2005/8/layout/hList7"/>
     <dgm:cxn modelId="{2E016A71-4A74-45F5-AD15-07D3B1D0466D}" srcId="{95C89F30-E4C0-41F0-9F78-CFBA2BC6B6E7}" destId="{47253CFC-4569-4709-81D3-DEEB42841B34}" srcOrd="2" destOrd="0" parTransId="{790D9CA9-D5EB-4ABB-B3FF-C076CA534420}" sibTransId="{2F25E3F7-E9EB-4C08-9116-69D5C4FD6E2A}"/>
     <dgm:cxn modelId="{CBFA5B2F-FA2B-40C7-9AF9-BAACF290EBC3}" type="presOf" srcId="{94CA40FB-60B0-465C-89DE-37B57251E362}" destId="{6A4D6A8E-A18C-499A-84BC-74FED5388C93}" srcOrd="0" destOrd="0" presId="urn:microsoft.com/office/officeart/2005/8/layout/hList7"/>
@@ -15854,6 +15855,104 @@
 </p:notes>
 </file>
 
+<file path=ppt/notesSlides/notesSlide9.xml><?xml version="1.0" encoding="utf-8"?>
+<p:notes xmlns:a="http://schemas.openxmlformats.org/drawingml/2006/main" xmlns:r="http://schemas.openxmlformats.org/officeDocument/2006/relationships" xmlns:p="http://schemas.openxmlformats.org/presentationml/2006/main">
+  <p:cSld>
+    <p:spTree>
+      <p:nvGrpSpPr>
+        <p:cNvPr id="1" name=""/>
+        <p:cNvGrpSpPr/>
+        <p:nvPr/>
+      </p:nvGrpSpPr>
+      <p:grpSpPr>
+        <a:xfrm>
+          <a:off x="0" y="0"/>
+          <a:ext cx="0" cy="0"/>
+          <a:chOff x="0" y="0"/>
+          <a:chExt cx="0" cy="0"/>
+        </a:xfrm>
+      </p:grpSpPr>
+      <p:sp>
+        <p:nvSpPr>
+          <p:cNvPr id="2" name="Slide Image Placeholder 1"/>
+          <p:cNvSpPr>
+            <a:spLocks noGrp="1" noRot="1" noChangeAspect="1"/>
+          </p:cNvSpPr>
+          <p:nvPr>
+            <p:ph type="sldImg"/>
+          </p:nvPr>
+        </p:nvSpPr>
+        <p:spPr/>
+      </p:sp>
+      <p:sp>
+        <p:nvSpPr>
+          <p:cNvPr id="3" name="Notes Placeholder 2"/>
+          <p:cNvSpPr>
+            <a:spLocks noGrp="1"/>
+          </p:cNvSpPr>
+          <p:nvPr>
+            <p:ph type="body" idx="1"/>
+          </p:nvPr>
+        </p:nvSpPr>
+        <p:spPr/>
+        <p:txBody>
+          <a:bodyPr/>
+          <a:lstStyle/>
+          <a:p>
+            <a:r>
+              <a:rPr lang="en-CA" dirty="0" smtClean="0"/>
+              <a:t>This slide goes</a:t>
+            </a:r>
+            <a:r>
+              <a:rPr lang="en-CA" baseline="0" dirty="0" smtClean="0"/>
+              <a:t> over some (not all) of the components for the client’s web page. It is important to state that this can only be accessed using a username and password known only by our client and the team leader.</a:t>
+            </a:r>
+          </a:p>
+          <a:p>
+            <a:r>
+              <a:rPr lang="en-CA" baseline="0" dirty="0" smtClean="0"/>
+              <a:t>The take away of this slide is that is it essentially an interface to manage the database in which all of the non-canonic information is located.</a:t>
+            </a:r>
+            <a:endParaRPr lang="en-CA" dirty="0"/>
+          </a:p>
+        </p:txBody>
+      </p:sp>
+      <p:sp>
+        <p:nvSpPr>
+          <p:cNvPr id="4" name="Slide Number Placeholder 3"/>
+          <p:cNvSpPr>
+            <a:spLocks noGrp="1"/>
+          </p:cNvSpPr>
+          <p:nvPr>
+            <p:ph type="sldNum" sz="quarter" idx="10"/>
+          </p:nvPr>
+        </p:nvSpPr>
+        <p:spPr/>
+        <p:txBody>
+          <a:bodyPr/>
+          <a:lstStyle/>
+          <a:p>
+            <a:fld id="{049843D5-FBCC-450E-8A81-920AD1F49A83}" type="slidenum">
+              <a:rPr lang="fr-FR" smtClean="0"/>
+              <a:t>10</a:t>
+            </a:fld>
+            <a:endParaRPr lang="fr-FR"/>
+          </a:p>
+        </p:txBody>
+      </p:sp>
+    </p:spTree>
+    <p:extLst>
+      <p:ext uri="{BB962C8B-B14F-4D97-AF65-F5344CB8AC3E}">
+        <p14:creationId xmlns:p14="http://schemas.microsoft.com/office/powerpoint/2010/main" val="2952416794"/>
+      </p:ext>
+    </p:extLst>
+  </p:cSld>
+  <p:clrMapOvr>
+    <a:masterClrMapping/>
+  </p:clrMapOvr>
+</p:notes>
+</file>
+
 <file path=ppt/slideLayouts/slideLayout1.xml><?xml version="1.0" encoding="utf-8"?>
 <p:sldLayout xmlns:a="http://schemas.openxmlformats.org/drawingml/2006/main" xmlns:r="http://schemas.openxmlformats.org/officeDocument/2006/relationships" xmlns:p="http://schemas.openxmlformats.org/presentationml/2006/main" preserve="1" userDrawn="1">
   <p:cSld name="Title Slide">
@@ -17238,11 +17337,7 @@
           <a:p>
             <a:r>
               <a:rPr lang="fr-FR" dirty="0" smtClean="0"/>
-              <a:t>Web – </a:t>
-            </a:r>
-            <a:r>
-              <a:rPr lang="fr-FR" dirty="0" smtClean="0"/>
-              <a:t>User </a:t>
+              <a:t>Web – User </a:t>
             </a:r>
             <a:r>
               <a:rPr lang="fr-FR" dirty="0" err="1" smtClean="0"/>
@@ -17570,6 +17665,1302 @@
 </file>
 
 <file path=ppt/slides/slide11.xml><?xml version="1.0" encoding="utf-8"?>
+<p:sld xmlns:a="http://schemas.openxmlformats.org/drawingml/2006/main" xmlns:r="http://schemas.openxmlformats.org/officeDocument/2006/relationships" xmlns:p="http://schemas.openxmlformats.org/presentationml/2006/main">
+  <p:cSld>
+    <p:spTree>
+      <p:nvGrpSpPr>
+        <p:cNvPr id="1" name=""/>
+        <p:cNvGrpSpPr/>
+        <p:nvPr/>
+      </p:nvGrpSpPr>
+      <p:grpSpPr>
+        <a:xfrm>
+          <a:off x="0" y="0"/>
+          <a:ext cx="0" cy="0"/>
+          <a:chOff x="0" y="0"/>
+          <a:chExt cx="0" cy="0"/>
+        </a:xfrm>
+      </p:grpSpPr>
+      <p:sp>
+        <p:nvSpPr>
+          <p:cNvPr id="24" name="Rectangle 23"/>
+          <p:cNvSpPr/>
+          <p:nvPr/>
+        </p:nvSpPr>
+        <p:spPr>
+          <a:xfrm>
+            <a:off x="5057775" y="2008120"/>
+            <a:ext cx="6511048" cy="4134489"/>
+          </a:xfrm>
+          <a:prstGeom prst="rect">
+            <a:avLst/>
+          </a:prstGeom>
+          <a:solidFill>
+            <a:schemeClr val="bg2">
+              <a:lumMod val="90000"/>
+            </a:schemeClr>
+          </a:solidFill>
+          <a:ln>
+            <a:solidFill>
+              <a:schemeClr val="tx1"/>
+            </a:solidFill>
+          </a:ln>
+        </p:spPr>
+        <p:style>
+          <a:lnRef idx="2">
+            <a:schemeClr val="accent1">
+              <a:shade val="50000"/>
+            </a:schemeClr>
+          </a:lnRef>
+          <a:fillRef idx="1">
+            <a:schemeClr val="accent1"/>
+          </a:fillRef>
+          <a:effectRef idx="0">
+            <a:schemeClr val="accent1"/>
+          </a:effectRef>
+          <a:fontRef idx="minor">
+            <a:schemeClr val="lt1"/>
+          </a:fontRef>
+        </p:style>
+        <p:txBody>
+          <a:bodyPr rtlCol="0" anchor="ctr"/>
+          <a:lstStyle/>
+          <a:p>
+            <a:pPr algn="ctr"/>
+            <a:endParaRPr lang="en-CA"/>
+          </a:p>
+        </p:txBody>
+      </p:sp>
+      <p:pic>
+        <p:nvPicPr>
+          <p:cNvPr id="5" name="Picture 4"/>
+          <p:cNvPicPr>
+            <a:picLocks noChangeAspect="1"/>
+          </p:cNvPicPr>
+          <p:nvPr/>
+        </p:nvPicPr>
+        <p:blipFill rotWithShape="1">
+          <a:blip r:embed="rId3">
+            <a:extLst>
+              <a:ext uri="{28A0092B-C50C-407E-A947-70E740481C1C}">
+                <a14:useLocalDpi xmlns:a14="http://schemas.microsoft.com/office/drawing/2010/main" val="0"/>
+              </a:ext>
+            </a:extLst>
+          </a:blip>
+          <a:srcRect l="1936" r="2496"/>
+          <a:stretch/>
+        </p:blipFill>
+        <p:spPr>
+          <a:xfrm>
+            <a:off x="5067300" y="2018624"/>
+            <a:ext cx="6501523" cy="4113480"/>
+          </a:xfrm>
+          <a:prstGeom prst="rect">
+            <a:avLst/>
+          </a:prstGeom>
+          <a:ln>
+            <a:solidFill>
+              <a:schemeClr val="tx1"/>
+            </a:solidFill>
+          </a:ln>
+        </p:spPr>
+      </p:pic>
+      <p:sp>
+        <p:nvSpPr>
+          <p:cNvPr id="2" name="Slide Number Placeholder 1"/>
+          <p:cNvSpPr>
+            <a:spLocks noGrp="1"/>
+          </p:cNvSpPr>
+          <p:nvPr>
+            <p:ph type="sldNum" sz="quarter" idx="4"/>
+          </p:nvPr>
+        </p:nvSpPr>
+        <p:spPr/>
+        <p:txBody>
+          <a:bodyPr/>
+          <a:lstStyle/>
+          <a:p>
+            <a:fld id="{813506F1-DB5F-4FC9-88BA-B486F30FE4BF}" type="slidenum">
+              <a:rPr lang="fr-FR" smtClean="0"/>
+              <a:pPr/>
+              <a:t>10</a:t>
+            </a:fld>
+            <a:endParaRPr lang="fr-FR" dirty="0"/>
+          </a:p>
+        </p:txBody>
+      </p:sp>
+      <p:sp>
+        <p:nvSpPr>
+          <p:cNvPr id="3" name="Title 1"/>
+          <p:cNvSpPr txBox="1">
+            <a:spLocks/>
+          </p:cNvSpPr>
+          <p:nvPr/>
+        </p:nvSpPr>
+        <p:spPr>
+          <a:xfrm>
+            <a:off x="648393" y="2101646"/>
+            <a:ext cx="4028381" cy="733833"/>
+          </a:xfrm>
+          <a:prstGeom prst="rect">
+            <a:avLst/>
+          </a:prstGeom>
+        </p:spPr>
+        <p:txBody>
+          <a:bodyPr/>
+          <a:lstStyle>
+            <a:lvl1pPr algn="l" defTabSz="914400" rtl="0" eaLnBrk="1" latinLnBrk="0" hangingPunct="1">
+              <a:lnSpc>
+                <a:spcPct val="90000"/>
+              </a:lnSpc>
+              <a:spcBef>
+                <a:spcPct val="0"/>
+              </a:spcBef>
+              <a:buNone/>
+              <a:defRPr sz="4400" kern="1200">
+                <a:solidFill>
+                  <a:schemeClr val="tx1"/>
+                </a:solidFill>
+                <a:latin typeface="+mj-lt"/>
+                <a:ea typeface="+mj-ea"/>
+                <a:cs typeface="+mj-cs"/>
+              </a:defRPr>
+            </a:lvl1pPr>
+          </a:lstStyle>
+          <a:p>
+            <a:r>
+              <a:rPr lang="fr-FR" dirty="0" err="1" smtClean="0"/>
+              <a:t>Client’s</a:t>
+            </a:r>
+            <a:r>
+              <a:rPr lang="fr-FR" dirty="0" smtClean="0"/>
+              <a:t> </a:t>
+            </a:r>
+            <a:r>
+              <a:rPr lang="fr-FR" dirty="0" err="1" smtClean="0"/>
+              <a:t>webpage</a:t>
+            </a:r>
+            <a:endParaRPr lang="fr-FR" dirty="0"/>
+          </a:p>
+        </p:txBody>
+      </p:sp>
+      <p:sp>
+        <p:nvSpPr>
+          <p:cNvPr id="4" name="Content Placeholder 2"/>
+          <p:cNvSpPr txBox="1">
+            <a:spLocks/>
+          </p:cNvSpPr>
+          <p:nvPr/>
+        </p:nvSpPr>
+        <p:spPr>
+          <a:xfrm>
+            <a:off x="1236684" y="2835479"/>
+            <a:ext cx="3830616" cy="3765346"/>
+          </a:xfrm>
+          <a:prstGeom prst="rect">
+            <a:avLst/>
+          </a:prstGeom>
+        </p:spPr>
+        <p:txBody>
+          <a:bodyPr>
+            <a:normAutofit/>
+          </a:bodyPr>
+          <a:lstStyle>
+            <a:lvl1pPr marL="228600" indent="-228600" algn="l" defTabSz="914400" rtl="0" eaLnBrk="1" latinLnBrk="0" hangingPunct="1">
+              <a:lnSpc>
+                <a:spcPct val="90000"/>
+              </a:lnSpc>
+              <a:spcBef>
+                <a:spcPts val="1000"/>
+              </a:spcBef>
+              <a:buFont typeface="Arial" panose="020B0604020202020204" pitchFamily="34" charset="0"/>
+              <a:buChar char="•"/>
+              <a:defRPr sz="2800" kern="1200">
+                <a:solidFill>
+                  <a:schemeClr val="tx1"/>
+                </a:solidFill>
+                <a:latin typeface="+mn-lt"/>
+                <a:ea typeface="+mn-ea"/>
+                <a:cs typeface="+mn-cs"/>
+              </a:defRPr>
+            </a:lvl1pPr>
+            <a:lvl2pPr marL="685800" indent="-228600" algn="l" defTabSz="914400" rtl="0" eaLnBrk="1" latinLnBrk="0" hangingPunct="1">
+              <a:lnSpc>
+                <a:spcPct val="90000"/>
+              </a:lnSpc>
+              <a:spcBef>
+                <a:spcPts val="500"/>
+              </a:spcBef>
+              <a:buFont typeface="Arial" panose="020B0604020202020204" pitchFamily="34" charset="0"/>
+              <a:buChar char="•"/>
+              <a:defRPr sz="2400" kern="1200">
+                <a:solidFill>
+                  <a:schemeClr val="tx1"/>
+                </a:solidFill>
+                <a:latin typeface="+mn-lt"/>
+                <a:ea typeface="+mn-ea"/>
+                <a:cs typeface="+mn-cs"/>
+              </a:defRPr>
+            </a:lvl2pPr>
+            <a:lvl3pPr marL="1143000" indent="-228600" algn="l" defTabSz="914400" rtl="0" eaLnBrk="1" latinLnBrk="0" hangingPunct="1">
+              <a:lnSpc>
+                <a:spcPct val="90000"/>
+              </a:lnSpc>
+              <a:spcBef>
+                <a:spcPts val="500"/>
+              </a:spcBef>
+              <a:buFont typeface="Arial" panose="020B0604020202020204" pitchFamily="34" charset="0"/>
+              <a:buChar char="•"/>
+              <a:defRPr sz="2000" kern="1200">
+                <a:solidFill>
+                  <a:schemeClr val="tx1"/>
+                </a:solidFill>
+                <a:latin typeface="+mn-lt"/>
+                <a:ea typeface="+mn-ea"/>
+                <a:cs typeface="+mn-cs"/>
+              </a:defRPr>
+            </a:lvl3pPr>
+            <a:lvl4pPr marL="1600200" indent="-228600" algn="l" defTabSz="914400" rtl="0" eaLnBrk="1" latinLnBrk="0" hangingPunct="1">
+              <a:lnSpc>
+                <a:spcPct val="90000"/>
+              </a:lnSpc>
+              <a:spcBef>
+                <a:spcPts val="500"/>
+              </a:spcBef>
+              <a:buFont typeface="Arial" panose="020B0604020202020204" pitchFamily="34" charset="0"/>
+              <a:buChar char="•"/>
+              <a:defRPr sz="1800" kern="1200">
+                <a:solidFill>
+                  <a:schemeClr val="tx1"/>
+                </a:solidFill>
+                <a:latin typeface="+mn-lt"/>
+                <a:ea typeface="+mn-ea"/>
+                <a:cs typeface="+mn-cs"/>
+              </a:defRPr>
+            </a:lvl4pPr>
+            <a:lvl5pPr marL="2057400" indent="-228600" algn="l" defTabSz="914400" rtl="0" eaLnBrk="1" latinLnBrk="0" hangingPunct="1">
+              <a:lnSpc>
+                <a:spcPct val="90000"/>
+              </a:lnSpc>
+              <a:spcBef>
+                <a:spcPts val="500"/>
+              </a:spcBef>
+              <a:buFont typeface="Arial" panose="020B0604020202020204" pitchFamily="34" charset="0"/>
+              <a:buChar char="•"/>
+              <a:defRPr sz="1800" kern="1200">
+                <a:solidFill>
+                  <a:schemeClr val="tx1"/>
+                </a:solidFill>
+                <a:latin typeface="+mn-lt"/>
+                <a:ea typeface="+mn-ea"/>
+                <a:cs typeface="+mn-cs"/>
+              </a:defRPr>
+            </a:lvl5pPr>
+            <a:lvl6pPr marL="2514600" indent="-228600" algn="l" defTabSz="914400" rtl="0" eaLnBrk="1" latinLnBrk="0" hangingPunct="1">
+              <a:lnSpc>
+                <a:spcPct val="90000"/>
+              </a:lnSpc>
+              <a:spcBef>
+                <a:spcPts val="500"/>
+              </a:spcBef>
+              <a:buFont typeface="Arial" panose="020B0604020202020204" pitchFamily="34" charset="0"/>
+              <a:buChar char="•"/>
+              <a:defRPr sz="1800" kern="1200">
+                <a:solidFill>
+                  <a:schemeClr val="tx1"/>
+                </a:solidFill>
+                <a:latin typeface="+mn-lt"/>
+                <a:ea typeface="+mn-ea"/>
+                <a:cs typeface="+mn-cs"/>
+              </a:defRPr>
+            </a:lvl6pPr>
+            <a:lvl7pPr marL="2971800" indent="-228600" algn="l" defTabSz="914400" rtl="0" eaLnBrk="1" latinLnBrk="0" hangingPunct="1">
+              <a:lnSpc>
+                <a:spcPct val="90000"/>
+              </a:lnSpc>
+              <a:spcBef>
+                <a:spcPts val="500"/>
+              </a:spcBef>
+              <a:buFont typeface="Arial" panose="020B0604020202020204" pitchFamily="34" charset="0"/>
+              <a:buChar char="•"/>
+              <a:defRPr sz="1800" kern="1200">
+                <a:solidFill>
+                  <a:schemeClr val="tx1"/>
+                </a:solidFill>
+                <a:latin typeface="+mn-lt"/>
+                <a:ea typeface="+mn-ea"/>
+                <a:cs typeface="+mn-cs"/>
+              </a:defRPr>
+            </a:lvl7pPr>
+            <a:lvl8pPr marL="3429000" indent="-228600" algn="l" defTabSz="914400" rtl="0" eaLnBrk="1" latinLnBrk="0" hangingPunct="1">
+              <a:lnSpc>
+                <a:spcPct val="90000"/>
+              </a:lnSpc>
+              <a:spcBef>
+                <a:spcPts val="500"/>
+              </a:spcBef>
+              <a:buFont typeface="Arial" panose="020B0604020202020204" pitchFamily="34" charset="0"/>
+              <a:buChar char="•"/>
+              <a:defRPr sz="1800" kern="1200">
+                <a:solidFill>
+                  <a:schemeClr val="tx1"/>
+                </a:solidFill>
+                <a:latin typeface="+mn-lt"/>
+                <a:ea typeface="+mn-ea"/>
+                <a:cs typeface="+mn-cs"/>
+              </a:defRPr>
+            </a:lvl8pPr>
+            <a:lvl9pPr marL="3886200" indent="-228600" algn="l" defTabSz="914400" rtl="0" eaLnBrk="1" latinLnBrk="0" hangingPunct="1">
+              <a:lnSpc>
+                <a:spcPct val="90000"/>
+              </a:lnSpc>
+              <a:spcBef>
+                <a:spcPts val="500"/>
+              </a:spcBef>
+              <a:buFont typeface="Arial" panose="020B0604020202020204" pitchFamily="34" charset="0"/>
+              <a:buChar char="•"/>
+              <a:defRPr sz="1800" kern="1200">
+                <a:solidFill>
+                  <a:schemeClr val="tx1"/>
+                </a:solidFill>
+                <a:latin typeface="+mn-lt"/>
+                <a:ea typeface="+mn-ea"/>
+                <a:cs typeface="+mn-cs"/>
+              </a:defRPr>
+            </a:lvl9pPr>
+          </a:lstStyle>
+          <a:p>
+            <a:pPr algn="just"/>
+            <a:r>
+              <a:rPr lang="fr-FR" sz="2000" dirty="0" smtClean="0"/>
+              <a:t>Manage </a:t>
+            </a:r>
+            <a:r>
+              <a:rPr lang="fr-FR" sz="2000" dirty="0" err="1" smtClean="0"/>
+              <a:t>database</a:t>
+            </a:r>
+            <a:endParaRPr lang="fr-FR" sz="2000" dirty="0" smtClean="0"/>
+          </a:p>
+          <a:p>
+            <a:pPr lvl="1" algn="just"/>
+            <a:r>
+              <a:rPr lang="fr-FR" sz="1600" dirty="0" err="1" smtClean="0"/>
+              <a:t>Add</a:t>
+            </a:r>
+            <a:r>
+              <a:rPr lang="fr-FR" sz="1600" dirty="0" smtClean="0"/>
+              <a:t> </a:t>
+            </a:r>
+            <a:r>
+              <a:rPr lang="fr-FR" sz="1600" dirty="0" err="1" smtClean="0"/>
+              <a:t>genes</a:t>
+            </a:r>
+            <a:endParaRPr lang="fr-FR" sz="1600" dirty="0" smtClean="0"/>
+          </a:p>
+          <a:p>
+            <a:pPr lvl="1" algn="just"/>
+            <a:endParaRPr lang="fr-FR" sz="1600" dirty="0"/>
+          </a:p>
+          <a:p>
+            <a:pPr lvl="1" algn="just"/>
+            <a:r>
+              <a:rPr lang="fr-FR" sz="1600" dirty="0" err="1" smtClean="0"/>
+              <a:t>Remove</a:t>
+            </a:r>
+            <a:r>
+              <a:rPr lang="fr-FR" sz="1600" dirty="0" smtClean="0"/>
+              <a:t> </a:t>
+            </a:r>
+            <a:r>
+              <a:rPr lang="fr-FR" sz="1600" dirty="0" err="1" smtClean="0"/>
+              <a:t>genes</a:t>
+            </a:r>
+            <a:endParaRPr lang="fr-FR" sz="1600" dirty="0" smtClean="0"/>
+          </a:p>
+          <a:p>
+            <a:pPr lvl="1" algn="just"/>
+            <a:endParaRPr lang="fr-FR" sz="1600" dirty="0"/>
+          </a:p>
+          <a:p>
+            <a:pPr lvl="1" algn="just"/>
+            <a:r>
+              <a:rPr lang="fr-FR" sz="1600" dirty="0" err="1" smtClean="0"/>
+              <a:t>Modify</a:t>
+            </a:r>
+            <a:r>
+              <a:rPr lang="fr-FR" sz="1600" dirty="0" smtClean="0"/>
+              <a:t> </a:t>
+            </a:r>
+            <a:r>
+              <a:rPr lang="fr-FR" sz="1600" dirty="0" err="1" smtClean="0"/>
+              <a:t>genes</a:t>
+            </a:r>
+            <a:endParaRPr lang="fr-FR" sz="1600" dirty="0" smtClean="0"/>
+          </a:p>
+          <a:p>
+            <a:pPr lvl="1" algn="just"/>
+            <a:endParaRPr lang="fr-FR" sz="1600" dirty="0"/>
+          </a:p>
+          <a:p>
+            <a:pPr lvl="1" algn="just"/>
+            <a:r>
+              <a:rPr lang="fr-FR" sz="1600" dirty="0" err="1" smtClean="0"/>
+              <a:t>Download</a:t>
+            </a:r>
+            <a:r>
+              <a:rPr lang="fr-FR" sz="1600" dirty="0" smtClean="0"/>
+              <a:t> </a:t>
+            </a:r>
+            <a:r>
+              <a:rPr lang="fr-FR" sz="1600" dirty="0" err="1" smtClean="0"/>
+              <a:t>survey</a:t>
+            </a:r>
+            <a:r>
+              <a:rPr lang="fr-FR" sz="1600" dirty="0" smtClean="0"/>
+              <a:t> </a:t>
+            </a:r>
+            <a:r>
+              <a:rPr lang="fr-FR" sz="1600" dirty="0" err="1" smtClean="0"/>
+              <a:t>answers</a:t>
+            </a:r>
+            <a:endParaRPr lang="fr-FR" sz="1600" dirty="0" smtClean="0"/>
+          </a:p>
+          <a:p>
+            <a:pPr marL="0" indent="0" algn="just">
+              <a:buNone/>
+            </a:pPr>
+            <a:endParaRPr lang="fr-FR" sz="2000" dirty="0"/>
+          </a:p>
+          <a:p>
+            <a:pPr marL="0" indent="0" algn="just">
+              <a:buFont typeface="Arial" panose="020B0604020202020204" pitchFamily="34" charset="0"/>
+              <a:buNone/>
+            </a:pPr>
+            <a:endParaRPr lang="fr-FR" sz="2000" dirty="0"/>
+          </a:p>
+        </p:txBody>
+      </p:sp>
+      <p:pic>
+        <p:nvPicPr>
+          <p:cNvPr id="12" name="Picture 11"/>
+          <p:cNvPicPr>
+            <a:picLocks noChangeAspect="1"/>
+          </p:cNvPicPr>
+          <p:nvPr/>
+        </p:nvPicPr>
+        <p:blipFill>
+          <a:blip r:embed="rId4">
+            <a:extLst>
+              <a:ext uri="{28A0092B-C50C-407E-A947-70E740481C1C}">
+                <a14:useLocalDpi xmlns:a14="http://schemas.microsoft.com/office/drawing/2010/main" val="0"/>
+              </a:ext>
+            </a:extLst>
+          </a:blip>
+          <a:stretch>
+            <a:fillRect/>
+          </a:stretch>
+        </p:blipFill>
+        <p:spPr>
+          <a:xfrm>
+            <a:off x="6038556" y="2835479"/>
+            <a:ext cx="4937668" cy="2803321"/>
+          </a:xfrm>
+          <a:prstGeom prst="rect">
+            <a:avLst/>
+          </a:prstGeom>
+          <a:ln>
+            <a:solidFill>
+              <a:schemeClr val="tx1"/>
+            </a:solidFill>
+          </a:ln>
+        </p:spPr>
+      </p:pic>
+      <p:pic>
+        <p:nvPicPr>
+          <p:cNvPr id="19" name="Picture 18"/>
+          <p:cNvPicPr>
+            <a:picLocks noChangeAspect="1"/>
+          </p:cNvPicPr>
+          <p:nvPr/>
+        </p:nvPicPr>
+        <p:blipFill>
+          <a:blip r:embed="rId5">
+            <a:extLst>
+              <a:ext uri="{28A0092B-C50C-407E-A947-70E740481C1C}">
+                <a14:useLocalDpi xmlns:a14="http://schemas.microsoft.com/office/drawing/2010/main" val="0"/>
+              </a:ext>
+            </a:extLst>
+          </a:blip>
+          <a:stretch>
+            <a:fillRect/>
+          </a:stretch>
+        </p:blipFill>
+        <p:spPr>
+          <a:xfrm>
+            <a:off x="5286705" y="2952355"/>
+            <a:ext cx="6219768" cy="1870572"/>
+          </a:xfrm>
+          <a:prstGeom prst="rect">
+            <a:avLst/>
+          </a:prstGeom>
+          <a:ln>
+            <a:solidFill>
+              <a:schemeClr val="tx1"/>
+            </a:solidFill>
+          </a:ln>
+        </p:spPr>
+      </p:pic>
+      <p:pic>
+        <p:nvPicPr>
+          <p:cNvPr id="20" name="Picture 19"/>
+          <p:cNvPicPr>
+            <a:picLocks noChangeAspect="1"/>
+          </p:cNvPicPr>
+          <p:nvPr/>
+        </p:nvPicPr>
+        <p:blipFill>
+          <a:blip r:embed="rId6" cstate="print">
+            <a:extLst>
+              <a:ext uri="{28A0092B-C50C-407E-A947-70E740481C1C}">
+                <a14:useLocalDpi xmlns:a14="http://schemas.microsoft.com/office/drawing/2010/main" val="0"/>
+              </a:ext>
+            </a:extLst>
+          </a:blip>
+          <a:stretch>
+            <a:fillRect/>
+          </a:stretch>
+        </p:blipFill>
+        <p:spPr>
+          <a:xfrm>
+            <a:off x="5457826" y="2737493"/>
+            <a:ext cx="5877527" cy="1150148"/>
+          </a:xfrm>
+          <a:prstGeom prst="rect">
+            <a:avLst/>
+          </a:prstGeom>
+          <a:ln>
+            <a:solidFill>
+              <a:schemeClr val="tx1"/>
+            </a:solidFill>
+          </a:ln>
+        </p:spPr>
+      </p:pic>
+      <p:pic>
+        <p:nvPicPr>
+          <p:cNvPr id="21" name="Picture 20"/>
+          <p:cNvPicPr>
+            <a:picLocks noChangeAspect="1"/>
+          </p:cNvPicPr>
+          <p:nvPr/>
+        </p:nvPicPr>
+        <p:blipFill>
+          <a:blip r:embed="rId7">
+            <a:extLst>
+              <a:ext uri="{28A0092B-C50C-407E-A947-70E740481C1C}">
+                <a14:useLocalDpi xmlns:a14="http://schemas.microsoft.com/office/drawing/2010/main" val="0"/>
+              </a:ext>
+            </a:extLst>
+          </a:blip>
+          <a:stretch>
+            <a:fillRect/>
+          </a:stretch>
+        </p:blipFill>
+        <p:spPr>
+          <a:xfrm>
+            <a:off x="8229435" y="2101646"/>
+            <a:ext cx="3277038" cy="3984646"/>
+          </a:xfrm>
+          <a:prstGeom prst="rect">
+            <a:avLst/>
+          </a:prstGeom>
+          <a:ln>
+            <a:solidFill>
+              <a:schemeClr val="tx1"/>
+            </a:solidFill>
+          </a:ln>
+        </p:spPr>
+      </p:pic>
+      <p:pic>
+        <p:nvPicPr>
+          <p:cNvPr id="23" name="Picture 22"/>
+          <p:cNvPicPr>
+            <a:picLocks noChangeAspect="1"/>
+          </p:cNvPicPr>
+          <p:nvPr/>
+        </p:nvPicPr>
+        <p:blipFill>
+          <a:blip r:embed="rId8" cstate="print">
+            <a:extLst>
+              <a:ext uri="{28A0092B-C50C-407E-A947-70E740481C1C}">
+                <a14:useLocalDpi xmlns:a14="http://schemas.microsoft.com/office/drawing/2010/main" val="0"/>
+              </a:ext>
+            </a:extLst>
+          </a:blip>
+          <a:stretch>
+            <a:fillRect/>
+          </a:stretch>
+        </p:blipFill>
+        <p:spPr>
+          <a:xfrm>
+            <a:off x="5101314" y="2705000"/>
+            <a:ext cx="6405159" cy="1182641"/>
+          </a:xfrm>
+          <a:prstGeom prst="rect">
+            <a:avLst/>
+          </a:prstGeom>
+          <a:ln>
+            <a:solidFill>
+              <a:schemeClr val="tx1"/>
+            </a:solidFill>
+          </a:ln>
+        </p:spPr>
+      </p:pic>
+    </p:spTree>
+    <p:extLst>
+      <p:ext uri="{BB962C8B-B14F-4D97-AF65-F5344CB8AC3E}">
+        <p14:creationId xmlns:p14="http://schemas.microsoft.com/office/powerpoint/2010/main" val="2170887135"/>
+      </p:ext>
+    </p:extLst>
+  </p:cSld>
+  <p:clrMapOvr>
+    <a:masterClrMapping/>
+  </p:clrMapOvr>
+  <p:timing>
+    <p:tnLst>
+      <p:par>
+        <p:cTn id="1" dur="indefinite" restart="never" nodeType="tmRoot">
+          <p:childTnLst>
+            <p:seq concurrent="1" nextAc="seek">
+              <p:cTn id="2" dur="indefinite" nodeType="mainSeq">
+                <p:childTnLst>
+                  <p:par>
+                    <p:cTn id="3" fill="hold">
+                      <p:stCondLst>
+                        <p:cond delay="indefinite"/>
+                      </p:stCondLst>
+                      <p:childTnLst>
+                        <p:par>
+                          <p:cTn id="4" fill="hold">
+                            <p:stCondLst>
+                              <p:cond delay="0"/>
+                            </p:stCondLst>
+                            <p:childTnLst>
+                              <p:par>
+                                <p:cTn id="5" presetID="10" presetClass="entr" presetSubtype="0" fill="hold" grpId="0" nodeType="clickEffect">
+                                  <p:stCondLst>
+                                    <p:cond delay="0"/>
+                                  </p:stCondLst>
+                                  <p:childTnLst>
+                                    <p:set>
+                                      <p:cBhvr>
+                                        <p:cTn id="6" dur="1" fill="hold">
+                                          <p:stCondLst>
+                                            <p:cond delay="0"/>
+                                          </p:stCondLst>
+                                        </p:cTn>
+                                        <p:tgtEl>
+                                          <p:spTgt spid="24"/>
+                                        </p:tgtEl>
+                                        <p:attrNameLst>
+                                          <p:attrName>style.visibility</p:attrName>
+                                        </p:attrNameLst>
+                                      </p:cBhvr>
+                                      <p:to>
+                                        <p:strVal val="visible"/>
+                                      </p:to>
+                                    </p:set>
+                                    <p:animEffect transition="in" filter="fade">
+                                      <p:cBhvr>
+                                        <p:cTn id="7" dur="500"/>
+                                        <p:tgtEl>
+                                          <p:spTgt spid="24"/>
+                                        </p:tgtEl>
+                                      </p:cBhvr>
+                                    </p:animEffect>
+                                  </p:childTnLst>
+                                </p:cTn>
+                              </p:par>
+                              <p:par>
+                                <p:cTn id="8" presetID="10" presetClass="exit" presetSubtype="0" fill="hold" nodeType="withEffect">
+                                  <p:stCondLst>
+                                    <p:cond delay="0"/>
+                                  </p:stCondLst>
+                                  <p:childTnLst>
+                                    <p:animEffect transition="out" filter="fade">
+                                      <p:cBhvr>
+                                        <p:cTn id="9" dur="500"/>
+                                        <p:tgtEl>
+                                          <p:spTgt spid="5"/>
+                                        </p:tgtEl>
+                                      </p:cBhvr>
+                                    </p:animEffect>
+                                    <p:set>
+                                      <p:cBhvr>
+                                        <p:cTn id="10" dur="1" fill="hold">
+                                          <p:stCondLst>
+                                            <p:cond delay="499"/>
+                                          </p:stCondLst>
+                                        </p:cTn>
+                                        <p:tgtEl>
+                                          <p:spTgt spid="5"/>
+                                        </p:tgtEl>
+                                        <p:attrNameLst>
+                                          <p:attrName>style.visibility</p:attrName>
+                                        </p:attrNameLst>
+                                      </p:cBhvr>
+                                      <p:to>
+                                        <p:strVal val="hidden"/>
+                                      </p:to>
+                                    </p:set>
+                                  </p:childTnLst>
+                                </p:cTn>
+                              </p:par>
+                              <p:par>
+                                <p:cTn id="11" presetID="10" presetClass="entr" presetSubtype="0" fill="hold" nodeType="withEffect">
+                                  <p:stCondLst>
+                                    <p:cond delay="0"/>
+                                  </p:stCondLst>
+                                  <p:childTnLst>
+                                    <p:set>
+                                      <p:cBhvr>
+                                        <p:cTn id="12" dur="1" fill="hold">
+                                          <p:stCondLst>
+                                            <p:cond delay="0"/>
+                                          </p:stCondLst>
+                                        </p:cTn>
+                                        <p:tgtEl>
+                                          <p:spTgt spid="12"/>
+                                        </p:tgtEl>
+                                        <p:attrNameLst>
+                                          <p:attrName>style.visibility</p:attrName>
+                                        </p:attrNameLst>
+                                      </p:cBhvr>
+                                      <p:to>
+                                        <p:strVal val="visible"/>
+                                      </p:to>
+                                    </p:set>
+                                    <p:animEffect transition="in" filter="fade">
+                                      <p:cBhvr>
+                                        <p:cTn id="13" dur="500"/>
+                                        <p:tgtEl>
+                                          <p:spTgt spid="12"/>
+                                        </p:tgtEl>
+                                      </p:cBhvr>
+                                    </p:animEffect>
+                                  </p:childTnLst>
+                                </p:cTn>
+                              </p:par>
+                            </p:childTnLst>
+                          </p:cTn>
+                        </p:par>
+                      </p:childTnLst>
+                    </p:cTn>
+                  </p:par>
+                  <p:par>
+                    <p:cTn id="14" fill="hold">
+                      <p:stCondLst>
+                        <p:cond delay="indefinite"/>
+                      </p:stCondLst>
+                      <p:childTnLst>
+                        <p:par>
+                          <p:cTn id="15" fill="hold">
+                            <p:stCondLst>
+                              <p:cond delay="0"/>
+                            </p:stCondLst>
+                            <p:childTnLst>
+                              <p:par>
+                                <p:cTn id="16" presetID="10" presetClass="exit" presetSubtype="0" fill="hold" nodeType="clickEffect">
+                                  <p:stCondLst>
+                                    <p:cond delay="0"/>
+                                  </p:stCondLst>
+                                  <p:childTnLst>
+                                    <p:animEffect transition="out" filter="fade">
+                                      <p:cBhvr>
+                                        <p:cTn id="17" dur="500"/>
+                                        <p:tgtEl>
+                                          <p:spTgt spid="12"/>
+                                        </p:tgtEl>
+                                      </p:cBhvr>
+                                    </p:animEffect>
+                                    <p:set>
+                                      <p:cBhvr>
+                                        <p:cTn id="18" dur="1" fill="hold">
+                                          <p:stCondLst>
+                                            <p:cond delay="499"/>
+                                          </p:stCondLst>
+                                        </p:cTn>
+                                        <p:tgtEl>
+                                          <p:spTgt spid="12"/>
+                                        </p:tgtEl>
+                                        <p:attrNameLst>
+                                          <p:attrName>style.visibility</p:attrName>
+                                        </p:attrNameLst>
+                                      </p:cBhvr>
+                                      <p:to>
+                                        <p:strVal val="hidden"/>
+                                      </p:to>
+                                    </p:set>
+                                  </p:childTnLst>
+                                </p:cTn>
+                              </p:par>
+                              <p:par>
+                                <p:cTn id="19" presetID="10" presetClass="entr" presetSubtype="0" fill="hold" nodeType="withEffect">
+                                  <p:stCondLst>
+                                    <p:cond delay="0"/>
+                                  </p:stCondLst>
+                                  <p:childTnLst>
+                                    <p:set>
+                                      <p:cBhvr>
+                                        <p:cTn id="20" dur="1" fill="hold">
+                                          <p:stCondLst>
+                                            <p:cond delay="0"/>
+                                          </p:stCondLst>
+                                        </p:cTn>
+                                        <p:tgtEl>
+                                          <p:spTgt spid="19"/>
+                                        </p:tgtEl>
+                                        <p:attrNameLst>
+                                          <p:attrName>style.visibility</p:attrName>
+                                        </p:attrNameLst>
+                                      </p:cBhvr>
+                                      <p:to>
+                                        <p:strVal val="visible"/>
+                                      </p:to>
+                                    </p:set>
+                                    <p:animEffect transition="in" filter="fade">
+                                      <p:cBhvr>
+                                        <p:cTn id="21" dur="500"/>
+                                        <p:tgtEl>
+                                          <p:spTgt spid="19"/>
+                                        </p:tgtEl>
+                                      </p:cBhvr>
+                                    </p:animEffect>
+                                  </p:childTnLst>
+                                </p:cTn>
+                              </p:par>
+                            </p:childTnLst>
+                          </p:cTn>
+                        </p:par>
+                      </p:childTnLst>
+                    </p:cTn>
+                  </p:par>
+                  <p:par>
+                    <p:cTn id="22" fill="hold">
+                      <p:stCondLst>
+                        <p:cond delay="indefinite"/>
+                      </p:stCondLst>
+                      <p:childTnLst>
+                        <p:par>
+                          <p:cTn id="23" fill="hold">
+                            <p:stCondLst>
+                              <p:cond delay="0"/>
+                            </p:stCondLst>
+                            <p:childTnLst>
+                              <p:par>
+                                <p:cTn id="24" presetID="10" presetClass="exit" presetSubtype="0" fill="hold" nodeType="clickEffect">
+                                  <p:stCondLst>
+                                    <p:cond delay="0"/>
+                                  </p:stCondLst>
+                                  <p:childTnLst>
+                                    <p:animEffect transition="out" filter="fade">
+                                      <p:cBhvr>
+                                        <p:cTn id="25" dur="500"/>
+                                        <p:tgtEl>
+                                          <p:spTgt spid="19"/>
+                                        </p:tgtEl>
+                                      </p:cBhvr>
+                                    </p:animEffect>
+                                    <p:set>
+                                      <p:cBhvr>
+                                        <p:cTn id="26" dur="1" fill="hold">
+                                          <p:stCondLst>
+                                            <p:cond delay="499"/>
+                                          </p:stCondLst>
+                                        </p:cTn>
+                                        <p:tgtEl>
+                                          <p:spTgt spid="19"/>
+                                        </p:tgtEl>
+                                        <p:attrNameLst>
+                                          <p:attrName>style.visibility</p:attrName>
+                                        </p:attrNameLst>
+                                      </p:cBhvr>
+                                      <p:to>
+                                        <p:strVal val="hidden"/>
+                                      </p:to>
+                                    </p:set>
+                                  </p:childTnLst>
+                                </p:cTn>
+                              </p:par>
+                              <p:par>
+                                <p:cTn id="27" presetID="10" presetClass="entr" presetSubtype="0" fill="hold" nodeType="withEffect">
+                                  <p:stCondLst>
+                                    <p:cond delay="0"/>
+                                  </p:stCondLst>
+                                  <p:childTnLst>
+                                    <p:set>
+                                      <p:cBhvr>
+                                        <p:cTn id="28" dur="1" fill="hold">
+                                          <p:stCondLst>
+                                            <p:cond delay="0"/>
+                                          </p:stCondLst>
+                                        </p:cTn>
+                                        <p:tgtEl>
+                                          <p:spTgt spid="20"/>
+                                        </p:tgtEl>
+                                        <p:attrNameLst>
+                                          <p:attrName>style.visibility</p:attrName>
+                                        </p:attrNameLst>
+                                      </p:cBhvr>
+                                      <p:to>
+                                        <p:strVal val="visible"/>
+                                      </p:to>
+                                    </p:set>
+                                    <p:animEffect transition="in" filter="fade">
+                                      <p:cBhvr>
+                                        <p:cTn id="29" dur="500"/>
+                                        <p:tgtEl>
+                                          <p:spTgt spid="20"/>
+                                        </p:tgtEl>
+                                      </p:cBhvr>
+                                    </p:animEffect>
+                                  </p:childTnLst>
+                                </p:cTn>
+                              </p:par>
+                            </p:childTnLst>
+                          </p:cTn>
+                        </p:par>
+                      </p:childTnLst>
+                    </p:cTn>
+                  </p:par>
+                  <p:par>
+                    <p:cTn id="30" fill="hold">
+                      <p:stCondLst>
+                        <p:cond delay="indefinite"/>
+                      </p:stCondLst>
+                      <p:childTnLst>
+                        <p:par>
+                          <p:cTn id="31" fill="hold">
+                            <p:stCondLst>
+                              <p:cond delay="0"/>
+                            </p:stCondLst>
+                            <p:childTnLst>
+                              <p:par>
+                                <p:cTn id="32" presetID="10" presetClass="entr" presetSubtype="0" fill="hold" nodeType="clickEffect">
+                                  <p:stCondLst>
+                                    <p:cond delay="0"/>
+                                  </p:stCondLst>
+                                  <p:childTnLst>
+                                    <p:set>
+                                      <p:cBhvr>
+                                        <p:cTn id="33" dur="1" fill="hold">
+                                          <p:stCondLst>
+                                            <p:cond delay="0"/>
+                                          </p:stCondLst>
+                                        </p:cTn>
+                                        <p:tgtEl>
+                                          <p:spTgt spid="21"/>
+                                        </p:tgtEl>
+                                        <p:attrNameLst>
+                                          <p:attrName>style.visibility</p:attrName>
+                                        </p:attrNameLst>
+                                      </p:cBhvr>
+                                      <p:to>
+                                        <p:strVal val="visible"/>
+                                      </p:to>
+                                    </p:set>
+                                    <p:animEffect transition="in" filter="fade">
+                                      <p:cBhvr>
+                                        <p:cTn id="34" dur="500"/>
+                                        <p:tgtEl>
+                                          <p:spTgt spid="21"/>
+                                        </p:tgtEl>
+                                      </p:cBhvr>
+                                    </p:animEffect>
+                                  </p:childTnLst>
+                                </p:cTn>
+                              </p:par>
+                            </p:childTnLst>
+                          </p:cTn>
+                        </p:par>
+                      </p:childTnLst>
+                    </p:cTn>
+                  </p:par>
+                  <p:par>
+                    <p:cTn id="35" fill="hold">
+                      <p:stCondLst>
+                        <p:cond delay="indefinite"/>
+                      </p:stCondLst>
+                      <p:childTnLst>
+                        <p:par>
+                          <p:cTn id="36" fill="hold">
+                            <p:stCondLst>
+                              <p:cond delay="0"/>
+                            </p:stCondLst>
+                            <p:childTnLst>
+                              <p:par>
+                                <p:cTn id="37" presetID="10" presetClass="exit" presetSubtype="0" fill="hold" nodeType="clickEffect">
+                                  <p:stCondLst>
+                                    <p:cond delay="0"/>
+                                  </p:stCondLst>
+                                  <p:childTnLst>
+                                    <p:animEffect transition="out" filter="fade">
+                                      <p:cBhvr>
+                                        <p:cTn id="38" dur="500"/>
+                                        <p:tgtEl>
+                                          <p:spTgt spid="20"/>
+                                        </p:tgtEl>
+                                      </p:cBhvr>
+                                    </p:animEffect>
+                                    <p:set>
+                                      <p:cBhvr>
+                                        <p:cTn id="39" dur="1" fill="hold">
+                                          <p:stCondLst>
+                                            <p:cond delay="499"/>
+                                          </p:stCondLst>
+                                        </p:cTn>
+                                        <p:tgtEl>
+                                          <p:spTgt spid="20"/>
+                                        </p:tgtEl>
+                                        <p:attrNameLst>
+                                          <p:attrName>style.visibility</p:attrName>
+                                        </p:attrNameLst>
+                                      </p:cBhvr>
+                                      <p:to>
+                                        <p:strVal val="hidden"/>
+                                      </p:to>
+                                    </p:set>
+                                  </p:childTnLst>
+                                </p:cTn>
+                              </p:par>
+                              <p:par>
+                                <p:cTn id="40" presetID="10" presetClass="exit" presetSubtype="0" fill="hold" nodeType="withEffect">
+                                  <p:stCondLst>
+                                    <p:cond delay="0"/>
+                                  </p:stCondLst>
+                                  <p:childTnLst>
+                                    <p:animEffect transition="out" filter="fade">
+                                      <p:cBhvr>
+                                        <p:cTn id="41" dur="500"/>
+                                        <p:tgtEl>
+                                          <p:spTgt spid="21"/>
+                                        </p:tgtEl>
+                                      </p:cBhvr>
+                                    </p:animEffect>
+                                    <p:set>
+                                      <p:cBhvr>
+                                        <p:cTn id="42" dur="1" fill="hold">
+                                          <p:stCondLst>
+                                            <p:cond delay="499"/>
+                                          </p:stCondLst>
+                                        </p:cTn>
+                                        <p:tgtEl>
+                                          <p:spTgt spid="21"/>
+                                        </p:tgtEl>
+                                        <p:attrNameLst>
+                                          <p:attrName>style.visibility</p:attrName>
+                                        </p:attrNameLst>
+                                      </p:cBhvr>
+                                      <p:to>
+                                        <p:strVal val="hidden"/>
+                                      </p:to>
+                                    </p:set>
+                                  </p:childTnLst>
+                                </p:cTn>
+                              </p:par>
+                              <p:par>
+                                <p:cTn id="43" presetID="10" presetClass="entr" presetSubtype="0" fill="hold" nodeType="withEffect">
+                                  <p:stCondLst>
+                                    <p:cond delay="0"/>
+                                  </p:stCondLst>
+                                  <p:childTnLst>
+                                    <p:set>
+                                      <p:cBhvr>
+                                        <p:cTn id="44" dur="1" fill="hold">
+                                          <p:stCondLst>
+                                            <p:cond delay="0"/>
+                                          </p:stCondLst>
+                                        </p:cTn>
+                                        <p:tgtEl>
+                                          <p:spTgt spid="23"/>
+                                        </p:tgtEl>
+                                        <p:attrNameLst>
+                                          <p:attrName>style.visibility</p:attrName>
+                                        </p:attrNameLst>
+                                      </p:cBhvr>
+                                      <p:to>
+                                        <p:strVal val="visible"/>
+                                      </p:to>
+                                    </p:set>
+                                    <p:animEffect transition="in" filter="fade">
+                                      <p:cBhvr>
+                                        <p:cTn id="45" dur="500"/>
+                                        <p:tgtEl>
+                                          <p:spTgt spid="23"/>
+                                        </p:tgtEl>
+                                      </p:cBhvr>
+                                    </p:animEffect>
+                                  </p:childTnLst>
+                                </p:cTn>
+                              </p:par>
+                            </p:childTnLst>
+                          </p:cTn>
+                        </p:par>
+                      </p:childTnLst>
+                    </p:cTn>
+                  </p:par>
+                  <p:par>
+                    <p:cTn id="46" fill="hold">
+                      <p:stCondLst>
+                        <p:cond delay="indefinite"/>
+                      </p:stCondLst>
+                      <p:childTnLst>
+                        <p:par>
+                          <p:cTn id="47" fill="hold">
+                            <p:stCondLst>
+                              <p:cond delay="0"/>
+                            </p:stCondLst>
+                            <p:childTnLst>
+                              <p:par>
+                                <p:cTn id="48" presetID="10" presetClass="exit" presetSubtype="0" fill="hold" nodeType="clickEffect">
+                                  <p:stCondLst>
+                                    <p:cond delay="0"/>
+                                  </p:stCondLst>
+                                  <p:childTnLst>
+                                    <p:animEffect transition="out" filter="fade">
+                                      <p:cBhvr>
+                                        <p:cTn id="49" dur="500"/>
+                                        <p:tgtEl>
+                                          <p:spTgt spid="23"/>
+                                        </p:tgtEl>
+                                      </p:cBhvr>
+                                    </p:animEffect>
+                                    <p:set>
+                                      <p:cBhvr>
+                                        <p:cTn id="50" dur="1" fill="hold">
+                                          <p:stCondLst>
+                                            <p:cond delay="499"/>
+                                          </p:stCondLst>
+                                        </p:cTn>
+                                        <p:tgtEl>
+                                          <p:spTgt spid="23"/>
+                                        </p:tgtEl>
+                                        <p:attrNameLst>
+                                          <p:attrName>style.visibility</p:attrName>
+                                        </p:attrNameLst>
+                                      </p:cBhvr>
+                                      <p:to>
+                                        <p:strVal val="hidden"/>
+                                      </p:to>
+                                    </p:set>
+                                  </p:childTnLst>
+                                </p:cTn>
+                              </p:par>
+                              <p:par>
+                                <p:cTn id="51" presetID="10" presetClass="exit" presetSubtype="0" fill="hold" grpId="1" nodeType="withEffect">
+                                  <p:stCondLst>
+                                    <p:cond delay="0"/>
+                                  </p:stCondLst>
+                                  <p:childTnLst>
+                                    <p:animEffect transition="out" filter="fade">
+                                      <p:cBhvr>
+                                        <p:cTn id="52" dur="500"/>
+                                        <p:tgtEl>
+                                          <p:spTgt spid="24"/>
+                                        </p:tgtEl>
+                                      </p:cBhvr>
+                                    </p:animEffect>
+                                    <p:set>
+                                      <p:cBhvr>
+                                        <p:cTn id="53" dur="1" fill="hold">
+                                          <p:stCondLst>
+                                            <p:cond delay="499"/>
+                                          </p:stCondLst>
+                                        </p:cTn>
+                                        <p:tgtEl>
+                                          <p:spTgt spid="24"/>
+                                        </p:tgtEl>
+                                        <p:attrNameLst>
+                                          <p:attrName>style.visibility</p:attrName>
+                                        </p:attrNameLst>
+                                      </p:cBhvr>
+                                      <p:to>
+                                        <p:strVal val="hidden"/>
+                                      </p:to>
+                                    </p:set>
+                                  </p:childTnLst>
+                                </p:cTn>
+                              </p:par>
+                              <p:par>
+                                <p:cTn id="54" presetID="10" presetClass="entr" presetSubtype="0" fill="hold" nodeType="withEffect">
+                                  <p:stCondLst>
+                                    <p:cond delay="0"/>
+                                  </p:stCondLst>
+                                  <p:childTnLst>
+                                    <p:set>
+                                      <p:cBhvr>
+                                        <p:cTn id="55" dur="1" fill="hold">
+                                          <p:stCondLst>
+                                            <p:cond delay="0"/>
+                                          </p:stCondLst>
+                                        </p:cTn>
+                                        <p:tgtEl>
+                                          <p:spTgt spid="5"/>
+                                        </p:tgtEl>
+                                        <p:attrNameLst>
+                                          <p:attrName>style.visibility</p:attrName>
+                                        </p:attrNameLst>
+                                      </p:cBhvr>
+                                      <p:to>
+                                        <p:strVal val="visible"/>
+                                      </p:to>
+                                    </p:set>
+                                    <p:animEffect transition="in" filter="fade">
+                                      <p:cBhvr>
+                                        <p:cTn id="56" dur="500"/>
+                                        <p:tgtEl>
+                                          <p:spTgt spid="5"/>
+                                        </p:tgtEl>
+                                      </p:cBhvr>
+                                    </p:animEffect>
+                                  </p:childTnLst>
+                                </p:cTn>
+                              </p:par>
+                            </p:childTnLst>
+                          </p:cTn>
+                        </p:par>
+                      </p:childTnLst>
+                    </p:cTn>
+                  </p:par>
+                </p:childTnLst>
+              </p:cTn>
+              <p:prevCondLst>
+                <p:cond evt="onPrev" delay="0">
+                  <p:tgtEl>
+                    <p:sldTgt/>
+                  </p:tgtEl>
+                </p:cond>
+              </p:prevCondLst>
+              <p:nextCondLst>
+                <p:cond evt="onNext" delay="0">
+                  <p:tgtEl>
+                    <p:sldTgt/>
+                  </p:tgtEl>
+                </p:cond>
+              </p:nextCondLst>
+            </p:seq>
+          </p:childTnLst>
+        </p:cTn>
+      </p:par>
+    </p:tnLst>
+    <p:bldLst>
+      <p:bldP spid="24" grpId="0" animBg="1"/>
+      <p:bldP spid="24" grpId="1" animBg="1"/>
+    </p:bldLst>
+  </p:timing>
+</p:sld>
+</file>
+
+<file path=ppt/slides/slide12.xml><?xml version="1.0" encoding="utf-8"?>
 <p:sld xmlns:a="http://schemas.openxmlformats.org/drawingml/2006/main" xmlns:r="http://schemas.openxmlformats.org/officeDocument/2006/relationships" xmlns:p="http://schemas.openxmlformats.org/presentationml/2006/main">
   <p:cSld>
     <p:spTree>
@@ -30030,7 +31421,6 @@
               <a:rPr lang="fr-FR" sz="2000" dirty="0" smtClean="0"/>
               <a:t> user guide</a:t>
             </a:r>
-            <a:endParaRPr lang="fr-FR" sz="2000" dirty="0" smtClean="0"/>
           </a:p>
           <a:p>
             <a:pPr algn="just"/>
@@ -30058,7 +31448,6 @@
               <a:rPr lang="fr-FR" sz="2000" dirty="0" smtClean="0"/>
               <a:t> plots</a:t>
             </a:r>
-            <a:endParaRPr lang="fr-FR" sz="2000" dirty="0" smtClean="0"/>
           </a:p>
           <a:p>
             <a:pPr algn="just"/>

</xml_diff>